<commit_message>
Update image assets and presentation file
</commit_message>
<xml_diff>
--- a/docs/pptx/presentation.pptx
+++ b/docs/pptx/presentation.pptx
@@ -4,10 +4,18 @@
   <p:sldMasterIdLst>
     <p:sldMasterId id="2147483648" r:id="rId1"/>
   </p:sldMasterIdLst>
+  <p:notesMasterIdLst>
+    <p:notesMasterId r:id="rId10"/>
+  </p:notesMasterIdLst>
   <p:sldIdLst>
     <p:sldId id="268" r:id="rId2"/>
     <p:sldId id="264" r:id="rId3"/>
     <p:sldId id="267" r:id="rId4"/>
+    <p:sldId id="266" r:id="rId5"/>
+    <p:sldId id="273" r:id="rId6"/>
+    <p:sldId id="274" r:id="rId7"/>
+    <p:sldId id="275" r:id="rId8"/>
+    <p:sldId id="276" r:id="rId9"/>
   </p:sldIdLst>
   <p:sldSz cx="12192000" cy="6858000"/>
   <p:notesSz cx="6858000" cy="9144000"/>
@@ -107,6 +115,26 @@
     </a:lvl9pPr>
   </p:defaultTextStyle>
   <p:extLst>
+    <p:ext uri="{521415D9-36F7-43E2-AB2F-B90AF26B5E84}">
+      <p14:sectionLst xmlns:p14="http://schemas.microsoft.com/office/powerpoint/2010/main">
+        <p14:section name="Start" id="{0ED8C0E4-2B11-4D41-A936-8144C29CEDB4}">
+          <p14:sldIdLst>
+            <p14:sldId id="268"/>
+            <p14:sldId id="264"/>
+            <p14:sldId id="267"/>
+          </p14:sldIdLst>
+        </p14:section>
+        <p14:section name="The Team" id="{70D90DC9-6066-4B18-8F67-B9EA86E54289}">
+          <p14:sldIdLst>
+            <p14:sldId id="266"/>
+            <p14:sldId id="273"/>
+            <p14:sldId id="274"/>
+            <p14:sldId id="275"/>
+            <p14:sldId id="276"/>
+          </p14:sldIdLst>
+        </p14:section>
+      </p14:sectionLst>
+    </p:ext>
     <p:ext uri="{EFAFB233-063F-42B5-8137-9DF3F51BA10A}">
       <p15:sldGuideLst xmlns:p15="http://schemas.microsoft.com/office/powerpoint/2012/main"/>
     </p:ext>
@@ -114,302 +142,14 @@
 </p:presentation>
 </file>
 
+<file path=ppt/authors.xml><?xml version="1.0" encoding="utf-8"?>
+<p188:authorLst xmlns:a="http://schemas.openxmlformats.org/drawingml/2006/main" xmlns:r="http://schemas.openxmlformats.org/officeDocument/2006/relationships" xmlns:p188="http://schemas.microsoft.com/office/powerpoint/2018/8/main">
+  <p188:author id="{3FD63471-C24D-D332-D512-AB20B0423CA0}" name="Elias De Hondt" initials="ED" userId="3b92d85b72b00998" providerId="Windows Live"/>
+</p188:authorLst>
+</file>
+
 <file path=ppt/changesInfos/changesInfo1.xml><?xml version="1.0" encoding="utf-8"?>
 <pc:chgInfo xmlns:a="http://schemas.openxmlformats.org/drawingml/2006/main" xmlns:r="http://schemas.openxmlformats.org/officeDocument/2006/relationships" xmlns:ac="http://schemas.microsoft.com/office/drawing/2013/main/command" xmlns:pc="http://schemas.microsoft.com/office/powerpoint/2013/main/command">
-  <pc:docChgLst>
-    <pc:chgData name="Elias De Hondt" userId="3b92d85b72b00998" providerId="LiveId" clId="{2F2FD6ED-E68F-4E10-9ACB-6117AA10A7D6}"/>
-    <pc:docChg chg="delSld modSld sldOrd delSection modSection">
-      <pc:chgData name="Elias De Hondt" userId="3b92d85b72b00998" providerId="LiveId" clId="{2F2FD6ED-E68F-4E10-9ACB-6117AA10A7D6}" dt="2025-03-10T12:23:59.394" v="26" actId="17851"/>
-      <pc:docMkLst>
-        <pc:docMk/>
-      </pc:docMkLst>
-      <pc:sldChg chg="del">
-        <pc:chgData name="Elias De Hondt" userId="3b92d85b72b00998" providerId="LiveId" clId="{2F2FD6ED-E68F-4E10-9ACB-6117AA10A7D6}" dt="2025-03-10T12:23:30.632" v="3" actId="47"/>
-        <pc:sldMkLst>
-          <pc:docMk/>
-          <pc:sldMk cId="309141628" sldId="260"/>
-        </pc:sldMkLst>
-      </pc:sldChg>
-      <pc:sldChg chg="del">
-        <pc:chgData name="Elias De Hondt" userId="3b92d85b72b00998" providerId="LiveId" clId="{2F2FD6ED-E68F-4E10-9ACB-6117AA10A7D6}" dt="2025-03-10T12:23:30.005" v="2" actId="47"/>
-        <pc:sldMkLst>
-          <pc:docMk/>
-          <pc:sldMk cId="1635829816" sldId="262"/>
-        </pc:sldMkLst>
-      </pc:sldChg>
-      <pc:sldChg chg="ord">
-        <pc:chgData name="Elias De Hondt" userId="3b92d85b72b00998" providerId="LiveId" clId="{2F2FD6ED-E68F-4E10-9ACB-6117AA10A7D6}" dt="2025-03-10T12:23:52.290" v="25"/>
-        <pc:sldMkLst>
-          <pc:docMk/>
-          <pc:sldMk cId="200142806" sldId="264"/>
-        </pc:sldMkLst>
-      </pc:sldChg>
-      <pc:sldChg chg="del">
-        <pc:chgData name="Elias De Hondt" userId="3b92d85b72b00998" providerId="LiveId" clId="{2F2FD6ED-E68F-4E10-9ACB-6117AA10A7D6}" dt="2025-03-10T12:23:29.341" v="1" actId="47"/>
-        <pc:sldMkLst>
-          <pc:docMk/>
-          <pc:sldMk cId="947095383" sldId="266"/>
-        </pc:sldMkLst>
-      </pc:sldChg>
-      <pc:sldChg chg="ord">
-        <pc:chgData name="Elias De Hondt" userId="3b92d85b72b00998" providerId="LiveId" clId="{2F2FD6ED-E68F-4E10-9ACB-6117AA10A7D6}" dt="2025-03-10T12:23:52.290" v="25"/>
-        <pc:sldMkLst>
-          <pc:docMk/>
-          <pc:sldMk cId="3630277553" sldId="267"/>
-        </pc:sldMkLst>
-      </pc:sldChg>
-      <pc:sldChg chg="ord">
-        <pc:chgData name="Elias De Hondt" userId="3b92d85b72b00998" providerId="LiveId" clId="{2F2FD6ED-E68F-4E10-9ACB-6117AA10A7D6}" dt="2025-03-10T12:23:52.290" v="25"/>
-        <pc:sldMkLst>
-          <pc:docMk/>
-          <pc:sldMk cId="346494623" sldId="268"/>
-        </pc:sldMkLst>
-      </pc:sldChg>
-      <pc:sldChg chg="del">
-        <pc:chgData name="Elias De Hondt" userId="3b92d85b72b00998" providerId="LiveId" clId="{2F2FD6ED-E68F-4E10-9ACB-6117AA10A7D6}" dt="2025-03-10T12:23:35.971" v="11" actId="47"/>
-        <pc:sldMkLst>
-          <pc:docMk/>
-          <pc:sldMk cId="1693724240" sldId="269"/>
-        </pc:sldMkLst>
-      </pc:sldChg>
-      <pc:sldChg chg="del">
-        <pc:chgData name="Elias De Hondt" userId="3b92d85b72b00998" providerId="LiveId" clId="{2F2FD6ED-E68F-4E10-9ACB-6117AA10A7D6}" dt="2025-03-10T12:23:36.673" v="12" actId="47"/>
-        <pc:sldMkLst>
-          <pc:docMk/>
-          <pc:sldMk cId="3180204086" sldId="270"/>
-        </pc:sldMkLst>
-      </pc:sldChg>
-      <pc:sldChg chg="del">
-        <pc:chgData name="Elias De Hondt" userId="3b92d85b72b00998" providerId="LiveId" clId="{2F2FD6ED-E68F-4E10-9ACB-6117AA10A7D6}" dt="2025-03-10T12:23:37.337" v="13" actId="47"/>
-        <pc:sldMkLst>
-          <pc:docMk/>
-          <pc:sldMk cId="1339890587" sldId="271"/>
-        </pc:sldMkLst>
-      </pc:sldChg>
-      <pc:sldChg chg="del">
-        <pc:chgData name="Elias De Hondt" userId="3b92d85b72b00998" providerId="LiveId" clId="{2F2FD6ED-E68F-4E10-9ACB-6117AA10A7D6}" dt="2025-03-10T12:23:31.261" v="4" actId="47"/>
-        <pc:sldMkLst>
-          <pc:docMk/>
-          <pc:sldMk cId="1756481023" sldId="272"/>
-        </pc:sldMkLst>
-      </pc:sldChg>
-      <pc:sldChg chg="del">
-        <pc:chgData name="Elias De Hondt" userId="3b92d85b72b00998" providerId="LiveId" clId="{2F2FD6ED-E68F-4E10-9ACB-6117AA10A7D6}" dt="2025-03-10T12:23:31.916" v="5" actId="47"/>
-        <pc:sldMkLst>
-          <pc:docMk/>
-          <pc:sldMk cId="564582124" sldId="273"/>
-        </pc:sldMkLst>
-      </pc:sldChg>
-      <pc:sldChg chg="del">
-        <pc:chgData name="Elias De Hondt" userId="3b92d85b72b00998" providerId="LiveId" clId="{2F2FD6ED-E68F-4E10-9ACB-6117AA10A7D6}" dt="2025-03-10T12:23:32.576" v="6" actId="47"/>
-        <pc:sldMkLst>
-          <pc:docMk/>
-          <pc:sldMk cId="445726379" sldId="274"/>
-        </pc:sldMkLst>
-      </pc:sldChg>
-      <pc:sldChg chg="del">
-        <pc:chgData name="Elias De Hondt" userId="3b92d85b72b00998" providerId="LiveId" clId="{2F2FD6ED-E68F-4E10-9ACB-6117AA10A7D6}" dt="2025-03-10T12:23:33.265" v="7" actId="47"/>
-        <pc:sldMkLst>
-          <pc:docMk/>
-          <pc:sldMk cId="2885291258" sldId="275"/>
-        </pc:sldMkLst>
-      </pc:sldChg>
-      <pc:sldChg chg="del">
-        <pc:chgData name="Elias De Hondt" userId="3b92d85b72b00998" providerId="LiveId" clId="{2F2FD6ED-E68F-4E10-9ACB-6117AA10A7D6}" dt="2025-03-10T12:23:34.007" v="8" actId="47"/>
-        <pc:sldMkLst>
-          <pc:docMk/>
-          <pc:sldMk cId="31916419" sldId="276"/>
-        </pc:sldMkLst>
-      </pc:sldChg>
-      <pc:sldChg chg="del">
-        <pc:chgData name="Elias De Hondt" userId="3b92d85b72b00998" providerId="LiveId" clId="{2F2FD6ED-E68F-4E10-9ACB-6117AA10A7D6}" dt="2025-03-10T12:23:34.624" v="9" actId="47"/>
-        <pc:sldMkLst>
-          <pc:docMk/>
-          <pc:sldMk cId="2817392180" sldId="277"/>
-        </pc:sldMkLst>
-      </pc:sldChg>
-      <pc:sldChg chg="del">
-        <pc:chgData name="Elias De Hondt" userId="3b92d85b72b00998" providerId="LiveId" clId="{2F2FD6ED-E68F-4E10-9ACB-6117AA10A7D6}" dt="2025-03-10T12:23:35.249" v="10" actId="47"/>
-        <pc:sldMkLst>
-          <pc:docMk/>
-          <pc:sldMk cId="2925493796" sldId="278"/>
-        </pc:sldMkLst>
-      </pc:sldChg>
-      <pc:sldChg chg="del">
-        <pc:chgData name="Elias De Hondt" userId="3b92d85b72b00998" providerId="LiveId" clId="{2F2FD6ED-E68F-4E10-9ACB-6117AA10A7D6}" dt="2025-03-10T12:23:28.467" v="0" actId="47"/>
-        <pc:sldMkLst>
-          <pc:docMk/>
-          <pc:sldMk cId="3550550909" sldId="283"/>
-        </pc:sldMkLst>
-      </pc:sldChg>
-      <pc:sldChg chg="del">
-        <pc:chgData name="Elias De Hondt" userId="3b92d85b72b00998" providerId="LiveId" clId="{2F2FD6ED-E68F-4E10-9ACB-6117AA10A7D6}" dt="2025-03-10T12:23:38.885" v="14" actId="47"/>
-        <pc:sldMkLst>
-          <pc:docMk/>
-          <pc:sldMk cId="1363884546" sldId="285"/>
-        </pc:sldMkLst>
-      </pc:sldChg>
-    </pc:docChg>
-  </pc:docChgLst>
-  <pc:docChgLst>
-    <pc:chgData name="Elias De Hondt" userId="3b92d85b72b00998" providerId="LiveId" clId="{E8343391-394F-4C4F-9616-58701B0FCA0F}"/>
-    <pc:docChg chg="custSel addSld delSld modSld sldOrd addSection modSection">
-      <pc:chgData name="Elias De Hondt" userId="3b92d85b72b00998" providerId="LiveId" clId="{E8343391-394F-4C4F-9616-58701B0FCA0F}" dt="2025-01-09T19:31:51.581" v="343" actId="17846"/>
-      <pc:docMkLst>
-        <pc:docMk/>
-      </pc:docMkLst>
-      <pc:sldChg chg="modTransition">
-        <pc:chgData name="Elias De Hondt" userId="3b92d85b72b00998" providerId="LiveId" clId="{E8343391-394F-4C4F-9616-58701B0FCA0F}" dt="2025-01-07T17:21:16.084" v="233"/>
-        <pc:sldMkLst>
-          <pc:docMk/>
-          <pc:sldMk cId="309141628" sldId="260"/>
-        </pc:sldMkLst>
-      </pc:sldChg>
-      <pc:sldChg chg="modTransition">
-        <pc:chgData name="Elias De Hondt" userId="3b92d85b72b00998" providerId="LiveId" clId="{E8343391-394F-4C4F-9616-58701B0FCA0F}" dt="2025-01-07T17:21:16.084" v="233"/>
-        <pc:sldMkLst>
-          <pc:docMk/>
-          <pc:sldMk cId="1635829816" sldId="262"/>
-        </pc:sldMkLst>
-      </pc:sldChg>
-      <pc:sldChg chg="del modTransition">
-        <pc:chgData name="Elias De Hondt" userId="3b92d85b72b00998" providerId="LiveId" clId="{E8343391-394F-4C4F-9616-58701B0FCA0F}" dt="2025-01-07T15:39:47.097" v="229" actId="47"/>
-        <pc:sldMkLst>
-          <pc:docMk/>
-          <pc:sldMk cId="277346045" sldId="263"/>
-        </pc:sldMkLst>
-      </pc:sldChg>
-      <pc:sldChg chg="modTransition">
-        <pc:chgData name="Elias De Hondt" userId="3b92d85b72b00998" providerId="LiveId" clId="{E8343391-394F-4C4F-9616-58701B0FCA0F}" dt="2025-01-07T17:21:16.084" v="233"/>
-        <pc:sldMkLst>
-          <pc:docMk/>
-          <pc:sldMk cId="200142806" sldId="264"/>
-        </pc:sldMkLst>
-      </pc:sldChg>
-      <pc:sldChg chg="addSp delSp modSp add del mod ord modTransition">
-        <pc:chgData name="Elias De Hondt" userId="3b92d85b72b00998" providerId="LiveId" clId="{E8343391-394F-4C4F-9616-58701B0FCA0F}" dt="2025-01-07T15:38:24.397" v="21" actId="47"/>
-        <pc:sldMkLst>
-          <pc:docMk/>
-          <pc:sldMk cId="2148487984" sldId="265"/>
-        </pc:sldMkLst>
-      </pc:sldChg>
-      <pc:sldChg chg="modSp add mod ord modTransition">
-        <pc:chgData name="Elias De Hondt" userId="3b92d85b72b00998" providerId="LiveId" clId="{E8343391-394F-4C4F-9616-58701B0FCA0F}" dt="2025-01-07T17:21:16.084" v="233"/>
-        <pc:sldMkLst>
-          <pc:docMk/>
-          <pc:sldMk cId="947095383" sldId="266"/>
-        </pc:sldMkLst>
-      </pc:sldChg>
-      <pc:sldChg chg="add ord modTransition">
-        <pc:chgData name="Elias De Hondt" userId="3b92d85b72b00998" providerId="LiveId" clId="{E8343391-394F-4C4F-9616-58701B0FCA0F}" dt="2025-01-07T17:21:16.084" v="233"/>
-        <pc:sldMkLst>
-          <pc:docMk/>
-          <pc:sldMk cId="3630277553" sldId="267"/>
-        </pc:sldMkLst>
-      </pc:sldChg>
-      <pc:sldChg chg="add ord modTransition">
-        <pc:chgData name="Elias De Hondt" userId="3b92d85b72b00998" providerId="LiveId" clId="{E8343391-394F-4C4F-9616-58701B0FCA0F}" dt="2025-01-07T17:21:16.084" v="233"/>
-        <pc:sldMkLst>
-          <pc:docMk/>
-          <pc:sldMk cId="346494623" sldId="268"/>
-        </pc:sldMkLst>
-      </pc:sldChg>
-      <pc:sldChg chg="modSp add mod ord">
-        <pc:chgData name="Elias De Hondt" userId="3b92d85b72b00998" providerId="LiveId" clId="{E8343391-394F-4C4F-9616-58701B0FCA0F}" dt="2025-01-09T19:30:24.849" v="337"/>
-        <pc:sldMkLst>
-          <pc:docMk/>
-          <pc:sldMk cId="1693724240" sldId="269"/>
-        </pc:sldMkLst>
-        <pc:spChg chg="mod">
-          <ac:chgData name="Elias De Hondt" userId="3b92d85b72b00998" providerId="LiveId" clId="{E8343391-394F-4C4F-9616-58701B0FCA0F}" dt="2025-01-09T15:11:34.204" v="329" actId="1035"/>
-          <ac:spMkLst>
-            <pc:docMk/>
-            <pc:sldMk cId="1693724240" sldId="269"/>
-            <ac:spMk id="5" creationId="{1D0C745F-80B8-9BD4-3915-268F93DC3ACE}"/>
-          </ac:spMkLst>
-        </pc:spChg>
-      </pc:sldChg>
-      <pc:sldChg chg="modSp add mod">
-        <pc:chgData name="Elias De Hondt" userId="3b92d85b72b00998" providerId="LiveId" clId="{E8343391-394F-4C4F-9616-58701B0FCA0F}" dt="2025-01-09T15:11:47.819" v="332" actId="20577"/>
-        <pc:sldMkLst>
-          <pc:docMk/>
-          <pc:sldMk cId="3180204086" sldId="270"/>
-        </pc:sldMkLst>
-        <pc:spChg chg="mod">
-          <ac:chgData name="Elias De Hondt" userId="3b92d85b72b00998" providerId="LiveId" clId="{E8343391-394F-4C4F-9616-58701B0FCA0F}" dt="2025-01-09T15:11:47.819" v="332" actId="20577"/>
-          <ac:spMkLst>
-            <pc:docMk/>
-            <pc:sldMk cId="3180204086" sldId="270"/>
-            <ac:spMk id="5" creationId="{3D67B48D-4099-F64F-B093-46F893C4911E}"/>
-          </ac:spMkLst>
-        </pc:spChg>
-      </pc:sldChg>
-      <pc:sldChg chg="modSp add mod">
-        <pc:chgData name="Elias De Hondt" userId="3b92d85b72b00998" providerId="LiveId" clId="{E8343391-394F-4C4F-9616-58701B0FCA0F}" dt="2025-01-09T15:11:50.919" v="333" actId="20577"/>
-        <pc:sldMkLst>
-          <pc:docMk/>
-          <pc:sldMk cId="1339890587" sldId="271"/>
-        </pc:sldMkLst>
-        <pc:spChg chg="mod">
-          <ac:chgData name="Elias De Hondt" userId="3b92d85b72b00998" providerId="LiveId" clId="{E8343391-394F-4C4F-9616-58701B0FCA0F}" dt="2025-01-09T15:11:50.919" v="333" actId="20577"/>
-          <ac:spMkLst>
-            <pc:docMk/>
-            <pc:sldMk cId="1339890587" sldId="271"/>
-            <ac:spMk id="5" creationId="{502D2316-AB77-7A46-C96B-C705FB76B82E}"/>
-          </ac:spMkLst>
-        </pc:spChg>
-      </pc:sldChg>
-      <pc:sldChg chg="add">
-        <pc:chgData name="Elias De Hondt" userId="3b92d85b72b00998" providerId="LiveId" clId="{E8343391-394F-4C4F-9616-58701B0FCA0F}" dt="2025-01-09T19:31:07.262" v="340"/>
-        <pc:sldMkLst>
-          <pc:docMk/>
-          <pc:sldMk cId="1756481023" sldId="272"/>
-        </pc:sldMkLst>
-      </pc:sldChg>
-      <pc:sldChg chg="add">
-        <pc:chgData name="Elias De Hondt" userId="3b92d85b72b00998" providerId="LiveId" clId="{E8343391-394F-4C4F-9616-58701B0FCA0F}" dt="2025-01-09T19:31:07.262" v="340"/>
-        <pc:sldMkLst>
-          <pc:docMk/>
-          <pc:sldMk cId="564582124" sldId="273"/>
-        </pc:sldMkLst>
-      </pc:sldChg>
-      <pc:sldChg chg="add">
-        <pc:chgData name="Elias De Hondt" userId="3b92d85b72b00998" providerId="LiveId" clId="{E8343391-394F-4C4F-9616-58701B0FCA0F}" dt="2025-01-09T19:31:07.262" v="340"/>
-        <pc:sldMkLst>
-          <pc:docMk/>
-          <pc:sldMk cId="445726379" sldId="274"/>
-        </pc:sldMkLst>
-      </pc:sldChg>
-      <pc:sldChg chg="add">
-        <pc:chgData name="Elias De Hondt" userId="3b92d85b72b00998" providerId="LiveId" clId="{E8343391-394F-4C4F-9616-58701B0FCA0F}" dt="2025-01-09T19:31:07.262" v="340"/>
-        <pc:sldMkLst>
-          <pc:docMk/>
-          <pc:sldMk cId="2885291258" sldId="275"/>
-        </pc:sldMkLst>
-      </pc:sldChg>
-      <pc:sldChg chg="add">
-        <pc:chgData name="Elias De Hondt" userId="3b92d85b72b00998" providerId="LiveId" clId="{E8343391-394F-4C4F-9616-58701B0FCA0F}" dt="2025-01-09T19:31:07.262" v="340"/>
-        <pc:sldMkLst>
-          <pc:docMk/>
-          <pc:sldMk cId="31916419" sldId="276"/>
-        </pc:sldMkLst>
-      </pc:sldChg>
-      <pc:sldChg chg="add">
-        <pc:chgData name="Elias De Hondt" userId="3b92d85b72b00998" providerId="LiveId" clId="{E8343391-394F-4C4F-9616-58701B0FCA0F}" dt="2025-01-09T19:31:07.262" v="340"/>
-        <pc:sldMkLst>
-          <pc:docMk/>
-          <pc:sldMk cId="2817392180" sldId="277"/>
-        </pc:sldMkLst>
-      </pc:sldChg>
-      <pc:sldChg chg="add">
-        <pc:chgData name="Elias De Hondt" userId="3b92d85b72b00998" providerId="LiveId" clId="{E8343391-394F-4C4F-9616-58701B0FCA0F}" dt="2025-01-09T19:31:07.262" v="340"/>
-        <pc:sldMkLst>
-          <pc:docMk/>
-          <pc:sldMk cId="2925493796" sldId="278"/>
-        </pc:sldMkLst>
-      </pc:sldChg>
-    </pc:docChg>
-  </pc:docChgLst>
   <pc:docChgLst>
     <pc:chgData name="Elias De Hondt" userId="3b92d85b72b00998" providerId="LiveId" clId="{6158632E-934C-499F-AF52-B4A4CD278010}"/>
     <pc:docChg chg="undo custSel addSld delSld modSld sldOrd addSection delSection modSection">
@@ -826,6 +566,300 @@
     </pc:docChg>
   </pc:docChgLst>
   <pc:docChgLst>
+    <pc:chgData name="Elias De Hondt" userId="3b92d85b72b00998" providerId="LiveId" clId="{E8343391-394F-4C4F-9616-58701B0FCA0F}"/>
+    <pc:docChg chg="custSel addSld delSld modSld sldOrd addSection modSection">
+      <pc:chgData name="Elias De Hondt" userId="3b92d85b72b00998" providerId="LiveId" clId="{E8343391-394F-4C4F-9616-58701B0FCA0F}" dt="2025-01-09T19:31:51.581" v="343" actId="17846"/>
+      <pc:docMkLst>
+        <pc:docMk/>
+      </pc:docMkLst>
+      <pc:sldChg chg="modTransition">
+        <pc:chgData name="Elias De Hondt" userId="3b92d85b72b00998" providerId="LiveId" clId="{E8343391-394F-4C4F-9616-58701B0FCA0F}" dt="2025-01-07T17:21:16.084" v="233"/>
+        <pc:sldMkLst>
+          <pc:docMk/>
+          <pc:sldMk cId="309141628" sldId="260"/>
+        </pc:sldMkLst>
+      </pc:sldChg>
+      <pc:sldChg chg="modTransition">
+        <pc:chgData name="Elias De Hondt" userId="3b92d85b72b00998" providerId="LiveId" clId="{E8343391-394F-4C4F-9616-58701B0FCA0F}" dt="2025-01-07T17:21:16.084" v="233"/>
+        <pc:sldMkLst>
+          <pc:docMk/>
+          <pc:sldMk cId="1635829816" sldId="262"/>
+        </pc:sldMkLst>
+      </pc:sldChg>
+      <pc:sldChg chg="del modTransition">
+        <pc:chgData name="Elias De Hondt" userId="3b92d85b72b00998" providerId="LiveId" clId="{E8343391-394F-4C4F-9616-58701B0FCA0F}" dt="2025-01-07T15:39:47.097" v="229" actId="47"/>
+        <pc:sldMkLst>
+          <pc:docMk/>
+          <pc:sldMk cId="277346045" sldId="263"/>
+        </pc:sldMkLst>
+      </pc:sldChg>
+      <pc:sldChg chg="modTransition">
+        <pc:chgData name="Elias De Hondt" userId="3b92d85b72b00998" providerId="LiveId" clId="{E8343391-394F-4C4F-9616-58701B0FCA0F}" dt="2025-01-07T17:21:16.084" v="233"/>
+        <pc:sldMkLst>
+          <pc:docMk/>
+          <pc:sldMk cId="200142806" sldId="264"/>
+        </pc:sldMkLst>
+      </pc:sldChg>
+      <pc:sldChg chg="addSp delSp modSp add del mod ord modTransition">
+        <pc:chgData name="Elias De Hondt" userId="3b92d85b72b00998" providerId="LiveId" clId="{E8343391-394F-4C4F-9616-58701B0FCA0F}" dt="2025-01-07T15:38:24.397" v="21" actId="47"/>
+        <pc:sldMkLst>
+          <pc:docMk/>
+          <pc:sldMk cId="2148487984" sldId="265"/>
+        </pc:sldMkLst>
+      </pc:sldChg>
+      <pc:sldChg chg="modSp add mod ord modTransition">
+        <pc:chgData name="Elias De Hondt" userId="3b92d85b72b00998" providerId="LiveId" clId="{E8343391-394F-4C4F-9616-58701B0FCA0F}" dt="2025-01-07T17:21:16.084" v="233"/>
+        <pc:sldMkLst>
+          <pc:docMk/>
+          <pc:sldMk cId="947095383" sldId="266"/>
+        </pc:sldMkLst>
+      </pc:sldChg>
+      <pc:sldChg chg="add ord modTransition">
+        <pc:chgData name="Elias De Hondt" userId="3b92d85b72b00998" providerId="LiveId" clId="{E8343391-394F-4C4F-9616-58701B0FCA0F}" dt="2025-01-07T17:21:16.084" v="233"/>
+        <pc:sldMkLst>
+          <pc:docMk/>
+          <pc:sldMk cId="3630277553" sldId="267"/>
+        </pc:sldMkLst>
+      </pc:sldChg>
+      <pc:sldChg chg="add ord modTransition">
+        <pc:chgData name="Elias De Hondt" userId="3b92d85b72b00998" providerId="LiveId" clId="{E8343391-394F-4C4F-9616-58701B0FCA0F}" dt="2025-01-07T17:21:16.084" v="233"/>
+        <pc:sldMkLst>
+          <pc:docMk/>
+          <pc:sldMk cId="346494623" sldId="268"/>
+        </pc:sldMkLst>
+      </pc:sldChg>
+      <pc:sldChg chg="modSp add mod ord">
+        <pc:chgData name="Elias De Hondt" userId="3b92d85b72b00998" providerId="LiveId" clId="{E8343391-394F-4C4F-9616-58701B0FCA0F}" dt="2025-01-09T19:30:24.849" v="337"/>
+        <pc:sldMkLst>
+          <pc:docMk/>
+          <pc:sldMk cId="1693724240" sldId="269"/>
+        </pc:sldMkLst>
+        <pc:spChg chg="mod">
+          <ac:chgData name="Elias De Hondt" userId="3b92d85b72b00998" providerId="LiveId" clId="{E8343391-394F-4C4F-9616-58701B0FCA0F}" dt="2025-01-09T15:11:34.204" v="329" actId="1035"/>
+          <ac:spMkLst>
+            <pc:docMk/>
+            <pc:sldMk cId="1693724240" sldId="269"/>
+            <ac:spMk id="5" creationId="{1D0C745F-80B8-9BD4-3915-268F93DC3ACE}"/>
+          </ac:spMkLst>
+        </pc:spChg>
+      </pc:sldChg>
+      <pc:sldChg chg="modSp add mod">
+        <pc:chgData name="Elias De Hondt" userId="3b92d85b72b00998" providerId="LiveId" clId="{E8343391-394F-4C4F-9616-58701B0FCA0F}" dt="2025-01-09T15:11:47.819" v="332" actId="20577"/>
+        <pc:sldMkLst>
+          <pc:docMk/>
+          <pc:sldMk cId="3180204086" sldId="270"/>
+        </pc:sldMkLst>
+        <pc:spChg chg="mod">
+          <ac:chgData name="Elias De Hondt" userId="3b92d85b72b00998" providerId="LiveId" clId="{E8343391-394F-4C4F-9616-58701B0FCA0F}" dt="2025-01-09T15:11:47.819" v="332" actId="20577"/>
+          <ac:spMkLst>
+            <pc:docMk/>
+            <pc:sldMk cId="3180204086" sldId="270"/>
+            <ac:spMk id="5" creationId="{3D67B48D-4099-F64F-B093-46F893C4911E}"/>
+          </ac:spMkLst>
+        </pc:spChg>
+      </pc:sldChg>
+      <pc:sldChg chg="modSp add mod">
+        <pc:chgData name="Elias De Hondt" userId="3b92d85b72b00998" providerId="LiveId" clId="{E8343391-394F-4C4F-9616-58701B0FCA0F}" dt="2025-01-09T15:11:50.919" v="333" actId="20577"/>
+        <pc:sldMkLst>
+          <pc:docMk/>
+          <pc:sldMk cId="1339890587" sldId="271"/>
+        </pc:sldMkLst>
+        <pc:spChg chg="mod">
+          <ac:chgData name="Elias De Hondt" userId="3b92d85b72b00998" providerId="LiveId" clId="{E8343391-394F-4C4F-9616-58701B0FCA0F}" dt="2025-01-09T15:11:50.919" v="333" actId="20577"/>
+          <ac:spMkLst>
+            <pc:docMk/>
+            <pc:sldMk cId="1339890587" sldId="271"/>
+            <ac:spMk id="5" creationId="{502D2316-AB77-7A46-C96B-C705FB76B82E}"/>
+          </ac:spMkLst>
+        </pc:spChg>
+      </pc:sldChg>
+      <pc:sldChg chg="add">
+        <pc:chgData name="Elias De Hondt" userId="3b92d85b72b00998" providerId="LiveId" clId="{E8343391-394F-4C4F-9616-58701B0FCA0F}" dt="2025-01-09T19:31:07.262" v="340"/>
+        <pc:sldMkLst>
+          <pc:docMk/>
+          <pc:sldMk cId="1756481023" sldId="272"/>
+        </pc:sldMkLst>
+      </pc:sldChg>
+      <pc:sldChg chg="add">
+        <pc:chgData name="Elias De Hondt" userId="3b92d85b72b00998" providerId="LiveId" clId="{E8343391-394F-4C4F-9616-58701B0FCA0F}" dt="2025-01-09T19:31:07.262" v="340"/>
+        <pc:sldMkLst>
+          <pc:docMk/>
+          <pc:sldMk cId="564582124" sldId="273"/>
+        </pc:sldMkLst>
+      </pc:sldChg>
+      <pc:sldChg chg="add">
+        <pc:chgData name="Elias De Hondt" userId="3b92d85b72b00998" providerId="LiveId" clId="{E8343391-394F-4C4F-9616-58701B0FCA0F}" dt="2025-01-09T19:31:07.262" v="340"/>
+        <pc:sldMkLst>
+          <pc:docMk/>
+          <pc:sldMk cId="445726379" sldId="274"/>
+        </pc:sldMkLst>
+      </pc:sldChg>
+      <pc:sldChg chg="add">
+        <pc:chgData name="Elias De Hondt" userId="3b92d85b72b00998" providerId="LiveId" clId="{E8343391-394F-4C4F-9616-58701B0FCA0F}" dt="2025-01-09T19:31:07.262" v="340"/>
+        <pc:sldMkLst>
+          <pc:docMk/>
+          <pc:sldMk cId="2885291258" sldId="275"/>
+        </pc:sldMkLst>
+      </pc:sldChg>
+      <pc:sldChg chg="add">
+        <pc:chgData name="Elias De Hondt" userId="3b92d85b72b00998" providerId="LiveId" clId="{E8343391-394F-4C4F-9616-58701B0FCA0F}" dt="2025-01-09T19:31:07.262" v="340"/>
+        <pc:sldMkLst>
+          <pc:docMk/>
+          <pc:sldMk cId="31916419" sldId="276"/>
+        </pc:sldMkLst>
+      </pc:sldChg>
+      <pc:sldChg chg="add">
+        <pc:chgData name="Elias De Hondt" userId="3b92d85b72b00998" providerId="LiveId" clId="{E8343391-394F-4C4F-9616-58701B0FCA0F}" dt="2025-01-09T19:31:07.262" v="340"/>
+        <pc:sldMkLst>
+          <pc:docMk/>
+          <pc:sldMk cId="2817392180" sldId="277"/>
+        </pc:sldMkLst>
+      </pc:sldChg>
+      <pc:sldChg chg="add">
+        <pc:chgData name="Elias De Hondt" userId="3b92d85b72b00998" providerId="LiveId" clId="{E8343391-394F-4C4F-9616-58701B0FCA0F}" dt="2025-01-09T19:31:07.262" v="340"/>
+        <pc:sldMkLst>
+          <pc:docMk/>
+          <pc:sldMk cId="2925493796" sldId="278"/>
+        </pc:sldMkLst>
+      </pc:sldChg>
+    </pc:docChg>
+  </pc:docChgLst>
+  <pc:docChgLst>
+    <pc:chgData name="Elias De Hondt" userId="3b92d85b72b00998" providerId="LiveId" clId="{2F2FD6ED-E68F-4E10-9ACB-6117AA10A7D6}"/>
+    <pc:docChg chg="delSld modSld sldOrd delSection modSection">
+      <pc:chgData name="Elias De Hondt" userId="3b92d85b72b00998" providerId="LiveId" clId="{2F2FD6ED-E68F-4E10-9ACB-6117AA10A7D6}" dt="2025-03-10T12:23:59.394" v="26" actId="17851"/>
+      <pc:docMkLst>
+        <pc:docMk/>
+      </pc:docMkLst>
+      <pc:sldChg chg="del">
+        <pc:chgData name="Elias De Hondt" userId="3b92d85b72b00998" providerId="LiveId" clId="{2F2FD6ED-E68F-4E10-9ACB-6117AA10A7D6}" dt="2025-03-10T12:23:30.632" v="3" actId="47"/>
+        <pc:sldMkLst>
+          <pc:docMk/>
+          <pc:sldMk cId="309141628" sldId="260"/>
+        </pc:sldMkLst>
+      </pc:sldChg>
+      <pc:sldChg chg="del">
+        <pc:chgData name="Elias De Hondt" userId="3b92d85b72b00998" providerId="LiveId" clId="{2F2FD6ED-E68F-4E10-9ACB-6117AA10A7D6}" dt="2025-03-10T12:23:30.005" v="2" actId="47"/>
+        <pc:sldMkLst>
+          <pc:docMk/>
+          <pc:sldMk cId="1635829816" sldId="262"/>
+        </pc:sldMkLst>
+      </pc:sldChg>
+      <pc:sldChg chg="ord">
+        <pc:chgData name="Elias De Hondt" userId="3b92d85b72b00998" providerId="LiveId" clId="{2F2FD6ED-E68F-4E10-9ACB-6117AA10A7D6}" dt="2025-03-10T12:23:52.290" v="25"/>
+        <pc:sldMkLst>
+          <pc:docMk/>
+          <pc:sldMk cId="200142806" sldId="264"/>
+        </pc:sldMkLst>
+      </pc:sldChg>
+      <pc:sldChg chg="del">
+        <pc:chgData name="Elias De Hondt" userId="3b92d85b72b00998" providerId="LiveId" clId="{2F2FD6ED-E68F-4E10-9ACB-6117AA10A7D6}" dt="2025-03-10T12:23:29.341" v="1" actId="47"/>
+        <pc:sldMkLst>
+          <pc:docMk/>
+          <pc:sldMk cId="947095383" sldId="266"/>
+        </pc:sldMkLst>
+      </pc:sldChg>
+      <pc:sldChg chg="ord">
+        <pc:chgData name="Elias De Hondt" userId="3b92d85b72b00998" providerId="LiveId" clId="{2F2FD6ED-E68F-4E10-9ACB-6117AA10A7D6}" dt="2025-03-10T12:23:52.290" v="25"/>
+        <pc:sldMkLst>
+          <pc:docMk/>
+          <pc:sldMk cId="3630277553" sldId="267"/>
+        </pc:sldMkLst>
+      </pc:sldChg>
+      <pc:sldChg chg="ord">
+        <pc:chgData name="Elias De Hondt" userId="3b92d85b72b00998" providerId="LiveId" clId="{2F2FD6ED-E68F-4E10-9ACB-6117AA10A7D6}" dt="2025-03-10T12:23:52.290" v="25"/>
+        <pc:sldMkLst>
+          <pc:docMk/>
+          <pc:sldMk cId="346494623" sldId="268"/>
+        </pc:sldMkLst>
+      </pc:sldChg>
+      <pc:sldChg chg="del">
+        <pc:chgData name="Elias De Hondt" userId="3b92d85b72b00998" providerId="LiveId" clId="{2F2FD6ED-E68F-4E10-9ACB-6117AA10A7D6}" dt="2025-03-10T12:23:35.971" v="11" actId="47"/>
+        <pc:sldMkLst>
+          <pc:docMk/>
+          <pc:sldMk cId="1693724240" sldId="269"/>
+        </pc:sldMkLst>
+      </pc:sldChg>
+      <pc:sldChg chg="del">
+        <pc:chgData name="Elias De Hondt" userId="3b92d85b72b00998" providerId="LiveId" clId="{2F2FD6ED-E68F-4E10-9ACB-6117AA10A7D6}" dt="2025-03-10T12:23:36.673" v="12" actId="47"/>
+        <pc:sldMkLst>
+          <pc:docMk/>
+          <pc:sldMk cId="3180204086" sldId="270"/>
+        </pc:sldMkLst>
+      </pc:sldChg>
+      <pc:sldChg chg="del">
+        <pc:chgData name="Elias De Hondt" userId="3b92d85b72b00998" providerId="LiveId" clId="{2F2FD6ED-E68F-4E10-9ACB-6117AA10A7D6}" dt="2025-03-10T12:23:37.337" v="13" actId="47"/>
+        <pc:sldMkLst>
+          <pc:docMk/>
+          <pc:sldMk cId="1339890587" sldId="271"/>
+        </pc:sldMkLst>
+      </pc:sldChg>
+      <pc:sldChg chg="del">
+        <pc:chgData name="Elias De Hondt" userId="3b92d85b72b00998" providerId="LiveId" clId="{2F2FD6ED-E68F-4E10-9ACB-6117AA10A7D6}" dt="2025-03-10T12:23:31.261" v="4" actId="47"/>
+        <pc:sldMkLst>
+          <pc:docMk/>
+          <pc:sldMk cId="1756481023" sldId="272"/>
+        </pc:sldMkLst>
+      </pc:sldChg>
+      <pc:sldChg chg="del">
+        <pc:chgData name="Elias De Hondt" userId="3b92d85b72b00998" providerId="LiveId" clId="{2F2FD6ED-E68F-4E10-9ACB-6117AA10A7D6}" dt="2025-03-10T12:23:31.916" v="5" actId="47"/>
+        <pc:sldMkLst>
+          <pc:docMk/>
+          <pc:sldMk cId="564582124" sldId="273"/>
+        </pc:sldMkLst>
+      </pc:sldChg>
+      <pc:sldChg chg="del">
+        <pc:chgData name="Elias De Hondt" userId="3b92d85b72b00998" providerId="LiveId" clId="{2F2FD6ED-E68F-4E10-9ACB-6117AA10A7D6}" dt="2025-03-10T12:23:32.576" v="6" actId="47"/>
+        <pc:sldMkLst>
+          <pc:docMk/>
+          <pc:sldMk cId="445726379" sldId="274"/>
+        </pc:sldMkLst>
+      </pc:sldChg>
+      <pc:sldChg chg="del">
+        <pc:chgData name="Elias De Hondt" userId="3b92d85b72b00998" providerId="LiveId" clId="{2F2FD6ED-E68F-4E10-9ACB-6117AA10A7D6}" dt="2025-03-10T12:23:33.265" v="7" actId="47"/>
+        <pc:sldMkLst>
+          <pc:docMk/>
+          <pc:sldMk cId="2885291258" sldId="275"/>
+        </pc:sldMkLst>
+      </pc:sldChg>
+      <pc:sldChg chg="del">
+        <pc:chgData name="Elias De Hondt" userId="3b92d85b72b00998" providerId="LiveId" clId="{2F2FD6ED-E68F-4E10-9ACB-6117AA10A7D6}" dt="2025-03-10T12:23:34.007" v="8" actId="47"/>
+        <pc:sldMkLst>
+          <pc:docMk/>
+          <pc:sldMk cId="31916419" sldId="276"/>
+        </pc:sldMkLst>
+      </pc:sldChg>
+      <pc:sldChg chg="del">
+        <pc:chgData name="Elias De Hondt" userId="3b92d85b72b00998" providerId="LiveId" clId="{2F2FD6ED-E68F-4E10-9ACB-6117AA10A7D6}" dt="2025-03-10T12:23:34.624" v="9" actId="47"/>
+        <pc:sldMkLst>
+          <pc:docMk/>
+          <pc:sldMk cId="2817392180" sldId="277"/>
+        </pc:sldMkLst>
+      </pc:sldChg>
+      <pc:sldChg chg="del">
+        <pc:chgData name="Elias De Hondt" userId="3b92d85b72b00998" providerId="LiveId" clId="{2F2FD6ED-E68F-4E10-9ACB-6117AA10A7D6}" dt="2025-03-10T12:23:35.249" v="10" actId="47"/>
+        <pc:sldMkLst>
+          <pc:docMk/>
+          <pc:sldMk cId="2925493796" sldId="278"/>
+        </pc:sldMkLst>
+      </pc:sldChg>
+      <pc:sldChg chg="del">
+        <pc:chgData name="Elias De Hondt" userId="3b92d85b72b00998" providerId="LiveId" clId="{2F2FD6ED-E68F-4E10-9ACB-6117AA10A7D6}" dt="2025-03-10T12:23:28.467" v="0" actId="47"/>
+        <pc:sldMkLst>
+          <pc:docMk/>
+          <pc:sldMk cId="3550550909" sldId="283"/>
+        </pc:sldMkLst>
+      </pc:sldChg>
+      <pc:sldChg chg="del">
+        <pc:chgData name="Elias De Hondt" userId="3b92d85b72b00998" providerId="LiveId" clId="{2F2FD6ED-E68F-4E10-9ACB-6117AA10A7D6}" dt="2025-03-10T12:23:38.885" v="14" actId="47"/>
+        <pc:sldMkLst>
+          <pc:docMk/>
+          <pc:sldMk cId="1363884546" sldId="285"/>
+        </pc:sldMkLst>
+      </pc:sldChg>
+    </pc:docChg>
+  </pc:docChgLst>
+  <pc:docChgLst>
     <pc:chgData name="Elias De Hondt" userId="3b92d85b72b00998" providerId="LiveId" clId="{022AC737-DA8D-4904-B26C-B2D0D6E0F6A5}"/>
     <pc:docChg chg="undo custSel addSld delSld modSld sldOrd">
       <pc:chgData name="Elias De Hondt" userId="3b92d85b72b00998" providerId="LiveId" clId="{022AC737-DA8D-4904-B26C-B2D0D6E0F6A5}" dt="2024-12-12T11:33:34.934" v="141" actId="1076"/>
@@ -886,6 +920,872 @@
 </pc:chgInfo>
 </file>
 
+<file path=ppt/notesMasters/notesMaster1.xml><?xml version="1.0" encoding="utf-8"?>
+<p:notesMaster xmlns:a="http://schemas.openxmlformats.org/drawingml/2006/main" xmlns:r="http://schemas.openxmlformats.org/officeDocument/2006/relationships" xmlns:p="http://schemas.openxmlformats.org/presentationml/2006/main">
+  <p:cSld>
+    <p:bg>
+      <p:bgRef idx="1001">
+        <a:schemeClr val="bg1"/>
+      </p:bgRef>
+    </p:bg>
+    <p:spTree>
+      <p:nvGrpSpPr>
+        <p:cNvPr id="1" name=""/>
+        <p:cNvGrpSpPr/>
+        <p:nvPr/>
+      </p:nvGrpSpPr>
+      <p:grpSpPr>
+        <a:xfrm>
+          <a:off x="0" y="0"/>
+          <a:ext cx="0" cy="0"/>
+          <a:chOff x="0" y="0"/>
+          <a:chExt cx="0" cy="0"/>
+        </a:xfrm>
+      </p:grpSpPr>
+      <p:sp>
+        <p:nvSpPr>
+          <p:cNvPr id="2" name="Tijdelijke aanduiding voor koptekst 1"/>
+          <p:cNvSpPr>
+            <a:spLocks noGrp="1"/>
+          </p:cNvSpPr>
+          <p:nvPr>
+            <p:ph type="hdr" sz="quarter"/>
+          </p:nvPr>
+        </p:nvSpPr>
+        <p:spPr>
+          <a:xfrm>
+            <a:off x="0" y="0"/>
+            <a:ext cx="2971800" cy="458788"/>
+          </a:xfrm>
+          <a:prstGeom prst="rect">
+            <a:avLst/>
+          </a:prstGeom>
+        </p:spPr>
+        <p:txBody>
+          <a:bodyPr vert="horz" lIns="91440" tIns="45720" rIns="91440" bIns="45720" rtlCol="0"/>
+          <a:lstStyle>
+            <a:lvl1pPr algn="l">
+              <a:defRPr sz="1200"/>
+            </a:lvl1pPr>
+          </a:lstStyle>
+          <a:p>
+            <a:endParaRPr lang="nl-BE"/>
+          </a:p>
+        </p:txBody>
+      </p:sp>
+      <p:sp>
+        <p:nvSpPr>
+          <p:cNvPr id="3" name="Tijdelijke aanduiding voor datum 2"/>
+          <p:cNvSpPr>
+            <a:spLocks noGrp="1"/>
+          </p:cNvSpPr>
+          <p:nvPr>
+            <p:ph type="dt" idx="1"/>
+          </p:nvPr>
+        </p:nvSpPr>
+        <p:spPr>
+          <a:xfrm>
+            <a:off x="3884613" y="0"/>
+            <a:ext cx="2971800" cy="458788"/>
+          </a:xfrm>
+          <a:prstGeom prst="rect">
+            <a:avLst/>
+          </a:prstGeom>
+        </p:spPr>
+        <p:txBody>
+          <a:bodyPr vert="horz" lIns="91440" tIns="45720" rIns="91440" bIns="45720" rtlCol="0"/>
+          <a:lstStyle>
+            <a:lvl1pPr algn="r">
+              <a:defRPr sz="1200"/>
+            </a:lvl1pPr>
+          </a:lstStyle>
+          <a:p>
+            <a:fld id="{F4EB8CDE-9571-4377-94AA-D6A6C7869D2C}" type="datetimeFigureOut">
+              <a:rPr lang="nl-BE" smtClean="0"/>
+              <a:t>12/03/2025</a:t>
+            </a:fld>
+            <a:endParaRPr lang="nl-BE"/>
+          </a:p>
+        </p:txBody>
+      </p:sp>
+      <p:sp>
+        <p:nvSpPr>
+          <p:cNvPr id="4" name="Tijdelijke aanduiding voor dia-afbeelding 3"/>
+          <p:cNvSpPr>
+            <a:spLocks noGrp="1" noRot="1" noChangeAspect="1"/>
+          </p:cNvSpPr>
+          <p:nvPr>
+            <p:ph type="sldImg" idx="2"/>
+          </p:nvPr>
+        </p:nvSpPr>
+        <p:spPr>
+          <a:xfrm>
+            <a:off x="685800" y="1143000"/>
+            <a:ext cx="5486400" cy="3086100"/>
+          </a:xfrm>
+          <a:prstGeom prst="rect">
+            <a:avLst/>
+          </a:prstGeom>
+          <a:noFill/>
+          <a:ln w="12700">
+            <a:solidFill>
+              <a:prstClr val="black"/>
+            </a:solidFill>
+          </a:ln>
+        </p:spPr>
+        <p:txBody>
+          <a:bodyPr vert="horz" lIns="91440" tIns="45720" rIns="91440" bIns="45720" rtlCol="0" anchor="ctr"/>
+          <a:lstStyle/>
+          <a:p>
+            <a:endParaRPr lang="nl-BE"/>
+          </a:p>
+        </p:txBody>
+      </p:sp>
+      <p:sp>
+        <p:nvSpPr>
+          <p:cNvPr id="5" name="Tijdelijke aanduiding voor notities 4"/>
+          <p:cNvSpPr>
+            <a:spLocks noGrp="1"/>
+          </p:cNvSpPr>
+          <p:nvPr>
+            <p:ph type="body" sz="quarter" idx="3"/>
+          </p:nvPr>
+        </p:nvSpPr>
+        <p:spPr>
+          <a:xfrm>
+            <a:off x="685800" y="4400550"/>
+            <a:ext cx="5486400" cy="3600450"/>
+          </a:xfrm>
+          <a:prstGeom prst="rect">
+            <a:avLst/>
+          </a:prstGeom>
+        </p:spPr>
+        <p:txBody>
+          <a:bodyPr vert="horz" lIns="91440" tIns="45720" rIns="91440" bIns="45720" rtlCol="0"/>
+          <a:lstStyle/>
+          <a:p>
+            <a:pPr lvl="0"/>
+            <a:r>
+              <a:rPr lang="nl-NL"/>
+              <a:t>Klikken om de tekststijl van het model te bewerken</a:t>
+            </a:r>
+          </a:p>
+          <a:p>
+            <a:pPr lvl="1"/>
+            <a:r>
+              <a:rPr lang="nl-NL"/>
+              <a:t>Tweede niveau</a:t>
+            </a:r>
+          </a:p>
+          <a:p>
+            <a:pPr lvl="2"/>
+            <a:r>
+              <a:rPr lang="nl-NL"/>
+              <a:t>Derde niveau</a:t>
+            </a:r>
+          </a:p>
+          <a:p>
+            <a:pPr lvl="3"/>
+            <a:r>
+              <a:rPr lang="nl-NL"/>
+              <a:t>Vierde niveau</a:t>
+            </a:r>
+          </a:p>
+          <a:p>
+            <a:pPr lvl="4"/>
+            <a:r>
+              <a:rPr lang="nl-NL"/>
+              <a:t>Vijfde niveau</a:t>
+            </a:r>
+            <a:endParaRPr lang="nl-BE"/>
+          </a:p>
+        </p:txBody>
+      </p:sp>
+      <p:sp>
+        <p:nvSpPr>
+          <p:cNvPr id="6" name="Tijdelijke aanduiding voor voettekst 5"/>
+          <p:cNvSpPr>
+            <a:spLocks noGrp="1"/>
+          </p:cNvSpPr>
+          <p:nvPr>
+            <p:ph type="ftr" sz="quarter" idx="4"/>
+          </p:nvPr>
+        </p:nvSpPr>
+        <p:spPr>
+          <a:xfrm>
+            <a:off x="0" y="8685213"/>
+            <a:ext cx="2971800" cy="458787"/>
+          </a:xfrm>
+          <a:prstGeom prst="rect">
+            <a:avLst/>
+          </a:prstGeom>
+        </p:spPr>
+        <p:txBody>
+          <a:bodyPr vert="horz" lIns="91440" tIns="45720" rIns="91440" bIns="45720" rtlCol="0" anchor="b"/>
+          <a:lstStyle>
+            <a:lvl1pPr algn="l">
+              <a:defRPr sz="1200"/>
+            </a:lvl1pPr>
+          </a:lstStyle>
+          <a:p>
+            <a:endParaRPr lang="nl-BE"/>
+          </a:p>
+        </p:txBody>
+      </p:sp>
+      <p:sp>
+        <p:nvSpPr>
+          <p:cNvPr id="7" name="Tijdelijke aanduiding voor dianummer 6"/>
+          <p:cNvSpPr>
+            <a:spLocks noGrp="1"/>
+          </p:cNvSpPr>
+          <p:nvPr>
+            <p:ph type="sldNum" sz="quarter" idx="5"/>
+          </p:nvPr>
+        </p:nvSpPr>
+        <p:spPr>
+          <a:xfrm>
+            <a:off x="3884613" y="8685213"/>
+            <a:ext cx="2971800" cy="458787"/>
+          </a:xfrm>
+          <a:prstGeom prst="rect">
+            <a:avLst/>
+          </a:prstGeom>
+        </p:spPr>
+        <p:txBody>
+          <a:bodyPr vert="horz" lIns="91440" tIns="45720" rIns="91440" bIns="45720" rtlCol="0" anchor="b"/>
+          <a:lstStyle>
+            <a:lvl1pPr algn="r">
+              <a:defRPr sz="1200"/>
+            </a:lvl1pPr>
+          </a:lstStyle>
+          <a:p>
+            <a:fld id="{89284E18-2A08-4495-ABBA-2C4402C2FBE9}" type="slidenum">
+              <a:rPr lang="nl-BE" smtClean="0"/>
+              <a:t>‹nr.›</a:t>
+            </a:fld>
+            <a:endParaRPr lang="nl-BE"/>
+          </a:p>
+        </p:txBody>
+      </p:sp>
+    </p:spTree>
+    <p:extLst>
+      <p:ext uri="{BB962C8B-B14F-4D97-AF65-F5344CB8AC3E}">
+        <p14:creationId xmlns:p14="http://schemas.microsoft.com/office/powerpoint/2010/main" val="2303465500"/>
+      </p:ext>
+    </p:extLst>
+  </p:cSld>
+  <p:clrMap bg1="lt1" tx1="dk1" bg2="lt2" tx2="dk2" accent1="accent1" accent2="accent2" accent3="accent3" accent4="accent4" accent5="accent5" accent6="accent6" hlink="hlink" folHlink="folHlink"/>
+  <p:notesStyle>
+    <a:lvl1pPr marL="0" algn="l" defTabSz="914400" rtl="0" eaLnBrk="1" latinLnBrk="0" hangingPunct="1">
+      <a:defRPr sz="1200" kern="1200">
+        <a:solidFill>
+          <a:schemeClr val="tx1"/>
+        </a:solidFill>
+        <a:latin typeface="+mn-lt"/>
+        <a:ea typeface="+mn-ea"/>
+        <a:cs typeface="+mn-cs"/>
+      </a:defRPr>
+    </a:lvl1pPr>
+    <a:lvl2pPr marL="457200" algn="l" defTabSz="914400" rtl="0" eaLnBrk="1" latinLnBrk="0" hangingPunct="1">
+      <a:defRPr sz="1200" kern="1200">
+        <a:solidFill>
+          <a:schemeClr val="tx1"/>
+        </a:solidFill>
+        <a:latin typeface="+mn-lt"/>
+        <a:ea typeface="+mn-ea"/>
+        <a:cs typeface="+mn-cs"/>
+      </a:defRPr>
+    </a:lvl2pPr>
+    <a:lvl3pPr marL="914400" algn="l" defTabSz="914400" rtl="0" eaLnBrk="1" latinLnBrk="0" hangingPunct="1">
+      <a:defRPr sz="1200" kern="1200">
+        <a:solidFill>
+          <a:schemeClr val="tx1"/>
+        </a:solidFill>
+        <a:latin typeface="+mn-lt"/>
+        <a:ea typeface="+mn-ea"/>
+        <a:cs typeface="+mn-cs"/>
+      </a:defRPr>
+    </a:lvl3pPr>
+    <a:lvl4pPr marL="1371600" algn="l" defTabSz="914400" rtl="0" eaLnBrk="1" latinLnBrk="0" hangingPunct="1">
+      <a:defRPr sz="1200" kern="1200">
+        <a:solidFill>
+          <a:schemeClr val="tx1"/>
+        </a:solidFill>
+        <a:latin typeface="+mn-lt"/>
+        <a:ea typeface="+mn-ea"/>
+        <a:cs typeface="+mn-cs"/>
+      </a:defRPr>
+    </a:lvl4pPr>
+    <a:lvl5pPr marL="1828800" algn="l" defTabSz="914400" rtl="0" eaLnBrk="1" latinLnBrk="0" hangingPunct="1">
+      <a:defRPr sz="1200" kern="1200">
+        <a:solidFill>
+          <a:schemeClr val="tx1"/>
+        </a:solidFill>
+        <a:latin typeface="+mn-lt"/>
+        <a:ea typeface="+mn-ea"/>
+        <a:cs typeface="+mn-cs"/>
+      </a:defRPr>
+    </a:lvl5pPr>
+    <a:lvl6pPr marL="2286000" algn="l" defTabSz="914400" rtl="0" eaLnBrk="1" latinLnBrk="0" hangingPunct="1">
+      <a:defRPr sz="1200" kern="1200">
+        <a:solidFill>
+          <a:schemeClr val="tx1"/>
+        </a:solidFill>
+        <a:latin typeface="+mn-lt"/>
+        <a:ea typeface="+mn-ea"/>
+        <a:cs typeface="+mn-cs"/>
+      </a:defRPr>
+    </a:lvl6pPr>
+    <a:lvl7pPr marL="2743200" algn="l" defTabSz="914400" rtl="0" eaLnBrk="1" latinLnBrk="0" hangingPunct="1">
+      <a:defRPr sz="1200" kern="1200">
+        <a:solidFill>
+          <a:schemeClr val="tx1"/>
+        </a:solidFill>
+        <a:latin typeface="+mn-lt"/>
+        <a:ea typeface="+mn-ea"/>
+        <a:cs typeface="+mn-cs"/>
+      </a:defRPr>
+    </a:lvl7pPr>
+    <a:lvl8pPr marL="3200400" algn="l" defTabSz="914400" rtl="0" eaLnBrk="1" latinLnBrk="0" hangingPunct="1">
+      <a:defRPr sz="1200" kern="1200">
+        <a:solidFill>
+          <a:schemeClr val="tx1"/>
+        </a:solidFill>
+        <a:latin typeface="+mn-lt"/>
+        <a:ea typeface="+mn-ea"/>
+        <a:cs typeface="+mn-cs"/>
+      </a:defRPr>
+    </a:lvl8pPr>
+    <a:lvl9pPr marL="3657600" algn="l" defTabSz="914400" rtl="0" eaLnBrk="1" latinLnBrk="0" hangingPunct="1">
+      <a:defRPr sz="1200" kern="1200">
+        <a:solidFill>
+          <a:schemeClr val="tx1"/>
+        </a:solidFill>
+        <a:latin typeface="+mn-lt"/>
+        <a:ea typeface="+mn-ea"/>
+        <a:cs typeface="+mn-cs"/>
+      </a:defRPr>
+    </a:lvl9pPr>
+  </p:notesStyle>
+</p:notesMaster>
+</file>
+
+<file path=ppt/notesSlides/notesSlide1.xml><?xml version="1.0" encoding="utf-8"?>
+<p:notes xmlns:a="http://schemas.openxmlformats.org/drawingml/2006/main" xmlns:r="http://schemas.openxmlformats.org/officeDocument/2006/relationships" xmlns:p="http://schemas.openxmlformats.org/presentationml/2006/main">
+  <p:cSld>
+    <p:spTree>
+      <p:nvGrpSpPr>
+        <p:cNvPr id="1" name=""/>
+        <p:cNvGrpSpPr/>
+        <p:nvPr/>
+      </p:nvGrpSpPr>
+      <p:grpSpPr>
+        <a:xfrm>
+          <a:off x="0" y="0"/>
+          <a:ext cx="0" cy="0"/>
+          <a:chOff x="0" y="0"/>
+          <a:chExt cx="0" cy="0"/>
+        </a:xfrm>
+      </p:grpSpPr>
+      <p:sp>
+        <p:nvSpPr>
+          <p:cNvPr id="2" name="Tijdelijke aanduiding voor dia-afbeelding 1"/>
+          <p:cNvSpPr>
+            <a:spLocks noGrp="1" noRot="1" noChangeAspect="1"/>
+          </p:cNvSpPr>
+          <p:nvPr>
+            <p:ph type="sldImg"/>
+          </p:nvPr>
+        </p:nvSpPr>
+        <p:spPr/>
+      </p:sp>
+      <p:sp>
+        <p:nvSpPr>
+          <p:cNvPr id="3" name="Tijdelijke aanduiding voor notities 2"/>
+          <p:cNvSpPr>
+            <a:spLocks noGrp="1"/>
+          </p:cNvSpPr>
+          <p:nvPr>
+            <p:ph type="body" idx="1"/>
+          </p:nvPr>
+        </p:nvSpPr>
+        <p:spPr/>
+        <p:txBody>
+          <a:bodyPr/>
+          <a:lstStyle/>
+          <a:p>
+            <a:endParaRPr lang="nl-BE" dirty="0"/>
+          </a:p>
+        </p:txBody>
+      </p:sp>
+      <p:sp>
+        <p:nvSpPr>
+          <p:cNvPr id="4" name="Tijdelijke aanduiding voor dianummer 3"/>
+          <p:cNvSpPr>
+            <a:spLocks noGrp="1"/>
+          </p:cNvSpPr>
+          <p:nvPr>
+            <p:ph type="sldNum" sz="quarter" idx="5"/>
+          </p:nvPr>
+        </p:nvSpPr>
+        <p:spPr/>
+        <p:txBody>
+          <a:bodyPr/>
+          <a:lstStyle/>
+          <a:p>
+            <a:fld id="{89284E18-2A08-4495-ABBA-2C4402C2FBE9}" type="slidenum">
+              <a:rPr lang="nl-BE" smtClean="0"/>
+              <a:t>4</a:t>
+            </a:fld>
+            <a:endParaRPr lang="nl-BE"/>
+          </a:p>
+        </p:txBody>
+      </p:sp>
+    </p:spTree>
+    <p:extLst>
+      <p:ext uri="{BB962C8B-B14F-4D97-AF65-F5344CB8AC3E}">
+        <p14:creationId xmlns:p14="http://schemas.microsoft.com/office/powerpoint/2010/main" val="616091580"/>
+      </p:ext>
+    </p:extLst>
+  </p:cSld>
+  <p:clrMapOvr>
+    <a:masterClrMapping/>
+  </p:clrMapOvr>
+</p:notes>
+</file>
+
+<file path=ppt/notesSlides/notesSlide2.xml><?xml version="1.0" encoding="utf-8"?>
+<p:notes xmlns:a="http://schemas.openxmlformats.org/drawingml/2006/main" xmlns:r="http://schemas.openxmlformats.org/officeDocument/2006/relationships" xmlns:p="http://schemas.openxmlformats.org/presentationml/2006/main">
+  <p:cSld>
+    <p:spTree>
+      <p:nvGrpSpPr>
+        <p:cNvPr id="1" name="">
+          <a:extLst>
+            <a:ext uri="{FF2B5EF4-FFF2-40B4-BE49-F238E27FC236}">
+              <a16:creationId xmlns:a16="http://schemas.microsoft.com/office/drawing/2014/main" id="{7F611A34-9916-955D-CA43-D6EA3212B742}"/>
+            </a:ext>
+          </a:extLst>
+        </p:cNvPr>
+        <p:cNvGrpSpPr/>
+        <p:nvPr/>
+      </p:nvGrpSpPr>
+      <p:grpSpPr>
+        <a:xfrm>
+          <a:off x="0" y="0"/>
+          <a:ext cx="0" cy="0"/>
+          <a:chOff x="0" y="0"/>
+          <a:chExt cx="0" cy="0"/>
+        </a:xfrm>
+      </p:grpSpPr>
+      <p:sp>
+        <p:nvSpPr>
+          <p:cNvPr id="2" name="Tijdelijke aanduiding voor dia-afbeelding 1">
+            <a:extLst>
+              <a:ext uri="{FF2B5EF4-FFF2-40B4-BE49-F238E27FC236}">
+                <a16:creationId xmlns:a16="http://schemas.microsoft.com/office/drawing/2014/main" id="{2A132B3C-8E04-EA36-54CB-D72442FA3C0F}"/>
+              </a:ext>
+            </a:extLst>
+          </p:cNvPr>
+          <p:cNvSpPr>
+            <a:spLocks noGrp="1" noRot="1" noChangeAspect="1"/>
+          </p:cNvSpPr>
+          <p:nvPr>
+            <p:ph type="sldImg"/>
+          </p:nvPr>
+        </p:nvSpPr>
+        <p:spPr/>
+      </p:sp>
+      <p:sp>
+        <p:nvSpPr>
+          <p:cNvPr id="3" name="Tijdelijke aanduiding voor notities 2">
+            <a:extLst>
+              <a:ext uri="{FF2B5EF4-FFF2-40B4-BE49-F238E27FC236}">
+                <a16:creationId xmlns:a16="http://schemas.microsoft.com/office/drawing/2014/main" id="{76D88727-5046-2529-7CB5-A6B56FF315E6}"/>
+              </a:ext>
+            </a:extLst>
+          </p:cNvPr>
+          <p:cNvSpPr>
+            <a:spLocks noGrp="1"/>
+          </p:cNvSpPr>
+          <p:nvPr>
+            <p:ph type="body" idx="1"/>
+          </p:nvPr>
+        </p:nvSpPr>
+        <p:spPr/>
+        <p:txBody>
+          <a:bodyPr/>
+          <a:lstStyle/>
+          <a:p>
+            <a:endParaRPr lang="nl-BE" dirty="0"/>
+          </a:p>
+        </p:txBody>
+      </p:sp>
+      <p:sp>
+        <p:nvSpPr>
+          <p:cNvPr id="4" name="Tijdelijke aanduiding voor dianummer 3">
+            <a:extLst>
+              <a:ext uri="{FF2B5EF4-FFF2-40B4-BE49-F238E27FC236}">
+                <a16:creationId xmlns:a16="http://schemas.microsoft.com/office/drawing/2014/main" id="{A18633D9-F5B2-4D66-E2CD-8B8D549481E3}"/>
+              </a:ext>
+            </a:extLst>
+          </p:cNvPr>
+          <p:cNvSpPr>
+            <a:spLocks noGrp="1"/>
+          </p:cNvSpPr>
+          <p:nvPr>
+            <p:ph type="sldNum" sz="quarter" idx="5"/>
+          </p:nvPr>
+        </p:nvSpPr>
+        <p:spPr/>
+        <p:txBody>
+          <a:bodyPr/>
+          <a:lstStyle/>
+          <a:p>
+            <a:fld id="{89284E18-2A08-4495-ABBA-2C4402C2FBE9}" type="slidenum">
+              <a:rPr lang="nl-BE" smtClean="0"/>
+              <a:t>5</a:t>
+            </a:fld>
+            <a:endParaRPr lang="nl-BE"/>
+          </a:p>
+        </p:txBody>
+      </p:sp>
+    </p:spTree>
+    <p:extLst>
+      <p:ext uri="{BB962C8B-B14F-4D97-AF65-F5344CB8AC3E}">
+        <p14:creationId xmlns:p14="http://schemas.microsoft.com/office/powerpoint/2010/main" val="3207276507"/>
+      </p:ext>
+    </p:extLst>
+  </p:cSld>
+  <p:clrMapOvr>
+    <a:masterClrMapping/>
+  </p:clrMapOvr>
+</p:notes>
+</file>
+
+<file path=ppt/notesSlides/notesSlide3.xml><?xml version="1.0" encoding="utf-8"?>
+<p:notes xmlns:a="http://schemas.openxmlformats.org/drawingml/2006/main" xmlns:r="http://schemas.openxmlformats.org/officeDocument/2006/relationships" xmlns:p="http://schemas.openxmlformats.org/presentationml/2006/main">
+  <p:cSld>
+    <p:spTree>
+      <p:nvGrpSpPr>
+        <p:cNvPr id="1" name="">
+          <a:extLst>
+            <a:ext uri="{FF2B5EF4-FFF2-40B4-BE49-F238E27FC236}">
+              <a16:creationId xmlns:a16="http://schemas.microsoft.com/office/drawing/2014/main" id="{73F99057-75D9-F910-7BB3-6C6850F8DF4D}"/>
+            </a:ext>
+          </a:extLst>
+        </p:cNvPr>
+        <p:cNvGrpSpPr/>
+        <p:nvPr/>
+      </p:nvGrpSpPr>
+      <p:grpSpPr>
+        <a:xfrm>
+          <a:off x="0" y="0"/>
+          <a:ext cx="0" cy="0"/>
+          <a:chOff x="0" y="0"/>
+          <a:chExt cx="0" cy="0"/>
+        </a:xfrm>
+      </p:grpSpPr>
+      <p:sp>
+        <p:nvSpPr>
+          <p:cNvPr id="2" name="Tijdelijke aanduiding voor dia-afbeelding 1">
+            <a:extLst>
+              <a:ext uri="{FF2B5EF4-FFF2-40B4-BE49-F238E27FC236}">
+                <a16:creationId xmlns:a16="http://schemas.microsoft.com/office/drawing/2014/main" id="{C1594D98-BA97-4635-D735-FBA6E16855DF}"/>
+              </a:ext>
+            </a:extLst>
+          </p:cNvPr>
+          <p:cNvSpPr>
+            <a:spLocks noGrp="1" noRot="1" noChangeAspect="1"/>
+          </p:cNvSpPr>
+          <p:nvPr>
+            <p:ph type="sldImg"/>
+          </p:nvPr>
+        </p:nvSpPr>
+        <p:spPr/>
+      </p:sp>
+      <p:sp>
+        <p:nvSpPr>
+          <p:cNvPr id="3" name="Tijdelijke aanduiding voor notities 2">
+            <a:extLst>
+              <a:ext uri="{FF2B5EF4-FFF2-40B4-BE49-F238E27FC236}">
+                <a16:creationId xmlns:a16="http://schemas.microsoft.com/office/drawing/2014/main" id="{B84D2095-1D9A-F4BB-BB53-73B330AFFE3E}"/>
+              </a:ext>
+            </a:extLst>
+          </p:cNvPr>
+          <p:cNvSpPr>
+            <a:spLocks noGrp="1"/>
+          </p:cNvSpPr>
+          <p:nvPr>
+            <p:ph type="body" idx="1"/>
+          </p:nvPr>
+        </p:nvSpPr>
+        <p:spPr/>
+        <p:txBody>
+          <a:bodyPr/>
+          <a:lstStyle/>
+          <a:p>
+            <a:endParaRPr lang="nl-BE" dirty="0"/>
+          </a:p>
+        </p:txBody>
+      </p:sp>
+      <p:sp>
+        <p:nvSpPr>
+          <p:cNvPr id="4" name="Tijdelijke aanduiding voor dianummer 3">
+            <a:extLst>
+              <a:ext uri="{FF2B5EF4-FFF2-40B4-BE49-F238E27FC236}">
+                <a16:creationId xmlns:a16="http://schemas.microsoft.com/office/drawing/2014/main" id="{8CD5EA71-0F4D-C3B3-FFF3-F0843BF0C38C}"/>
+              </a:ext>
+            </a:extLst>
+          </p:cNvPr>
+          <p:cNvSpPr>
+            <a:spLocks noGrp="1"/>
+          </p:cNvSpPr>
+          <p:nvPr>
+            <p:ph type="sldNum" sz="quarter" idx="5"/>
+          </p:nvPr>
+        </p:nvSpPr>
+        <p:spPr/>
+        <p:txBody>
+          <a:bodyPr/>
+          <a:lstStyle/>
+          <a:p>
+            <a:fld id="{89284E18-2A08-4495-ABBA-2C4402C2FBE9}" type="slidenum">
+              <a:rPr lang="nl-BE" smtClean="0"/>
+              <a:t>6</a:t>
+            </a:fld>
+            <a:endParaRPr lang="nl-BE"/>
+          </a:p>
+        </p:txBody>
+      </p:sp>
+    </p:spTree>
+    <p:extLst>
+      <p:ext uri="{BB962C8B-B14F-4D97-AF65-F5344CB8AC3E}">
+        <p14:creationId xmlns:p14="http://schemas.microsoft.com/office/powerpoint/2010/main" val="814818870"/>
+      </p:ext>
+    </p:extLst>
+  </p:cSld>
+  <p:clrMapOvr>
+    <a:masterClrMapping/>
+  </p:clrMapOvr>
+</p:notes>
+</file>
+
+<file path=ppt/notesSlides/notesSlide4.xml><?xml version="1.0" encoding="utf-8"?>
+<p:notes xmlns:a="http://schemas.openxmlformats.org/drawingml/2006/main" xmlns:r="http://schemas.openxmlformats.org/officeDocument/2006/relationships" xmlns:p="http://schemas.openxmlformats.org/presentationml/2006/main">
+  <p:cSld>
+    <p:spTree>
+      <p:nvGrpSpPr>
+        <p:cNvPr id="1" name="">
+          <a:extLst>
+            <a:ext uri="{FF2B5EF4-FFF2-40B4-BE49-F238E27FC236}">
+              <a16:creationId xmlns:a16="http://schemas.microsoft.com/office/drawing/2014/main" id="{FDDE7E51-C9C4-6130-8A01-1B31D76A8822}"/>
+            </a:ext>
+          </a:extLst>
+        </p:cNvPr>
+        <p:cNvGrpSpPr/>
+        <p:nvPr/>
+      </p:nvGrpSpPr>
+      <p:grpSpPr>
+        <a:xfrm>
+          <a:off x="0" y="0"/>
+          <a:ext cx="0" cy="0"/>
+          <a:chOff x="0" y="0"/>
+          <a:chExt cx="0" cy="0"/>
+        </a:xfrm>
+      </p:grpSpPr>
+      <p:sp>
+        <p:nvSpPr>
+          <p:cNvPr id="2" name="Tijdelijke aanduiding voor dia-afbeelding 1">
+            <a:extLst>
+              <a:ext uri="{FF2B5EF4-FFF2-40B4-BE49-F238E27FC236}">
+                <a16:creationId xmlns:a16="http://schemas.microsoft.com/office/drawing/2014/main" id="{207450DE-4764-C476-9A0F-17C07D68FA31}"/>
+              </a:ext>
+            </a:extLst>
+          </p:cNvPr>
+          <p:cNvSpPr>
+            <a:spLocks noGrp="1" noRot="1" noChangeAspect="1"/>
+          </p:cNvSpPr>
+          <p:nvPr>
+            <p:ph type="sldImg"/>
+          </p:nvPr>
+        </p:nvSpPr>
+        <p:spPr/>
+      </p:sp>
+      <p:sp>
+        <p:nvSpPr>
+          <p:cNvPr id="3" name="Tijdelijke aanduiding voor notities 2">
+            <a:extLst>
+              <a:ext uri="{FF2B5EF4-FFF2-40B4-BE49-F238E27FC236}">
+                <a16:creationId xmlns:a16="http://schemas.microsoft.com/office/drawing/2014/main" id="{BA130B36-B42C-CB2B-DAC9-295223376DBB}"/>
+              </a:ext>
+            </a:extLst>
+          </p:cNvPr>
+          <p:cNvSpPr>
+            <a:spLocks noGrp="1"/>
+          </p:cNvSpPr>
+          <p:nvPr>
+            <p:ph type="body" idx="1"/>
+          </p:nvPr>
+        </p:nvSpPr>
+        <p:spPr/>
+        <p:txBody>
+          <a:bodyPr/>
+          <a:lstStyle/>
+          <a:p>
+            <a:endParaRPr lang="nl-BE" dirty="0"/>
+          </a:p>
+        </p:txBody>
+      </p:sp>
+      <p:sp>
+        <p:nvSpPr>
+          <p:cNvPr id="4" name="Tijdelijke aanduiding voor dianummer 3">
+            <a:extLst>
+              <a:ext uri="{FF2B5EF4-FFF2-40B4-BE49-F238E27FC236}">
+                <a16:creationId xmlns:a16="http://schemas.microsoft.com/office/drawing/2014/main" id="{44532804-5C53-6061-2EC8-98BFAD16DCF6}"/>
+              </a:ext>
+            </a:extLst>
+          </p:cNvPr>
+          <p:cNvSpPr>
+            <a:spLocks noGrp="1"/>
+          </p:cNvSpPr>
+          <p:nvPr>
+            <p:ph type="sldNum" sz="quarter" idx="5"/>
+          </p:nvPr>
+        </p:nvSpPr>
+        <p:spPr/>
+        <p:txBody>
+          <a:bodyPr/>
+          <a:lstStyle/>
+          <a:p>
+            <a:fld id="{89284E18-2A08-4495-ABBA-2C4402C2FBE9}" type="slidenum">
+              <a:rPr lang="nl-BE" smtClean="0"/>
+              <a:t>7</a:t>
+            </a:fld>
+            <a:endParaRPr lang="nl-BE"/>
+          </a:p>
+        </p:txBody>
+      </p:sp>
+    </p:spTree>
+    <p:extLst>
+      <p:ext uri="{BB962C8B-B14F-4D97-AF65-F5344CB8AC3E}">
+        <p14:creationId xmlns:p14="http://schemas.microsoft.com/office/powerpoint/2010/main" val="1596762968"/>
+      </p:ext>
+    </p:extLst>
+  </p:cSld>
+  <p:clrMapOvr>
+    <a:masterClrMapping/>
+  </p:clrMapOvr>
+</p:notes>
+</file>
+
+<file path=ppt/notesSlides/notesSlide5.xml><?xml version="1.0" encoding="utf-8"?>
+<p:notes xmlns:a="http://schemas.openxmlformats.org/drawingml/2006/main" xmlns:r="http://schemas.openxmlformats.org/officeDocument/2006/relationships" xmlns:p="http://schemas.openxmlformats.org/presentationml/2006/main">
+  <p:cSld>
+    <p:spTree>
+      <p:nvGrpSpPr>
+        <p:cNvPr id="1" name="">
+          <a:extLst>
+            <a:ext uri="{FF2B5EF4-FFF2-40B4-BE49-F238E27FC236}">
+              <a16:creationId xmlns:a16="http://schemas.microsoft.com/office/drawing/2014/main" id="{0B7ABE43-661C-3656-AD76-97CB3435176B}"/>
+            </a:ext>
+          </a:extLst>
+        </p:cNvPr>
+        <p:cNvGrpSpPr/>
+        <p:nvPr/>
+      </p:nvGrpSpPr>
+      <p:grpSpPr>
+        <a:xfrm>
+          <a:off x="0" y="0"/>
+          <a:ext cx="0" cy="0"/>
+          <a:chOff x="0" y="0"/>
+          <a:chExt cx="0" cy="0"/>
+        </a:xfrm>
+      </p:grpSpPr>
+      <p:sp>
+        <p:nvSpPr>
+          <p:cNvPr id="2" name="Tijdelijke aanduiding voor dia-afbeelding 1">
+            <a:extLst>
+              <a:ext uri="{FF2B5EF4-FFF2-40B4-BE49-F238E27FC236}">
+                <a16:creationId xmlns:a16="http://schemas.microsoft.com/office/drawing/2014/main" id="{0374E02D-8938-C8D0-1304-1AF975E6C6B7}"/>
+              </a:ext>
+            </a:extLst>
+          </p:cNvPr>
+          <p:cNvSpPr>
+            <a:spLocks noGrp="1" noRot="1" noChangeAspect="1"/>
+          </p:cNvSpPr>
+          <p:nvPr>
+            <p:ph type="sldImg"/>
+          </p:nvPr>
+        </p:nvSpPr>
+        <p:spPr/>
+      </p:sp>
+      <p:sp>
+        <p:nvSpPr>
+          <p:cNvPr id="3" name="Tijdelijke aanduiding voor notities 2">
+            <a:extLst>
+              <a:ext uri="{FF2B5EF4-FFF2-40B4-BE49-F238E27FC236}">
+                <a16:creationId xmlns:a16="http://schemas.microsoft.com/office/drawing/2014/main" id="{2C5B599D-9EA9-6100-AAD8-98241DBA85F8}"/>
+              </a:ext>
+            </a:extLst>
+          </p:cNvPr>
+          <p:cNvSpPr>
+            <a:spLocks noGrp="1"/>
+          </p:cNvSpPr>
+          <p:nvPr>
+            <p:ph type="body" idx="1"/>
+          </p:nvPr>
+        </p:nvSpPr>
+        <p:spPr/>
+        <p:txBody>
+          <a:bodyPr/>
+          <a:lstStyle/>
+          <a:p>
+            <a:endParaRPr lang="nl-BE" dirty="0"/>
+          </a:p>
+        </p:txBody>
+      </p:sp>
+      <p:sp>
+        <p:nvSpPr>
+          <p:cNvPr id="4" name="Tijdelijke aanduiding voor dianummer 3">
+            <a:extLst>
+              <a:ext uri="{FF2B5EF4-FFF2-40B4-BE49-F238E27FC236}">
+                <a16:creationId xmlns:a16="http://schemas.microsoft.com/office/drawing/2014/main" id="{38A73C66-5530-E3A1-451A-9298DEF01019}"/>
+              </a:ext>
+            </a:extLst>
+          </p:cNvPr>
+          <p:cNvSpPr>
+            <a:spLocks noGrp="1"/>
+          </p:cNvSpPr>
+          <p:nvPr>
+            <p:ph type="sldNum" sz="quarter" idx="5"/>
+          </p:nvPr>
+        </p:nvSpPr>
+        <p:spPr/>
+        <p:txBody>
+          <a:bodyPr/>
+          <a:lstStyle/>
+          <a:p>
+            <a:fld id="{89284E18-2A08-4495-ABBA-2C4402C2FBE9}" type="slidenum">
+              <a:rPr lang="nl-BE" smtClean="0"/>
+              <a:t>8</a:t>
+            </a:fld>
+            <a:endParaRPr lang="nl-BE"/>
+          </a:p>
+        </p:txBody>
+      </p:sp>
+    </p:spTree>
+    <p:extLst>
+      <p:ext uri="{BB962C8B-B14F-4D97-AF65-F5344CB8AC3E}">
+        <p14:creationId xmlns:p14="http://schemas.microsoft.com/office/powerpoint/2010/main" val="3274698747"/>
+      </p:ext>
+    </p:extLst>
+  </p:cSld>
+  <p:clrMapOvr>
+    <a:masterClrMapping/>
+  </p:clrMapOvr>
+</p:notes>
+</file>
+
 <file path=ppt/slideLayouts/slideLayout1.xml><?xml version="1.0" encoding="utf-8"?>
 <p:sldLayout xmlns:a="http://schemas.openxmlformats.org/drawingml/2006/main" xmlns:r="http://schemas.openxmlformats.org/officeDocument/2006/relationships" xmlns:p="http://schemas.openxmlformats.org/presentationml/2006/main" type="title" preserve="1">
   <p:cSld name="Titeldia">
@@ -1035,7 +1935,7 @@
           <a:p>
             <a:fld id="{686F7AF0-E817-4751-8020-06980DDBEBE6}" type="datetimeFigureOut">
               <a:rPr lang="nl-BE" smtClean="0"/>
-              <a:t>10/03/2025</a:t>
+              <a:t>12/03/2025</a:t>
             </a:fld>
             <a:endParaRPr lang="nl-BE"/>
           </a:p>
@@ -1235,7 +2135,7 @@
           <a:p>
             <a:fld id="{686F7AF0-E817-4751-8020-06980DDBEBE6}" type="datetimeFigureOut">
               <a:rPr lang="nl-BE" smtClean="0"/>
-              <a:t>10/03/2025</a:t>
+              <a:t>12/03/2025</a:t>
             </a:fld>
             <a:endParaRPr lang="nl-BE"/>
           </a:p>
@@ -1445,7 +2345,7 @@
           <a:p>
             <a:fld id="{686F7AF0-E817-4751-8020-06980DDBEBE6}" type="datetimeFigureOut">
               <a:rPr lang="nl-BE" smtClean="0"/>
-              <a:t>10/03/2025</a:t>
+              <a:t>12/03/2025</a:t>
             </a:fld>
             <a:endParaRPr lang="nl-BE"/>
           </a:p>
@@ -1645,7 +2545,7 @@
           <a:p>
             <a:fld id="{686F7AF0-E817-4751-8020-06980DDBEBE6}" type="datetimeFigureOut">
               <a:rPr lang="nl-BE" smtClean="0"/>
-              <a:t>10/03/2025</a:t>
+              <a:t>12/03/2025</a:t>
             </a:fld>
             <a:endParaRPr lang="nl-BE"/>
           </a:p>
@@ -1921,7 +2821,7 @@
           <a:p>
             <a:fld id="{686F7AF0-E817-4751-8020-06980DDBEBE6}" type="datetimeFigureOut">
               <a:rPr lang="nl-BE" smtClean="0"/>
-              <a:t>10/03/2025</a:t>
+              <a:t>12/03/2025</a:t>
             </a:fld>
             <a:endParaRPr lang="nl-BE"/>
           </a:p>
@@ -2189,7 +3089,7 @@
           <a:p>
             <a:fld id="{686F7AF0-E817-4751-8020-06980DDBEBE6}" type="datetimeFigureOut">
               <a:rPr lang="nl-BE" smtClean="0"/>
-              <a:t>10/03/2025</a:t>
+              <a:t>12/03/2025</a:t>
             </a:fld>
             <a:endParaRPr lang="nl-BE"/>
           </a:p>
@@ -2604,7 +3504,7 @@
           <a:p>
             <a:fld id="{686F7AF0-E817-4751-8020-06980DDBEBE6}" type="datetimeFigureOut">
               <a:rPr lang="nl-BE" smtClean="0"/>
-              <a:t>10/03/2025</a:t>
+              <a:t>12/03/2025</a:t>
             </a:fld>
             <a:endParaRPr lang="nl-BE"/>
           </a:p>
@@ -2746,7 +3646,7 @@
           <a:p>
             <a:fld id="{686F7AF0-E817-4751-8020-06980DDBEBE6}" type="datetimeFigureOut">
               <a:rPr lang="nl-BE" smtClean="0"/>
-              <a:t>10/03/2025</a:t>
+              <a:t>12/03/2025</a:t>
             </a:fld>
             <a:endParaRPr lang="nl-BE"/>
           </a:p>
@@ -2859,7 +3759,7 @@
           <a:p>
             <a:fld id="{686F7AF0-E817-4751-8020-06980DDBEBE6}" type="datetimeFigureOut">
               <a:rPr lang="nl-BE" smtClean="0"/>
-              <a:t>10/03/2025</a:t>
+              <a:t>12/03/2025</a:t>
             </a:fld>
             <a:endParaRPr lang="nl-BE"/>
           </a:p>
@@ -3172,7 +4072,7 @@
           <a:p>
             <a:fld id="{686F7AF0-E817-4751-8020-06980DDBEBE6}" type="datetimeFigureOut">
               <a:rPr lang="nl-BE" smtClean="0"/>
-              <a:t>10/03/2025</a:t>
+              <a:t>12/03/2025</a:t>
             </a:fld>
             <a:endParaRPr lang="nl-BE"/>
           </a:p>
@@ -3461,7 +4361,7 @@
           <a:p>
             <a:fld id="{686F7AF0-E817-4751-8020-06980DDBEBE6}" type="datetimeFigureOut">
               <a:rPr lang="nl-BE" smtClean="0"/>
-              <a:t>10/03/2025</a:t>
+              <a:t>12/03/2025</a:t>
             </a:fld>
             <a:endParaRPr lang="nl-BE"/>
           </a:p>
@@ -3704,7 +4604,7 @@
           <a:p>
             <a:fld id="{686F7AF0-E817-4751-8020-06980DDBEBE6}" type="datetimeFigureOut">
               <a:rPr lang="nl-BE" smtClean="0"/>
-              <a:t>10/03/2025</a:t>
+              <a:t>12/03/2025</a:t>
             </a:fld>
             <a:endParaRPr lang="nl-BE"/>
           </a:p>
@@ -4141,7 +5041,7 @@
         </p:nvSpPr>
         <p:spPr>
           <a:xfrm>
-            <a:off x="0" y="-13280"/>
+            <a:off x="0" y="7268"/>
             <a:ext cx="12192000" cy="6858000"/>
           </a:xfrm>
           <a:prstGeom prst="rect">
@@ -6801,6 +7701,2857 @@
     </mc:Choice>
     <mc:Fallback xmlns="">
       <p:transition spd="slow">
+        <p:fade/>
+      </p:transition>
+    </mc:Fallback>
+  </mc:AlternateContent>
+</p:sld>
+</file>
+
+<file path=ppt/slides/slide4.xml><?xml version="1.0" encoding="utf-8"?>
+<p:sld xmlns:a="http://schemas.openxmlformats.org/drawingml/2006/main" xmlns:r="http://schemas.openxmlformats.org/officeDocument/2006/relationships" xmlns:p="http://schemas.openxmlformats.org/presentationml/2006/main">
+  <p:cSld>
+    <p:spTree>
+      <p:nvGrpSpPr>
+        <p:cNvPr id="1" name=""/>
+        <p:cNvGrpSpPr/>
+        <p:nvPr/>
+      </p:nvGrpSpPr>
+      <p:grpSpPr>
+        <a:xfrm>
+          <a:off x="0" y="0"/>
+          <a:ext cx="0" cy="0"/>
+          <a:chOff x="0" y="0"/>
+          <a:chExt cx="0" cy="0"/>
+        </a:xfrm>
+      </p:grpSpPr>
+      <p:sp>
+        <p:nvSpPr>
+          <p:cNvPr id="4" name="Rechthoek 3">
+            <a:extLst>
+              <a:ext uri="{FF2B5EF4-FFF2-40B4-BE49-F238E27FC236}">
+                <a16:creationId xmlns:a16="http://schemas.microsoft.com/office/drawing/2014/main" id="{1EFB7C11-EBB7-C8AF-ACA3-7C55D5C7A2BD}"/>
+              </a:ext>
+            </a:extLst>
+          </p:cNvPr>
+          <p:cNvSpPr/>
+          <p:nvPr/>
+        </p:nvSpPr>
+        <p:spPr>
+          <a:xfrm>
+            <a:off x="0" y="1"/>
+            <a:ext cx="12192000" cy="932330"/>
+          </a:xfrm>
+          <a:prstGeom prst="rect">
+            <a:avLst/>
+          </a:prstGeom>
+          <a:solidFill>
+            <a:srgbClr val="B6ABCE"/>
+          </a:solidFill>
+          <a:ln>
+            <a:solidFill>
+              <a:srgbClr val="B6ABCE"/>
+            </a:solidFill>
+          </a:ln>
+        </p:spPr>
+        <p:style>
+          <a:lnRef idx="2">
+            <a:schemeClr val="accent1">
+              <a:shade val="15000"/>
+            </a:schemeClr>
+          </a:lnRef>
+          <a:fillRef idx="1">
+            <a:schemeClr val="accent1"/>
+          </a:fillRef>
+          <a:effectRef idx="0">
+            <a:schemeClr val="accent1"/>
+          </a:effectRef>
+          <a:fontRef idx="minor">
+            <a:schemeClr val="lt1"/>
+          </a:fontRef>
+        </p:style>
+        <p:txBody>
+          <a:bodyPr rtlCol="0" anchor="ctr"/>
+          <a:lstStyle/>
+          <a:p>
+            <a:pPr algn="ctr"/>
+            <a:r>
+              <a:rPr lang="nl-BE" sz="5000" b="1" dirty="0">
+                <a:latin typeface="Inter"/>
+                <a:cs typeface="Arial" panose="020B0604020202020204" pitchFamily="34" charset="0"/>
+              </a:rPr>
+              <a:t>Het team</a:t>
+            </a:r>
+          </a:p>
+        </p:txBody>
+      </p:sp>
+      <p:sp>
+        <p:nvSpPr>
+          <p:cNvPr id="6" name="Rechthoek 5">
+            <a:extLst>
+              <a:ext uri="{FF2B5EF4-FFF2-40B4-BE49-F238E27FC236}">
+                <a16:creationId xmlns:a16="http://schemas.microsoft.com/office/drawing/2014/main" id="{56D90D8D-6466-0763-D57E-3EC60959914A}"/>
+              </a:ext>
+            </a:extLst>
+          </p:cNvPr>
+          <p:cNvSpPr/>
+          <p:nvPr/>
+        </p:nvSpPr>
+        <p:spPr>
+          <a:xfrm>
+            <a:off x="0" y="6492875"/>
+            <a:ext cx="12192000" cy="365125"/>
+          </a:xfrm>
+          <a:prstGeom prst="rect">
+            <a:avLst/>
+          </a:prstGeom>
+          <a:solidFill>
+            <a:srgbClr val="8F7EB4"/>
+          </a:solidFill>
+          <a:ln>
+            <a:solidFill>
+              <a:srgbClr val="8F7EB4"/>
+            </a:solidFill>
+          </a:ln>
+        </p:spPr>
+        <p:style>
+          <a:lnRef idx="2">
+            <a:schemeClr val="accent1">
+              <a:shade val="15000"/>
+            </a:schemeClr>
+          </a:lnRef>
+          <a:fillRef idx="1">
+            <a:schemeClr val="accent1"/>
+          </a:fillRef>
+          <a:effectRef idx="0">
+            <a:schemeClr val="accent1"/>
+          </a:effectRef>
+          <a:fontRef idx="minor">
+            <a:schemeClr val="lt1"/>
+          </a:fontRef>
+        </p:style>
+        <p:txBody>
+          <a:bodyPr rtlCol="0" anchor="ctr"/>
+          <a:lstStyle/>
+          <a:p>
+            <a:pPr algn="ctr"/>
+            <a:endParaRPr lang="nl-BE">
+              <a:solidFill>
+                <a:srgbClr val="F37C00"/>
+              </a:solidFill>
+            </a:endParaRPr>
+          </a:p>
+        </p:txBody>
+      </p:sp>
+      <p:sp>
+        <p:nvSpPr>
+          <p:cNvPr id="11" name="Tijdelijke aanduiding voor dianummer 10">
+            <a:extLst>
+              <a:ext uri="{FF2B5EF4-FFF2-40B4-BE49-F238E27FC236}">
+                <a16:creationId xmlns:a16="http://schemas.microsoft.com/office/drawing/2014/main" id="{EC2C6CB3-BAB9-EE3B-AF8E-4F4D03DFDAC3}"/>
+              </a:ext>
+            </a:extLst>
+          </p:cNvPr>
+          <p:cNvSpPr>
+            <a:spLocks noGrp="1"/>
+          </p:cNvSpPr>
+          <p:nvPr>
+            <p:ph type="sldNum" sz="quarter" idx="12"/>
+          </p:nvPr>
+        </p:nvSpPr>
+        <p:spPr>
+          <a:xfrm>
+            <a:off x="11362267" y="6492875"/>
+            <a:ext cx="829733" cy="365125"/>
+          </a:xfrm>
+        </p:spPr>
+        <p:txBody>
+          <a:bodyPr/>
+          <a:lstStyle/>
+          <a:p>
+            <a:r>
+              <a:rPr lang="nl-BE" sz="2000" b="1" dirty="0">
+                <a:solidFill>
+                  <a:schemeClr val="bg1"/>
+                </a:solidFill>
+                <a:latin typeface="Inter"/>
+                <a:cs typeface="Arial" panose="020B0604020202020204" pitchFamily="34" charset="0"/>
+              </a:rPr>
+              <a:t>01/20</a:t>
+            </a:r>
+          </a:p>
+        </p:txBody>
+      </p:sp>
+      <p:sp>
+        <p:nvSpPr>
+          <p:cNvPr id="2" name="Rechthoek: afgeronde hoeken 1">
+            <a:extLst>
+              <a:ext uri="{FF2B5EF4-FFF2-40B4-BE49-F238E27FC236}">
+                <a16:creationId xmlns:a16="http://schemas.microsoft.com/office/drawing/2014/main" id="{DDAE0C79-88EF-9C7E-0C71-F073815C0132}"/>
+              </a:ext>
+            </a:extLst>
+          </p:cNvPr>
+          <p:cNvSpPr/>
+          <p:nvPr/>
+        </p:nvSpPr>
+        <p:spPr>
+          <a:xfrm>
+            <a:off x="4535690" y="1757409"/>
+            <a:ext cx="934518" cy="3910366"/>
+          </a:xfrm>
+          <a:prstGeom prst="roundRect">
+            <a:avLst/>
+          </a:prstGeom>
+          <a:solidFill>
+            <a:srgbClr val="8F7EB4"/>
+          </a:solidFill>
+          <a:ln>
+            <a:solidFill>
+              <a:srgbClr val="8F7EB4"/>
+            </a:solidFill>
+          </a:ln>
+        </p:spPr>
+        <p:style>
+          <a:lnRef idx="2">
+            <a:schemeClr val="accent1">
+              <a:shade val="15000"/>
+            </a:schemeClr>
+          </a:lnRef>
+          <a:fillRef idx="1">
+            <a:schemeClr val="accent1"/>
+          </a:fillRef>
+          <a:effectRef idx="0">
+            <a:schemeClr val="accent1"/>
+          </a:effectRef>
+          <a:fontRef idx="minor">
+            <a:schemeClr val="lt1"/>
+          </a:fontRef>
+        </p:style>
+        <p:txBody>
+          <a:bodyPr rtlCol="0" anchor="ctr"/>
+          <a:lstStyle/>
+          <a:p>
+            <a:pPr algn="ctr"/>
+            <a:endParaRPr lang="nl-BE"/>
+          </a:p>
+        </p:txBody>
+      </p:sp>
+      <p:sp>
+        <p:nvSpPr>
+          <p:cNvPr id="3" name="Tekstvak 2">
+            <a:extLst>
+              <a:ext uri="{FF2B5EF4-FFF2-40B4-BE49-F238E27FC236}">
+                <a16:creationId xmlns:a16="http://schemas.microsoft.com/office/drawing/2014/main" id="{BD6E3E6D-BC9D-9835-C32A-A31E917EF680}"/>
+              </a:ext>
+            </a:extLst>
+          </p:cNvPr>
+          <p:cNvSpPr txBox="1"/>
+          <p:nvPr/>
+        </p:nvSpPr>
+        <p:spPr>
+          <a:xfrm rot="16200000">
+            <a:off x="3047794" y="3420206"/>
+            <a:ext cx="3910371" cy="584775"/>
+          </a:xfrm>
+          <a:prstGeom prst="rect">
+            <a:avLst/>
+          </a:prstGeom>
+          <a:noFill/>
+        </p:spPr>
+        <p:txBody>
+          <a:bodyPr wrap="square" rtlCol="0">
+            <a:spAutoFit/>
+          </a:bodyPr>
+          <a:lstStyle/>
+          <a:p>
+            <a:pPr algn="ctr"/>
+            <a:r>
+              <a:rPr lang="nl-BE" sz="3200" b="1" dirty="0">
+                <a:solidFill>
+                  <a:schemeClr val="bg1"/>
+                </a:solidFill>
+                <a:latin typeface="Inter"/>
+                <a:cs typeface="Arial" panose="020B0604020202020204" pitchFamily="34" charset="0"/>
+              </a:rPr>
+              <a:t>Elias De Hondt</a:t>
+            </a:r>
+          </a:p>
+        </p:txBody>
+      </p:sp>
+      <p:sp>
+        <p:nvSpPr>
+          <p:cNvPr id="5" name="Rechthoek: afgeronde hoeken 4">
+            <a:extLst>
+              <a:ext uri="{FF2B5EF4-FFF2-40B4-BE49-F238E27FC236}">
+                <a16:creationId xmlns:a16="http://schemas.microsoft.com/office/drawing/2014/main" id="{29065B29-6671-C437-D84B-8A0D0E7C6B2F}"/>
+              </a:ext>
+            </a:extLst>
+          </p:cNvPr>
+          <p:cNvSpPr/>
+          <p:nvPr/>
+        </p:nvSpPr>
+        <p:spPr>
+          <a:xfrm>
+            <a:off x="6754540" y="1748811"/>
+            <a:ext cx="934518" cy="3910364"/>
+          </a:xfrm>
+          <a:prstGeom prst="roundRect">
+            <a:avLst/>
+          </a:prstGeom>
+          <a:solidFill>
+            <a:srgbClr val="8F7EB4"/>
+          </a:solidFill>
+          <a:ln>
+            <a:solidFill>
+              <a:srgbClr val="8F7EB4"/>
+            </a:solidFill>
+          </a:ln>
+        </p:spPr>
+        <p:style>
+          <a:lnRef idx="2">
+            <a:schemeClr val="accent1">
+              <a:shade val="15000"/>
+            </a:schemeClr>
+          </a:lnRef>
+          <a:fillRef idx="1">
+            <a:schemeClr val="accent1"/>
+          </a:fillRef>
+          <a:effectRef idx="0">
+            <a:schemeClr val="accent1"/>
+          </a:effectRef>
+          <a:fontRef idx="minor">
+            <a:schemeClr val="lt1"/>
+          </a:fontRef>
+        </p:style>
+        <p:txBody>
+          <a:bodyPr rtlCol="0" anchor="ctr"/>
+          <a:lstStyle/>
+          <a:p>
+            <a:pPr algn="ctr"/>
+            <a:endParaRPr lang="nl-BE"/>
+          </a:p>
+        </p:txBody>
+      </p:sp>
+      <p:sp>
+        <p:nvSpPr>
+          <p:cNvPr id="8" name="Tekstvak 7">
+            <a:extLst>
+              <a:ext uri="{FF2B5EF4-FFF2-40B4-BE49-F238E27FC236}">
+                <a16:creationId xmlns:a16="http://schemas.microsoft.com/office/drawing/2014/main" id="{6369F8DA-078F-950D-D541-77DC77328027}"/>
+              </a:ext>
+            </a:extLst>
+          </p:cNvPr>
+          <p:cNvSpPr txBox="1"/>
+          <p:nvPr/>
+        </p:nvSpPr>
+        <p:spPr>
+          <a:xfrm rot="16200000">
+            <a:off x="5258006" y="3420216"/>
+            <a:ext cx="3927588" cy="584775"/>
+          </a:xfrm>
+          <a:prstGeom prst="rect">
+            <a:avLst/>
+          </a:prstGeom>
+          <a:noFill/>
+        </p:spPr>
+        <p:txBody>
+          <a:bodyPr wrap="square" rtlCol="0">
+            <a:spAutoFit/>
+          </a:bodyPr>
+          <a:lstStyle/>
+          <a:p>
+            <a:pPr algn="ctr"/>
+            <a:r>
+              <a:rPr lang="nl-BE" sz="3200" b="1" dirty="0">
+                <a:solidFill>
+                  <a:schemeClr val="bg1"/>
+                </a:solidFill>
+                <a:latin typeface="Inter"/>
+                <a:cs typeface="Arial" panose="020B0604020202020204" pitchFamily="34" charset="0"/>
+              </a:rPr>
+              <a:t>Vera Wise</a:t>
+            </a:r>
+          </a:p>
+        </p:txBody>
+      </p:sp>
+      <p:sp>
+        <p:nvSpPr>
+          <p:cNvPr id="9" name="Rechthoek: afgeronde hoeken 8">
+            <a:extLst>
+              <a:ext uri="{FF2B5EF4-FFF2-40B4-BE49-F238E27FC236}">
+                <a16:creationId xmlns:a16="http://schemas.microsoft.com/office/drawing/2014/main" id="{81408570-B378-C5D0-783A-E791001D7624}"/>
+              </a:ext>
+            </a:extLst>
+          </p:cNvPr>
+          <p:cNvSpPr/>
+          <p:nvPr/>
+        </p:nvSpPr>
+        <p:spPr>
+          <a:xfrm>
+            <a:off x="5628741" y="1748809"/>
+            <a:ext cx="934518" cy="3910365"/>
+          </a:xfrm>
+          <a:prstGeom prst="roundRect">
+            <a:avLst/>
+          </a:prstGeom>
+          <a:solidFill>
+            <a:srgbClr val="B6ABCE"/>
+          </a:solidFill>
+          <a:ln>
+            <a:solidFill>
+              <a:srgbClr val="B6ABCE"/>
+            </a:solidFill>
+          </a:ln>
+        </p:spPr>
+        <p:style>
+          <a:lnRef idx="2">
+            <a:schemeClr val="accent1">
+              <a:shade val="15000"/>
+            </a:schemeClr>
+          </a:lnRef>
+          <a:fillRef idx="1">
+            <a:schemeClr val="accent1"/>
+          </a:fillRef>
+          <a:effectRef idx="0">
+            <a:schemeClr val="accent1"/>
+          </a:effectRef>
+          <a:fontRef idx="minor">
+            <a:schemeClr val="lt1"/>
+          </a:fontRef>
+        </p:style>
+        <p:txBody>
+          <a:bodyPr rtlCol="0" anchor="ctr"/>
+          <a:lstStyle/>
+          <a:p>
+            <a:pPr algn="ctr"/>
+            <a:endParaRPr lang="nl-BE"/>
+          </a:p>
+        </p:txBody>
+      </p:sp>
+      <p:sp>
+        <p:nvSpPr>
+          <p:cNvPr id="10" name="Tekstvak 9">
+            <a:extLst>
+              <a:ext uri="{FF2B5EF4-FFF2-40B4-BE49-F238E27FC236}">
+                <a16:creationId xmlns:a16="http://schemas.microsoft.com/office/drawing/2014/main" id="{78E26CB0-F0F2-3EF5-5E6A-4DBD12FE73EC}"/>
+              </a:ext>
+            </a:extLst>
+          </p:cNvPr>
+          <p:cNvSpPr txBox="1"/>
+          <p:nvPr/>
+        </p:nvSpPr>
+        <p:spPr>
+          <a:xfrm rot="16200000">
+            <a:off x="4157198" y="3420206"/>
+            <a:ext cx="3910366" cy="584775"/>
+          </a:xfrm>
+          <a:prstGeom prst="rect">
+            <a:avLst/>
+          </a:prstGeom>
+          <a:noFill/>
+        </p:spPr>
+        <p:txBody>
+          <a:bodyPr wrap="square" rtlCol="0">
+            <a:spAutoFit/>
+          </a:bodyPr>
+          <a:lstStyle/>
+          <a:p>
+            <a:pPr algn="ctr"/>
+            <a:r>
+              <a:rPr lang="nl-BE" sz="3200" b="1" dirty="0">
+                <a:solidFill>
+                  <a:schemeClr val="bg1"/>
+                </a:solidFill>
+                <a:latin typeface="Inter"/>
+                <a:cs typeface="Arial" panose="020B0604020202020204" pitchFamily="34" charset="0"/>
+              </a:rPr>
+              <a:t>Vincent Verboven</a:t>
+            </a:r>
+          </a:p>
+        </p:txBody>
+      </p:sp>
+      <p:sp>
+        <p:nvSpPr>
+          <p:cNvPr id="12" name="Tekstvak 11">
+            <a:extLst>
+              <a:ext uri="{FF2B5EF4-FFF2-40B4-BE49-F238E27FC236}">
+                <a16:creationId xmlns:a16="http://schemas.microsoft.com/office/drawing/2014/main" id="{180F8405-5FF0-A8D2-C70B-98E00D62A89B}"/>
+              </a:ext>
+            </a:extLst>
+          </p:cNvPr>
+          <p:cNvSpPr txBox="1"/>
+          <p:nvPr/>
+        </p:nvSpPr>
+        <p:spPr>
+          <a:xfrm>
+            <a:off x="0" y="6492875"/>
+            <a:ext cx="2423227" cy="369332"/>
+          </a:xfrm>
+          <a:prstGeom prst="rect">
+            <a:avLst/>
+          </a:prstGeom>
+          <a:noFill/>
+        </p:spPr>
+        <p:txBody>
+          <a:bodyPr wrap="none" rtlCol="0">
+            <a:spAutoFit/>
+          </a:bodyPr>
+          <a:lstStyle/>
+          <a:p>
+            <a:r>
+              <a:rPr lang="nl-BE" b="1" dirty="0">
+                <a:solidFill>
+                  <a:schemeClr val="bg1"/>
+                </a:solidFill>
+                <a:latin typeface="Inter"/>
+                <a:cs typeface="Arial" panose="020B0604020202020204" pitchFamily="34" charset="0"/>
+              </a:rPr>
+              <a:t>Spreker: Elias De Hondt</a:t>
+            </a:r>
+          </a:p>
+        </p:txBody>
+      </p:sp>
+      <p:pic>
+        <p:nvPicPr>
+          <p:cNvPr id="19" name="Afbeelding 18" descr="Afbeelding met cirkel, diagram, pixel&#10;&#10;Door AI gegenereerde inhoud is mogelijk onjuist.">
+            <a:extLst>
+              <a:ext uri="{FF2B5EF4-FFF2-40B4-BE49-F238E27FC236}">
+                <a16:creationId xmlns:a16="http://schemas.microsoft.com/office/drawing/2014/main" id="{7B42E80A-C403-C9E2-C766-54F11662DEDC}"/>
+              </a:ext>
+            </a:extLst>
+          </p:cNvPr>
+          <p:cNvPicPr>
+            <a:picLocks noChangeAspect="1"/>
+          </p:cNvPicPr>
+          <p:nvPr/>
+        </p:nvPicPr>
+        <p:blipFill>
+          <a:blip r:embed="rId3">
+            <a:extLst>
+              <a:ext uri="{28A0092B-C50C-407E-A947-70E740481C1C}">
+                <a14:useLocalDpi xmlns:a14="http://schemas.microsoft.com/office/drawing/2010/main" val="0"/>
+              </a:ext>
+            </a:extLst>
+          </a:blip>
+          <a:stretch>
+            <a:fillRect/>
+          </a:stretch>
+        </p:blipFill>
+        <p:spPr>
+          <a:xfrm>
+            <a:off x="11203050" y="-56619"/>
+            <a:ext cx="1008000" cy="1008000"/>
+          </a:xfrm>
+          <a:prstGeom prst="rect">
+            <a:avLst/>
+          </a:prstGeom>
+        </p:spPr>
+      </p:pic>
+    </p:spTree>
+    <p:extLst>
+      <p:ext uri="{BB962C8B-B14F-4D97-AF65-F5344CB8AC3E}">
+        <p14:creationId xmlns:p14="http://schemas.microsoft.com/office/powerpoint/2010/main" val="1912202151"/>
+      </p:ext>
+    </p:extLst>
+  </p:cSld>
+  <p:clrMapOvr>
+    <a:masterClrMapping/>
+  </p:clrMapOvr>
+  <mc:AlternateContent xmlns:mc="http://schemas.openxmlformats.org/markup-compatibility/2006" xmlns:p159="http://schemas.microsoft.com/office/powerpoint/2015/09/main">
+    <mc:Choice Requires="p159">
+      <p:transition spd="med">
+        <p159:morph option="byObject"/>
+      </p:transition>
+    </mc:Choice>
+    <mc:Fallback xmlns="">
+      <p:transition spd="med">
+        <p:fade/>
+      </p:transition>
+    </mc:Fallback>
+  </mc:AlternateContent>
+</p:sld>
+</file>
+
+<file path=ppt/slides/slide5.xml><?xml version="1.0" encoding="utf-8"?>
+<p:sld xmlns:a="http://schemas.openxmlformats.org/drawingml/2006/main" xmlns:r="http://schemas.openxmlformats.org/officeDocument/2006/relationships" xmlns:p="http://schemas.openxmlformats.org/presentationml/2006/main">
+  <p:cSld>
+    <p:spTree>
+      <p:nvGrpSpPr>
+        <p:cNvPr id="1" name="">
+          <a:extLst>
+            <a:ext uri="{FF2B5EF4-FFF2-40B4-BE49-F238E27FC236}">
+              <a16:creationId xmlns:a16="http://schemas.microsoft.com/office/drawing/2014/main" id="{4E993D9C-10AA-640E-B66E-FDD0CE29B953}"/>
+            </a:ext>
+          </a:extLst>
+        </p:cNvPr>
+        <p:cNvGrpSpPr/>
+        <p:nvPr/>
+      </p:nvGrpSpPr>
+      <p:grpSpPr>
+        <a:xfrm>
+          <a:off x="0" y="0"/>
+          <a:ext cx="0" cy="0"/>
+          <a:chOff x="0" y="0"/>
+          <a:chExt cx="0" cy="0"/>
+        </a:xfrm>
+      </p:grpSpPr>
+      <p:sp>
+        <p:nvSpPr>
+          <p:cNvPr id="28" name="Rechthoek: afgeronde hoeken 27">
+            <a:extLst>
+              <a:ext uri="{FF2B5EF4-FFF2-40B4-BE49-F238E27FC236}">
+                <a16:creationId xmlns:a16="http://schemas.microsoft.com/office/drawing/2014/main" id="{93D00E87-E928-C8DD-CA34-2BCE7CA1FC4B}"/>
+              </a:ext>
+            </a:extLst>
+          </p:cNvPr>
+          <p:cNvSpPr/>
+          <p:nvPr/>
+        </p:nvSpPr>
+        <p:spPr>
+          <a:xfrm>
+            <a:off x="3412412" y="1711847"/>
+            <a:ext cx="3148370" cy="3910364"/>
+          </a:xfrm>
+          <a:prstGeom prst="roundRect">
+            <a:avLst/>
+          </a:prstGeom>
+          <a:solidFill>
+            <a:srgbClr val="8F7EB4"/>
+          </a:solidFill>
+          <a:ln>
+            <a:solidFill>
+              <a:srgbClr val="8F7EB4"/>
+            </a:solidFill>
+          </a:ln>
+        </p:spPr>
+        <p:style>
+          <a:lnRef idx="2">
+            <a:schemeClr val="accent1">
+              <a:shade val="15000"/>
+            </a:schemeClr>
+          </a:lnRef>
+          <a:fillRef idx="1">
+            <a:schemeClr val="accent1"/>
+          </a:fillRef>
+          <a:effectRef idx="0">
+            <a:schemeClr val="accent1"/>
+          </a:effectRef>
+          <a:fontRef idx="minor">
+            <a:schemeClr val="lt1"/>
+          </a:fontRef>
+        </p:style>
+        <p:txBody>
+          <a:bodyPr rtlCol="0" anchor="ctr"/>
+          <a:lstStyle/>
+          <a:p>
+            <a:pPr algn="ctr"/>
+            <a:endParaRPr lang="nl-BE"/>
+          </a:p>
+        </p:txBody>
+      </p:sp>
+      <p:sp>
+        <p:nvSpPr>
+          <p:cNvPr id="4" name="Rechthoek 3">
+            <a:extLst>
+              <a:ext uri="{FF2B5EF4-FFF2-40B4-BE49-F238E27FC236}">
+                <a16:creationId xmlns:a16="http://schemas.microsoft.com/office/drawing/2014/main" id="{75B717EB-3A06-5DF9-6E60-0B3171083EFC}"/>
+              </a:ext>
+            </a:extLst>
+          </p:cNvPr>
+          <p:cNvSpPr/>
+          <p:nvPr/>
+        </p:nvSpPr>
+        <p:spPr>
+          <a:xfrm>
+            <a:off x="0" y="1"/>
+            <a:ext cx="12192000" cy="932330"/>
+          </a:xfrm>
+          <a:prstGeom prst="rect">
+            <a:avLst/>
+          </a:prstGeom>
+          <a:solidFill>
+            <a:srgbClr val="B6ABCE"/>
+          </a:solidFill>
+          <a:ln>
+            <a:solidFill>
+              <a:srgbClr val="B6ABCE"/>
+            </a:solidFill>
+          </a:ln>
+        </p:spPr>
+        <p:style>
+          <a:lnRef idx="2">
+            <a:schemeClr val="accent1">
+              <a:shade val="15000"/>
+            </a:schemeClr>
+          </a:lnRef>
+          <a:fillRef idx="1">
+            <a:schemeClr val="accent1"/>
+          </a:fillRef>
+          <a:effectRef idx="0">
+            <a:schemeClr val="accent1"/>
+          </a:effectRef>
+          <a:fontRef idx="minor">
+            <a:schemeClr val="lt1"/>
+          </a:fontRef>
+        </p:style>
+        <p:txBody>
+          <a:bodyPr rtlCol="0" anchor="ctr"/>
+          <a:lstStyle/>
+          <a:p>
+            <a:pPr algn="ctr"/>
+            <a:r>
+              <a:rPr lang="nl-BE" sz="5000" b="1" dirty="0">
+                <a:latin typeface="Inter"/>
+                <a:cs typeface="Arial" panose="020B0604020202020204" pitchFamily="34" charset="0"/>
+              </a:rPr>
+              <a:t>Het team</a:t>
+            </a:r>
+          </a:p>
+        </p:txBody>
+      </p:sp>
+      <p:sp>
+        <p:nvSpPr>
+          <p:cNvPr id="6" name="Rechthoek 5">
+            <a:extLst>
+              <a:ext uri="{FF2B5EF4-FFF2-40B4-BE49-F238E27FC236}">
+                <a16:creationId xmlns:a16="http://schemas.microsoft.com/office/drawing/2014/main" id="{0B39C235-BA59-7CFA-8535-1B2259CC77B7}"/>
+              </a:ext>
+            </a:extLst>
+          </p:cNvPr>
+          <p:cNvSpPr/>
+          <p:nvPr/>
+        </p:nvSpPr>
+        <p:spPr>
+          <a:xfrm>
+            <a:off x="0" y="6492875"/>
+            <a:ext cx="12192000" cy="365125"/>
+          </a:xfrm>
+          <a:prstGeom prst="rect">
+            <a:avLst/>
+          </a:prstGeom>
+          <a:solidFill>
+            <a:srgbClr val="8F7EB4"/>
+          </a:solidFill>
+          <a:ln>
+            <a:solidFill>
+              <a:srgbClr val="8F7EB4"/>
+            </a:solidFill>
+          </a:ln>
+        </p:spPr>
+        <p:style>
+          <a:lnRef idx="2">
+            <a:schemeClr val="accent1">
+              <a:shade val="15000"/>
+            </a:schemeClr>
+          </a:lnRef>
+          <a:fillRef idx="1">
+            <a:schemeClr val="accent1"/>
+          </a:fillRef>
+          <a:effectRef idx="0">
+            <a:schemeClr val="accent1"/>
+          </a:effectRef>
+          <a:fontRef idx="minor">
+            <a:schemeClr val="lt1"/>
+          </a:fontRef>
+        </p:style>
+        <p:txBody>
+          <a:bodyPr rtlCol="0" anchor="ctr"/>
+          <a:lstStyle/>
+          <a:p>
+            <a:pPr algn="ctr"/>
+            <a:endParaRPr lang="nl-BE">
+              <a:solidFill>
+                <a:srgbClr val="F37C00"/>
+              </a:solidFill>
+            </a:endParaRPr>
+          </a:p>
+        </p:txBody>
+      </p:sp>
+      <p:sp>
+        <p:nvSpPr>
+          <p:cNvPr id="11" name="Tijdelijke aanduiding voor dianummer 10">
+            <a:extLst>
+              <a:ext uri="{FF2B5EF4-FFF2-40B4-BE49-F238E27FC236}">
+                <a16:creationId xmlns:a16="http://schemas.microsoft.com/office/drawing/2014/main" id="{1A565F74-2E43-0B19-EA72-AAAC00FA36F9}"/>
+              </a:ext>
+            </a:extLst>
+          </p:cNvPr>
+          <p:cNvSpPr>
+            <a:spLocks noGrp="1"/>
+          </p:cNvSpPr>
+          <p:nvPr>
+            <p:ph type="sldNum" sz="quarter" idx="12"/>
+          </p:nvPr>
+        </p:nvSpPr>
+        <p:spPr>
+          <a:xfrm>
+            <a:off x="11362267" y="6492875"/>
+            <a:ext cx="829733" cy="365125"/>
+          </a:xfrm>
+        </p:spPr>
+        <p:txBody>
+          <a:bodyPr/>
+          <a:lstStyle/>
+          <a:p>
+            <a:r>
+              <a:rPr lang="nl-BE" sz="2000" b="1" dirty="0">
+                <a:solidFill>
+                  <a:schemeClr val="bg1"/>
+                </a:solidFill>
+                <a:latin typeface="Inter"/>
+                <a:cs typeface="Arial" panose="020B0604020202020204" pitchFamily="34" charset="0"/>
+              </a:rPr>
+              <a:t>02/20</a:t>
+            </a:r>
+          </a:p>
+        </p:txBody>
+      </p:sp>
+      <p:sp>
+        <p:nvSpPr>
+          <p:cNvPr id="3" name="Tekstvak 2">
+            <a:extLst>
+              <a:ext uri="{FF2B5EF4-FFF2-40B4-BE49-F238E27FC236}">
+                <a16:creationId xmlns:a16="http://schemas.microsoft.com/office/drawing/2014/main" id="{00CED51D-DA9E-4315-5414-C4972B08CD39}"/>
+              </a:ext>
+            </a:extLst>
+          </p:cNvPr>
+          <p:cNvSpPr txBox="1"/>
+          <p:nvPr/>
+        </p:nvSpPr>
+        <p:spPr>
+          <a:xfrm>
+            <a:off x="3032944" y="4672998"/>
+            <a:ext cx="3910371" cy="584775"/>
+          </a:xfrm>
+          <a:prstGeom prst="rect">
+            <a:avLst/>
+          </a:prstGeom>
+          <a:noFill/>
+        </p:spPr>
+        <p:txBody>
+          <a:bodyPr wrap="square" rtlCol="0">
+            <a:spAutoFit/>
+          </a:bodyPr>
+          <a:lstStyle/>
+          <a:p>
+            <a:pPr algn="ctr"/>
+            <a:r>
+              <a:rPr lang="nl-BE" sz="3200" b="1" dirty="0">
+                <a:solidFill>
+                  <a:schemeClr val="bg1"/>
+                </a:solidFill>
+                <a:latin typeface="Inter"/>
+                <a:cs typeface="Arial" panose="020B0604020202020204" pitchFamily="34" charset="0"/>
+              </a:rPr>
+              <a:t>Elias De Hondt</a:t>
+            </a:r>
+          </a:p>
+        </p:txBody>
+      </p:sp>
+      <p:sp>
+        <p:nvSpPr>
+          <p:cNvPr id="5" name="Rechthoek: afgeronde hoeken 4">
+            <a:extLst>
+              <a:ext uri="{FF2B5EF4-FFF2-40B4-BE49-F238E27FC236}">
+                <a16:creationId xmlns:a16="http://schemas.microsoft.com/office/drawing/2014/main" id="{8C61D6F1-237C-4E85-79F5-FC979839B73D}"/>
+              </a:ext>
+            </a:extLst>
+          </p:cNvPr>
+          <p:cNvSpPr/>
+          <p:nvPr/>
+        </p:nvSpPr>
+        <p:spPr>
+          <a:xfrm>
+            <a:off x="7877862" y="1694624"/>
+            <a:ext cx="934518" cy="3910364"/>
+          </a:xfrm>
+          <a:prstGeom prst="roundRect">
+            <a:avLst/>
+          </a:prstGeom>
+          <a:solidFill>
+            <a:srgbClr val="8F7EB4"/>
+          </a:solidFill>
+          <a:ln>
+            <a:solidFill>
+              <a:srgbClr val="8F7EB4"/>
+            </a:solidFill>
+          </a:ln>
+        </p:spPr>
+        <p:style>
+          <a:lnRef idx="2">
+            <a:schemeClr val="accent1">
+              <a:shade val="15000"/>
+            </a:schemeClr>
+          </a:lnRef>
+          <a:fillRef idx="1">
+            <a:schemeClr val="accent1"/>
+          </a:fillRef>
+          <a:effectRef idx="0">
+            <a:schemeClr val="accent1"/>
+          </a:effectRef>
+          <a:fontRef idx="minor">
+            <a:schemeClr val="lt1"/>
+          </a:fontRef>
+        </p:style>
+        <p:txBody>
+          <a:bodyPr rtlCol="0" anchor="ctr"/>
+          <a:lstStyle/>
+          <a:p>
+            <a:pPr algn="ctr"/>
+            <a:endParaRPr lang="nl-BE"/>
+          </a:p>
+        </p:txBody>
+      </p:sp>
+      <p:sp>
+        <p:nvSpPr>
+          <p:cNvPr id="8" name="Tekstvak 7">
+            <a:extLst>
+              <a:ext uri="{FF2B5EF4-FFF2-40B4-BE49-F238E27FC236}">
+                <a16:creationId xmlns:a16="http://schemas.microsoft.com/office/drawing/2014/main" id="{1C8926A7-126F-5F3F-815E-745008D5BC92}"/>
+              </a:ext>
+            </a:extLst>
+          </p:cNvPr>
+          <p:cNvSpPr txBox="1"/>
+          <p:nvPr/>
+        </p:nvSpPr>
+        <p:spPr>
+          <a:xfrm rot="16200000">
+            <a:off x="6381328" y="3366029"/>
+            <a:ext cx="3927588" cy="584775"/>
+          </a:xfrm>
+          <a:prstGeom prst="rect">
+            <a:avLst/>
+          </a:prstGeom>
+          <a:noFill/>
+        </p:spPr>
+        <p:txBody>
+          <a:bodyPr wrap="square" rtlCol="0">
+            <a:spAutoFit/>
+          </a:bodyPr>
+          <a:lstStyle/>
+          <a:p>
+            <a:pPr algn="ctr"/>
+            <a:r>
+              <a:rPr lang="nl-BE" sz="3200" b="1" dirty="0">
+                <a:solidFill>
+                  <a:schemeClr val="bg1"/>
+                </a:solidFill>
+                <a:latin typeface="Inter"/>
+                <a:cs typeface="Arial" panose="020B0604020202020204" pitchFamily="34" charset="0"/>
+              </a:rPr>
+              <a:t>Vera Wise</a:t>
+            </a:r>
+          </a:p>
+        </p:txBody>
+      </p:sp>
+      <p:sp>
+        <p:nvSpPr>
+          <p:cNvPr id="9" name="Rechthoek: afgeronde hoeken 8">
+            <a:extLst>
+              <a:ext uri="{FF2B5EF4-FFF2-40B4-BE49-F238E27FC236}">
+                <a16:creationId xmlns:a16="http://schemas.microsoft.com/office/drawing/2014/main" id="{6593CC64-0291-8B04-AD8A-F64ACC4C9445}"/>
+              </a:ext>
+            </a:extLst>
+          </p:cNvPr>
+          <p:cNvSpPr/>
+          <p:nvPr/>
+        </p:nvSpPr>
+        <p:spPr>
+          <a:xfrm>
+            <a:off x="6752063" y="1694622"/>
+            <a:ext cx="934518" cy="3910365"/>
+          </a:xfrm>
+          <a:prstGeom prst="roundRect">
+            <a:avLst/>
+          </a:prstGeom>
+          <a:solidFill>
+            <a:srgbClr val="B6ABCE"/>
+          </a:solidFill>
+          <a:ln>
+            <a:solidFill>
+              <a:srgbClr val="B6ABCE"/>
+            </a:solidFill>
+          </a:ln>
+        </p:spPr>
+        <p:style>
+          <a:lnRef idx="2">
+            <a:schemeClr val="accent1">
+              <a:shade val="15000"/>
+            </a:schemeClr>
+          </a:lnRef>
+          <a:fillRef idx="1">
+            <a:schemeClr val="accent1"/>
+          </a:fillRef>
+          <a:effectRef idx="0">
+            <a:schemeClr val="accent1"/>
+          </a:effectRef>
+          <a:fontRef idx="minor">
+            <a:schemeClr val="lt1"/>
+          </a:fontRef>
+        </p:style>
+        <p:txBody>
+          <a:bodyPr rtlCol="0" anchor="ctr"/>
+          <a:lstStyle/>
+          <a:p>
+            <a:pPr algn="ctr"/>
+            <a:endParaRPr lang="nl-BE"/>
+          </a:p>
+        </p:txBody>
+      </p:sp>
+      <p:sp>
+        <p:nvSpPr>
+          <p:cNvPr id="10" name="Tekstvak 9">
+            <a:extLst>
+              <a:ext uri="{FF2B5EF4-FFF2-40B4-BE49-F238E27FC236}">
+                <a16:creationId xmlns:a16="http://schemas.microsoft.com/office/drawing/2014/main" id="{774AC6F1-7F79-77FE-1091-D133FDE44022}"/>
+              </a:ext>
+            </a:extLst>
+          </p:cNvPr>
+          <p:cNvSpPr txBox="1"/>
+          <p:nvPr/>
+        </p:nvSpPr>
+        <p:spPr>
+          <a:xfrm rot="16200000">
+            <a:off x="5280520" y="3366019"/>
+            <a:ext cx="3910366" cy="584775"/>
+          </a:xfrm>
+          <a:prstGeom prst="rect">
+            <a:avLst/>
+          </a:prstGeom>
+          <a:noFill/>
+        </p:spPr>
+        <p:txBody>
+          <a:bodyPr wrap="square" rtlCol="0">
+            <a:spAutoFit/>
+          </a:bodyPr>
+          <a:lstStyle/>
+          <a:p>
+            <a:pPr algn="ctr"/>
+            <a:r>
+              <a:rPr lang="nl-BE" sz="3200" b="1" dirty="0">
+                <a:solidFill>
+                  <a:schemeClr val="bg1"/>
+                </a:solidFill>
+                <a:latin typeface="Inter"/>
+                <a:cs typeface="Arial" panose="020B0604020202020204" pitchFamily="34" charset="0"/>
+              </a:rPr>
+              <a:t>Vincent Verboven</a:t>
+            </a:r>
+          </a:p>
+        </p:txBody>
+      </p:sp>
+      <p:pic>
+        <p:nvPicPr>
+          <p:cNvPr id="19" name="Afbeelding 18" descr="Afbeelding met cirkel, diagram, pixel&#10;&#10;Door AI gegenereerde inhoud is mogelijk onjuist.">
+            <a:extLst>
+              <a:ext uri="{FF2B5EF4-FFF2-40B4-BE49-F238E27FC236}">
+                <a16:creationId xmlns:a16="http://schemas.microsoft.com/office/drawing/2014/main" id="{2950ADF1-6D79-6893-A2C4-C89A9591D234}"/>
+              </a:ext>
+            </a:extLst>
+          </p:cNvPr>
+          <p:cNvPicPr>
+            <a:picLocks noChangeAspect="1"/>
+          </p:cNvPicPr>
+          <p:nvPr/>
+        </p:nvPicPr>
+        <p:blipFill>
+          <a:blip r:embed="rId3">
+            <a:extLst>
+              <a:ext uri="{28A0092B-C50C-407E-A947-70E740481C1C}">
+                <a14:useLocalDpi xmlns:a14="http://schemas.microsoft.com/office/drawing/2010/main" val="0"/>
+              </a:ext>
+            </a:extLst>
+          </a:blip>
+          <a:stretch>
+            <a:fillRect/>
+          </a:stretch>
+        </p:blipFill>
+        <p:spPr>
+          <a:xfrm>
+            <a:off x="11203050" y="-56619"/>
+            <a:ext cx="1008000" cy="1008000"/>
+          </a:xfrm>
+          <a:prstGeom prst="rect">
+            <a:avLst/>
+          </a:prstGeom>
+        </p:spPr>
+      </p:pic>
+      <p:sp>
+        <p:nvSpPr>
+          <p:cNvPr id="17" name="Tekstvak 16">
+            <a:extLst>
+              <a:ext uri="{FF2B5EF4-FFF2-40B4-BE49-F238E27FC236}">
+                <a16:creationId xmlns:a16="http://schemas.microsoft.com/office/drawing/2014/main" id="{C05317AF-8D9B-385D-AB85-0B242A5ACBFF}"/>
+              </a:ext>
+            </a:extLst>
+          </p:cNvPr>
+          <p:cNvSpPr txBox="1"/>
+          <p:nvPr/>
+        </p:nvSpPr>
+        <p:spPr>
+          <a:xfrm>
+            <a:off x="0" y="6492875"/>
+            <a:ext cx="2423227" cy="369332"/>
+          </a:xfrm>
+          <a:prstGeom prst="rect">
+            <a:avLst/>
+          </a:prstGeom>
+          <a:noFill/>
+        </p:spPr>
+        <p:txBody>
+          <a:bodyPr wrap="none" rtlCol="0">
+            <a:spAutoFit/>
+          </a:bodyPr>
+          <a:lstStyle/>
+          <a:p>
+            <a:r>
+              <a:rPr lang="nl-BE" b="1" dirty="0">
+                <a:solidFill>
+                  <a:schemeClr val="bg1"/>
+                </a:solidFill>
+                <a:latin typeface="Inter"/>
+                <a:cs typeface="Arial" panose="020B0604020202020204" pitchFamily="34" charset="0"/>
+              </a:rPr>
+              <a:t>Spreker: Elias De Hondt</a:t>
+            </a:r>
+          </a:p>
+        </p:txBody>
+      </p:sp>
+      <p:pic>
+        <p:nvPicPr>
+          <p:cNvPr id="30" name="Afbeelding 29" descr="Afbeelding met persoon, Menselijk gezicht, glimlach, kleding&#10;&#10;Door AI gegenereerde inhoud is mogelijk onjuist.">
+            <a:extLst>
+              <a:ext uri="{FF2B5EF4-FFF2-40B4-BE49-F238E27FC236}">
+                <a16:creationId xmlns:a16="http://schemas.microsoft.com/office/drawing/2014/main" id="{0845535C-659E-1A08-059D-32CBDB777596}"/>
+              </a:ext>
+            </a:extLst>
+          </p:cNvPr>
+          <p:cNvPicPr>
+            <a:picLocks noChangeAspect="1"/>
+          </p:cNvPicPr>
+          <p:nvPr/>
+        </p:nvPicPr>
+        <p:blipFill>
+          <a:blip r:embed="rId4">
+            <a:extLst>
+              <a:ext uri="{28A0092B-C50C-407E-A947-70E740481C1C}">
+                <a14:useLocalDpi xmlns:a14="http://schemas.microsoft.com/office/drawing/2010/main" val="0"/>
+              </a:ext>
+            </a:extLst>
+          </a:blip>
+          <a:stretch>
+            <a:fillRect/>
+          </a:stretch>
+        </p:blipFill>
+        <p:spPr>
+          <a:xfrm>
+            <a:off x="3586375" y="1881096"/>
+            <a:ext cx="2784297" cy="2784297"/>
+          </a:xfrm>
+          <a:prstGeom prst="rect">
+            <a:avLst/>
+          </a:prstGeom>
+        </p:spPr>
+      </p:pic>
+      <p:sp>
+        <p:nvSpPr>
+          <p:cNvPr id="31" name="Rechthoek: afgeronde hoeken 30">
+            <a:extLst>
+              <a:ext uri="{FF2B5EF4-FFF2-40B4-BE49-F238E27FC236}">
+                <a16:creationId xmlns:a16="http://schemas.microsoft.com/office/drawing/2014/main" id="{BB0D2655-41AE-434D-F687-CE206E124191}"/>
+              </a:ext>
+            </a:extLst>
+          </p:cNvPr>
+          <p:cNvSpPr/>
+          <p:nvPr/>
+        </p:nvSpPr>
+        <p:spPr>
+          <a:xfrm>
+            <a:off x="3825145" y="4619673"/>
+            <a:ext cx="2422915" cy="45719"/>
+          </a:xfrm>
+          <a:prstGeom prst="roundRect">
+            <a:avLst/>
+          </a:prstGeom>
+          <a:solidFill>
+            <a:srgbClr val="B6ABCE"/>
+          </a:solidFill>
+          <a:ln>
+            <a:solidFill>
+              <a:srgbClr val="B6ABCE"/>
+            </a:solidFill>
+          </a:ln>
+        </p:spPr>
+        <p:style>
+          <a:lnRef idx="2">
+            <a:schemeClr val="accent1">
+              <a:shade val="15000"/>
+            </a:schemeClr>
+          </a:lnRef>
+          <a:fillRef idx="1">
+            <a:schemeClr val="accent1"/>
+          </a:fillRef>
+          <a:effectRef idx="0">
+            <a:schemeClr val="accent1"/>
+          </a:effectRef>
+          <a:fontRef idx="minor">
+            <a:schemeClr val="lt1"/>
+          </a:fontRef>
+        </p:style>
+        <p:txBody>
+          <a:bodyPr rtlCol="0" anchor="ctr"/>
+          <a:lstStyle/>
+          <a:p>
+            <a:pPr algn="ctr"/>
+            <a:endParaRPr lang="nl-BE"/>
+          </a:p>
+        </p:txBody>
+      </p:sp>
+    </p:spTree>
+    <p:extLst>
+      <p:ext uri="{BB962C8B-B14F-4D97-AF65-F5344CB8AC3E}">
+        <p14:creationId xmlns:p14="http://schemas.microsoft.com/office/powerpoint/2010/main" val="3417144408"/>
+      </p:ext>
+    </p:extLst>
+  </p:cSld>
+  <p:clrMapOvr>
+    <a:masterClrMapping/>
+  </p:clrMapOvr>
+  <mc:AlternateContent xmlns:mc="http://schemas.openxmlformats.org/markup-compatibility/2006" xmlns:p159="http://schemas.microsoft.com/office/powerpoint/2015/09/main">
+    <mc:Choice Requires="p159">
+      <p:transition spd="med">
+        <p159:morph option="byObject"/>
+      </p:transition>
+    </mc:Choice>
+    <mc:Fallback xmlns="">
+      <p:transition spd="med">
+        <p:fade/>
+      </p:transition>
+    </mc:Fallback>
+  </mc:AlternateContent>
+</p:sld>
+</file>
+
+<file path=ppt/slides/slide6.xml><?xml version="1.0" encoding="utf-8"?>
+<p:sld xmlns:a="http://schemas.openxmlformats.org/drawingml/2006/main" xmlns:r="http://schemas.openxmlformats.org/officeDocument/2006/relationships" xmlns:p="http://schemas.openxmlformats.org/presentationml/2006/main">
+  <p:cSld>
+    <p:spTree>
+      <p:nvGrpSpPr>
+        <p:cNvPr id="1" name="">
+          <a:extLst>
+            <a:ext uri="{FF2B5EF4-FFF2-40B4-BE49-F238E27FC236}">
+              <a16:creationId xmlns:a16="http://schemas.microsoft.com/office/drawing/2014/main" id="{23C345D9-0B48-DAA5-472F-7FEFF61644E6}"/>
+            </a:ext>
+          </a:extLst>
+        </p:cNvPr>
+        <p:cNvGrpSpPr/>
+        <p:nvPr/>
+      </p:nvGrpSpPr>
+      <p:grpSpPr>
+        <a:xfrm>
+          <a:off x="0" y="0"/>
+          <a:ext cx="0" cy="0"/>
+          <a:chOff x="0" y="0"/>
+          <a:chExt cx="0" cy="0"/>
+        </a:xfrm>
+      </p:grpSpPr>
+      <p:sp>
+        <p:nvSpPr>
+          <p:cNvPr id="28" name="Rechthoek: afgeronde hoeken 27">
+            <a:extLst>
+              <a:ext uri="{FF2B5EF4-FFF2-40B4-BE49-F238E27FC236}">
+                <a16:creationId xmlns:a16="http://schemas.microsoft.com/office/drawing/2014/main" id="{106D8001-5008-1010-0099-7EACF443561E}"/>
+              </a:ext>
+            </a:extLst>
+          </p:cNvPr>
+          <p:cNvSpPr/>
+          <p:nvPr/>
+        </p:nvSpPr>
+        <p:spPr>
+          <a:xfrm>
+            <a:off x="3412412" y="1711847"/>
+            <a:ext cx="936000" cy="3910364"/>
+          </a:xfrm>
+          <a:prstGeom prst="roundRect">
+            <a:avLst/>
+          </a:prstGeom>
+          <a:solidFill>
+            <a:srgbClr val="8F7EB4"/>
+          </a:solidFill>
+          <a:ln>
+            <a:solidFill>
+              <a:srgbClr val="8F7EB4"/>
+            </a:solidFill>
+          </a:ln>
+        </p:spPr>
+        <p:style>
+          <a:lnRef idx="2">
+            <a:schemeClr val="accent1">
+              <a:shade val="15000"/>
+            </a:schemeClr>
+          </a:lnRef>
+          <a:fillRef idx="1">
+            <a:schemeClr val="accent1"/>
+          </a:fillRef>
+          <a:effectRef idx="0">
+            <a:schemeClr val="accent1"/>
+          </a:effectRef>
+          <a:fontRef idx="minor">
+            <a:schemeClr val="lt1"/>
+          </a:fontRef>
+        </p:style>
+        <p:txBody>
+          <a:bodyPr rtlCol="0" anchor="ctr"/>
+          <a:lstStyle/>
+          <a:p>
+            <a:pPr algn="ctr"/>
+            <a:endParaRPr lang="nl-BE"/>
+          </a:p>
+        </p:txBody>
+      </p:sp>
+      <p:sp>
+        <p:nvSpPr>
+          <p:cNvPr id="4" name="Rechthoek 3">
+            <a:extLst>
+              <a:ext uri="{FF2B5EF4-FFF2-40B4-BE49-F238E27FC236}">
+                <a16:creationId xmlns:a16="http://schemas.microsoft.com/office/drawing/2014/main" id="{F88D0763-2948-8186-0A55-BE0B7BD4D427}"/>
+              </a:ext>
+            </a:extLst>
+          </p:cNvPr>
+          <p:cNvSpPr/>
+          <p:nvPr/>
+        </p:nvSpPr>
+        <p:spPr>
+          <a:xfrm>
+            <a:off x="0" y="1"/>
+            <a:ext cx="12192000" cy="932330"/>
+          </a:xfrm>
+          <a:prstGeom prst="rect">
+            <a:avLst/>
+          </a:prstGeom>
+          <a:solidFill>
+            <a:srgbClr val="B6ABCE"/>
+          </a:solidFill>
+          <a:ln>
+            <a:solidFill>
+              <a:srgbClr val="B6ABCE"/>
+            </a:solidFill>
+          </a:ln>
+        </p:spPr>
+        <p:style>
+          <a:lnRef idx="2">
+            <a:schemeClr val="accent1">
+              <a:shade val="15000"/>
+            </a:schemeClr>
+          </a:lnRef>
+          <a:fillRef idx="1">
+            <a:schemeClr val="accent1"/>
+          </a:fillRef>
+          <a:effectRef idx="0">
+            <a:schemeClr val="accent1"/>
+          </a:effectRef>
+          <a:fontRef idx="minor">
+            <a:schemeClr val="lt1"/>
+          </a:fontRef>
+        </p:style>
+        <p:txBody>
+          <a:bodyPr rtlCol="0" anchor="ctr"/>
+          <a:lstStyle/>
+          <a:p>
+            <a:pPr algn="ctr"/>
+            <a:r>
+              <a:rPr lang="nl-BE" sz="5000" b="1" dirty="0">
+                <a:latin typeface="Inter"/>
+                <a:cs typeface="Arial" panose="020B0604020202020204" pitchFamily="34" charset="0"/>
+              </a:rPr>
+              <a:t>Het team</a:t>
+            </a:r>
+          </a:p>
+        </p:txBody>
+      </p:sp>
+      <p:sp>
+        <p:nvSpPr>
+          <p:cNvPr id="6" name="Rechthoek 5">
+            <a:extLst>
+              <a:ext uri="{FF2B5EF4-FFF2-40B4-BE49-F238E27FC236}">
+                <a16:creationId xmlns:a16="http://schemas.microsoft.com/office/drawing/2014/main" id="{3127E9ED-D524-A566-2009-0BE38C7469D1}"/>
+              </a:ext>
+            </a:extLst>
+          </p:cNvPr>
+          <p:cNvSpPr/>
+          <p:nvPr/>
+        </p:nvSpPr>
+        <p:spPr>
+          <a:xfrm>
+            <a:off x="0" y="6492875"/>
+            <a:ext cx="12192000" cy="365125"/>
+          </a:xfrm>
+          <a:prstGeom prst="rect">
+            <a:avLst/>
+          </a:prstGeom>
+          <a:solidFill>
+            <a:srgbClr val="8F7EB4"/>
+          </a:solidFill>
+          <a:ln>
+            <a:solidFill>
+              <a:srgbClr val="8F7EB4"/>
+            </a:solidFill>
+          </a:ln>
+        </p:spPr>
+        <p:style>
+          <a:lnRef idx="2">
+            <a:schemeClr val="accent1">
+              <a:shade val="15000"/>
+            </a:schemeClr>
+          </a:lnRef>
+          <a:fillRef idx="1">
+            <a:schemeClr val="accent1"/>
+          </a:fillRef>
+          <a:effectRef idx="0">
+            <a:schemeClr val="accent1"/>
+          </a:effectRef>
+          <a:fontRef idx="minor">
+            <a:schemeClr val="lt1"/>
+          </a:fontRef>
+        </p:style>
+        <p:txBody>
+          <a:bodyPr rtlCol="0" anchor="ctr"/>
+          <a:lstStyle/>
+          <a:p>
+            <a:pPr algn="ctr"/>
+            <a:endParaRPr lang="nl-BE">
+              <a:solidFill>
+                <a:srgbClr val="F37C00"/>
+              </a:solidFill>
+            </a:endParaRPr>
+          </a:p>
+        </p:txBody>
+      </p:sp>
+      <p:sp>
+        <p:nvSpPr>
+          <p:cNvPr id="11" name="Tijdelijke aanduiding voor dianummer 10">
+            <a:extLst>
+              <a:ext uri="{FF2B5EF4-FFF2-40B4-BE49-F238E27FC236}">
+                <a16:creationId xmlns:a16="http://schemas.microsoft.com/office/drawing/2014/main" id="{4B16DA65-7850-8E90-3FE6-20E7C59D758E}"/>
+              </a:ext>
+            </a:extLst>
+          </p:cNvPr>
+          <p:cNvSpPr>
+            <a:spLocks noGrp="1"/>
+          </p:cNvSpPr>
+          <p:nvPr>
+            <p:ph type="sldNum" sz="quarter" idx="12"/>
+          </p:nvPr>
+        </p:nvSpPr>
+        <p:spPr>
+          <a:xfrm>
+            <a:off x="11362267" y="6492875"/>
+            <a:ext cx="829733" cy="365125"/>
+          </a:xfrm>
+        </p:spPr>
+        <p:txBody>
+          <a:bodyPr/>
+          <a:lstStyle/>
+          <a:p>
+            <a:r>
+              <a:rPr lang="nl-BE" sz="2000" b="1" dirty="0">
+                <a:solidFill>
+                  <a:schemeClr val="bg1"/>
+                </a:solidFill>
+                <a:latin typeface="Inter"/>
+                <a:cs typeface="Arial" panose="020B0604020202020204" pitchFamily="34" charset="0"/>
+              </a:rPr>
+              <a:t>03/20</a:t>
+            </a:r>
+          </a:p>
+        </p:txBody>
+      </p:sp>
+      <p:sp>
+        <p:nvSpPr>
+          <p:cNvPr id="3" name="Tekstvak 2">
+            <a:extLst>
+              <a:ext uri="{FF2B5EF4-FFF2-40B4-BE49-F238E27FC236}">
+                <a16:creationId xmlns:a16="http://schemas.microsoft.com/office/drawing/2014/main" id="{92EDB6F3-E688-AE91-E41A-02B3AFC2CCF7}"/>
+              </a:ext>
+            </a:extLst>
+          </p:cNvPr>
+          <p:cNvSpPr txBox="1"/>
+          <p:nvPr/>
+        </p:nvSpPr>
+        <p:spPr>
+          <a:xfrm rot="16200000">
+            <a:off x="1925226" y="3366021"/>
+            <a:ext cx="3910371" cy="584775"/>
+          </a:xfrm>
+          <a:prstGeom prst="rect">
+            <a:avLst/>
+          </a:prstGeom>
+          <a:noFill/>
+        </p:spPr>
+        <p:txBody>
+          <a:bodyPr wrap="square" rtlCol="0">
+            <a:spAutoFit/>
+          </a:bodyPr>
+          <a:lstStyle/>
+          <a:p>
+            <a:pPr algn="ctr"/>
+            <a:r>
+              <a:rPr lang="nl-BE" sz="3200" b="1" dirty="0">
+                <a:solidFill>
+                  <a:schemeClr val="bg1"/>
+                </a:solidFill>
+                <a:latin typeface="Inter"/>
+                <a:cs typeface="Arial" panose="020B0604020202020204" pitchFamily="34" charset="0"/>
+              </a:rPr>
+              <a:t>Elias De Hondt</a:t>
+            </a:r>
+          </a:p>
+        </p:txBody>
+      </p:sp>
+      <p:sp>
+        <p:nvSpPr>
+          <p:cNvPr id="5" name="Rechthoek: afgeronde hoeken 4">
+            <a:extLst>
+              <a:ext uri="{FF2B5EF4-FFF2-40B4-BE49-F238E27FC236}">
+                <a16:creationId xmlns:a16="http://schemas.microsoft.com/office/drawing/2014/main" id="{DFF98FFC-ADF2-5C63-27CD-D96235C906D5}"/>
+              </a:ext>
+            </a:extLst>
+          </p:cNvPr>
+          <p:cNvSpPr/>
+          <p:nvPr/>
+        </p:nvSpPr>
+        <p:spPr>
+          <a:xfrm>
+            <a:off x="7877862" y="1694624"/>
+            <a:ext cx="934518" cy="3910364"/>
+          </a:xfrm>
+          <a:prstGeom prst="roundRect">
+            <a:avLst/>
+          </a:prstGeom>
+          <a:solidFill>
+            <a:srgbClr val="8F7EB4"/>
+          </a:solidFill>
+          <a:ln>
+            <a:solidFill>
+              <a:srgbClr val="8F7EB4"/>
+            </a:solidFill>
+          </a:ln>
+        </p:spPr>
+        <p:style>
+          <a:lnRef idx="2">
+            <a:schemeClr val="accent1">
+              <a:shade val="15000"/>
+            </a:schemeClr>
+          </a:lnRef>
+          <a:fillRef idx="1">
+            <a:schemeClr val="accent1"/>
+          </a:fillRef>
+          <a:effectRef idx="0">
+            <a:schemeClr val="accent1"/>
+          </a:effectRef>
+          <a:fontRef idx="minor">
+            <a:schemeClr val="lt1"/>
+          </a:fontRef>
+        </p:style>
+        <p:txBody>
+          <a:bodyPr rtlCol="0" anchor="ctr"/>
+          <a:lstStyle/>
+          <a:p>
+            <a:pPr algn="ctr"/>
+            <a:endParaRPr lang="nl-BE"/>
+          </a:p>
+        </p:txBody>
+      </p:sp>
+      <p:sp>
+        <p:nvSpPr>
+          <p:cNvPr id="8" name="Tekstvak 7">
+            <a:extLst>
+              <a:ext uri="{FF2B5EF4-FFF2-40B4-BE49-F238E27FC236}">
+                <a16:creationId xmlns:a16="http://schemas.microsoft.com/office/drawing/2014/main" id="{B43C30A1-EB7D-46F5-7B08-7CD8446933E1}"/>
+              </a:ext>
+            </a:extLst>
+          </p:cNvPr>
+          <p:cNvSpPr txBox="1"/>
+          <p:nvPr/>
+        </p:nvSpPr>
+        <p:spPr>
+          <a:xfrm rot="16200000">
+            <a:off x="6381328" y="3366029"/>
+            <a:ext cx="3927588" cy="584775"/>
+          </a:xfrm>
+          <a:prstGeom prst="rect">
+            <a:avLst/>
+          </a:prstGeom>
+          <a:noFill/>
+        </p:spPr>
+        <p:txBody>
+          <a:bodyPr wrap="square" rtlCol="0">
+            <a:spAutoFit/>
+          </a:bodyPr>
+          <a:lstStyle/>
+          <a:p>
+            <a:pPr algn="ctr"/>
+            <a:r>
+              <a:rPr lang="nl-BE" sz="3200" b="1" dirty="0">
+                <a:solidFill>
+                  <a:schemeClr val="bg1"/>
+                </a:solidFill>
+                <a:latin typeface="Inter"/>
+                <a:cs typeface="Arial" panose="020B0604020202020204" pitchFamily="34" charset="0"/>
+              </a:rPr>
+              <a:t>Vera Wise</a:t>
+            </a:r>
+          </a:p>
+        </p:txBody>
+      </p:sp>
+      <p:sp>
+        <p:nvSpPr>
+          <p:cNvPr id="9" name="Rechthoek: afgeronde hoeken 8">
+            <a:extLst>
+              <a:ext uri="{FF2B5EF4-FFF2-40B4-BE49-F238E27FC236}">
+                <a16:creationId xmlns:a16="http://schemas.microsoft.com/office/drawing/2014/main" id="{20844846-5D39-63B6-FA4A-37DE32CD1F5D}"/>
+              </a:ext>
+            </a:extLst>
+          </p:cNvPr>
+          <p:cNvSpPr/>
+          <p:nvPr/>
+        </p:nvSpPr>
+        <p:spPr>
+          <a:xfrm>
+            <a:off x="4523284" y="1703243"/>
+            <a:ext cx="3178966" cy="3910365"/>
+          </a:xfrm>
+          <a:prstGeom prst="roundRect">
+            <a:avLst/>
+          </a:prstGeom>
+          <a:solidFill>
+            <a:srgbClr val="B6ABCE"/>
+          </a:solidFill>
+          <a:ln>
+            <a:solidFill>
+              <a:srgbClr val="B6ABCE"/>
+            </a:solidFill>
+          </a:ln>
+        </p:spPr>
+        <p:style>
+          <a:lnRef idx="2">
+            <a:schemeClr val="accent1">
+              <a:shade val="15000"/>
+            </a:schemeClr>
+          </a:lnRef>
+          <a:fillRef idx="1">
+            <a:schemeClr val="accent1"/>
+          </a:fillRef>
+          <a:effectRef idx="0">
+            <a:schemeClr val="accent1"/>
+          </a:effectRef>
+          <a:fontRef idx="minor">
+            <a:schemeClr val="lt1"/>
+          </a:fontRef>
+        </p:style>
+        <p:txBody>
+          <a:bodyPr rtlCol="0" anchor="ctr"/>
+          <a:lstStyle/>
+          <a:p>
+            <a:pPr algn="ctr"/>
+            <a:endParaRPr lang="nl-BE"/>
+          </a:p>
+        </p:txBody>
+      </p:sp>
+      <p:sp>
+        <p:nvSpPr>
+          <p:cNvPr id="10" name="Tekstvak 9">
+            <a:extLst>
+              <a:ext uri="{FF2B5EF4-FFF2-40B4-BE49-F238E27FC236}">
+                <a16:creationId xmlns:a16="http://schemas.microsoft.com/office/drawing/2014/main" id="{302A2796-A381-1D6B-FE80-BC5D0526E897}"/>
+              </a:ext>
+            </a:extLst>
+          </p:cNvPr>
+          <p:cNvSpPr txBox="1"/>
+          <p:nvPr/>
+        </p:nvSpPr>
+        <p:spPr>
+          <a:xfrm>
+            <a:off x="4157197" y="4607537"/>
+            <a:ext cx="3910366" cy="584775"/>
+          </a:xfrm>
+          <a:prstGeom prst="rect">
+            <a:avLst/>
+          </a:prstGeom>
+          <a:noFill/>
+        </p:spPr>
+        <p:txBody>
+          <a:bodyPr wrap="square" rtlCol="0">
+            <a:spAutoFit/>
+          </a:bodyPr>
+          <a:lstStyle/>
+          <a:p>
+            <a:pPr algn="ctr"/>
+            <a:r>
+              <a:rPr lang="nl-BE" sz="3200" b="1" dirty="0">
+                <a:solidFill>
+                  <a:schemeClr val="bg1"/>
+                </a:solidFill>
+                <a:latin typeface="Inter"/>
+                <a:cs typeface="Arial" panose="020B0604020202020204" pitchFamily="34" charset="0"/>
+              </a:rPr>
+              <a:t>Vincent Verboven</a:t>
+            </a:r>
+          </a:p>
+        </p:txBody>
+      </p:sp>
+      <p:pic>
+        <p:nvPicPr>
+          <p:cNvPr id="19" name="Afbeelding 18" descr="Afbeelding met cirkel, diagram, pixel&#10;&#10;Door AI gegenereerde inhoud is mogelijk onjuist.">
+            <a:extLst>
+              <a:ext uri="{FF2B5EF4-FFF2-40B4-BE49-F238E27FC236}">
+                <a16:creationId xmlns:a16="http://schemas.microsoft.com/office/drawing/2014/main" id="{95B7E08D-49CF-CA8C-5AC5-22EE357AABEF}"/>
+              </a:ext>
+            </a:extLst>
+          </p:cNvPr>
+          <p:cNvPicPr>
+            <a:picLocks noChangeAspect="1"/>
+          </p:cNvPicPr>
+          <p:nvPr/>
+        </p:nvPicPr>
+        <p:blipFill>
+          <a:blip r:embed="rId3">
+            <a:extLst>
+              <a:ext uri="{28A0092B-C50C-407E-A947-70E740481C1C}">
+                <a14:useLocalDpi xmlns:a14="http://schemas.microsoft.com/office/drawing/2010/main" val="0"/>
+              </a:ext>
+            </a:extLst>
+          </a:blip>
+          <a:stretch>
+            <a:fillRect/>
+          </a:stretch>
+        </p:blipFill>
+        <p:spPr>
+          <a:xfrm>
+            <a:off x="11203050" y="-56619"/>
+            <a:ext cx="1008000" cy="1008000"/>
+          </a:xfrm>
+          <a:prstGeom prst="rect">
+            <a:avLst/>
+          </a:prstGeom>
+        </p:spPr>
+      </p:pic>
+      <p:sp>
+        <p:nvSpPr>
+          <p:cNvPr id="17" name="Tekstvak 16">
+            <a:extLst>
+              <a:ext uri="{FF2B5EF4-FFF2-40B4-BE49-F238E27FC236}">
+                <a16:creationId xmlns:a16="http://schemas.microsoft.com/office/drawing/2014/main" id="{B6E8A0A8-5061-B257-12BC-00C92558F125}"/>
+              </a:ext>
+            </a:extLst>
+          </p:cNvPr>
+          <p:cNvSpPr txBox="1"/>
+          <p:nvPr/>
+        </p:nvSpPr>
+        <p:spPr>
+          <a:xfrm>
+            <a:off x="0" y="6492875"/>
+            <a:ext cx="2725426" cy="369332"/>
+          </a:xfrm>
+          <a:prstGeom prst="rect">
+            <a:avLst/>
+          </a:prstGeom>
+          <a:noFill/>
+        </p:spPr>
+        <p:txBody>
+          <a:bodyPr wrap="square" rtlCol="0">
+            <a:spAutoFit/>
+          </a:bodyPr>
+          <a:lstStyle/>
+          <a:p>
+            <a:r>
+              <a:rPr lang="nl-BE" b="1" dirty="0">
+                <a:solidFill>
+                  <a:schemeClr val="bg1"/>
+                </a:solidFill>
+                <a:latin typeface="Inter"/>
+                <a:cs typeface="Arial" panose="020B0604020202020204" pitchFamily="34" charset="0"/>
+              </a:rPr>
+              <a:t>Spreker: </a:t>
+            </a:r>
+            <a:r>
+              <a:rPr lang="nl-BE" sz="1800" b="1" dirty="0">
+                <a:solidFill>
+                  <a:schemeClr val="bg1"/>
+                </a:solidFill>
+                <a:latin typeface="Inter"/>
+                <a:cs typeface="Arial" panose="020B0604020202020204" pitchFamily="34" charset="0"/>
+              </a:rPr>
+              <a:t>Vincent Verboven</a:t>
+            </a:r>
+          </a:p>
+        </p:txBody>
+      </p:sp>
+      <p:pic>
+        <p:nvPicPr>
+          <p:cNvPr id="2" name="Afbeelding 1">
+            <a:extLst>
+              <a:ext uri="{FF2B5EF4-FFF2-40B4-BE49-F238E27FC236}">
+                <a16:creationId xmlns:a16="http://schemas.microsoft.com/office/drawing/2014/main" id="{6AEBF3FF-93B2-454A-6851-840890242B15}"/>
+              </a:ext>
+            </a:extLst>
+          </p:cNvPr>
+          <p:cNvPicPr>
+            <a:picLocks noChangeAspect="1"/>
+          </p:cNvPicPr>
+          <p:nvPr/>
+        </p:nvPicPr>
+        <p:blipFill>
+          <a:blip r:embed="rId4">
+            <a:extLst>
+              <a:ext uri="{28A0092B-C50C-407E-A947-70E740481C1C}">
+                <a14:useLocalDpi xmlns:a14="http://schemas.microsoft.com/office/drawing/2010/main" val="0"/>
+              </a:ext>
+            </a:extLst>
+          </a:blip>
+          <a:srcRect/>
+          <a:stretch/>
+        </p:blipFill>
+        <p:spPr>
+          <a:xfrm>
+            <a:off x="4725254" y="1802995"/>
+            <a:ext cx="2784297" cy="2784297"/>
+          </a:xfrm>
+          <a:prstGeom prst="rect">
+            <a:avLst/>
+          </a:prstGeom>
+        </p:spPr>
+      </p:pic>
+      <p:sp>
+        <p:nvSpPr>
+          <p:cNvPr id="7" name="Rechthoek: afgeronde hoeken 6">
+            <a:extLst>
+              <a:ext uri="{FF2B5EF4-FFF2-40B4-BE49-F238E27FC236}">
+                <a16:creationId xmlns:a16="http://schemas.microsoft.com/office/drawing/2014/main" id="{4D486A99-7E99-837D-7510-924D72B564C0}"/>
+              </a:ext>
+            </a:extLst>
+          </p:cNvPr>
+          <p:cNvSpPr/>
+          <p:nvPr/>
+        </p:nvSpPr>
+        <p:spPr>
+          <a:xfrm>
+            <a:off x="5248380" y="4541573"/>
+            <a:ext cx="1728000" cy="45719"/>
+          </a:xfrm>
+          <a:prstGeom prst="roundRect">
+            <a:avLst/>
+          </a:prstGeom>
+          <a:solidFill>
+            <a:srgbClr val="8F7EB4"/>
+          </a:solidFill>
+          <a:ln>
+            <a:solidFill>
+              <a:srgbClr val="8F7EB4"/>
+            </a:solidFill>
+          </a:ln>
+        </p:spPr>
+        <p:style>
+          <a:lnRef idx="2">
+            <a:schemeClr val="accent1">
+              <a:shade val="15000"/>
+            </a:schemeClr>
+          </a:lnRef>
+          <a:fillRef idx="1">
+            <a:schemeClr val="accent1"/>
+          </a:fillRef>
+          <a:effectRef idx="0">
+            <a:schemeClr val="accent1"/>
+          </a:effectRef>
+          <a:fontRef idx="minor">
+            <a:schemeClr val="lt1"/>
+          </a:fontRef>
+        </p:style>
+        <p:txBody>
+          <a:bodyPr rtlCol="0" anchor="ctr"/>
+          <a:lstStyle/>
+          <a:p>
+            <a:pPr algn="ctr"/>
+            <a:endParaRPr lang="nl-BE"/>
+          </a:p>
+        </p:txBody>
+      </p:sp>
+    </p:spTree>
+    <p:extLst>
+      <p:ext uri="{BB962C8B-B14F-4D97-AF65-F5344CB8AC3E}">
+        <p14:creationId xmlns:p14="http://schemas.microsoft.com/office/powerpoint/2010/main" val="3783369461"/>
+      </p:ext>
+    </p:extLst>
+  </p:cSld>
+  <p:clrMapOvr>
+    <a:masterClrMapping/>
+  </p:clrMapOvr>
+  <mc:AlternateContent xmlns:mc="http://schemas.openxmlformats.org/markup-compatibility/2006" xmlns:p159="http://schemas.microsoft.com/office/powerpoint/2015/09/main">
+    <mc:Choice Requires="p159">
+      <p:transition spd="med">
+        <p159:morph option="byObject"/>
+      </p:transition>
+    </mc:Choice>
+    <mc:Fallback xmlns="">
+      <p:transition spd="med">
+        <p:fade/>
+      </p:transition>
+    </mc:Fallback>
+  </mc:AlternateContent>
+</p:sld>
+</file>
+
+<file path=ppt/slides/slide7.xml><?xml version="1.0" encoding="utf-8"?>
+<p:sld xmlns:a="http://schemas.openxmlformats.org/drawingml/2006/main" xmlns:r="http://schemas.openxmlformats.org/officeDocument/2006/relationships" xmlns:p="http://schemas.openxmlformats.org/presentationml/2006/main">
+  <p:cSld>
+    <p:spTree>
+      <p:nvGrpSpPr>
+        <p:cNvPr id="1" name="">
+          <a:extLst>
+            <a:ext uri="{FF2B5EF4-FFF2-40B4-BE49-F238E27FC236}">
+              <a16:creationId xmlns:a16="http://schemas.microsoft.com/office/drawing/2014/main" id="{10653142-2648-65A2-212A-C506F12C522B}"/>
+            </a:ext>
+          </a:extLst>
+        </p:cNvPr>
+        <p:cNvGrpSpPr/>
+        <p:nvPr/>
+      </p:nvGrpSpPr>
+      <p:grpSpPr>
+        <a:xfrm>
+          <a:off x="0" y="0"/>
+          <a:ext cx="0" cy="0"/>
+          <a:chOff x="0" y="0"/>
+          <a:chExt cx="0" cy="0"/>
+        </a:xfrm>
+      </p:grpSpPr>
+      <p:sp>
+        <p:nvSpPr>
+          <p:cNvPr id="28" name="Rechthoek: afgeronde hoeken 27">
+            <a:extLst>
+              <a:ext uri="{FF2B5EF4-FFF2-40B4-BE49-F238E27FC236}">
+                <a16:creationId xmlns:a16="http://schemas.microsoft.com/office/drawing/2014/main" id="{C329D797-5C34-91A5-A1F0-A87E54BA0125}"/>
+              </a:ext>
+            </a:extLst>
+          </p:cNvPr>
+          <p:cNvSpPr/>
+          <p:nvPr/>
+        </p:nvSpPr>
+        <p:spPr>
+          <a:xfrm>
+            <a:off x="3412412" y="1711847"/>
+            <a:ext cx="936000" cy="3910364"/>
+          </a:xfrm>
+          <a:prstGeom prst="roundRect">
+            <a:avLst/>
+          </a:prstGeom>
+          <a:solidFill>
+            <a:srgbClr val="8F7EB4"/>
+          </a:solidFill>
+          <a:ln>
+            <a:solidFill>
+              <a:srgbClr val="8F7EB4"/>
+            </a:solidFill>
+          </a:ln>
+        </p:spPr>
+        <p:style>
+          <a:lnRef idx="2">
+            <a:schemeClr val="accent1">
+              <a:shade val="15000"/>
+            </a:schemeClr>
+          </a:lnRef>
+          <a:fillRef idx="1">
+            <a:schemeClr val="accent1"/>
+          </a:fillRef>
+          <a:effectRef idx="0">
+            <a:schemeClr val="accent1"/>
+          </a:effectRef>
+          <a:fontRef idx="minor">
+            <a:schemeClr val="lt1"/>
+          </a:fontRef>
+        </p:style>
+        <p:txBody>
+          <a:bodyPr rtlCol="0" anchor="ctr"/>
+          <a:lstStyle/>
+          <a:p>
+            <a:pPr algn="ctr"/>
+            <a:endParaRPr lang="nl-BE"/>
+          </a:p>
+        </p:txBody>
+      </p:sp>
+      <p:sp>
+        <p:nvSpPr>
+          <p:cNvPr id="4" name="Rechthoek 3">
+            <a:extLst>
+              <a:ext uri="{FF2B5EF4-FFF2-40B4-BE49-F238E27FC236}">
+                <a16:creationId xmlns:a16="http://schemas.microsoft.com/office/drawing/2014/main" id="{F6B761A1-EAC3-BED5-4D35-17C59057F695}"/>
+              </a:ext>
+            </a:extLst>
+          </p:cNvPr>
+          <p:cNvSpPr/>
+          <p:nvPr/>
+        </p:nvSpPr>
+        <p:spPr>
+          <a:xfrm>
+            <a:off x="0" y="1"/>
+            <a:ext cx="12192000" cy="932330"/>
+          </a:xfrm>
+          <a:prstGeom prst="rect">
+            <a:avLst/>
+          </a:prstGeom>
+          <a:solidFill>
+            <a:srgbClr val="B6ABCE"/>
+          </a:solidFill>
+          <a:ln>
+            <a:solidFill>
+              <a:srgbClr val="B6ABCE"/>
+            </a:solidFill>
+          </a:ln>
+        </p:spPr>
+        <p:style>
+          <a:lnRef idx="2">
+            <a:schemeClr val="accent1">
+              <a:shade val="15000"/>
+            </a:schemeClr>
+          </a:lnRef>
+          <a:fillRef idx="1">
+            <a:schemeClr val="accent1"/>
+          </a:fillRef>
+          <a:effectRef idx="0">
+            <a:schemeClr val="accent1"/>
+          </a:effectRef>
+          <a:fontRef idx="minor">
+            <a:schemeClr val="lt1"/>
+          </a:fontRef>
+        </p:style>
+        <p:txBody>
+          <a:bodyPr rtlCol="0" anchor="ctr"/>
+          <a:lstStyle/>
+          <a:p>
+            <a:pPr algn="ctr"/>
+            <a:r>
+              <a:rPr lang="nl-BE" sz="5000" b="1" dirty="0">
+                <a:latin typeface="Inter"/>
+                <a:cs typeface="Arial" panose="020B0604020202020204" pitchFamily="34" charset="0"/>
+              </a:rPr>
+              <a:t>Het team</a:t>
+            </a:r>
+          </a:p>
+        </p:txBody>
+      </p:sp>
+      <p:sp>
+        <p:nvSpPr>
+          <p:cNvPr id="6" name="Rechthoek 5">
+            <a:extLst>
+              <a:ext uri="{FF2B5EF4-FFF2-40B4-BE49-F238E27FC236}">
+                <a16:creationId xmlns:a16="http://schemas.microsoft.com/office/drawing/2014/main" id="{4C07CFAC-FA89-634B-CFDC-600F8891DB25}"/>
+              </a:ext>
+            </a:extLst>
+          </p:cNvPr>
+          <p:cNvSpPr/>
+          <p:nvPr/>
+        </p:nvSpPr>
+        <p:spPr>
+          <a:xfrm>
+            <a:off x="0" y="6492875"/>
+            <a:ext cx="12192000" cy="365125"/>
+          </a:xfrm>
+          <a:prstGeom prst="rect">
+            <a:avLst/>
+          </a:prstGeom>
+          <a:solidFill>
+            <a:srgbClr val="8F7EB4"/>
+          </a:solidFill>
+          <a:ln>
+            <a:solidFill>
+              <a:srgbClr val="8F7EB4"/>
+            </a:solidFill>
+          </a:ln>
+        </p:spPr>
+        <p:style>
+          <a:lnRef idx="2">
+            <a:schemeClr val="accent1">
+              <a:shade val="15000"/>
+            </a:schemeClr>
+          </a:lnRef>
+          <a:fillRef idx="1">
+            <a:schemeClr val="accent1"/>
+          </a:fillRef>
+          <a:effectRef idx="0">
+            <a:schemeClr val="accent1"/>
+          </a:effectRef>
+          <a:fontRef idx="minor">
+            <a:schemeClr val="lt1"/>
+          </a:fontRef>
+        </p:style>
+        <p:txBody>
+          <a:bodyPr rtlCol="0" anchor="ctr"/>
+          <a:lstStyle/>
+          <a:p>
+            <a:pPr algn="ctr"/>
+            <a:endParaRPr lang="nl-BE">
+              <a:solidFill>
+                <a:srgbClr val="F37C00"/>
+              </a:solidFill>
+            </a:endParaRPr>
+          </a:p>
+        </p:txBody>
+      </p:sp>
+      <p:sp>
+        <p:nvSpPr>
+          <p:cNvPr id="11" name="Tijdelijke aanduiding voor dianummer 10">
+            <a:extLst>
+              <a:ext uri="{FF2B5EF4-FFF2-40B4-BE49-F238E27FC236}">
+                <a16:creationId xmlns:a16="http://schemas.microsoft.com/office/drawing/2014/main" id="{76D675AE-B7A1-AE49-0B71-4F575EF9C40D}"/>
+              </a:ext>
+            </a:extLst>
+          </p:cNvPr>
+          <p:cNvSpPr>
+            <a:spLocks noGrp="1"/>
+          </p:cNvSpPr>
+          <p:nvPr>
+            <p:ph type="sldNum" sz="quarter" idx="12"/>
+          </p:nvPr>
+        </p:nvSpPr>
+        <p:spPr>
+          <a:xfrm>
+            <a:off x="11362267" y="6492875"/>
+            <a:ext cx="829733" cy="365125"/>
+          </a:xfrm>
+        </p:spPr>
+        <p:txBody>
+          <a:bodyPr/>
+          <a:lstStyle/>
+          <a:p>
+            <a:r>
+              <a:rPr lang="nl-BE" sz="2000" b="1" dirty="0">
+                <a:solidFill>
+                  <a:schemeClr val="bg1"/>
+                </a:solidFill>
+                <a:latin typeface="Inter"/>
+                <a:cs typeface="Arial" panose="020B0604020202020204" pitchFamily="34" charset="0"/>
+              </a:rPr>
+              <a:t>04/20</a:t>
+            </a:r>
+          </a:p>
+        </p:txBody>
+      </p:sp>
+      <p:sp>
+        <p:nvSpPr>
+          <p:cNvPr id="3" name="Tekstvak 2">
+            <a:extLst>
+              <a:ext uri="{FF2B5EF4-FFF2-40B4-BE49-F238E27FC236}">
+                <a16:creationId xmlns:a16="http://schemas.microsoft.com/office/drawing/2014/main" id="{37537891-5416-4FF9-507E-04C172FBC78E}"/>
+              </a:ext>
+            </a:extLst>
+          </p:cNvPr>
+          <p:cNvSpPr txBox="1"/>
+          <p:nvPr/>
+        </p:nvSpPr>
+        <p:spPr>
+          <a:xfrm rot="16200000">
+            <a:off x="1925226" y="3366021"/>
+            <a:ext cx="3910371" cy="584775"/>
+          </a:xfrm>
+          <a:prstGeom prst="rect">
+            <a:avLst/>
+          </a:prstGeom>
+          <a:noFill/>
+        </p:spPr>
+        <p:txBody>
+          <a:bodyPr wrap="square" rtlCol="0">
+            <a:spAutoFit/>
+          </a:bodyPr>
+          <a:lstStyle/>
+          <a:p>
+            <a:pPr algn="ctr"/>
+            <a:r>
+              <a:rPr lang="nl-BE" sz="3200" b="1" dirty="0">
+                <a:solidFill>
+                  <a:schemeClr val="bg1"/>
+                </a:solidFill>
+                <a:latin typeface="Inter"/>
+                <a:cs typeface="Arial" panose="020B0604020202020204" pitchFamily="34" charset="0"/>
+              </a:rPr>
+              <a:t>Elias De Hondt</a:t>
+            </a:r>
+          </a:p>
+        </p:txBody>
+      </p:sp>
+      <p:sp>
+        <p:nvSpPr>
+          <p:cNvPr id="5" name="Rechthoek: afgeronde hoeken 4">
+            <a:extLst>
+              <a:ext uri="{FF2B5EF4-FFF2-40B4-BE49-F238E27FC236}">
+                <a16:creationId xmlns:a16="http://schemas.microsoft.com/office/drawing/2014/main" id="{E6846E56-D971-33F3-4F71-0D733D4F051A}"/>
+              </a:ext>
+            </a:extLst>
+          </p:cNvPr>
+          <p:cNvSpPr/>
+          <p:nvPr/>
+        </p:nvSpPr>
+        <p:spPr>
+          <a:xfrm>
+            <a:off x="5628740" y="1703230"/>
+            <a:ext cx="3183639" cy="3910364"/>
+          </a:xfrm>
+          <a:prstGeom prst="roundRect">
+            <a:avLst/>
+          </a:prstGeom>
+          <a:solidFill>
+            <a:srgbClr val="8F7EB4"/>
+          </a:solidFill>
+          <a:ln>
+            <a:solidFill>
+              <a:srgbClr val="8F7EB4"/>
+            </a:solidFill>
+          </a:ln>
+        </p:spPr>
+        <p:style>
+          <a:lnRef idx="2">
+            <a:schemeClr val="accent1">
+              <a:shade val="15000"/>
+            </a:schemeClr>
+          </a:lnRef>
+          <a:fillRef idx="1">
+            <a:schemeClr val="accent1"/>
+          </a:fillRef>
+          <a:effectRef idx="0">
+            <a:schemeClr val="accent1"/>
+          </a:effectRef>
+          <a:fontRef idx="minor">
+            <a:schemeClr val="lt1"/>
+          </a:fontRef>
+        </p:style>
+        <p:txBody>
+          <a:bodyPr rtlCol="0" anchor="ctr"/>
+          <a:lstStyle/>
+          <a:p>
+            <a:pPr algn="ctr"/>
+            <a:endParaRPr lang="nl-BE"/>
+          </a:p>
+        </p:txBody>
+      </p:sp>
+      <p:sp>
+        <p:nvSpPr>
+          <p:cNvPr id="8" name="Tekstvak 7">
+            <a:extLst>
+              <a:ext uri="{FF2B5EF4-FFF2-40B4-BE49-F238E27FC236}">
+                <a16:creationId xmlns:a16="http://schemas.microsoft.com/office/drawing/2014/main" id="{0568B825-55AF-ACC8-44E4-43FCEB49E7F2}"/>
+              </a:ext>
+            </a:extLst>
+          </p:cNvPr>
+          <p:cNvSpPr txBox="1"/>
+          <p:nvPr/>
+        </p:nvSpPr>
+        <p:spPr>
+          <a:xfrm>
+            <a:off x="5279117" y="4605550"/>
+            <a:ext cx="3927588" cy="584775"/>
+          </a:xfrm>
+          <a:prstGeom prst="rect">
+            <a:avLst/>
+          </a:prstGeom>
+          <a:noFill/>
+        </p:spPr>
+        <p:txBody>
+          <a:bodyPr wrap="square" rtlCol="0">
+            <a:spAutoFit/>
+          </a:bodyPr>
+          <a:lstStyle/>
+          <a:p>
+            <a:pPr algn="ctr"/>
+            <a:r>
+              <a:rPr lang="nl-BE" sz="3200" b="1" dirty="0">
+                <a:solidFill>
+                  <a:schemeClr val="bg1"/>
+                </a:solidFill>
+                <a:latin typeface="Inter"/>
+                <a:cs typeface="Arial" panose="020B0604020202020204" pitchFamily="34" charset="0"/>
+              </a:rPr>
+              <a:t>Vera Wise</a:t>
+            </a:r>
+          </a:p>
+        </p:txBody>
+      </p:sp>
+      <p:sp>
+        <p:nvSpPr>
+          <p:cNvPr id="9" name="Rechthoek: afgeronde hoeken 8">
+            <a:extLst>
+              <a:ext uri="{FF2B5EF4-FFF2-40B4-BE49-F238E27FC236}">
+                <a16:creationId xmlns:a16="http://schemas.microsoft.com/office/drawing/2014/main" id="{21B5C6A7-8C2B-D09E-81C1-A17A63568E57}"/>
+              </a:ext>
+            </a:extLst>
+          </p:cNvPr>
+          <p:cNvSpPr/>
+          <p:nvPr/>
+        </p:nvSpPr>
+        <p:spPr>
+          <a:xfrm>
+            <a:off x="4523284" y="1703243"/>
+            <a:ext cx="936000" cy="3910365"/>
+          </a:xfrm>
+          <a:prstGeom prst="roundRect">
+            <a:avLst/>
+          </a:prstGeom>
+          <a:solidFill>
+            <a:srgbClr val="B6ABCE"/>
+          </a:solidFill>
+          <a:ln>
+            <a:solidFill>
+              <a:srgbClr val="B6ABCE"/>
+            </a:solidFill>
+          </a:ln>
+        </p:spPr>
+        <p:style>
+          <a:lnRef idx="2">
+            <a:schemeClr val="accent1">
+              <a:shade val="15000"/>
+            </a:schemeClr>
+          </a:lnRef>
+          <a:fillRef idx="1">
+            <a:schemeClr val="accent1"/>
+          </a:fillRef>
+          <a:effectRef idx="0">
+            <a:schemeClr val="accent1"/>
+          </a:effectRef>
+          <a:fontRef idx="minor">
+            <a:schemeClr val="lt1"/>
+          </a:fontRef>
+        </p:style>
+        <p:txBody>
+          <a:bodyPr rtlCol="0" anchor="ctr"/>
+          <a:lstStyle/>
+          <a:p>
+            <a:pPr algn="ctr"/>
+            <a:endParaRPr lang="nl-BE"/>
+          </a:p>
+        </p:txBody>
+      </p:sp>
+      <p:sp>
+        <p:nvSpPr>
+          <p:cNvPr id="10" name="Tekstvak 9">
+            <a:extLst>
+              <a:ext uri="{FF2B5EF4-FFF2-40B4-BE49-F238E27FC236}">
+                <a16:creationId xmlns:a16="http://schemas.microsoft.com/office/drawing/2014/main" id="{9B0DE678-2D59-B873-3487-92E4F4B71BB8}"/>
+              </a:ext>
+            </a:extLst>
+          </p:cNvPr>
+          <p:cNvSpPr txBox="1"/>
+          <p:nvPr/>
+        </p:nvSpPr>
+        <p:spPr>
+          <a:xfrm rot="16200000">
+            <a:off x="3031546" y="3357417"/>
+            <a:ext cx="3910366" cy="584775"/>
+          </a:xfrm>
+          <a:prstGeom prst="rect">
+            <a:avLst/>
+          </a:prstGeom>
+          <a:noFill/>
+        </p:spPr>
+        <p:txBody>
+          <a:bodyPr wrap="square" rtlCol="0">
+            <a:spAutoFit/>
+          </a:bodyPr>
+          <a:lstStyle/>
+          <a:p>
+            <a:pPr algn="ctr"/>
+            <a:r>
+              <a:rPr lang="nl-BE" sz="3200" b="1" dirty="0">
+                <a:solidFill>
+                  <a:schemeClr val="bg1"/>
+                </a:solidFill>
+                <a:latin typeface="Inter"/>
+                <a:cs typeface="Arial" panose="020B0604020202020204" pitchFamily="34" charset="0"/>
+              </a:rPr>
+              <a:t>Vincent Verboven</a:t>
+            </a:r>
+          </a:p>
+        </p:txBody>
+      </p:sp>
+      <p:pic>
+        <p:nvPicPr>
+          <p:cNvPr id="19" name="Afbeelding 18" descr="Afbeelding met cirkel, diagram, pixel&#10;&#10;Door AI gegenereerde inhoud is mogelijk onjuist.">
+            <a:extLst>
+              <a:ext uri="{FF2B5EF4-FFF2-40B4-BE49-F238E27FC236}">
+                <a16:creationId xmlns:a16="http://schemas.microsoft.com/office/drawing/2014/main" id="{F500C621-332F-DBAF-7CE2-4A110078FAEE}"/>
+              </a:ext>
+            </a:extLst>
+          </p:cNvPr>
+          <p:cNvPicPr>
+            <a:picLocks noChangeAspect="1"/>
+          </p:cNvPicPr>
+          <p:nvPr/>
+        </p:nvPicPr>
+        <p:blipFill>
+          <a:blip r:embed="rId3">
+            <a:extLst>
+              <a:ext uri="{28A0092B-C50C-407E-A947-70E740481C1C}">
+                <a14:useLocalDpi xmlns:a14="http://schemas.microsoft.com/office/drawing/2010/main" val="0"/>
+              </a:ext>
+            </a:extLst>
+          </a:blip>
+          <a:stretch>
+            <a:fillRect/>
+          </a:stretch>
+        </p:blipFill>
+        <p:spPr>
+          <a:xfrm>
+            <a:off x="11203050" y="-56619"/>
+            <a:ext cx="1008000" cy="1008000"/>
+          </a:xfrm>
+          <a:prstGeom prst="rect">
+            <a:avLst/>
+          </a:prstGeom>
+        </p:spPr>
+      </p:pic>
+      <p:sp>
+        <p:nvSpPr>
+          <p:cNvPr id="17" name="Tekstvak 16">
+            <a:extLst>
+              <a:ext uri="{FF2B5EF4-FFF2-40B4-BE49-F238E27FC236}">
+                <a16:creationId xmlns:a16="http://schemas.microsoft.com/office/drawing/2014/main" id="{D6CE9A8A-6664-74A5-BA5F-3304DFE9C251}"/>
+              </a:ext>
+            </a:extLst>
+          </p:cNvPr>
+          <p:cNvSpPr txBox="1"/>
+          <p:nvPr/>
+        </p:nvSpPr>
+        <p:spPr>
+          <a:xfrm>
+            <a:off x="0" y="6492875"/>
+            <a:ext cx="2725426" cy="369332"/>
+          </a:xfrm>
+          <a:prstGeom prst="rect">
+            <a:avLst/>
+          </a:prstGeom>
+          <a:noFill/>
+        </p:spPr>
+        <p:txBody>
+          <a:bodyPr wrap="square" rtlCol="0">
+            <a:spAutoFit/>
+          </a:bodyPr>
+          <a:lstStyle/>
+          <a:p>
+            <a:r>
+              <a:rPr lang="nl-BE" b="1" dirty="0">
+                <a:solidFill>
+                  <a:schemeClr val="bg1"/>
+                </a:solidFill>
+                <a:latin typeface="Inter"/>
+                <a:cs typeface="Arial" panose="020B0604020202020204" pitchFamily="34" charset="0"/>
+              </a:rPr>
+              <a:t>Spreker: </a:t>
+            </a:r>
+            <a:r>
+              <a:rPr lang="nl-BE" sz="1800" b="1" dirty="0">
+                <a:solidFill>
+                  <a:schemeClr val="bg1"/>
+                </a:solidFill>
+                <a:latin typeface="Inter"/>
+                <a:cs typeface="Arial" panose="020B0604020202020204" pitchFamily="34" charset="0"/>
+              </a:rPr>
+              <a:t>Vera Wise</a:t>
+            </a:r>
+          </a:p>
+        </p:txBody>
+      </p:sp>
+      <p:pic>
+        <p:nvPicPr>
+          <p:cNvPr id="16" name="Afbeelding 15">
+            <a:extLst>
+              <a:ext uri="{FF2B5EF4-FFF2-40B4-BE49-F238E27FC236}">
+                <a16:creationId xmlns:a16="http://schemas.microsoft.com/office/drawing/2014/main" id="{4332B46B-84E7-3E02-65ED-976ED67DEB05}"/>
+              </a:ext>
+            </a:extLst>
+          </p:cNvPr>
+          <p:cNvPicPr>
+            <a:picLocks noChangeAspect="1"/>
+          </p:cNvPicPr>
+          <p:nvPr/>
+        </p:nvPicPr>
+        <p:blipFill>
+          <a:blip r:embed="rId4">
+            <a:extLst>
+              <a:ext uri="{28A0092B-C50C-407E-A947-70E740481C1C}">
+                <a14:useLocalDpi xmlns:a14="http://schemas.microsoft.com/office/drawing/2010/main" val="0"/>
+              </a:ext>
+            </a:extLst>
+          </a:blip>
+          <a:srcRect/>
+          <a:stretch/>
+        </p:blipFill>
+        <p:spPr>
+          <a:xfrm>
+            <a:off x="5832548" y="1811598"/>
+            <a:ext cx="2784297" cy="2784297"/>
+          </a:xfrm>
+          <a:prstGeom prst="rect">
+            <a:avLst/>
+          </a:prstGeom>
+        </p:spPr>
+      </p:pic>
+      <p:sp>
+        <p:nvSpPr>
+          <p:cNvPr id="20" name="Rechthoek: afgeronde hoeken 19">
+            <a:extLst>
+              <a:ext uri="{FF2B5EF4-FFF2-40B4-BE49-F238E27FC236}">
+                <a16:creationId xmlns:a16="http://schemas.microsoft.com/office/drawing/2014/main" id="{229D885D-BD6E-C25A-A064-A3B512EC7142}"/>
+              </a:ext>
+            </a:extLst>
+          </p:cNvPr>
+          <p:cNvSpPr/>
+          <p:nvPr/>
+        </p:nvSpPr>
+        <p:spPr>
+          <a:xfrm>
+            <a:off x="6071318" y="4550175"/>
+            <a:ext cx="2422915" cy="45719"/>
+          </a:xfrm>
+          <a:prstGeom prst="roundRect">
+            <a:avLst/>
+          </a:prstGeom>
+          <a:solidFill>
+            <a:srgbClr val="B6ABCE"/>
+          </a:solidFill>
+          <a:ln>
+            <a:solidFill>
+              <a:srgbClr val="B6ABCE"/>
+            </a:solidFill>
+          </a:ln>
+        </p:spPr>
+        <p:style>
+          <a:lnRef idx="2">
+            <a:schemeClr val="accent1">
+              <a:shade val="15000"/>
+            </a:schemeClr>
+          </a:lnRef>
+          <a:fillRef idx="1">
+            <a:schemeClr val="accent1"/>
+          </a:fillRef>
+          <a:effectRef idx="0">
+            <a:schemeClr val="accent1"/>
+          </a:effectRef>
+          <a:fontRef idx="minor">
+            <a:schemeClr val="lt1"/>
+          </a:fontRef>
+        </p:style>
+        <p:txBody>
+          <a:bodyPr rtlCol="0" anchor="ctr"/>
+          <a:lstStyle/>
+          <a:p>
+            <a:pPr algn="ctr"/>
+            <a:endParaRPr lang="nl-BE"/>
+          </a:p>
+        </p:txBody>
+      </p:sp>
+    </p:spTree>
+    <p:extLst>
+      <p:ext uri="{BB962C8B-B14F-4D97-AF65-F5344CB8AC3E}">
+        <p14:creationId xmlns:p14="http://schemas.microsoft.com/office/powerpoint/2010/main" val="3677102111"/>
+      </p:ext>
+    </p:extLst>
+  </p:cSld>
+  <p:clrMapOvr>
+    <a:masterClrMapping/>
+  </p:clrMapOvr>
+  <mc:AlternateContent xmlns:mc="http://schemas.openxmlformats.org/markup-compatibility/2006" xmlns:p159="http://schemas.microsoft.com/office/powerpoint/2015/09/main">
+    <mc:Choice Requires="p159">
+      <p:transition spd="med">
+        <p159:morph option="byObject"/>
+      </p:transition>
+    </mc:Choice>
+    <mc:Fallback xmlns="">
+      <p:transition spd="med">
+        <p:fade/>
+      </p:transition>
+    </mc:Fallback>
+  </mc:AlternateContent>
+</p:sld>
+</file>
+
+<file path=ppt/slides/slide8.xml><?xml version="1.0" encoding="utf-8"?>
+<p:sld xmlns:a="http://schemas.openxmlformats.org/drawingml/2006/main" xmlns:r="http://schemas.openxmlformats.org/officeDocument/2006/relationships" xmlns:p="http://schemas.openxmlformats.org/presentationml/2006/main">
+  <p:cSld>
+    <p:spTree>
+      <p:nvGrpSpPr>
+        <p:cNvPr id="1" name="">
+          <a:extLst>
+            <a:ext uri="{FF2B5EF4-FFF2-40B4-BE49-F238E27FC236}">
+              <a16:creationId xmlns:a16="http://schemas.microsoft.com/office/drawing/2014/main" id="{6A5F40CF-BC7E-95FB-3AC8-8DB784748FB0}"/>
+            </a:ext>
+          </a:extLst>
+        </p:cNvPr>
+        <p:cNvGrpSpPr/>
+        <p:nvPr/>
+      </p:nvGrpSpPr>
+      <p:grpSpPr>
+        <a:xfrm>
+          <a:off x="0" y="0"/>
+          <a:ext cx="0" cy="0"/>
+          <a:chOff x="0" y="0"/>
+          <a:chExt cx="0" cy="0"/>
+        </a:xfrm>
+      </p:grpSpPr>
+      <p:sp>
+        <p:nvSpPr>
+          <p:cNvPr id="4" name="Rechthoek 3">
+            <a:extLst>
+              <a:ext uri="{FF2B5EF4-FFF2-40B4-BE49-F238E27FC236}">
+                <a16:creationId xmlns:a16="http://schemas.microsoft.com/office/drawing/2014/main" id="{4CA0FE78-DB6A-7927-41CA-4194071A22F9}"/>
+              </a:ext>
+            </a:extLst>
+          </p:cNvPr>
+          <p:cNvSpPr/>
+          <p:nvPr/>
+        </p:nvSpPr>
+        <p:spPr>
+          <a:xfrm>
+            <a:off x="0" y="1"/>
+            <a:ext cx="12192000" cy="932330"/>
+          </a:xfrm>
+          <a:prstGeom prst="rect">
+            <a:avLst/>
+          </a:prstGeom>
+          <a:solidFill>
+            <a:srgbClr val="B6ABCE"/>
+          </a:solidFill>
+          <a:ln>
+            <a:solidFill>
+              <a:srgbClr val="B6ABCE"/>
+            </a:solidFill>
+          </a:ln>
+        </p:spPr>
+        <p:style>
+          <a:lnRef idx="2">
+            <a:schemeClr val="accent1">
+              <a:shade val="15000"/>
+            </a:schemeClr>
+          </a:lnRef>
+          <a:fillRef idx="1">
+            <a:schemeClr val="accent1"/>
+          </a:fillRef>
+          <a:effectRef idx="0">
+            <a:schemeClr val="accent1"/>
+          </a:effectRef>
+          <a:fontRef idx="minor">
+            <a:schemeClr val="lt1"/>
+          </a:fontRef>
+        </p:style>
+        <p:txBody>
+          <a:bodyPr rtlCol="0" anchor="ctr"/>
+          <a:lstStyle/>
+          <a:p>
+            <a:pPr algn="ctr"/>
+            <a:r>
+              <a:rPr lang="nl-BE" sz="5000" b="1" dirty="0">
+                <a:latin typeface="Inter"/>
+                <a:cs typeface="Arial" panose="020B0604020202020204" pitchFamily="34" charset="0"/>
+              </a:rPr>
+              <a:t>Wat is K10s</a:t>
+            </a:r>
+          </a:p>
+        </p:txBody>
+      </p:sp>
+      <p:sp>
+        <p:nvSpPr>
+          <p:cNvPr id="6" name="Rechthoek 5">
+            <a:extLst>
+              <a:ext uri="{FF2B5EF4-FFF2-40B4-BE49-F238E27FC236}">
+                <a16:creationId xmlns:a16="http://schemas.microsoft.com/office/drawing/2014/main" id="{70B8F699-09B0-1E24-4071-1E3A280F6531}"/>
+              </a:ext>
+            </a:extLst>
+          </p:cNvPr>
+          <p:cNvSpPr/>
+          <p:nvPr/>
+        </p:nvSpPr>
+        <p:spPr>
+          <a:xfrm>
+            <a:off x="0" y="6492875"/>
+            <a:ext cx="12192000" cy="365125"/>
+          </a:xfrm>
+          <a:prstGeom prst="rect">
+            <a:avLst/>
+          </a:prstGeom>
+          <a:solidFill>
+            <a:srgbClr val="8F7EB4"/>
+          </a:solidFill>
+          <a:ln>
+            <a:solidFill>
+              <a:srgbClr val="8F7EB4"/>
+            </a:solidFill>
+          </a:ln>
+        </p:spPr>
+        <p:style>
+          <a:lnRef idx="2">
+            <a:schemeClr val="accent1">
+              <a:shade val="15000"/>
+            </a:schemeClr>
+          </a:lnRef>
+          <a:fillRef idx="1">
+            <a:schemeClr val="accent1"/>
+          </a:fillRef>
+          <a:effectRef idx="0">
+            <a:schemeClr val="accent1"/>
+          </a:effectRef>
+          <a:fontRef idx="minor">
+            <a:schemeClr val="lt1"/>
+          </a:fontRef>
+        </p:style>
+        <p:txBody>
+          <a:bodyPr rtlCol="0" anchor="ctr"/>
+          <a:lstStyle/>
+          <a:p>
+            <a:pPr algn="ctr"/>
+            <a:endParaRPr lang="nl-BE">
+              <a:solidFill>
+                <a:srgbClr val="F37C00"/>
+              </a:solidFill>
+            </a:endParaRPr>
+          </a:p>
+        </p:txBody>
+      </p:sp>
+      <p:sp>
+        <p:nvSpPr>
+          <p:cNvPr id="11" name="Tijdelijke aanduiding voor dianummer 10">
+            <a:extLst>
+              <a:ext uri="{FF2B5EF4-FFF2-40B4-BE49-F238E27FC236}">
+                <a16:creationId xmlns:a16="http://schemas.microsoft.com/office/drawing/2014/main" id="{2E06C170-80F9-D3A0-DCC5-C413AD56811F}"/>
+              </a:ext>
+            </a:extLst>
+          </p:cNvPr>
+          <p:cNvSpPr>
+            <a:spLocks noGrp="1"/>
+          </p:cNvSpPr>
+          <p:nvPr>
+            <p:ph type="sldNum" sz="quarter" idx="12"/>
+          </p:nvPr>
+        </p:nvSpPr>
+        <p:spPr>
+          <a:xfrm>
+            <a:off x="11362267" y="6492875"/>
+            <a:ext cx="829733" cy="365125"/>
+          </a:xfrm>
+        </p:spPr>
+        <p:txBody>
+          <a:bodyPr/>
+          <a:lstStyle/>
+          <a:p>
+            <a:r>
+              <a:rPr lang="nl-BE" sz="2000" b="1" dirty="0">
+                <a:solidFill>
+                  <a:schemeClr val="bg1"/>
+                </a:solidFill>
+                <a:latin typeface="Inter"/>
+                <a:cs typeface="Arial" panose="020B0604020202020204" pitchFamily="34" charset="0"/>
+              </a:rPr>
+              <a:t>05/20</a:t>
+            </a:r>
+          </a:p>
+        </p:txBody>
+      </p:sp>
+      <p:pic>
+        <p:nvPicPr>
+          <p:cNvPr id="19" name="Afbeelding 18" descr="Afbeelding met cirkel, diagram, pixel&#10;&#10;Door AI gegenereerde inhoud is mogelijk onjuist.">
+            <a:extLst>
+              <a:ext uri="{FF2B5EF4-FFF2-40B4-BE49-F238E27FC236}">
+                <a16:creationId xmlns:a16="http://schemas.microsoft.com/office/drawing/2014/main" id="{7204B075-BC52-BDF1-0DEE-C744BD5BF7F8}"/>
+              </a:ext>
+            </a:extLst>
+          </p:cNvPr>
+          <p:cNvPicPr>
+            <a:picLocks noChangeAspect="1"/>
+          </p:cNvPicPr>
+          <p:nvPr/>
+        </p:nvPicPr>
+        <p:blipFill>
+          <a:blip r:embed="rId3">
+            <a:extLst>
+              <a:ext uri="{28A0092B-C50C-407E-A947-70E740481C1C}">
+                <a14:useLocalDpi xmlns:a14="http://schemas.microsoft.com/office/drawing/2010/main" val="0"/>
+              </a:ext>
+            </a:extLst>
+          </a:blip>
+          <a:stretch>
+            <a:fillRect/>
+          </a:stretch>
+        </p:blipFill>
+        <p:spPr>
+          <a:xfrm>
+            <a:off x="11203050" y="-56619"/>
+            <a:ext cx="1008000" cy="1008000"/>
+          </a:xfrm>
+          <a:prstGeom prst="rect">
+            <a:avLst/>
+          </a:prstGeom>
+        </p:spPr>
+      </p:pic>
+      <p:sp>
+        <p:nvSpPr>
+          <p:cNvPr id="17" name="Tekstvak 16">
+            <a:extLst>
+              <a:ext uri="{FF2B5EF4-FFF2-40B4-BE49-F238E27FC236}">
+                <a16:creationId xmlns:a16="http://schemas.microsoft.com/office/drawing/2014/main" id="{87B6773B-68F7-B60A-7A99-DE5D637C813B}"/>
+              </a:ext>
+            </a:extLst>
+          </p:cNvPr>
+          <p:cNvSpPr txBox="1"/>
+          <p:nvPr/>
+        </p:nvSpPr>
+        <p:spPr>
+          <a:xfrm>
+            <a:off x="0" y="6492875"/>
+            <a:ext cx="2725426" cy="369332"/>
+          </a:xfrm>
+          <a:prstGeom prst="rect">
+            <a:avLst/>
+          </a:prstGeom>
+          <a:noFill/>
+        </p:spPr>
+        <p:txBody>
+          <a:bodyPr wrap="square" rtlCol="0">
+            <a:spAutoFit/>
+          </a:bodyPr>
+          <a:lstStyle/>
+          <a:p>
+            <a:r>
+              <a:rPr lang="nl-BE" b="1" dirty="0">
+                <a:solidFill>
+                  <a:schemeClr val="bg1"/>
+                </a:solidFill>
+                <a:latin typeface="Inter"/>
+                <a:cs typeface="Arial" panose="020B0604020202020204" pitchFamily="34" charset="0"/>
+              </a:rPr>
+              <a:t>Spreker: Elias De Hondt</a:t>
+            </a:r>
+            <a:endParaRPr lang="nl-BE" sz="1800" b="1" dirty="0">
+              <a:solidFill>
+                <a:schemeClr val="bg1"/>
+              </a:solidFill>
+              <a:latin typeface="Inter"/>
+              <a:cs typeface="Arial" panose="020B0604020202020204" pitchFamily="34" charset="0"/>
+            </a:endParaRPr>
+          </a:p>
+        </p:txBody>
+      </p:sp>
+    </p:spTree>
+    <p:extLst>
+      <p:ext uri="{BB962C8B-B14F-4D97-AF65-F5344CB8AC3E}">
+        <p14:creationId xmlns:p14="http://schemas.microsoft.com/office/powerpoint/2010/main" val="235943227"/>
+      </p:ext>
+    </p:extLst>
+  </p:cSld>
+  <p:clrMapOvr>
+    <a:masterClrMapping/>
+  </p:clrMapOvr>
+  <mc:AlternateContent xmlns:mc="http://schemas.openxmlformats.org/markup-compatibility/2006" xmlns:p159="http://schemas.microsoft.com/office/powerpoint/2015/09/main">
+    <mc:Choice Requires="p159">
+      <p:transition spd="med">
+        <p159:morph option="byObject"/>
+      </p:transition>
+    </mc:Choice>
+    <mc:Fallback xmlns="">
+      <p:transition spd="med">
         <p:fade/>
       </p:transition>
     </mc:Fallback>
@@ -7121,4 +10872,319 @@
     </a:ext>
   </a:extLst>
 </a:theme>
+</file>
+
+<file path=ppt/theme/theme2.xml><?xml version="1.0" encoding="utf-8"?>
+<a:theme xmlns:a="http://schemas.openxmlformats.org/drawingml/2006/main" name="Kantoorthema">
+  <a:themeElements>
+    <a:clrScheme name="Office">
+      <a:dk1>
+        <a:sysClr val="windowText" lastClr="000000"/>
+      </a:dk1>
+      <a:lt1>
+        <a:sysClr val="window" lastClr="FFFFFF"/>
+      </a:lt1>
+      <a:dk2>
+        <a:srgbClr val="0E2841"/>
+      </a:dk2>
+      <a:lt2>
+        <a:srgbClr val="E8E8E8"/>
+      </a:lt2>
+      <a:accent1>
+        <a:srgbClr val="156082"/>
+      </a:accent1>
+      <a:accent2>
+        <a:srgbClr val="E97132"/>
+      </a:accent2>
+      <a:accent3>
+        <a:srgbClr val="196B24"/>
+      </a:accent3>
+      <a:accent4>
+        <a:srgbClr val="0F9ED5"/>
+      </a:accent4>
+      <a:accent5>
+        <a:srgbClr val="A02B93"/>
+      </a:accent5>
+      <a:accent6>
+        <a:srgbClr val="4EA72E"/>
+      </a:accent6>
+      <a:hlink>
+        <a:srgbClr val="467886"/>
+      </a:hlink>
+      <a:folHlink>
+        <a:srgbClr val="96607D"/>
+      </a:folHlink>
+    </a:clrScheme>
+    <a:fontScheme name="Office">
+      <a:majorFont>
+        <a:latin typeface="Aptos Display" panose="02110004020202020204"/>
+        <a:ea typeface=""/>
+        <a:cs typeface=""/>
+        <a:font script="Jpan" typeface="游ゴシック Light"/>
+        <a:font script="Hang" typeface="맑은 고딕"/>
+        <a:font script="Hans" typeface="等线 Light"/>
+        <a:font script="Hant" typeface="新細明體"/>
+        <a:font script="Arab" typeface="Times New Roman"/>
+        <a:font script="Hebr" typeface="Times New Roman"/>
+        <a:font script="Thai" typeface="Angsana New"/>
+        <a:font script="Ethi" typeface="Nyala"/>
+        <a:font script="Beng" typeface="Vrinda"/>
+        <a:font script="Gujr" typeface="Shruti"/>
+        <a:font script="Khmr" typeface="MoolBoran"/>
+        <a:font script="Knda" typeface="Tunga"/>
+        <a:font script="Guru" typeface="Raavi"/>
+        <a:font script="Cans" typeface="Euphemia"/>
+        <a:font script="Cher" typeface="Plantagenet Cherokee"/>
+        <a:font script="Yiii" typeface="Microsoft Yi Baiti"/>
+        <a:font script="Tibt" typeface="Microsoft Himalaya"/>
+        <a:font script="Thaa" typeface="MV Boli"/>
+        <a:font script="Deva" typeface="Mangal"/>
+        <a:font script="Telu" typeface="Gautami"/>
+        <a:font script="Taml" typeface="Latha"/>
+        <a:font script="Syrc" typeface="Estrangelo Edessa"/>
+        <a:font script="Orya" typeface="Kalinga"/>
+        <a:font script="Mlym" typeface="Kartika"/>
+        <a:font script="Laoo" typeface="DokChampa"/>
+        <a:font script="Sinh" typeface="Iskoola Pota"/>
+        <a:font script="Mong" typeface="Mongolian Baiti"/>
+        <a:font script="Viet" typeface="Times New Roman"/>
+        <a:font script="Uigh" typeface="Microsoft Uighur"/>
+        <a:font script="Geor" typeface="Sylfaen"/>
+        <a:font script="Armn" typeface="Arial"/>
+        <a:font script="Bugi" typeface="Leelawadee UI"/>
+        <a:font script="Bopo" typeface="Microsoft JhengHei"/>
+        <a:font script="Java" typeface="Javanese Text"/>
+        <a:font script="Lisu" typeface="Segoe UI"/>
+        <a:font script="Mymr" typeface="Myanmar Text"/>
+        <a:font script="Nkoo" typeface="Ebrima"/>
+        <a:font script="Olck" typeface="Nirmala UI"/>
+        <a:font script="Osma" typeface="Ebrima"/>
+        <a:font script="Phag" typeface="Phagspa"/>
+        <a:font script="Syrn" typeface="Estrangelo Edessa"/>
+        <a:font script="Syrj" typeface="Estrangelo Edessa"/>
+        <a:font script="Syre" typeface="Estrangelo Edessa"/>
+        <a:font script="Sora" typeface="Nirmala UI"/>
+        <a:font script="Tale" typeface="Microsoft Tai Le"/>
+        <a:font script="Talu" typeface="Microsoft New Tai Lue"/>
+        <a:font script="Tfng" typeface="Ebrima"/>
+      </a:majorFont>
+      <a:minorFont>
+        <a:latin typeface="Aptos" panose="02110004020202020204"/>
+        <a:ea typeface=""/>
+        <a:cs typeface=""/>
+        <a:font script="Jpan" typeface="游ゴシック"/>
+        <a:font script="Hang" typeface="맑은 고딕"/>
+        <a:font script="Hans" typeface="等线"/>
+        <a:font script="Hant" typeface="新細明體"/>
+        <a:font script="Arab" typeface="Arial"/>
+        <a:font script="Hebr" typeface="Arial"/>
+        <a:font script="Thai" typeface="Cordia New"/>
+        <a:font script="Ethi" typeface="Nyala"/>
+        <a:font script="Beng" typeface="Vrinda"/>
+        <a:font script="Gujr" typeface="Shruti"/>
+        <a:font script="Khmr" typeface="DaunPenh"/>
+        <a:font script="Knda" typeface="Tunga"/>
+        <a:font script="Guru" typeface="Raavi"/>
+        <a:font script="Cans" typeface="Euphemia"/>
+        <a:font script="Cher" typeface="Plantagenet Cherokee"/>
+        <a:font script="Yiii" typeface="Microsoft Yi Baiti"/>
+        <a:font script="Tibt" typeface="Microsoft Himalaya"/>
+        <a:font script="Thaa" typeface="MV Boli"/>
+        <a:font script="Deva" typeface="Mangal"/>
+        <a:font script="Telu" typeface="Gautami"/>
+        <a:font script="Taml" typeface="Latha"/>
+        <a:font script="Syrc" typeface="Estrangelo Edessa"/>
+        <a:font script="Orya" typeface="Kalinga"/>
+        <a:font script="Mlym" typeface="Kartika"/>
+        <a:font script="Laoo" typeface="DokChampa"/>
+        <a:font script="Sinh" typeface="Iskoola Pota"/>
+        <a:font script="Mong" typeface="Mongolian Baiti"/>
+        <a:font script="Viet" typeface="Arial"/>
+        <a:font script="Uigh" typeface="Microsoft Uighur"/>
+        <a:font script="Geor" typeface="Sylfaen"/>
+        <a:font script="Armn" typeface="Arial"/>
+        <a:font script="Bugi" typeface="Leelawadee UI"/>
+        <a:font script="Bopo" typeface="Microsoft JhengHei"/>
+        <a:font script="Java" typeface="Javanese Text"/>
+        <a:font script="Lisu" typeface="Segoe UI"/>
+        <a:font script="Mymr" typeface="Myanmar Text"/>
+        <a:font script="Nkoo" typeface="Ebrima"/>
+        <a:font script="Olck" typeface="Nirmala UI"/>
+        <a:font script="Osma" typeface="Ebrima"/>
+        <a:font script="Phag" typeface="Phagspa"/>
+        <a:font script="Syrn" typeface="Estrangelo Edessa"/>
+        <a:font script="Syrj" typeface="Estrangelo Edessa"/>
+        <a:font script="Syre" typeface="Estrangelo Edessa"/>
+        <a:font script="Sora" typeface="Nirmala UI"/>
+        <a:font script="Tale" typeface="Microsoft Tai Le"/>
+        <a:font script="Talu" typeface="Microsoft New Tai Lue"/>
+        <a:font script="Tfng" typeface="Ebrima"/>
+      </a:minorFont>
+    </a:fontScheme>
+    <a:fmtScheme name="Office">
+      <a:fillStyleLst>
+        <a:solidFill>
+          <a:schemeClr val="phClr"/>
+        </a:solidFill>
+        <a:gradFill rotWithShape="1">
+          <a:gsLst>
+            <a:gs pos="0">
+              <a:schemeClr val="phClr">
+                <a:lumMod val="110000"/>
+                <a:satMod val="105000"/>
+                <a:tint val="67000"/>
+              </a:schemeClr>
+            </a:gs>
+            <a:gs pos="50000">
+              <a:schemeClr val="phClr">
+                <a:lumMod val="105000"/>
+                <a:satMod val="103000"/>
+                <a:tint val="73000"/>
+              </a:schemeClr>
+            </a:gs>
+            <a:gs pos="100000">
+              <a:schemeClr val="phClr">
+                <a:lumMod val="105000"/>
+                <a:satMod val="109000"/>
+                <a:tint val="81000"/>
+              </a:schemeClr>
+            </a:gs>
+          </a:gsLst>
+          <a:lin ang="5400000" scaled="0"/>
+        </a:gradFill>
+        <a:gradFill rotWithShape="1">
+          <a:gsLst>
+            <a:gs pos="0">
+              <a:schemeClr val="phClr">
+                <a:satMod val="103000"/>
+                <a:lumMod val="102000"/>
+                <a:tint val="94000"/>
+              </a:schemeClr>
+            </a:gs>
+            <a:gs pos="50000">
+              <a:schemeClr val="phClr">
+                <a:satMod val="110000"/>
+                <a:lumMod val="100000"/>
+                <a:shade val="100000"/>
+              </a:schemeClr>
+            </a:gs>
+            <a:gs pos="100000">
+              <a:schemeClr val="phClr">
+                <a:lumMod val="99000"/>
+                <a:satMod val="120000"/>
+                <a:shade val="78000"/>
+              </a:schemeClr>
+            </a:gs>
+          </a:gsLst>
+          <a:lin ang="5400000" scaled="0"/>
+        </a:gradFill>
+      </a:fillStyleLst>
+      <a:lnStyleLst>
+        <a:ln w="12700" cap="flat" cmpd="sng" algn="ctr">
+          <a:solidFill>
+            <a:schemeClr val="phClr"/>
+          </a:solidFill>
+          <a:prstDash val="solid"/>
+          <a:miter lim="800000"/>
+        </a:ln>
+        <a:ln w="19050" cap="flat" cmpd="sng" algn="ctr">
+          <a:solidFill>
+            <a:schemeClr val="phClr"/>
+          </a:solidFill>
+          <a:prstDash val="solid"/>
+          <a:miter lim="800000"/>
+        </a:ln>
+        <a:ln w="25400" cap="flat" cmpd="sng" algn="ctr">
+          <a:solidFill>
+            <a:schemeClr val="phClr"/>
+          </a:solidFill>
+          <a:prstDash val="solid"/>
+          <a:miter lim="800000"/>
+        </a:ln>
+      </a:lnStyleLst>
+      <a:effectStyleLst>
+        <a:effectStyle>
+          <a:effectLst/>
+        </a:effectStyle>
+        <a:effectStyle>
+          <a:effectLst/>
+        </a:effectStyle>
+        <a:effectStyle>
+          <a:effectLst>
+            <a:outerShdw blurRad="57150" dist="19050" dir="5400000" algn="ctr" rotWithShape="0">
+              <a:srgbClr val="000000">
+                <a:alpha val="63000"/>
+              </a:srgbClr>
+            </a:outerShdw>
+          </a:effectLst>
+        </a:effectStyle>
+      </a:effectStyleLst>
+      <a:bgFillStyleLst>
+        <a:solidFill>
+          <a:schemeClr val="phClr"/>
+        </a:solidFill>
+        <a:solidFill>
+          <a:schemeClr val="phClr">
+            <a:tint val="95000"/>
+            <a:satMod val="170000"/>
+          </a:schemeClr>
+        </a:solidFill>
+        <a:gradFill rotWithShape="1">
+          <a:gsLst>
+            <a:gs pos="0">
+              <a:schemeClr val="phClr">
+                <a:tint val="93000"/>
+                <a:satMod val="150000"/>
+                <a:shade val="98000"/>
+                <a:lumMod val="102000"/>
+              </a:schemeClr>
+            </a:gs>
+            <a:gs pos="50000">
+              <a:schemeClr val="phClr">
+                <a:tint val="98000"/>
+                <a:satMod val="130000"/>
+                <a:shade val="90000"/>
+                <a:lumMod val="103000"/>
+              </a:schemeClr>
+            </a:gs>
+            <a:gs pos="100000">
+              <a:schemeClr val="phClr">
+                <a:shade val="63000"/>
+                <a:satMod val="120000"/>
+              </a:schemeClr>
+            </a:gs>
+          </a:gsLst>
+          <a:lin ang="5400000" scaled="0"/>
+        </a:gradFill>
+      </a:bgFillStyleLst>
+    </a:fmtScheme>
+  </a:themeElements>
+  <a:objectDefaults>
+    <a:lnDef>
+      <a:spPr/>
+      <a:bodyPr/>
+      <a:lstStyle/>
+      <a:style>
+        <a:lnRef idx="2">
+          <a:schemeClr val="accent1"/>
+        </a:lnRef>
+        <a:fillRef idx="0">
+          <a:schemeClr val="accent1"/>
+        </a:fillRef>
+        <a:effectRef idx="1">
+          <a:schemeClr val="accent1"/>
+        </a:effectRef>
+        <a:fontRef idx="minor">
+          <a:schemeClr val="tx1"/>
+        </a:fontRef>
+      </a:style>
+    </a:lnDef>
+  </a:objectDefaults>
+  <a:extraClrSchemeLst/>
+  <a:extLst>
+    <a:ext uri="{05A4C25C-085E-4340-85A3-A5531E510DB2}">
+      <thm15:themeFamily xmlns:thm15="http://schemas.microsoft.com/office/thememl/2012/main" name="Office Theme" id="{2E142A2C-CD16-42D6-873A-C26D2A0506FA}" vid="{1BDDFF52-6CD6-40A5-AB3C-68EB2F1E4D0A}"/>
+    </a:ext>
+  </a:extLst>
+</a:theme>
 </file>
</xml_diff>

<commit_message>
Update README to remove table of contents and enhance introduction; update presentation file
</commit_message>
<xml_diff>
--- a/docs/pptx/presentation.pptx
+++ b/docs/pptx/presentation.pptx
@@ -5,7 +5,7 @@
     <p:sldMasterId id="2147483648" r:id="rId1"/>
   </p:sldMasterIdLst>
   <p:notesMasterIdLst>
-    <p:notesMasterId r:id="rId10"/>
+    <p:notesMasterId r:id="rId16"/>
   </p:notesMasterIdLst>
   <p:sldIdLst>
     <p:sldId id="268" r:id="rId2"/>
@@ -16,6 +16,12 @@
     <p:sldId id="274" r:id="rId7"/>
     <p:sldId id="275" r:id="rId8"/>
     <p:sldId id="276" r:id="rId9"/>
+    <p:sldId id="279" r:id="rId10"/>
+    <p:sldId id="280" r:id="rId11"/>
+    <p:sldId id="278" r:id="rId12"/>
+    <p:sldId id="277" r:id="rId13"/>
+    <p:sldId id="281" r:id="rId14"/>
+    <p:sldId id="284" r:id="rId15"/>
   </p:sldIdLst>
   <p:sldSz cx="12192000" cy="6858000"/>
   <p:notesSz cx="6858000" cy="9144000"/>
@@ -130,7 +136,17 @@
             <p14:sldId id="273"/>
             <p14:sldId id="274"/>
             <p14:sldId id="275"/>
+          </p14:sldIdLst>
+        </p14:section>
+        <p14:section name="Body" id="{50C48108-5850-422B-80BC-1455754F8DDD}">
+          <p14:sldIdLst>
             <p14:sldId id="276"/>
+            <p14:sldId id="279"/>
+            <p14:sldId id="280"/>
+            <p14:sldId id="278"/>
+            <p14:sldId id="277"/>
+            <p14:sldId id="281"/>
+            <p14:sldId id="284"/>
           </p14:sldIdLst>
         </p14:section>
       </p14:sectionLst>
@@ -1354,6 +1370,114 @@
 </p:notes>
 </file>
 
+<file path=ppt/notesSlides/notesSlide10.xml><?xml version="1.0" encoding="utf-8"?>
+<p:notes xmlns:a="http://schemas.openxmlformats.org/drawingml/2006/main" xmlns:r="http://schemas.openxmlformats.org/officeDocument/2006/relationships" xmlns:p="http://schemas.openxmlformats.org/presentationml/2006/main">
+  <p:cSld>
+    <p:spTree>
+      <p:nvGrpSpPr>
+        <p:cNvPr id="1" name="">
+          <a:extLst>
+            <a:ext uri="{FF2B5EF4-FFF2-40B4-BE49-F238E27FC236}">
+              <a16:creationId xmlns:a16="http://schemas.microsoft.com/office/drawing/2014/main" id="{FBF374B4-7D8C-AFD9-167C-44B536113AF3}"/>
+            </a:ext>
+          </a:extLst>
+        </p:cNvPr>
+        <p:cNvGrpSpPr/>
+        <p:nvPr/>
+      </p:nvGrpSpPr>
+      <p:grpSpPr>
+        <a:xfrm>
+          <a:off x="0" y="0"/>
+          <a:ext cx="0" cy="0"/>
+          <a:chOff x="0" y="0"/>
+          <a:chExt cx="0" cy="0"/>
+        </a:xfrm>
+      </p:grpSpPr>
+      <p:sp>
+        <p:nvSpPr>
+          <p:cNvPr id="2" name="Tijdelijke aanduiding voor dia-afbeelding 1">
+            <a:extLst>
+              <a:ext uri="{FF2B5EF4-FFF2-40B4-BE49-F238E27FC236}">
+                <a16:creationId xmlns:a16="http://schemas.microsoft.com/office/drawing/2014/main" id="{4C150679-C464-6D6A-4DC1-8C5B2359F5F3}"/>
+              </a:ext>
+            </a:extLst>
+          </p:cNvPr>
+          <p:cNvSpPr>
+            <a:spLocks noGrp="1" noRot="1" noChangeAspect="1"/>
+          </p:cNvSpPr>
+          <p:nvPr>
+            <p:ph type="sldImg"/>
+          </p:nvPr>
+        </p:nvSpPr>
+        <p:spPr/>
+      </p:sp>
+      <p:sp>
+        <p:nvSpPr>
+          <p:cNvPr id="3" name="Tijdelijke aanduiding voor notities 2">
+            <a:extLst>
+              <a:ext uri="{FF2B5EF4-FFF2-40B4-BE49-F238E27FC236}">
+                <a16:creationId xmlns:a16="http://schemas.microsoft.com/office/drawing/2014/main" id="{8C57F45D-4DB9-E394-DE42-354AA78A9FCB}"/>
+              </a:ext>
+            </a:extLst>
+          </p:cNvPr>
+          <p:cNvSpPr>
+            <a:spLocks noGrp="1"/>
+          </p:cNvSpPr>
+          <p:nvPr>
+            <p:ph type="body" idx="1"/>
+          </p:nvPr>
+        </p:nvSpPr>
+        <p:spPr/>
+        <p:txBody>
+          <a:bodyPr/>
+          <a:lstStyle/>
+          <a:p>
+            <a:endParaRPr lang="nl-BE" dirty="0"/>
+          </a:p>
+        </p:txBody>
+      </p:sp>
+      <p:sp>
+        <p:nvSpPr>
+          <p:cNvPr id="4" name="Tijdelijke aanduiding voor dianummer 3">
+            <a:extLst>
+              <a:ext uri="{FF2B5EF4-FFF2-40B4-BE49-F238E27FC236}">
+                <a16:creationId xmlns:a16="http://schemas.microsoft.com/office/drawing/2014/main" id="{A8A9AAB2-C6CA-722D-538C-09458166D50A}"/>
+              </a:ext>
+            </a:extLst>
+          </p:cNvPr>
+          <p:cNvSpPr>
+            <a:spLocks noGrp="1"/>
+          </p:cNvSpPr>
+          <p:nvPr>
+            <p:ph type="sldNum" sz="quarter" idx="5"/>
+          </p:nvPr>
+        </p:nvSpPr>
+        <p:spPr/>
+        <p:txBody>
+          <a:bodyPr/>
+          <a:lstStyle/>
+          <a:p>
+            <a:fld id="{89284E18-2A08-4495-ABBA-2C4402C2FBE9}" type="slidenum">
+              <a:rPr lang="nl-BE" smtClean="0"/>
+              <a:t>13</a:t>
+            </a:fld>
+            <a:endParaRPr lang="nl-BE"/>
+          </a:p>
+        </p:txBody>
+      </p:sp>
+    </p:spTree>
+    <p:extLst>
+      <p:ext uri="{BB962C8B-B14F-4D97-AF65-F5344CB8AC3E}">
+        <p14:creationId xmlns:p14="http://schemas.microsoft.com/office/powerpoint/2010/main" val="2207819163"/>
+      </p:ext>
+    </p:extLst>
+  </p:cSld>
+  <p:clrMapOvr>
+    <a:masterClrMapping/>
+  </p:clrMapOvr>
+</p:notes>
+</file>
+
 <file path=ppt/notesSlides/notesSlide2.xml><?xml version="1.0" encoding="utf-8"?>
 <p:notes xmlns:a="http://schemas.openxmlformats.org/drawingml/2006/main" xmlns:r="http://schemas.openxmlformats.org/officeDocument/2006/relationships" xmlns:p="http://schemas.openxmlformats.org/presentationml/2006/main">
   <p:cSld>
@@ -1777,6 +1901,438 @@
     <p:extLst>
       <p:ext uri="{BB962C8B-B14F-4D97-AF65-F5344CB8AC3E}">
         <p14:creationId xmlns:p14="http://schemas.microsoft.com/office/powerpoint/2010/main" val="3274698747"/>
+      </p:ext>
+    </p:extLst>
+  </p:cSld>
+  <p:clrMapOvr>
+    <a:masterClrMapping/>
+  </p:clrMapOvr>
+</p:notes>
+</file>
+
+<file path=ppt/notesSlides/notesSlide6.xml><?xml version="1.0" encoding="utf-8"?>
+<p:notes xmlns:a="http://schemas.openxmlformats.org/drawingml/2006/main" xmlns:r="http://schemas.openxmlformats.org/officeDocument/2006/relationships" xmlns:p="http://schemas.openxmlformats.org/presentationml/2006/main">
+  <p:cSld>
+    <p:spTree>
+      <p:nvGrpSpPr>
+        <p:cNvPr id="1" name="">
+          <a:extLst>
+            <a:ext uri="{FF2B5EF4-FFF2-40B4-BE49-F238E27FC236}">
+              <a16:creationId xmlns:a16="http://schemas.microsoft.com/office/drawing/2014/main" id="{28F40876-76C1-162C-B168-45E10D8F3C26}"/>
+            </a:ext>
+          </a:extLst>
+        </p:cNvPr>
+        <p:cNvGrpSpPr/>
+        <p:nvPr/>
+      </p:nvGrpSpPr>
+      <p:grpSpPr>
+        <a:xfrm>
+          <a:off x="0" y="0"/>
+          <a:ext cx="0" cy="0"/>
+          <a:chOff x="0" y="0"/>
+          <a:chExt cx="0" cy="0"/>
+        </a:xfrm>
+      </p:grpSpPr>
+      <p:sp>
+        <p:nvSpPr>
+          <p:cNvPr id="2" name="Tijdelijke aanduiding voor dia-afbeelding 1">
+            <a:extLst>
+              <a:ext uri="{FF2B5EF4-FFF2-40B4-BE49-F238E27FC236}">
+                <a16:creationId xmlns:a16="http://schemas.microsoft.com/office/drawing/2014/main" id="{9CA16704-08D4-64AE-12D2-D60FD8F8C63A}"/>
+              </a:ext>
+            </a:extLst>
+          </p:cNvPr>
+          <p:cNvSpPr>
+            <a:spLocks noGrp="1" noRot="1" noChangeAspect="1"/>
+          </p:cNvSpPr>
+          <p:nvPr>
+            <p:ph type="sldImg"/>
+          </p:nvPr>
+        </p:nvSpPr>
+        <p:spPr/>
+      </p:sp>
+      <p:sp>
+        <p:nvSpPr>
+          <p:cNvPr id="3" name="Tijdelijke aanduiding voor notities 2">
+            <a:extLst>
+              <a:ext uri="{FF2B5EF4-FFF2-40B4-BE49-F238E27FC236}">
+                <a16:creationId xmlns:a16="http://schemas.microsoft.com/office/drawing/2014/main" id="{829A0156-98D8-9428-8657-C34859EEAC26}"/>
+              </a:ext>
+            </a:extLst>
+          </p:cNvPr>
+          <p:cNvSpPr>
+            <a:spLocks noGrp="1"/>
+          </p:cNvSpPr>
+          <p:nvPr>
+            <p:ph type="body" idx="1"/>
+          </p:nvPr>
+        </p:nvSpPr>
+        <p:spPr/>
+        <p:txBody>
+          <a:bodyPr/>
+          <a:lstStyle/>
+          <a:p>
+            <a:endParaRPr lang="nl-BE" dirty="0"/>
+          </a:p>
+        </p:txBody>
+      </p:sp>
+      <p:sp>
+        <p:nvSpPr>
+          <p:cNvPr id="4" name="Tijdelijke aanduiding voor dianummer 3">
+            <a:extLst>
+              <a:ext uri="{FF2B5EF4-FFF2-40B4-BE49-F238E27FC236}">
+                <a16:creationId xmlns:a16="http://schemas.microsoft.com/office/drawing/2014/main" id="{4C9F63D1-D498-1C59-C0A1-7EEDA1B74FBE}"/>
+              </a:ext>
+            </a:extLst>
+          </p:cNvPr>
+          <p:cNvSpPr>
+            <a:spLocks noGrp="1"/>
+          </p:cNvSpPr>
+          <p:nvPr>
+            <p:ph type="sldNum" sz="quarter" idx="5"/>
+          </p:nvPr>
+        </p:nvSpPr>
+        <p:spPr/>
+        <p:txBody>
+          <a:bodyPr/>
+          <a:lstStyle/>
+          <a:p>
+            <a:fld id="{89284E18-2A08-4495-ABBA-2C4402C2FBE9}" type="slidenum">
+              <a:rPr lang="nl-BE" smtClean="0"/>
+              <a:t>9</a:t>
+            </a:fld>
+            <a:endParaRPr lang="nl-BE"/>
+          </a:p>
+        </p:txBody>
+      </p:sp>
+    </p:spTree>
+    <p:extLst>
+      <p:ext uri="{BB962C8B-B14F-4D97-AF65-F5344CB8AC3E}">
+        <p14:creationId xmlns:p14="http://schemas.microsoft.com/office/powerpoint/2010/main" val="1348770785"/>
+      </p:ext>
+    </p:extLst>
+  </p:cSld>
+  <p:clrMapOvr>
+    <a:masterClrMapping/>
+  </p:clrMapOvr>
+</p:notes>
+</file>
+
+<file path=ppt/notesSlides/notesSlide7.xml><?xml version="1.0" encoding="utf-8"?>
+<p:notes xmlns:a="http://schemas.openxmlformats.org/drawingml/2006/main" xmlns:r="http://schemas.openxmlformats.org/officeDocument/2006/relationships" xmlns:p="http://schemas.openxmlformats.org/presentationml/2006/main">
+  <p:cSld>
+    <p:spTree>
+      <p:nvGrpSpPr>
+        <p:cNvPr id="1" name="">
+          <a:extLst>
+            <a:ext uri="{FF2B5EF4-FFF2-40B4-BE49-F238E27FC236}">
+              <a16:creationId xmlns:a16="http://schemas.microsoft.com/office/drawing/2014/main" id="{70B98DC5-E85A-1170-1B79-656E1485476D}"/>
+            </a:ext>
+          </a:extLst>
+        </p:cNvPr>
+        <p:cNvGrpSpPr/>
+        <p:nvPr/>
+      </p:nvGrpSpPr>
+      <p:grpSpPr>
+        <a:xfrm>
+          <a:off x="0" y="0"/>
+          <a:ext cx="0" cy="0"/>
+          <a:chOff x="0" y="0"/>
+          <a:chExt cx="0" cy="0"/>
+        </a:xfrm>
+      </p:grpSpPr>
+      <p:sp>
+        <p:nvSpPr>
+          <p:cNvPr id="2" name="Tijdelijke aanduiding voor dia-afbeelding 1">
+            <a:extLst>
+              <a:ext uri="{FF2B5EF4-FFF2-40B4-BE49-F238E27FC236}">
+                <a16:creationId xmlns:a16="http://schemas.microsoft.com/office/drawing/2014/main" id="{EE358DED-29AC-7233-B1F9-B1A5958F3D52}"/>
+              </a:ext>
+            </a:extLst>
+          </p:cNvPr>
+          <p:cNvSpPr>
+            <a:spLocks noGrp="1" noRot="1" noChangeAspect="1"/>
+          </p:cNvSpPr>
+          <p:nvPr>
+            <p:ph type="sldImg"/>
+          </p:nvPr>
+        </p:nvSpPr>
+        <p:spPr/>
+      </p:sp>
+      <p:sp>
+        <p:nvSpPr>
+          <p:cNvPr id="3" name="Tijdelijke aanduiding voor notities 2">
+            <a:extLst>
+              <a:ext uri="{FF2B5EF4-FFF2-40B4-BE49-F238E27FC236}">
+                <a16:creationId xmlns:a16="http://schemas.microsoft.com/office/drawing/2014/main" id="{2292C0A9-A940-7A0D-869E-4EB9D48CC6E1}"/>
+              </a:ext>
+            </a:extLst>
+          </p:cNvPr>
+          <p:cNvSpPr>
+            <a:spLocks noGrp="1"/>
+          </p:cNvSpPr>
+          <p:nvPr>
+            <p:ph type="body" idx="1"/>
+          </p:nvPr>
+        </p:nvSpPr>
+        <p:spPr/>
+        <p:txBody>
+          <a:bodyPr/>
+          <a:lstStyle/>
+          <a:p>
+            <a:endParaRPr lang="nl-BE" dirty="0"/>
+          </a:p>
+        </p:txBody>
+      </p:sp>
+      <p:sp>
+        <p:nvSpPr>
+          <p:cNvPr id="4" name="Tijdelijke aanduiding voor dianummer 3">
+            <a:extLst>
+              <a:ext uri="{FF2B5EF4-FFF2-40B4-BE49-F238E27FC236}">
+                <a16:creationId xmlns:a16="http://schemas.microsoft.com/office/drawing/2014/main" id="{AC668E34-B399-88BA-5482-A00F2B89CD0D}"/>
+              </a:ext>
+            </a:extLst>
+          </p:cNvPr>
+          <p:cNvSpPr>
+            <a:spLocks noGrp="1"/>
+          </p:cNvSpPr>
+          <p:nvPr>
+            <p:ph type="sldNum" sz="quarter" idx="5"/>
+          </p:nvPr>
+        </p:nvSpPr>
+        <p:spPr/>
+        <p:txBody>
+          <a:bodyPr/>
+          <a:lstStyle/>
+          <a:p>
+            <a:fld id="{89284E18-2A08-4495-ABBA-2C4402C2FBE9}" type="slidenum">
+              <a:rPr lang="nl-BE" smtClean="0"/>
+              <a:t>10</a:t>
+            </a:fld>
+            <a:endParaRPr lang="nl-BE"/>
+          </a:p>
+        </p:txBody>
+      </p:sp>
+    </p:spTree>
+    <p:extLst>
+      <p:ext uri="{BB962C8B-B14F-4D97-AF65-F5344CB8AC3E}">
+        <p14:creationId xmlns:p14="http://schemas.microsoft.com/office/powerpoint/2010/main" val="4281348210"/>
+      </p:ext>
+    </p:extLst>
+  </p:cSld>
+  <p:clrMapOvr>
+    <a:masterClrMapping/>
+  </p:clrMapOvr>
+</p:notes>
+</file>
+
+<file path=ppt/notesSlides/notesSlide8.xml><?xml version="1.0" encoding="utf-8"?>
+<p:notes xmlns:a="http://schemas.openxmlformats.org/drawingml/2006/main" xmlns:r="http://schemas.openxmlformats.org/officeDocument/2006/relationships" xmlns:p="http://schemas.openxmlformats.org/presentationml/2006/main">
+  <p:cSld>
+    <p:spTree>
+      <p:nvGrpSpPr>
+        <p:cNvPr id="1" name="">
+          <a:extLst>
+            <a:ext uri="{FF2B5EF4-FFF2-40B4-BE49-F238E27FC236}">
+              <a16:creationId xmlns:a16="http://schemas.microsoft.com/office/drawing/2014/main" id="{BB76C3F9-F7BB-3758-C7F6-052960F587F3}"/>
+            </a:ext>
+          </a:extLst>
+        </p:cNvPr>
+        <p:cNvGrpSpPr/>
+        <p:nvPr/>
+      </p:nvGrpSpPr>
+      <p:grpSpPr>
+        <a:xfrm>
+          <a:off x="0" y="0"/>
+          <a:ext cx="0" cy="0"/>
+          <a:chOff x="0" y="0"/>
+          <a:chExt cx="0" cy="0"/>
+        </a:xfrm>
+      </p:grpSpPr>
+      <p:sp>
+        <p:nvSpPr>
+          <p:cNvPr id="2" name="Tijdelijke aanduiding voor dia-afbeelding 1">
+            <a:extLst>
+              <a:ext uri="{FF2B5EF4-FFF2-40B4-BE49-F238E27FC236}">
+                <a16:creationId xmlns:a16="http://schemas.microsoft.com/office/drawing/2014/main" id="{56B5F8E3-68E3-9A51-C8FE-7D1DCB4A2C81}"/>
+              </a:ext>
+            </a:extLst>
+          </p:cNvPr>
+          <p:cNvSpPr>
+            <a:spLocks noGrp="1" noRot="1" noChangeAspect="1"/>
+          </p:cNvSpPr>
+          <p:nvPr>
+            <p:ph type="sldImg"/>
+          </p:nvPr>
+        </p:nvSpPr>
+        <p:spPr/>
+      </p:sp>
+      <p:sp>
+        <p:nvSpPr>
+          <p:cNvPr id="3" name="Tijdelijke aanduiding voor notities 2">
+            <a:extLst>
+              <a:ext uri="{FF2B5EF4-FFF2-40B4-BE49-F238E27FC236}">
+                <a16:creationId xmlns:a16="http://schemas.microsoft.com/office/drawing/2014/main" id="{163B3412-9B15-9D73-1529-F890E63A30EF}"/>
+              </a:ext>
+            </a:extLst>
+          </p:cNvPr>
+          <p:cNvSpPr>
+            <a:spLocks noGrp="1"/>
+          </p:cNvSpPr>
+          <p:nvPr>
+            <p:ph type="body" idx="1"/>
+          </p:nvPr>
+        </p:nvSpPr>
+        <p:spPr/>
+        <p:txBody>
+          <a:bodyPr/>
+          <a:lstStyle/>
+          <a:p>
+            <a:endParaRPr lang="nl-BE" dirty="0"/>
+          </a:p>
+        </p:txBody>
+      </p:sp>
+      <p:sp>
+        <p:nvSpPr>
+          <p:cNvPr id="4" name="Tijdelijke aanduiding voor dianummer 3">
+            <a:extLst>
+              <a:ext uri="{FF2B5EF4-FFF2-40B4-BE49-F238E27FC236}">
+                <a16:creationId xmlns:a16="http://schemas.microsoft.com/office/drawing/2014/main" id="{D41155C9-6A7A-262E-9288-575374E7EAFF}"/>
+              </a:ext>
+            </a:extLst>
+          </p:cNvPr>
+          <p:cNvSpPr>
+            <a:spLocks noGrp="1"/>
+          </p:cNvSpPr>
+          <p:nvPr>
+            <p:ph type="sldNum" sz="quarter" idx="5"/>
+          </p:nvPr>
+        </p:nvSpPr>
+        <p:spPr/>
+        <p:txBody>
+          <a:bodyPr/>
+          <a:lstStyle/>
+          <a:p>
+            <a:fld id="{89284E18-2A08-4495-ABBA-2C4402C2FBE9}" type="slidenum">
+              <a:rPr lang="nl-BE" smtClean="0"/>
+              <a:t>11</a:t>
+            </a:fld>
+            <a:endParaRPr lang="nl-BE"/>
+          </a:p>
+        </p:txBody>
+      </p:sp>
+    </p:spTree>
+    <p:extLst>
+      <p:ext uri="{BB962C8B-B14F-4D97-AF65-F5344CB8AC3E}">
+        <p14:creationId xmlns:p14="http://schemas.microsoft.com/office/powerpoint/2010/main" val="2939006583"/>
+      </p:ext>
+    </p:extLst>
+  </p:cSld>
+  <p:clrMapOvr>
+    <a:masterClrMapping/>
+  </p:clrMapOvr>
+</p:notes>
+</file>
+
+<file path=ppt/notesSlides/notesSlide9.xml><?xml version="1.0" encoding="utf-8"?>
+<p:notes xmlns:a="http://schemas.openxmlformats.org/drawingml/2006/main" xmlns:r="http://schemas.openxmlformats.org/officeDocument/2006/relationships" xmlns:p="http://schemas.openxmlformats.org/presentationml/2006/main">
+  <p:cSld>
+    <p:spTree>
+      <p:nvGrpSpPr>
+        <p:cNvPr id="1" name="">
+          <a:extLst>
+            <a:ext uri="{FF2B5EF4-FFF2-40B4-BE49-F238E27FC236}">
+              <a16:creationId xmlns:a16="http://schemas.microsoft.com/office/drawing/2014/main" id="{122F3196-B956-492B-F74D-F78C961F5456}"/>
+            </a:ext>
+          </a:extLst>
+        </p:cNvPr>
+        <p:cNvGrpSpPr/>
+        <p:nvPr/>
+      </p:nvGrpSpPr>
+      <p:grpSpPr>
+        <a:xfrm>
+          <a:off x="0" y="0"/>
+          <a:ext cx="0" cy="0"/>
+          <a:chOff x="0" y="0"/>
+          <a:chExt cx="0" cy="0"/>
+        </a:xfrm>
+      </p:grpSpPr>
+      <p:sp>
+        <p:nvSpPr>
+          <p:cNvPr id="2" name="Tijdelijke aanduiding voor dia-afbeelding 1">
+            <a:extLst>
+              <a:ext uri="{FF2B5EF4-FFF2-40B4-BE49-F238E27FC236}">
+                <a16:creationId xmlns:a16="http://schemas.microsoft.com/office/drawing/2014/main" id="{54699E3C-E042-975E-FE15-67D35BA0385C}"/>
+              </a:ext>
+            </a:extLst>
+          </p:cNvPr>
+          <p:cNvSpPr>
+            <a:spLocks noGrp="1" noRot="1" noChangeAspect="1"/>
+          </p:cNvSpPr>
+          <p:nvPr>
+            <p:ph type="sldImg"/>
+          </p:nvPr>
+        </p:nvSpPr>
+        <p:spPr/>
+      </p:sp>
+      <p:sp>
+        <p:nvSpPr>
+          <p:cNvPr id="3" name="Tijdelijke aanduiding voor notities 2">
+            <a:extLst>
+              <a:ext uri="{FF2B5EF4-FFF2-40B4-BE49-F238E27FC236}">
+                <a16:creationId xmlns:a16="http://schemas.microsoft.com/office/drawing/2014/main" id="{D4539BA8-96C3-7BE8-9947-3BDC85EEA20D}"/>
+              </a:ext>
+            </a:extLst>
+          </p:cNvPr>
+          <p:cNvSpPr>
+            <a:spLocks noGrp="1"/>
+          </p:cNvSpPr>
+          <p:nvPr>
+            <p:ph type="body" idx="1"/>
+          </p:nvPr>
+        </p:nvSpPr>
+        <p:spPr/>
+        <p:txBody>
+          <a:bodyPr/>
+          <a:lstStyle/>
+          <a:p>
+            <a:endParaRPr lang="nl-BE" dirty="0"/>
+          </a:p>
+        </p:txBody>
+      </p:sp>
+      <p:sp>
+        <p:nvSpPr>
+          <p:cNvPr id="4" name="Tijdelijke aanduiding voor dianummer 3">
+            <a:extLst>
+              <a:ext uri="{FF2B5EF4-FFF2-40B4-BE49-F238E27FC236}">
+                <a16:creationId xmlns:a16="http://schemas.microsoft.com/office/drawing/2014/main" id="{DEE55723-5AC9-31E6-3DF3-C93BB44AD077}"/>
+              </a:ext>
+            </a:extLst>
+          </p:cNvPr>
+          <p:cNvSpPr>
+            <a:spLocks noGrp="1"/>
+          </p:cNvSpPr>
+          <p:nvPr>
+            <p:ph type="sldNum" sz="quarter" idx="5"/>
+          </p:nvPr>
+        </p:nvSpPr>
+        <p:spPr/>
+        <p:txBody>
+          <a:bodyPr/>
+          <a:lstStyle/>
+          <a:p>
+            <a:fld id="{89284E18-2A08-4495-ABBA-2C4402C2FBE9}" type="slidenum">
+              <a:rPr lang="nl-BE" smtClean="0"/>
+              <a:t>12</a:t>
+            </a:fld>
+            <a:endParaRPr lang="nl-BE"/>
+          </a:p>
+        </p:txBody>
+      </p:sp>
+    </p:spTree>
+    <p:extLst>
+      <p:ext uri="{BB962C8B-B14F-4D97-AF65-F5344CB8AC3E}">
+        <p14:creationId xmlns:p14="http://schemas.microsoft.com/office/powerpoint/2010/main" val="789028981"/>
       </p:ext>
     </p:extLst>
   </p:cSld>
@@ -5888,6 +6444,2937 @@
 </p:sld>
 </file>
 
+<file path=ppt/slides/slide10.xml><?xml version="1.0" encoding="utf-8"?>
+<p:sld xmlns:a="http://schemas.openxmlformats.org/drawingml/2006/main" xmlns:r="http://schemas.openxmlformats.org/officeDocument/2006/relationships" xmlns:p="http://schemas.openxmlformats.org/presentationml/2006/main">
+  <p:cSld>
+    <p:spTree>
+      <p:nvGrpSpPr>
+        <p:cNvPr id="1" name="">
+          <a:extLst>
+            <a:ext uri="{FF2B5EF4-FFF2-40B4-BE49-F238E27FC236}">
+              <a16:creationId xmlns:a16="http://schemas.microsoft.com/office/drawing/2014/main" id="{0F136276-032C-C7C3-A07C-6F0D5D1832D9}"/>
+            </a:ext>
+          </a:extLst>
+        </p:cNvPr>
+        <p:cNvGrpSpPr/>
+        <p:nvPr/>
+      </p:nvGrpSpPr>
+      <p:grpSpPr>
+        <a:xfrm>
+          <a:off x="0" y="0"/>
+          <a:ext cx="0" cy="0"/>
+          <a:chOff x="0" y="0"/>
+          <a:chExt cx="0" cy="0"/>
+        </a:xfrm>
+      </p:grpSpPr>
+      <p:sp>
+        <p:nvSpPr>
+          <p:cNvPr id="4" name="Rechthoek 3">
+            <a:extLst>
+              <a:ext uri="{FF2B5EF4-FFF2-40B4-BE49-F238E27FC236}">
+                <a16:creationId xmlns:a16="http://schemas.microsoft.com/office/drawing/2014/main" id="{CFD3B2A8-F347-EBB4-EC1C-D5FAFB779080}"/>
+              </a:ext>
+            </a:extLst>
+          </p:cNvPr>
+          <p:cNvSpPr/>
+          <p:nvPr/>
+        </p:nvSpPr>
+        <p:spPr>
+          <a:xfrm>
+            <a:off x="0" y="1"/>
+            <a:ext cx="12192000" cy="932330"/>
+          </a:xfrm>
+          <a:prstGeom prst="rect">
+            <a:avLst/>
+          </a:prstGeom>
+          <a:solidFill>
+            <a:srgbClr val="B6ABCE"/>
+          </a:solidFill>
+          <a:ln>
+            <a:solidFill>
+              <a:srgbClr val="B6ABCE"/>
+            </a:solidFill>
+          </a:ln>
+        </p:spPr>
+        <p:style>
+          <a:lnRef idx="2">
+            <a:schemeClr val="accent1">
+              <a:shade val="15000"/>
+            </a:schemeClr>
+          </a:lnRef>
+          <a:fillRef idx="1">
+            <a:schemeClr val="accent1"/>
+          </a:fillRef>
+          <a:effectRef idx="0">
+            <a:schemeClr val="accent1"/>
+          </a:effectRef>
+          <a:fontRef idx="minor">
+            <a:schemeClr val="lt1"/>
+          </a:fontRef>
+        </p:style>
+        <p:txBody>
+          <a:bodyPr rtlCol="0" anchor="ctr"/>
+          <a:lstStyle/>
+          <a:p>
+            <a:pPr algn="ctr"/>
+            <a:r>
+              <a:rPr lang="nl-BE" sz="5000" b="1" dirty="0">
+                <a:latin typeface="Inter"/>
+                <a:cs typeface="Arial" panose="020B0604020202020204" pitchFamily="34" charset="0"/>
+              </a:rPr>
+              <a:t>Onze Oplossing</a:t>
+            </a:r>
+          </a:p>
+        </p:txBody>
+      </p:sp>
+      <p:sp>
+        <p:nvSpPr>
+          <p:cNvPr id="6" name="Rechthoek 5">
+            <a:extLst>
+              <a:ext uri="{FF2B5EF4-FFF2-40B4-BE49-F238E27FC236}">
+                <a16:creationId xmlns:a16="http://schemas.microsoft.com/office/drawing/2014/main" id="{790D7869-9F94-8018-1874-A1B63FE9A662}"/>
+              </a:ext>
+            </a:extLst>
+          </p:cNvPr>
+          <p:cNvSpPr/>
+          <p:nvPr/>
+        </p:nvSpPr>
+        <p:spPr>
+          <a:xfrm>
+            <a:off x="0" y="6492875"/>
+            <a:ext cx="12192000" cy="365125"/>
+          </a:xfrm>
+          <a:prstGeom prst="rect">
+            <a:avLst/>
+          </a:prstGeom>
+          <a:solidFill>
+            <a:srgbClr val="8F7EB4"/>
+          </a:solidFill>
+          <a:ln>
+            <a:solidFill>
+              <a:srgbClr val="8F7EB4"/>
+            </a:solidFill>
+          </a:ln>
+        </p:spPr>
+        <p:style>
+          <a:lnRef idx="2">
+            <a:schemeClr val="accent1">
+              <a:shade val="15000"/>
+            </a:schemeClr>
+          </a:lnRef>
+          <a:fillRef idx="1">
+            <a:schemeClr val="accent1"/>
+          </a:fillRef>
+          <a:effectRef idx="0">
+            <a:schemeClr val="accent1"/>
+          </a:effectRef>
+          <a:fontRef idx="minor">
+            <a:schemeClr val="lt1"/>
+          </a:fontRef>
+        </p:style>
+        <p:txBody>
+          <a:bodyPr rtlCol="0" anchor="ctr"/>
+          <a:lstStyle/>
+          <a:p>
+            <a:pPr algn="ctr"/>
+            <a:endParaRPr lang="nl-BE">
+              <a:solidFill>
+                <a:srgbClr val="F37C00"/>
+              </a:solidFill>
+            </a:endParaRPr>
+          </a:p>
+        </p:txBody>
+      </p:sp>
+      <p:sp>
+        <p:nvSpPr>
+          <p:cNvPr id="11" name="Tijdelijke aanduiding voor dianummer 10">
+            <a:extLst>
+              <a:ext uri="{FF2B5EF4-FFF2-40B4-BE49-F238E27FC236}">
+                <a16:creationId xmlns:a16="http://schemas.microsoft.com/office/drawing/2014/main" id="{68556C50-2A9B-C74C-2687-60F23195DEED}"/>
+              </a:ext>
+            </a:extLst>
+          </p:cNvPr>
+          <p:cNvSpPr>
+            <a:spLocks noGrp="1"/>
+          </p:cNvSpPr>
+          <p:nvPr>
+            <p:ph type="sldNum" sz="quarter" idx="12"/>
+          </p:nvPr>
+        </p:nvSpPr>
+        <p:spPr>
+          <a:xfrm>
+            <a:off x="11362267" y="6492875"/>
+            <a:ext cx="829733" cy="365125"/>
+          </a:xfrm>
+        </p:spPr>
+        <p:txBody>
+          <a:bodyPr/>
+          <a:lstStyle/>
+          <a:p>
+            <a:r>
+              <a:rPr lang="nl-BE" sz="2000" b="1" dirty="0">
+                <a:solidFill>
+                  <a:schemeClr val="bg1"/>
+                </a:solidFill>
+                <a:latin typeface="Inter"/>
+                <a:cs typeface="Arial" panose="020B0604020202020204" pitchFamily="34" charset="0"/>
+              </a:rPr>
+              <a:t>05/20</a:t>
+            </a:r>
+          </a:p>
+        </p:txBody>
+      </p:sp>
+      <p:pic>
+        <p:nvPicPr>
+          <p:cNvPr id="19" name="Afbeelding 18" descr="Afbeelding met cirkel, diagram, pixel&#10;&#10;Door AI gegenereerde inhoud is mogelijk onjuist.">
+            <a:extLst>
+              <a:ext uri="{FF2B5EF4-FFF2-40B4-BE49-F238E27FC236}">
+                <a16:creationId xmlns:a16="http://schemas.microsoft.com/office/drawing/2014/main" id="{21021A3C-59A8-7609-D547-C948F32CC47C}"/>
+              </a:ext>
+            </a:extLst>
+          </p:cNvPr>
+          <p:cNvPicPr>
+            <a:picLocks noChangeAspect="1"/>
+          </p:cNvPicPr>
+          <p:nvPr/>
+        </p:nvPicPr>
+        <p:blipFill>
+          <a:blip r:embed="rId3">
+            <a:extLst>
+              <a:ext uri="{28A0092B-C50C-407E-A947-70E740481C1C}">
+                <a14:useLocalDpi xmlns:a14="http://schemas.microsoft.com/office/drawing/2010/main" val="0"/>
+              </a:ext>
+            </a:extLst>
+          </a:blip>
+          <a:stretch>
+            <a:fillRect/>
+          </a:stretch>
+        </p:blipFill>
+        <p:spPr>
+          <a:xfrm>
+            <a:off x="11203050" y="-56619"/>
+            <a:ext cx="1008000" cy="1008000"/>
+          </a:xfrm>
+          <a:prstGeom prst="rect">
+            <a:avLst/>
+          </a:prstGeom>
+        </p:spPr>
+      </p:pic>
+      <p:sp>
+        <p:nvSpPr>
+          <p:cNvPr id="17" name="Tekstvak 16">
+            <a:extLst>
+              <a:ext uri="{FF2B5EF4-FFF2-40B4-BE49-F238E27FC236}">
+                <a16:creationId xmlns:a16="http://schemas.microsoft.com/office/drawing/2014/main" id="{AFE54BFD-90FA-94B2-FF70-FAE0108412FB}"/>
+              </a:ext>
+            </a:extLst>
+          </p:cNvPr>
+          <p:cNvSpPr txBox="1"/>
+          <p:nvPr/>
+        </p:nvSpPr>
+        <p:spPr>
+          <a:xfrm>
+            <a:off x="0" y="6492875"/>
+            <a:ext cx="2725426" cy="369332"/>
+          </a:xfrm>
+          <a:prstGeom prst="rect">
+            <a:avLst/>
+          </a:prstGeom>
+          <a:noFill/>
+        </p:spPr>
+        <p:txBody>
+          <a:bodyPr wrap="square" rtlCol="0">
+            <a:spAutoFit/>
+          </a:bodyPr>
+          <a:lstStyle/>
+          <a:p>
+            <a:r>
+              <a:rPr lang="nl-BE" b="1" dirty="0">
+                <a:solidFill>
+                  <a:schemeClr val="bg1"/>
+                </a:solidFill>
+                <a:latin typeface="Inter"/>
+                <a:cs typeface="Arial" panose="020B0604020202020204" pitchFamily="34" charset="0"/>
+              </a:rPr>
+              <a:t>Spreker: Elias De Hondt</a:t>
+            </a:r>
+            <a:endParaRPr lang="nl-BE" sz="1800" b="1" dirty="0">
+              <a:solidFill>
+                <a:schemeClr val="bg1"/>
+              </a:solidFill>
+              <a:latin typeface="Inter"/>
+              <a:cs typeface="Arial" panose="020B0604020202020204" pitchFamily="34" charset="0"/>
+            </a:endParaRPr>
+          </a:p>
+        </p:txBody>
+      </p:sp>
+    </p:spTree>
+    <p:extLst>
+      <p:ext uri="{BB962C8B-B14F-4D97-AF65-F5344CB8AC3E}">
+        <p14:creationId xmlns:p14="http://schemas.microsoft.com/office/powerpoint/2010/main" val="1192056523"/>
+      </p:ext>
+    </p:extLst>
+  </p:cSld>
+  <p:clrMapOvr>
+    <a:masterClrMapping/>
+  </p:clrMapOvr>
+  <mc:AlternateContent xmlns:mc="http://schemas.openxmlformats.org/markup-compatibility/2006" xmlns:p159="http://schemas.microsoft.com/office/powerpoint/2015/09/main">
+    <mc:Choice Requires="p159">
+      <p:transition spd="med">
+        <p159:morph option="byObject"/>
+      </p:transition>
+    </mc:Choice>
+    <mc:Fallback xmlns="">
+      <p:transition spd="med">
+        <p:fade/>
+      </p:transition>
+    </mc:Fallback>
+  </mc:AlternateContent>
+</p:sld>
+</file>
+
+<file path=ppt/slides/slide11.xml><?xml version="1.0" encoding="utf-8"?>
+<p:sld xmlns:a="http://schemas.openxmlformats.org/drawingml/2006/main" xmlns:r="http://schemas.openxmlformats.org/officeDocument/2006/relationships" xmlns:p="http://schemas.openxmlformats.org/presentationml/2006/main">
+  <p:cSld>
+    <p:spTree>
+      <p:nvGrpSpPr>
+        <p:cNvPr id="1" name="">
+          <a:extLst>
+            <a:ext uri="{FF2B5EF4-FFF2-40B4-BE49-F238E27FC236}">
+              <a16:creationId xmlns:a16="http://schemas.microsoft.com/office/drawing/2014/main" id="{05998835-E796-0847-949A-98013552E1CD}"/>
+            </a:ext>
+          </a:extLst>
+        </p:cNvPr>
+        <p:cNvGrpSpPr/>
+        <p:nvPr/>
+      </p:nvGrpSpPr>
+      <p:grpSpPr>
+        <a:xfrm>
+          <a:off x="0" y="0"/>
+          <a:ext cx="0" cy="0"/>
+          <a:chOff x="0" y="0"/>
+          <a:chExt cx="0" cy="0"/>
+        </a:xfrm>
+      </p:grpSpPr>
+      <p:sp>
+        <p:nvSpPr>
+          <p:cNvPr id="4" name="Rechthoek 3">
+            <a:extLst>
+              <a:ext uri="{FF2B5EF4-FFF2-40B4-BE49-F238E27FC236}">
+                <a16:creationId xmlns:a16="http://schemas.microsoft.com/office/drawing/2014/main" id="{EC54BD6D-5913-5335-16FB-AB7743DE02DA}"/>
+              </a:ext>
+            </a:extLst>
+          </p:cNvPr>
+          <p:cNvSpPr/>
+          <p:nvPr/>
+        </p:nvSpPr>
+        <p:spPr>
+          <a:xfrm>
+            <a:off x="0" y="1"/>
+            <a:ext cx="12192000" cy="932330"/>
+          </a:xfrm>
+          <a:prstGeom prst="rect">
+            <a:avLst/>
+          </a:prstGeom>
+          <a:solidFill>
+            <a:srgbClr val="B6ABCE"/>
+          </a:solidFill>
+          <a:ln>
+            <a:solidFill>
+              <a:srgbClr val="B6ABCE"/>
+            </a:solidFill>
+          </a:ln>
+        </p:spPr>
+        <p:style>
+          <a:lnRef idx="2">
+            <a:schemeClr val="accent1">
+              <a:shade val="15000"/>
+            </a:schemeClr>
+          </a:lnRef>
+          <a:fillRef idx="1">
+            <a:schemeClr val="accent1"/>
+          </a:fillRef>
+          <a:effectRef idx="0">
+            <a:schemeClr val="accent1"/>
+          </a:effectRef>
+          <a:fontRef idx="minor">
+            <a:schemeClr val="lt1"/>
+          </a:fontRef>
+        </p:style>
+        <p:txBody>
+          <a:bodyPr rtlCol="0" anchor="ctr"/>
+          <a:lstStyle/>
+          <a:p>
+            <a:pPr algn="ctr"/>
+            <a:r>
+              <a:rPr lang="nl-NL" sz="5400" b="1" dirty="0">
+                <a:latin typeface="Inter"/>
+              </a:rPr>
+              <a:t>Hoe werkt K10s?</a:t>
+            </a:r>
+            <a:endParaRPr lang="nl-BE" sz="5000" b="1" dirty="0">
+              <a:latin typeface="Inter"/>
+              <a:cs typeface="Arial" panose="020B0604020202020204" pitchFamily="34" charset="0"/>
+            </a:endParaRPr>
+          </a:p>
+        </p:txBody>
+      </p:sp>
+      <p:sp>
+        <p:nvSpPr>
+          <p:cNvPr id="6" name="Rechthoek 5">
+            <a:extLst>
+              <a:ext uri="{FF2B5EF4-FFF2-40B4-BE49-F238E27FC236}">
+                <a16:creationId xmlns:a16="http://schemas.microsoft.com/office/drawing/2014/main" id="{10045364-C0A2-C9EA-80CC-0EEA21672AC1}"/>
+              </a:ext>
+            </a:extLst>
+          </p:cNvPr>
+          <p:cNvSpPr/>
+          <p:nvPr/>
+        </p:nvSpPr>
+        <p:spPr>
+          <a:xfrm>
+            <a:off x="0" y="6492875"/>
+            <a:ext cx="12192000" cy="365125"/>
+          </a:xfrm>
+          <a:prstGeom prst="rect">
+            <a:avLst/>
+          </a:prstGeom>
+          <a:solidFill>
+            <a:srgbClr val="8F7EB4"/>
+          </a:solidFill>
+          <a:ln>
+            <a:solidFill>
+              <a:srgbClr val="8F7EB4"/>
+            </a:solidFill>
+          </a:ln>
+        </p:spPr>
+        <p:style>
+          <a:lnRef idx="2">
+            <a:schemeClr val="accent1">
+              <a:shade val="15000"/>
+            </a:schemeClr>
+          </a:lnRef>
+          <a:fillRef idx="1">
+            <a:schemeClr val="accent1"/>
+          </a:fillRef>
+          <a:effectRef idx="0">
+            <a:schemeClr val="accent1"/>
+          </a:effectRef>
+          <a:fontRef idx="minor">
+            <a:schemeClr val="lt1"/>
+          </a:fontRef>
+        </p:style>
+        <p:txBody>
+          <a:bodyPr rtlCol="0" anchor="ctr"/>
+          <a:lstStyle/>
+          <a:p>
+            <a:pPr algn="ctr"/>
+            <a:endParaRPr lang="nl-BE">
+              <a:solidFill>
+                <a:srgbClr val="F37C00"/>
+              </a:solidFill>
+            </a:endParaRPr>
+          </a:p>
+        </p:txBody>
+      </p:sp>
+      <p:sp>
+        <p:nvSpPr>
+          <p:cNvPr id="11" name="Tijdelijke aanduiding voor dianummer 10">
+            <a:extLst>
+              <a:ext uri="{FF2B5EF4-FFF2-40B4-BE49-F238E27FC236}">
+                <a16:creationId xmlns:a16="http://schemas.microsoft.com/office/drawing/2014/main" id="{BB7AF67C-43A7-633F-9062-09270C3BD2B5}"/>
+              </a:ext>
+            </a:extLst>
+          </p:cNvPr>
+          <p:cNvSpPr>
+            <a:spLocks noGrp="1"/>
+          </p:cNvSpPr>
+          <p:nvPr>
+            <p:ph type="sldNum" sz="quarter" idx="12"/>
+          </p:nvPr>
+        </p:nvSpPr>
+        <p:spPr>
+          <a:xfrm>
+            <a:off x="11362267" y="6492875"/>
+            <a:ext cx="829733" cy="365125"/>
+          </a:xfrm>
+        </p:spPr>
+        <p:txBody>
+          <a:bodyPr/>
+          <a:lstStyle/>
+          <a:p>
+            <a:r>
+              <a:rPr lang="nl-BE" sz="2000" b="1" dirty="0">
+                <a:solidFill>
+                  <a:schemeClr val="bg1"/>
+                </a:solidFill>
+                <a:latin typeface="Inter"/>
+                <a:cs typeface="Arial" panose="020B0604020202020204" pitchFamily="34" charset="0"/>
+              </a:rPr>
+              <a:t>05/20</a:t>
+            </a:r>
+          </a:p>
+        </p:txBody>
+      </p:sp>
+      <p:pic>
+        <p:nvPicPr>
+          <p:cNvPr id="19" name="Afbeelding 18" descr="Afbeelding met cirkel, diagram, pixel&#10;&#10;Door AI gegenereerde inhoud is mogelijk onjuist.">
+            <a:extLst>
+              <a:ext uri="{FF2B5EF4-FFF2-40B4-BE49-F238E27FC236}">
+                <a16:creationId xmlns:a16="http://schemas.microsoft.com/office/drawing/2014/main" id="{7F51B3A3-89F4-E043-9613-FAEF2D7E7FE4}"/>
+              </a:ext>
+            </a:extLst>
+          </p:cNvPr>
+          <p:cNvPicPr>
+            <a:picLocks noChangeAspect="1"/>
+          </p:cNvPicPr>
+          <p:nvPr/>
+        </p:nvPicPr>
+        <p:blipFill>
+          <a:blip r:embed="rId3">
+            <a:extLst>
+              <a:ext uri="{28A0092B-C50C-407E-A947-70E740481C1C}">
+                <a14:useLocalDpi xmlns:a14="http://schemas.microsoft.com/office/drawing/2010/main" val="0"/>
+              </a:ext>
+            </a:extLst>
+          </a:blip>
+          <a:stretch>
+            <a:fillRect/>
+          </a:stretch>
+        </p:blipFill>
+        <p:spPr>
+          <a:xfrm>
+            <a:off x="11203050" y="-56619"/>
+            <a:ext cx="1008000" cy="1008000"/>
+          </a:xfrm>
+          <a:prstGeom prst="rect">
+            <a:avLst/>
+          </a:prstGeom>
+        </p:spPr>
+      </p:pic>
+      <p:sp>
+        <p:nvSpPr>
+          <p:cNvPr id="17" name="Tekstvak 16">
+            <a:extLst>
+              <a:ext uri="{FF2B5EF4-FFF2-40B4-BE49-F238E27FC236}">
+                <a16:creationId xmlns:a16="http://schemas.microsoft.com/office/drawing/2014/main" id="{411FBA8E-28F9-1FD6-5B66-0D14067DBBB8}"/>
+              </a:ext>
+            </a:extLst>
+          </p:cNvPr>
+          <p:cNvSpPr txBox="1"/>
+          <p:nvPr/>
+        </p:nvSpPr>
+        <p:spPr>
+          <a:xfrm>
+            <a:off x="0" y="6492875"/>
+            <a:ext cx="2725426" cy="369332"/>
+          </a:xfrm>
+          <a:prstGeom prst="rect">
+            <a:avLst/>
+          </a:prstGeom>
+          <a:noFill/>
+        </p:spPr>
+        <p:txBody>
+          <a:bodyPr wrap="square" rtlCol="0">
+            <a:spAutoFit/>
+          </a:bodyPr>
+          <a:lstStyle/>
+          <a:p>
+            <a:r>
+              <a:rPr lang="nl-BE" b="1" dirty="0">
+                <a:solidFill>
+                  <a:schemeClr val="bg1"/>
+                </a:solidFill>
+                <a:latin typeface="Inter"/>
+                <a:cs typeface="Arial" panose="020B0604020202020204" pitchFamily="34" charset="0"/>
+              </a:rPr>
+              <a:t>Spreker: Elias De Hondt</a:t>
+            </a:r>
+            <a:endParaRPr lang="nl-BE" sz="1800" b="1" dirty="0">
+              <a:solidFill>
+                <a:schemeClr val="bg1"/>
+              </a:solidFill>
+              <a:latin typeface="Inter"/>
+              <a:cs typeface="Arial" panose="020B0604020202020204" pitchFamily="34" charset="0"/>
+            </a:endParaRPr>
+          </a:p>
+        </p:txBody>
+      </p:sp>
+      <p:pic>
+        <p:nvPicPr>
+          <p:cNvPr id="7" name="Afbeelding 6" descr="Afbeelding met logo, clipart, symbool, Graphics&#10;&#10;Door AI gegenereerde inhoud is mogelijk onjuist.">
+            <a:extLst>
+              <a:ext uri="{FF2B5EF4-FFF2-40B4-BE49-F238E27FC236}">
+                <a16:creationId xmlns:a16="http://schemas.microsoft.com/office/drawing/2014/main" id="{DD75F728-A465-FACC-6DBA-611B04B47F9E}"/>
+              </a:ext>
+            </a:extLst>
+          </p:cNvPr>
+          <p:cNvPicPr>
+            <a:picLocks noChangeAspect="1"/>
+          </p:cNvPicPr>
+          <p:nvPr/>
+        </p:nvPicPr>
+        <p:blipFill>
+          <a:blip r:embed="rId4">
+            <a:extLst>
+              <a:ext uri="{28A0092B-C50C-407E-A947-70E740481C1C}">
+                <a14:useLocalDpi xmlns:a14="http://schemas.microsoft.com/office/drawing/2010/main" val="0"/>
+              </a:ext>
+            </a:extLst>
+          </a:blip>
+          <a:stretch>
+            <a:fillRect/>
+          </a:stretch>
+        </p:blipFill>
+        <p:spPr>
+          <a:xfrm>
+            <a:off x="5008464" y="3988807"/>
+            <a:ext cx="720000" cy="720000"/>
+          </a:xfrm>
+          <a:prstGeom prst="rect">
+            <a:avLst/>
+          </a:prstGeom>
+        </p:spPr>
+      </p:pic>
+      <p:pic>
+        <p:nvPicPr>
+          <p:cNvPr id="10" name="Afbeelding 9" descr="Afbeelding met logo, clipart, symbool, Graphics&#10;&#10;Door AI gegenereerde inhoud is mogelijk onjuist.">
+            <a:extLst>
+              <a:ext uri="{FF2B5EF4-FFF2-40B4-BE49-F238E27FC236}">
+                <a16:creationId xmlns:a16="http://schemas.microsoft.com/office/drawing/2014/main" id="{41292B83-EC6D-384A-F590-44428ED5FBA7}"/>
+              </a:ext>
+            </a:extLst>
+          </p:cNvPr>
+          <p:cNvPicPr>
+            <a:picLocks noChangeAspect="1"/>
+          </p:cNvPicPr>
+          <p:nvPr/>
+        </p:nvPicPr>
+        <p:blipFill>
+          <a:blip r:embed="rId4">
+            <a:extLst>
+              <a:ext uri="{28A0092B-C50C-407E-A947-70E740481C1C}">
+                <a14:useLocalDpi xmlns:a14="http://schemas.microsoft.com/office/drawing/2010/main" val="0"/>
+              </a:ext>
+            </a:extLst>
+          </a:blip>
+          <a:stretch>
+            <a:fillRect/>
+          </a:stretch>
+        </p:blipFill>
+        <p:spPr>
+          <a:xfrm>
+            <a:off x="7232533" y="3988807"/>
+            <a:ext cx="720000" cy="720000"/>
+          </a:xfrm>
+          <a:prstGeom prst="rect">
+            <a:avLst/>
+          </a:prstGeom>
+        </p:spPr>
+      </p:pic>
+      <p:sp>
+        <p:nvSpPr>
+          <p:cNvPr id="12" name="Tekstvak 11">
+            <a:extLst>
+              <a:ext uri="{FF2B5EF4-FFF2-40B4-BE49-F238E27FC236}">
+                <a16:creationId xmlns:a16="http://schemas.microsoft.com/office/drawing/2014/main" id="{32B7EBDA-4034-E229-B8B2-945B0DE7115A}"/>
+              </a:ext>
+            </a:extLst>
+          </p:cNvPr>
+          <p:cNvSpPr txBox="1"/>
+          <p:nvPr/>
+        </p:nvSpPr>
+        <p:spPr>
+          <a:xfrm>
+            <a:off x="4507108" y="4713014"/>
+            <a:ext cx="1722713" cy="400110"/>
+          </a:xfrm>
+          <a:prstGeom prst="rect">
+            <a:avLst/>
+          </a:prstGeom>
+          <a:noFill/>
+        </p:spPr>
+        <p:txBody>
+          <a:bodyPr wrap="square" rtlCol="0">
+            <a:spAutoFit/>
+          </a:bodyPr>
+          <a:lstStyle/>
+          <a:p>
+            <a:r>
+              <a:rPr lang="nl-BE" sz="2000" b="1" dirty="0">
+                <a:solidFill>
+                  <a:srgbClr val="8F7EB4"/>
+                </a:solidFill>
+                <a:latin typeface="Inter"/>
+                <a:cs typeface="Arial" panose="020B0604020202020204" pitchFamily="34" charset="0"/>
+              </a:rPr>
+              <a:t>k10s-frontend</a:t>
+            </a:r>
+          </a:p>
+        </p:txBody>
+      </p:sp>
+      <p:sp>
+        <p:nvSpPr>
+          <p:cNvPr id="13" name="Tekstvak 12">
+            <a:extLst>
+              <a:ext uri="{FF2B5EF4-FFF2-40B4-BE49-F238E27FC236}">
+                <a16:creationId xmlns:a16="http://schemas.microsoft.com/office/drawing/2014/main" id="{95DE7093-A49F-B5D3-9105-59CB2625F935}"/>
+              </a:ext>
+            </a:extLst>
+          </p:cNvPr>
+          <p:cNvSpPr txBox="1"/>
+          <p:nvPr/>
+        </p:nvSpPr>
+        <p:spPr>
+          <a:xfrm>
+            <a:off x="6731177" y="4713014"/>
+            <a:ext cx="1722713" cy="400110"/>
+          </a:xfrm>
+          <a:prstGeom prst="rect">
+            <a:avLst/>
+          </a:prstGeom>
+          <a:noFill/>
+        </p:spPr>
+        <p:txBody>
+          <a:bodyPr wrap="square" rtlCol="0">
+            <a:spAutoFit/>
+          </a:bodyPr>
+          <a:lstStyle/>
+          <a:p>
+            <a:r>
+              <a:rPr lang="nl-BE" sz="2000" b="1" dirty="0">
+                <a:solidFill>
+                  <a:srgbClr val="8F7EB4"/>
+                </a:solidFill>
+                <a:latin typeface="Inter"/>
+                <a:cs typeface="Arial" panose="020B0604020202020204" pitchFamily="34" charset="0"/>
+              </a:rPr>
+              <a:t>k10s-backend</a:t>
+            </a:r>
+          </a:p>
+        </p:txBody>
+      </p:sp>
+      <p:sp>
+        <p:nvSpPr>
+          <p:cNvPr id="16" name="Tekstvak 15">
+            <a:extLst>
+              <a:ext uri="{FF2B5EF4-FFF2-40B4-BE49-F238E27FC236}">
+                <a16:creationId xmlns:a16="http://schemas.microsoft.com/office/drawing/2014/main" id="{CB6F4703-530F-6645-C4CF-AAD85FD4098A}"/>
+              </a:ext>
+            </a:extLst>
+          </p:cNvPr>
+          <p:cNvSpPr txBox="1"/>
+          <p:nvPr/>
+        </p:nvSpPr>
+        <p:spPr>
+          <a:xfrm>
+            <a:off x="5728464" y="2689840"/>
+            <a:ext cx="1287717" cy="400110"/>
+          </a:xfrm>
+          <a:prstGeom prst="rect">
+            <a:avLst/>
+          </a:prstGeom>
+          <a:noFill/>
+        </p:spPr>
+        <p:txBody>
+          <a:bodyPr wrap="square" rtlCol="0">
+            <a:spAutoFit/>
+          </a:bodyPr>
+          <a:lstStyle/>
+          <a:p>
+            <a:r>
+              <a:rPr lang="nl-BE" sz="2000" b="1" dirty="0">
+                <a:solidFill>
+                  <a:srgbClr val="8F7EB4"/>
+                </a:solidFill>
+                <a:latin typeface="Inter"/>
+                <a:cs typeface="Arial" panose="020B0604020202020204" pitchFamily="34" charset="0"/>
+              </a:rPr>
+              <a:t>Code Base</a:t>
+            </a:r>
+          </a:p>
+        </p:txBody>
+      </p:sp>
+      <p:sp>
+        <p:nvSpPr>
+          <p:cNvPr id="18" name="Tekstvak 17">
+            <a:extLst>
+              <a:ext uri="{FF2B5EF4-FFF2-40B4-BE49-F238E27FC236}">
+                <a16:creationId xmlns:a16="http://schemas.microsoft.com/office/drawing/2014/main" id="{3B8CC98A-388F-896B-0EAA-5A81628168EF}"/>
+              </a:ext>
+            </a:extLst>
+          </p:cNvPr>
+          <p:cNvSpPr txBox="1"/>
+          <p:nvPr/>
+        </p:nvSpPr>
+        <p:spPr>
+          <a:xfrm>
+            <a:off x="3812583" y="2689840"/>
+            <a:ext cx="936790" cy="400110"/>
+          </a:xfrm>
+          <a:prstGeom prst="rect">
+            <a:avLst/>
+          </a:prstGeom>
+          <a:noFill/>
+        </p:spPr>
+        <p:txBody>
+          <a:bodyPr wrap="square" rtlCol="0">
+            <a:spAutoFit/>
+          </a:bodyPr>
+          <a:lstStyle/>
+          <a:p>
+            <a:r>
+              <a:rPr lang="nl-BE" sz="2000" b="1" dirty="0">
+                <a:solidFill>
+                  <a:srgbClr val="8F7EB4"/>
+                </a:solidFill>
+                <a:latin typeface="Inter"/>
+                <a:cs typeface="Arial" panose="020B0604020202020204" pitchFamily="34" charset="0"/>
+              </a:rPr>
+              <a:t>GitHub</a:t>
+            </a:r>
+          </a:p>
+        </p:txBody>
+      </p:sp>
+      <p:cxnSp>
+        <p:nvCxnSpPr>
+          <p:cNvPr id="21" name="Rechte verbindingslijn met pijl 20">
+            <a:extLst>
+              <a:ext uri="{FF2B5EF4-FFF2-40B4-BE49-F238E27FC236}">
+                <a16:creationId xmlns:a16="http://schemas.microsoft.com/office/drawing/2014/main" id="{4FF2C2C0-3158-73EC-BF81-AF9B3BB9BA11}"/>
+              </a:ext>
+            </a:extLst>
+          </p:cNvPr>
+          <p:cNvCxnSpPr>
+            <a:cxnSpLocks/>
+            <a:endCxn id="15" idx="1"/>
+          </p:cNvCxnSpPr>
+          <p:nvPr/>
+        </p:nvCxnSpPr>
+        <p:spPr>
+          <a:xfrm>
+            <a:off x="3085426" y="2293198"/>
+            <a:ext cx="2879491" cy="1"/>
+          </a:xfrm>
+          <a:prstGeom prst="straightConnector1">
+            <a:avLst/>
+          </a:prstGeom>
+          <a:ln w="28575">
+            <a:solidFill>
+              <a:srgbClr val="8F7EB4"/>
+            </a:solidFill>
+            <a:tailEnd type="triangle"/>
+          </a:ln>
+        </p:spPr>
+        <p:style>
+          <a:lnRef idx="2">
+            <a:schemeClr val="accent1"/>
+          </a:lnRef>
+          <a:fillRef idx="0">
+            <a:schemeClr val="accent1"/>
+          </a:fillRef>
+          <a:effectRef idx="1">
+            <a:schemeClr val="accent1"/>
+          </a:effectRef>
+          <a:fontRef idx="minor">
+            <a:schemeClr val="tx1"/>
+          </a:fontRef>
+        </p:style>
+      </p:cxnSp>
+      <p:cxnSp>
+        <p:nvCxnSpPr>
+          <p:cNvPr id="22" name="Rechte verbindingslijn met pijl 21">
+            <a:extLst>
+              <a:ext uri="{FF2B5EF4-FFF2-40B4-BE49-F238E27FC236}">
+                <a16:creationId xmlns:a16="http://schemas.microsoft.com/office/drawing/2014/main" id="{92EF3AF7-D88B-F639-CBA1-534857690E03}"/>
+              </a:ext>
+            </a:extLst>
+          </p:cNvPr>
+          <p:cNvCxnSpPr>
+            <a:cxnSpLocks/>
+            <a:endCxn id="7" idx="0"/>
+          </p:cNvCxnSpPr>
+          <p:nvPr/>
+        </p:nvCxnSpPr>
+        <p:spPr>
+          <a:xfrm>
+            <a:off x="5368464" y="3486590"/>
+            <a:ext cx="0" cy="502217"/>
+          </a:xfrm>
+          <a:prstGeom prst="straightConnector1">
+            <a:avLst/>
+          </a:prstGeom>
+          <a:ln w="28575">
+            <a:solidFill>
+              <a:srgbClr val="8F7EB4"/>
+            </a:solidFill>
+            <a:tailEnd type="triangle"/>
+          </a:ln>
+        </p:spPr>
+        <p:style>
+          <a:lnRef idx="2">
+            <a:schemeClr val="accent1"/>
+          </a:lnRef>
+          <a:fillRef idx="0">
+            <a:schemeClr val="accent1"/>
+          </a:fillRef>
+          <a:effectRef idx="1">
+            <a:schemeClr val="accent1"/>
+          </a:effectRef>
+          <a:fontRef idx="minor">
+            <a:schemeClr val="tx1"/>
+          </a:fontRef>
+        </p:style>
+      </p:cxnSp>
+      <p:cxnSp>
+        <p:nvCxnSpPr>
+          <p:cNvPr id="25" name="Rechte verbindingslijn met pijl 24">
+            <a:extLst>
+              <a:ext uri="{FF2B5EF4-FFF2-40B4-BE49-F238E27FC236}">
+                <a16:creationId xmlns:a16="http://schemas.microsoft.com/office/drawing/2014/main" id="{8F7EA95A-909E-FACB-74D8-E4F40478CF99}"/>
+              </a:ext>
+            </a:extLst>
+          </p:cNvPr>
+          <p:cNvCxnSpPr>
+            <a:cxnSpLocks/>
+            <a:endCxn id="10" idx="0"/>
+          </p:cNvCxnSpPr>
+          <p:nvPr/>
+        </p:nvCxnSpPr>
+        <p:spPr>
+          <a:xfrm>
+            <a:off x="7592533" y="2293198"/>
+            <a:ext cx="0" cy="1695609"/>
+          </a:xfrm>
+          <a:prstGeom prst="straightConnector1">
+            <a:avLst/>
+          </a:prstGeom>
+          <a:ln w="28575">
+            <a:solidFill>
+              <a:srgbClr val="8F7EB4"/>
+            </a:solidFill>
+            <a:tailEnd type="triangle"/>
+          </a:ln>
+        </p:spPr>
+        <p:style>
+          <a:lnRef idx="2">
+            <a:schemeClr val="accent1"/>
+          </a:lnRef>
+          <a:fillRef idx="0">
+            <a:schemeClr val="accent1"/>
+          </a:fillRef>
+          <a:effectRef idx="1">
+            <a:schemeClr val="accent1"/>
+          </a:effectRef>
+          <a:fontRef idx="minor">
+            <a:schemeClr val="tx1"/>
+          </a:fontRef>
+        </p:style>
+      </p:cxnSp>
+      <p:cxnSp>
+        <p:nvCxnSpPr>
+          <p:cNvPr id="45" name="Rechte verbindingslijn 44">
+            <a:extLst>
+              <a:ext uri="{FF2B5EF4-FFF2-40B4-BE49-F238E27FC236}">
+                <a16:creationId xmlns:a16="http://schemas.microsoft.com/office/drawing/2014/main" id="{0EE67AA9-62F5-A57C-FBBC-A7DA88DF2B3E}"/>
+              </a:ext>
+            </a:extLst>
+          </p:cNvPr>
+          <p:cNvCxnSpPr>
+            <a:cxnSpLocks/>
+          </p:cNvCxnSpPr>
+          <p:nvPr/>
+        </p:nvCxnSpPr>
+        <p:spPr>
+          <a:xfrm>
+            <a:off x="6634965" y="2293198"/>
+            <a:ext cx="973443" cy="0"/>
+          </a:xfrm>
+          <a:prstGeom prst="line">
+            <a:avLst/>
+          </a:prstGeom>
+          <a:ln w="28575">
+            <a:solidFill>
+              <a:srgbClr val="8F7EB4"/>
+            </a:solidFill>
+          </a:ln>
+        </p:spPr>
+        <p:style>
+          <a:lnRef idx="2">
+            <a:schemeClr val="accent1"/>
+          </a:lnRef>
+          <a:fillRef idx="0">
+            <a:schemeClr val="accent1"/>
+          </a:fillRef>
+          <a:effectRef idx="1">
+            <a:schemeClr val="accent1"/>
+          </a:effectRef>
+          <a:fontRef idx="minor">
+            <a:schemeClr val="tx1"/>
+          </a:fontRef>
+        </p:style>
+      </p:cxnSp>
+      <p:pic>
+        <p:nvPicPr>
+          <p:cNvPr id="15" name="Afbeelding 14" descr="Afbeelding met zwart, duisternis&#10;&#10;Door AI gegenereerde inhoud is mogelijk onjuist.">
+            <a:extLst>
+              <a:ext uri="{FF2B5EF4-FFF2-40B4-BE49-F238E27FC236}">
+                <a16:creationId xmlns:a16="http://schemas.microsoft.com/office/drawing/2014/main" id="{6687185E-FE29-3A13-C5C0-56E107A70E1D}"/>
+              </a:ext>
+            </a:extLst>
+          </p:cNvPr>
+          <p:cNvPicPr>
+            <a:picLocks noChangeAspect="1"/>
+          </p:cNvPicPr>
+          <p:nvPr/>
+        </p:nvPicPr>
+        <p:blipFill>
+          <a:blip r:embed="rId5">
+            <a:extLst>
+              <a:ext uri="{28A0092B-C50C-407E-A947-70E740481C1C}">
+                <a14:useLocalDpi xmlns:a14="http://schemas.microsoft.com/office/drawing/2010/main" val="0"/>
+              </a:ext>
+            </a:extLst>
+          </a:blip>
+          <a:stretch>
+            <a:fillRect/>
+          </a:stretch>
+        </p:blipFill>
+        <p:spPr>
+          <a:xfrm>
+            <a:off x="5964917" y="1885792"/>
+            <a:ext cx="814813" cy="814813"/>
+          </a:xfrm>
+          <a:prstGeom prst="rect">
+            <a:avLst/>
+          </a:prstGeom>
+        </p:spPr>
+      </p:pic>
+      <p:cxnSp>
+        <p:nvCxnSpPr>
+          <p:cNvPr id="49" name="Rechte verbindingslijn 48">
+            <a:extLst>
+              <a:ext uri="{FF2B5EF4-FFF2-40B4-BE49-F238E27FC236}">
+                <a16:creationId xmlns:a16="http://schemas.microsoft.com/office/drawing/2014/main" id="{9F7278C4-B772-102F-E20D-0365C990A991}"/>
+              </a:ext>
+            </a:extLst>
+          </p:cNvPr>
+          <p:cNvCxnSpPr>
+            <a:cxnSpLocks/>
+          </p:cNvCxnSpPr>
+          <p:nvPr/>
+        </p:nvCxnSpPr>
+        <p:spPr>
+          <a:xfrm>
+            <a:off x="5358940" y="3500493"/>
+            <a:ext cx="2233593" cy="0"/>
+          </a:xfrm>
+          <a:prstGeom prst="line">
+            <a:avLst/>
+          </a:prstGeom>
+          <a:ln w="28575">
+            <a:solidFill>
+              <a:srgbClr val="8F7EB4"/>
+            </a:solidFill>
+          </a:ln>
+        </p:spPr>
+        <p:style>
+          <a:lnRef idx="2">
+            <a:schemeClr val="accent1"/>
+          </a:lnRef>
+          <a:fillRef idx="0">
+            <a:schemeClr val="accent1"/>
+          </a:fillRef>
+          <a:effectRef idx="1">
+            <a:schemeClr val="accent1"/>
+          </a:effectRef>
+          <a:fontRef idx="minor">
+            <a:schemeClr val="tx1"/>
+          </a:fontRef>
+        </p:style>
+      </p:cxnSp>
+      <p:sp>
+        <p:nvSpPr>
+          <p:cNvPr id="51" name="Rechthoek: afgeronde hoeken 50">
+            <a:extLst>
+              <a:ext uri="{FF2B5EF4-FFF2-40B4-BE49-F238E27FC236}">
+                <a16:creationId xmlns:a16="http://schemas.microsoft.com/office/drawing/2014/main" id="{5B2A0B74-FF7D-4A93-B9D6-F199290D8967}"/>
+              </a:ext>
+            </a:extLst>
+          </p:cNvPr>
+          <p:cNvSpPr/>
+          <p:nvPr/>
+        </p:nvSpPr>
+        <p:spPr>
+          <a:xfrm>
+            <a:off x="9460500" y="1545651"/>
+            <a:ext cx="2160000" cy="2160000"/>
+          </a:xfrm>
+          <a:prstGeom prst="roundRect">
+            <a:avLst>
+              <a:gd name="adj" fmla="val 8485"/>
+            </a:avLst>
+          </a:prstGeom>
+          <a:solidFill>
+            <a:schemeClr val="bg2">
+              <a:lumMod val="90000"/>
+            </a:schemeClr>
+          </a:solidFill>
+          <a:ln w="38100">
+            <a:solidFill>
+              <a:schemeClr val="tx1"/>
+            </a:solidFill>
+          </a:ln>
+          <a:scene3d>
+            <a:camera prst="isometricTopUp"/>
+            <a:lightRig rig="threePt" dir="t"/>
+          </a:scene3d>
+        </p:spPr>
+        <p:style>
+          <a:lnRef idx="1">
+            <a:schemeClr val="accent6"/>
+          </a:lnRef>
+          <a:fillRef idx="3">
+            <a:schemeClr val="accent6"/>
+          </a:fillRef>
+          <a:effectRef idx="2">
+            <a:schemeClr val="accent6"/>
+          </a:effectRef>
+          <a:fontRef idx="minor">
+            <a:schemeClr val="lt1"/>
+          </a:fontRef>
+        </p:style>
+        <p:txBody>
+          <a:bodyPr rtlCol="0" anchor="ctr"/>
+          <a:lstStyle/>
+          <a:p>
+            <a:pPr algn="ctr"/>
+            <a:endParaRPr lang="nl-BE" sz="3000" b="1" dirty="0">
+              <a:solidFill>
+                <a:schemeClr val="bg1"/>
+              </a:solidFill>
+              <a:latin typeface="Arial" panose="020B0604020202020204" pitchFamily="34" charset="0"/>
+              <a:cs typeface="Arial" panose="020B0604020202020204" pitchFamily="34" charset="0"/>
+            </a:endParaRPr>
+          </a:p>
+        </p:txBody>
+      </p:sp>
+      <p:sp>
+        <p:nvSpPr>
+          <p:cNvPr id="52" name="Rechthoek: afgeronde hoeken 51">
+            <a:extLst>
+              <a:ext uri="{FF2B5EF4-FFF2-40B4-BE49-F238E27FC236}">
+                <a16:creationId xmlns:a16="http://schemas.microsoft.com/office/drawing/2014/main" id="{73D13731-7E4E-18BF-8DBE-61A19406FD01}"/>
+              </a:ext>
+            </a:extLst>
+          </p:cNvPr>
+          <p:cNvSpPr/>
+          <p:nvPr/>
+        </p:nvSpPr>
+        <p:spPr>
+          <a:xfrm>
+            <a:off x="9460500" y="1341211"/>
+            <a:ext cx="2160000" cy="2160000"/>
+          </a:xfrm>
+          <a:prstGeom prst="roundRect">
+            <a:avLst>
+              <a:gd name="adj" fmla="val 8485"/>
+            </a:avLst>
+          </a:prstGeom>
+          <a:solidFill>
+            <a:schemeClr val="bg2">
+              <a:lumMod val="90000"/>
+            </a:schemeClr>
+          </a:solidFill>
+          <a:ln w="38100">
+            <a:solidFill>
+              <a:schemeClr val="tx1"/>
+            </a:solidFill>
+          </a:ln>
+          <a:scene3d>
+            <a:camera prst="isometricTopUp"/>
+            <a:lightRig rig="threePt" dir="t"/>
+          </a:scene3d>
+        </p:spPr>
+        <p:style>
+          <a:lnRef idx="1">
+            <a:schemeClr val="accent6"/>
+          </a:lnRef>
+          <a:fillRef idx="3">
+            <a:schemeClr val="accent6"/>
+          </a:fillRef>
+          <a:effectRef idx="2">
+            <a:schemeClr val="accent6"/>
+          </a:effectRef>
+          <a:fontRef idx="minor">
+            <a:schemeClr val="lt1"/>
+          </a:fontRef>
+        </p:style>
+        <p:txBody>
+          <a:bodyPr rtlCol="0" anchor="ctr"/>
+          <a:lstStyle/>
+          <a:p>
+            <a:pPr algn="ctr"/>
+            <a:endParaRPr lang="nl-BE" sz="3000" b="1" dirty="0">
+              <a:solidFill>
+                <a:schemeClr val="bg1"/>
+              </a:solidFill>
+              <a:latin typeface="Arial" panose="020B0604020202020204" pitchFamily="34" charset="0"/>
+              <a:cs typeface="Arial" panose="020B0604020202020204" pitchFamily="34" charset="0"/>
+            </a:endParaRPr>
+          </a:p>
+        </p:txBody>
+      </p:sp>
+      <p:sp>
+        <p:nvSpPr>
+          <p:cNvPr id="53" name="Rechthoek: afgeronde hoeken 52">
+            <a:extLst>
+              <a:ext uri="{FF2B5EF4-FFF2-40B4-BE49-F238E27FC236}">
+                <a16:creationId xmlns:a16="http://schemas.microsoft.com/office/drawing/2014/main" id="{AB6A0AD5-075B-713C-5116-452110F63970}"/>
+              </a:ext>
+            </a:extLst>
+          </p:cNvPr>
+          <p:cNvSpPr/>
+          <p:nvPr/>
+        </p:nvSpPr>
+        <p:spPr>
+          <a:xfrm>
+            <a:off x="9460500" y="1136771"/>
+            <a:ext cx="2160000" cy="2160000"/>
+          </a:xfrm>
+          <a:prstGeom prst="roundRect">
+            <a:avLst>
+              <a:gd name="adj" fmla="val 8485"/>
+            </a:avLst>
+          </a:prstGeom>
+          <a:solidFill>
+            <a:schemeClr val="bg2">
+              <a:lumMod val="90000"/>
+            </a:schemeClr>
+          </a:solidFill>
+          <a:ln w="38100">
+            <a:solidFill>
+              <a:schemeClr val="tx1"/>
+            </a:solidFill>
+          </a:ln>
+          <a:scene3d>
+            <a:camera prst="isometricTopUp"/>
+            <a:lightRig rig="threePt" dir="t"/>
+          </a:scene3d>
+        </p:spPr>
+        <p:style>
+          <a:lnRef idx="1">
+            <a:schemeClr val="accent6"/>
+          </a:lnRef>
+          <a:fillRef idx="3">
+            <a:schemeClr val="accent6"/>
+          </a:fillRef>
+          <a:effectRef idx="2">
+            <a:schemeClr val="accent6"/>
+          </a:effectRef>
+          <a:fontRef idx="minor">
+            <a:schemeClr val="lt1"/>
+          </a:fontRef>
+        </p:style>
+        <p:txBody>
+          <a:bodyPr rtlCol="0" anchor="ctr"/>
+          <a:lstStyle/>
+          <a:p>
+            <a:pPr algn="ctr"/>
+            <a:endParaRPr lang="nl-BE" sz="3000" b="1" dirty="0">
+              <a:solidFill>
+                <a:schemeClr val="bg1"/>
+              </a:solidFill>
+              <a:latin typeface="Arial" panose="020B0604020202020204" pitchFamily="34" charset="0"/>
+              <a:cs typeface="Arial" panose="020B0604020202020204" pitchFamily="34" charset="0"/>
+            </a:endParaRPr>
+          </a:p>
+        </p:txBody>
+      </p:sp>
+      <p:sp>
+        <p:nvSpPr>
+          <p:cNvPr id="54" name="Rechthoek: afgeronde hoeken 53">
+            <a:extLst>
+              <a:ext uri="{FF2B5EF4-FFF2-40B4-BE49-F238E27FC236}">
+                <a16:creationId xmlns:a16="http://schemas.microsoft.com/office/drawing/2014/main" id="{E012B6AC-45B5-49C2-4925-470E6187DEF7}"/>
+              </a:ext>
+            </a:extLst>
+          </p:cNvPr>
+          <p:cNvSpPr/>
+          <p:nvPr/>
+        </p:nvSpPr>
+        <p:spPr>
+          <a:xfrm>
+            <a:off x="9460500" y="932331"/>
+            <a:ext cx="2160000" cy="2160000"/>
+          </a:xfrm>
+          <a:prstGeom prst="roundRect">
+            <a:avLst>
+              <a:gd name="adj" fmla="val 8485"/>
+            </a:avLst>
+          </a:prstGeom>
+          <a:solidFill>
+            <a:srgbClr val="B6ABCE"/>
+          </a:solidFill>
+          <a:ln w="38100">
+            <a:solidFill>
+              <a:schemeClr val="tx1"/>
+            </a:solidFill>
+          </a:ln>
+          <a:scene3d>
+            <a:camera prst="isometricTopUp"/>
+            <a:lightRig rig="threePt" dir="t"/>
+          </a:scene3d>
+        </p:spPr>
+        <p:style>
+          <a:lnRef idx="1">
+            <a:schemeClr val="accent6"/>
+          </a:lnRef>
+          <a:fillRef idx="3">
+            <a:schemeClr val="accent6"/>
+          </a:fillRef>
+          <a:effectRef idx="2">
+            <a:schemeClr val="accent6"/>
+          </a:effectRef>
+          <a:fontRef idx="minor">
+            <a:schemeClr val="lt1"/>
+          </a:fontRef>
+        </p:style>
+        <p:txBody>
+          <a:bodyPr rtlCol="0" anchor="ctr"/>
+          <a:lstStyle/>
+          <a:p>
+            <a:pPr algn="ctr"/>
+            <a:endParaRPr lang="nl-BE" sz="3000" b="1" dirty="0">
+              <a:solidFill>
+                <a:schemeClr val="bg1"/>
+              </a:solidFill>
+              <a:latin typeface="Arial" panose="020B0604020202020204" pitchFamily="34" charset="0"/>
+              <a:cs typeface="Arial" panose="020B0604020202020204" pitchFamily="34" charset="0"/>
+            </a:endParaRPr>
+          </a:p>
+        </p:txBody>
+      </p:sp>
+      <p:pic>
+        <p:nvPicPr>
+          <p:cNvPr id="56" name="Afbeelding 55" descr="Afbeelding met zwart, duisternis&#10;&#10;Door AI gegenereerde inhoud is mogelijk onjuist.">
+            <a:extLst>
+              <a:ext uri="{FF2B5EF4-FFF2-40B4-BE49-F238E27FC236}">
+                <a16:creationId xmlns:a16="http://schemas.microsoft.com/office/drawing/2014/main" id="{310BE08E-CDA5-2096-0861-73E310292DE1}"/>
+              </a:ext>
+            </a:extLst>
+          </p:cNvPr>
+          <p:cNvPicPr>
+            <a:picLocks noChangeAspect="1"/>
+          </p:cNvPicPr>
+          <p:nvPr/>
+        </p:nvPicPr>
+        <p:blipFill>
+          <a:blip r:embed="rId6">
+            <a:extLst>
+              <a:ext uri="{28A0092B-C50C-407E-A947-70E740481C1C}">
+                <a14:useLocalDpi xmlns:a14="http://schemas.microsoft.com/office/drawing/2010/main" val="0"/>
+              </a:ext>
+            </a:extLst>
+          </a:blip>
+          <a:stretch>
+            <a:fillRect/>
+          </a:stretch>
+        </p:blipFill>
+        <p:spPr>
+          <a:xfrm>
+            <a:off x="2725426" y="3384243"/>
+            <a:ext cx="720000" cy="720000"/>
+          </a:xfrm>
+          <a:prstGeom prst="rect">
+            <a:avLst/>
+          </a:prstGeom>
+        </p:spPr>
+      </p:pic>
+      <p:sp>
+        <p:nvSpPr>
+          <p:cNvPr id="57" name="Tekstvak 56">
+            <a:extLst>
+              <a:ext uri="{FF2B5EF4-FFF2-40B4-BE49-F238E27FC236}">
+                <a16:creationId xmlns:a16="http://schemas.microsoft.com/office/drawing/2014/main" id="{46C4F4E1-D82E-8655-3C12-5898A4EBEB40}"/>
+              </a:ext>
+            </a:extLst>
+          </p:cNvPr>
+          <p:cNvSpPr txBox="1"/>
+          <p:nvPr/>
+        </p:nvSpPr>
+        <p:spPr>
+          <a:xfrm>
+            <a:off x="2344716" y="4103502"/>
+            <a:ext cx="1481419" cy="400110"/>
+          </a:xfrm>
+          <a:prstGeom prst="rect">
+            <a:avLst/>
+          </a:prstGeom>
+          <a:noFill/>
+        </p:spPr>
+        <p:txBody>
+          <a:bodyPr wrap="square" rtlCol="0">
+            <a:spAutoFit/>
+          </a:bodyPr>
+          <a:lstStyle/>
+          <a:p>
+            <a:r>
+              <a:rPr lang="nl-BE" sz="2000" b="1" dirty="0">
+                <a:solidFill>
+                  <a:srgbClr val="8F7EB4"/>
+                </a:solidFill>
+                <a:latin typeface="Inter"/>
+                <a:cs typeface="Arial" panose="020B0604020202020204" pitchFamily="34" charset="0"/>
+              </a:rPr>
+              <a:t>Community</a:t>
+            </a:r>
+          </a:p>
+        </p:txBody>
+      </p:sp>
+      <p:pic>
+        <p:nvPicPr>
+          <p:cNvPr id="9" name="Afbeelding 8" descr="Afbeelding met kat, clipart, zoogdier, silhouet&#10;&#10;Door AI gegenereerde inhoud is mogelijk onjuist.">
+            <a:extLst>
+              <a:ext uri="{FF2B5EF4-FFF2-40B4-BE49-F238E27FC236}">
+                <a16:creationId xmlns:a16="http://schemas.microsoft.com/office/drawing/2014/main" id="{1DD6D22B-C2FD-594B-5A6B-72D2F6A76756}"/>
+              </a:ext>
+            </a:extLst>
+          </p:cNvPr>
+          <p:cNvPicPr>
+            <a:picLocks noChangeAspect="1"/>
+          </p:cNvPicPr>
+          <p:nvPr/>
+        </p:nvPicPr>
+        <p:blipFill>
+          <a:blip r:embed="rId7">
+            <a:extLst>
+              <a:ext uri="{28A0092B-C50C-407E-A947-70E740481C1C}">
+                <a14:useLocalDpi xmlns:a14="http://schemas.microsoft.com/office/drawing/2010/main" val="0"/>
+              </a:ext>
+            </a:extLst>
+          </a:blip>
+          <a:stretch>
+            <a:fillRect/>
+          </a:stretch>
+        </p:blipFill>
+        <p:spPr>
+          <a:xfrm>
+            <a:off x="3920978" y="1933199"/>
+            <a:ext cx="720000" cy="720000"/>
+          </a:xfrm>
+          <a:prstGeom prst="rect">
+            <a:avLst/>
+          </a:prstGeom>
+        </p:spPr>
+      </p:pic>
+      <p:cxnSp>
+        <p:nvCxnSpPr>
+          <p:cNvPr id="60" name="Rechte verbindingslijn met pijl 59">
+            <a:extLst>
+              <a:ext uri="{FF2B5EF4-FFF2-40B4-BE49-F238E27FC236}">
+                <a16:creationId xmlns:a16="http://schemas.microsoft.com/office/drawing/2014/main" id="{DD9F6536-229E-D6F0-ECC2-7E833267F74A}"/>
+              </a:ext>
+            </a:extLst>
+          </p:cNvPr>
+          <p:cNvCxnSpPr>
+            <a:cxnSpLocks/>
+          </p:cNvCxnSpPr>
+          <p:nvPr/>
+        </p:nvCxnSpPr>
+        <p:spPr>
+          <a:xfrm>
+            <a:off x="3085426" y="2279650"/>
+            <a:ext cx="0" cy="1164918"/>
+          </a:xfrm>
+          <a:prstGeom prst="straightConnector1">
+            <a:avLst/>
+          </a:prstGeom>
+          <a:ln w="28575">
+            <a:solidFill>
+              <a:srgbClr val="8F7EB4"/>
+            </a:solidFill>
+            <a:tailEnd type="triangle"/>
+          </a:ln>
+        </p:spPr>
+        <p:style>
+          <a:lnRef idx="2">
+            <a:schemeClr val="accent1"/>
+          </a:lnRef>
+          <a:fillRef idx="0">
+            <a:schemeClr val="accent1"/>
+          </a:fillRef>
+          <a:effectRef idx="1">
+            <a:schemeClr val="accent1"/>
+          </a:effectRef>
+          <a:fontRef idx="minor">
+            <a:schemeClr val="tx1"/>
+          </a:fontRef>
+        </p:style>
+      </p:cxnSp>
+    </p:spTree>
+    <p:extLst>
+      <p:ext uri="{BB962C8B-B14F-4D97-AF65-F5344CB8AC3E}">
+        <p14:creationId xmlns:p14="http://schemas.microsoft.com/office/powerpoint/2010/main" val="2397534644"/>
+      </p:ext>
+    </p:extLst>
+  </p:cSld>
+  <p:clrMapOvr>
+    <a:masterClrMapping/>
+  </p:clrMapOvr>
+  <mc:AlternateContent xmlns:mc="http://schemas.openxmlformats.org/markup-compatibility/2006" xmlns:p159="http://schemas.microsoft.com/office/powerpoint/2015/09/main">
+    <mc:Choice Requires="p159">
+      <p:transition spd="med">
+        <p159:morph option="byObject"/>
+      </p:transition>
+    </mc:Choice>
+    <mc:Fallback xmlns="">
+      <p:transition spd="med">
+        <p:fade/>
+      </p:transition>
+    </mc:Fallback>
+  </mc:AlternateContent>
+</p:sld>
+</file>
+
+<file path=ppt/slides/slide12.xml><?xml version="1.0" encoding="utf-8"?>
+<p:sld xmlns:a="http://schemas.openxmlformats.org/drawingml/2006/main" xmlns:r="http://schemas.openxmlformats.org/officeDocument/2006/relationships" xmlns:p="http://schemas.openxmlformats.org/presentationml/2006/main">
+  <p:cSld>
+    <p:spTree>
+      <p:nvGrpSpPr>
+        <p:cNvPr id="1" name="">
+          <a:extLst>
+            <a:ext uri="{FF2B5EF4-FFF2-40B4-BE49-F238E27FC236}">
+              <a16:creationId xmlns:a16="http://schemas.microsoft.com/office/drawing/2014/main" id="{EEDB1805-9443-65C1-34CF-330F89F368C9}"/>
+            </a:ext>
+          </a:extLst>
+        </p:cNvPr>
+        <p:cNvGrpSpPr/>
+        <p:nvPr/>
+      </p:nvGrpSpPr>
+      <p:grpSpPr>
+        <a:xfrm>
+          <a:off x="0" y="0"/>
+          <a:ext cx="0" cy="0"/>
+          <a:chOff x="0" y="0"/>
+          <a:chExt cx="0" cy="0"/>
+        </a:xfrm>
+      </p:grpSpPr>
+      <p:sp>
+        <p:nvSpPr>
+          <p:cNvPr id="6" name="Rechthoek 5">
+            <a:extLst>
+              <a:ext uri="{FF2B5EF4-FFF2-40B4-BE49-F238E27FC236}">
+                <a16:creationId xmlns:a16="http://schemas.microsoft.com/office/drawing/2014/main" id="{7ED0E74A-E6FE-5658-590B-112CED66C1DD}"/>
+              </a:ext>
+            </a:extLst>
+          </p:cNvPr>
+          <p:cNvSpPr/>
+          <p:nvPr/>
+        </p:nvSpPr>
+        <p:spPr>
+          <a:xfrm>
+            <a:off x="0" y="0"/>
+            <a:ext cx="12192000" cy="6858001"/>
+          </a:xfrm>
+          <a:prstGeom prst="rect">
+            <a:avLst/>
+          </a:prstGeom>
+          <a:solidFill>
+            <a:srgbClr val="8F7EB4"/>
+          </a:solidFill>
+          <a:ln>
+            <a:solidFill>
+              <a:srgbClr val="8F7EB4"/>
+            </a:solidFill>
+          </a:ln>
+        </p:spPr>
+        <p:style>
+          <a:lnRef idx="2">
+            <a:schemeClr val="accent1">
+              <a:shade val="15000"/>
+            </a:schemeClr>
+          </a:lnRef>
+          <a:fillRef idx="1">
+            <a:schemeClr val="accent1"/>
+          </a:fillRef>
+          <a:effectRef idx="0">
+            <a:schemeClr val="accent1"/>
+          </a:effectRef>
+          <a:fontRef idx="minor">
+            <a:schemeClr val="lt1"/>
+          </a:fontRef>
+        </p:style>
+        <p:txBody>
+          <a:bodyPr rtlCol="0" anchor="ctr"/>
+          <a:lstStyle/>
+          <a:p>
+            <a:pPr algn="ctr"/>
+            <a:endParaRPr lang="nl-BE">
+              <a:solidFill>
+                <a:srgbClr val="F37C00"/>
+              </a:solidFill>
+            </a:endParaRPr>
+          </a:p>
+        </p:txBody>
+      </p:sp>
+      <p:sp>
+        <p:nvSpPr>
+          <p:cNvPr id="11" name="Tijdelijke aanduiding voor dianummer 10">
+            <a:extLst>
+              <a:ext uri="{FF2B5EF4-FFF2-40B4-BE49-F238E27FC236}">
+                <a16:creationId xmlns:a16="http://schemas.microsoft.com/office/drawing/2014/main" id="{81EDB862-4436-667F-271F-FED705A74FF5}"/>
+              </a:ext>
+            </a:extLst>
+          </p:cNvPr>
+          <p:cNvSpPr>
+            <a:spLocks noGrp="1"/>
+          </p:cNvSpPr>
+          <p:nvPr>
+            <p:ph type="sldNum" sz="quarter" idx="12"/>
+          </p:nvPr>
+        </p:nvSpPr>
+        <p:spPr>
+          <a:xfrm>
+            <a:off x="11362267" y="6492875"/>
+            <a:ext cx="829733" cy="365125"/>
+          </a:xfrm>
+        </p:spPr>
+        <p:txBody>
+          <a:bodyPr/>
+          <a:lstStyle/>
+          <a:p>
+            <a:r>
+              <a:rPr lang="nl-BE" sz="2000" b="1" dirty="0">
+                <a:solidFill>
+                  <a:schemeClr val="bg1"/>
+                </a:solidFill>
+                <a:latin typeface="Inter"/>
+                <a:cs typeface="Arial" panose="020B0604020202020204" pitchFamily="34" charset="0"/>
+              </a:rPr>
+              <a:t>05/20</a:t>
+            </a:r>
+          </a:p>
+        </p:txBody>
+      </p:sp>
+      <p:pic>
+        <p:nvPicPr>
+          <p:cNvPr id="19" name="Afbeelding 18" descr="Afbeelding met cirkel, diagram, pixel&#10;&#10;Door AI gegenereerde inhoud is mogelijk onjuist.">
+            <a:extLst>
+              <a:ext uri="{FF2B5EF4-FFF2-40B4-BE49-F238E27FC236}">
+                <a16:creationId xmlns:a16="http://schemas.microsoft.com/office/drawing/2014/main" id="{4A7510FD-E48C-73ED-73EF-610E6A0A8BD2}"/>
+              </a:ext>
+            </a:extLst>
+          </p:cNvPr>
+          <p:cNvPicPr>
+            <a:picLocks noChangeAspect="1"/>
+          </p:cNvPicPr>
+          <p:nvPr/>
+        </p:nvPicPr>
+        <p:blipFill>
+          <a:blip r:embed="rId3">
+            <a:extLst>
+              <a:ext uri="{28A0092B-C50C-407E-A947-70E740481C1C}">
+                <a14:useLocalDpi xmlns:a14="http://schemas.microsoft.com/office/drawing/2010/main" val="0"/>
+              </a:ext>
+            </a:extLst>
+          </a:blip>
+          <a:stretch>
+            <a:fillRect/>
+          </a:stretch>
+        </p:blipFill>
+        <p:spPr>
+          <a:xfrm>
+            <a:off x="11203050" y="-56619"/>
+            <a:ext cx="1008000" cy="1008000"/>
+          </a:xfrm>
+          <a:prstGeom prst="rect">
+            <a:avLst/>
+          </a:prstGeom>
+        </p:spPr>
+      </p:pic>
+      <p:sp>
+        <p:nvSpPr>
+          <p:cNvPr id="2" name="Tekstvak 1">
+            <a:extLst>
+              <a:ext uri="{FF2B5EF4-FFF2-40B4-BE49-F238E27FC236}">
+                <a16:creationId xmlns:a16="http://schemas.microsoft.com/office/drawing/2014/main" id="{FEFE6F41-8CD3-3476-DF39-F9E97EDCF534}"/>
+              </a:ext>
+            </a:extLst>
+          </p:cNvPr>
+          <p:cNvSpPr txBox="1"/>
+          <p:nvPr/>
+        </p:nvSpPr>
+        <p:spPr>
+          <a:xfrm>
+            <a:off x="4029046" y="2459504"/>
+            <a:ext cx="4133908" cy="1938992"/>
+          </a:xfrm>
+          <a:prstGeom prst="rect">
+            <a:avLst/>
+          </a:prstGeom>
+          <a:noFill/>
+        </p:spPr>
+        <p:txBody>
+          <a:bodyPr wrap="square" rtlCol="0">
+            <a:spAutoFit/>
+          </a:bodyPr>
+          <a:lstStyle/>
+          <a:p>
+            <a:r>
+              <a:rPr lang="nl-BE" sz="12000" dirty="0">
+                <a:ln w="0">
+                  <a:solidFill>
+                    <a:schemeClr val="tx1"/>
+                  </a:solidFill>
+                </a:ln>
+                <a:solidFill>
+                  <a:srgbClr val="EFF7FB"/>
+                </a:solidFill>
+                <a:effectLst>
+                  <a:outerShdw blurRad="50800" dist="38100" dir="5400000" algn="t" rotWithShape="0">
+                    <a:prstClr val="black">
+                      <a:alpha val="40000"/>
+                    </a:prstClr>
+                  </a:outerShdw>
+                </a:effectLst>
+                <a:latin typeface="Inter"/>
+              </a:rPr>
+              <a:t>Demo</a:t>
+            </a:r>
+          </a:p>
+        </p:txBody>
+      </p:sp>
+    </p:spTree>
+    <p:extLst>
+      <p:ext uri="{BB962C8B-B14F-4D97-AF65-F5344CB8AC3E}">
+        <p14:creationId xmlns:p14="http://schemas.microsoft.com/office/powerpoint/2010/main" val="899992369"/>
+      </p:ext>
+    </p:extLst>
+  </p:cSld>
+  <p:clrMapOvr>
+    <a:masterClrMapping/>
+  </p:clrMapOvr>
+  <mc:AlternateContent xmlns:mc="http://schemas.openxmlformats.org/markup-compatibility/2006" xmlns:p159="http://schemas.microsoft.com/office/powerpoint/2015/09/main">
+    <mc:Choice Requires="p159">
+      <p:transition spd="med">
+        <p159:morph option="byObject"/>
+      </p:transition>
+    </mc:Choice>
+    <mc:Fallback xmlns="">
+      <p:transition spd="med">
+        <p:fade/>
+      </p:transition>
+    </mc:Fallback>
+  </mc:AlternateContent>
+</p:sld>
+</file>
+
+<file path=ppt/slides/slide13.xml><?xml version="1.0" encoding="utf-8"?>
+<p:sld xmlns:a="http://schemas.openxmlformats.org/drawingml/2006/main" xmlns:r="http://schemas.openxmlformats.org/officeDocument/2006/relationships" xmlns:p="http://schemas.openxmlformats.org/presentationml/2006/main">
+  <p:cSld>
+    <p:spTree>
+      <p:nvGrpSpPr>
+        <p:cNvPr id="1" name="">
+          <a:extLst>
+            <a:ext uri="{FF2B5EF4-FFF2-40B4-BE49-F238E27FC236}">
+              <a16:creationId xmlns:a16="http://schemas.microsoft.com/office/drawing/2014/main" id="{E1F78CB1-D9BC-11BB-39AE-A64FD11F2CAB}"/>
+            </a:ext>
+          </a:extLst>
+        </p:cNvPr>
+        <p:cNvGrpSpPr/>
+        <p:nvPr/>
+      </p:nvGrpSpPr>
+      <p:grpSpPr>
+        <a:xfrm>
+          <a:off x="0" y="0"/>
+          <a:ext cx="0" cy="0"/>
+          <a:chOff x="0" y="0"/>
+          <a:chExt cx="0" cy="0"/>
+        </a:xfrm>
+      </p:grpSpPr>
+      <p:sp>
+        <p:nvSpPr>
+          <p:cNvPr id="6" name="Rechthoek 5">
+            <a:extLst>
+              <a:ext uri="{FF2B5EF4-FFF2-40B4-BE49-F238E27FC236}">
+                <a16:creationId xmlns:a16="http://schemas.microsoft.com/office/drawing/2014/main" id="{21DCC904-5CD4-CB8C-7BDF-A4DB94702651}"/>
+              </a:ext>
+            </a:extLst>
+          </p:cNvPr>
+          <p:cNvSpPr/>
+          <p:nvPr/>
+        </p:nvSpPr>
+        <p:spPr>
+          <a:xfrm>
+            <a:off x="0" y="0"/>
+            <a:ext cx="12192000" cy="6858001"/>
+          </a:xfrm>
+          <a:prstGeom prst="rect">
+            <a:avLst/>
+          </a:prstGeom>
+          <a:solidFill>
+            <a:srgbClr val="8F7EB4"/>
+          </a:solidFill>
+          <a:ln>
+            <a:solidFill>
+              <a:srgbClr val="8F7EB4"/>
+            </a:solidFill>
+          </a:ln>
+        </p:spPr>
+        <p:style>
+          <a:lnRef idx="2">
+            <a:schemeClr val="accent1">
+              <a:shade val="15000"/>
+            </a:schemeClr>
+          </a:lnRef>
+          <a:fillRef idx="1">
+            <a:schemeClr val="accent1"/>
+          </a:fillRef>
+          <a:effectRef idx="0">
+            <a:schemeClr val="accent1"/>
+          </a:effectRef>
+          <a:fontRef idx="minor">
+            <a:schemeClr val="lt1"/>
+          </a:fontRef>
+        </p:style>
+        <p:txBody>
+          <a:bodyPr rtlCol="0" anchor="ctr"/>
+          <a:lstStyle/>
+          <a:p>
+            <a:pPr algn="ctr"/>
+            <a:endParaRPr lang="nl-BE">
+              <a:solidFill>
+                <a:srgbClr val="F37C00"/>
+              </a:solidFill>
+            </a:endParaRPr>
+          </a:p>
+        </p:txBody>
+      </p:sp>
+      <p:sp>
+        <p:nvSpPr>
+          <p:cNvPr id="11" name="Tijdelijke aanduiding voor dianummer 10">
+            <a:extLst>
+              <a:ext uri="{FF2B5EF4-FFF2-40B4-BE49-F238E27FC236}">
+                <a16:creationId xmlns:a16="http://schemas.microsoft.com/office/drawing/2014/main" id="{553DCE1B-A642-6924-1C16-18AA5AD20F23}"/>
+              </a:ext>
+            </a:extLst>
+          </p:cNvPr>
+          <p:cNvSpPr>
+            <a:spLocks noGrp="1"/>
+          </p:cNvSpPr>
+          <p:nvPr>
+            <p:ph type="sldNum" sz="quarter" idx="12"/>
+          </p:nvPr>
+        </p:nvSpPr>
+        <p:spPr>
+          <a:xfrm>
+            <a:off x="11362267" y="6492875"/>
+            <a:ext cx="829733" cy="365125"/>
+          </a:xfrm>
+        </p:spPr>
+        <p:txBody>
+          <a:bodyPr/>
+          <a:lstStyle/>
+          <a:p>
+            <a:r>
+              <a:rPr lang="nl-BE" sz="2000" b="1" dirty="0">
+                <a:solidFill>
+                  <a:schemeClr val="bg1"/>
+                </a:solidFill>
+                <a:latin typeface="Inter"/>
+                <a:cs typeface="Arial" panose="020B0604020202020204" pitchFamily="34" charset="0"/>
+              </a:rPr>
+              <a:t>05/20</a:t>
+            </a:r>
+          </a:p>
+        </p:txBody>
+      </p:sp>
+      <p:pic>
+        <p:nvPicPr>
+          <p:cNvPr id="19" name="Afbeelding 18" descr="Afbeelding met cirkel, diagram, pixel&#10;&#10;Door AI gegenereerde inhoud is mogelijk onjuist.">
+            <a:extLst>
+              <a:ext uri="{FF2B5EF4-FFF2-40B4-BE49-F238E27FC236}">
+                <a16:creationId xmlns:a16="http://schemas.microsoft.com/office/drawing/2014/main" id="{5AC5899E-4AA8-7858-8C91-00F961A202E3}"/>
+              </a:ext>
+            </a:extLst>
+          </p:cNvPr>
+          <p:cNvPicPr>
+            <a:picLocks noChangeAspect="1"/>
+          </p:cNvPicPr>
+          <p:nvPr/>
+        </p:nvPicPr>
+        <p:blipFill>
+          <a:blip r:embed="rId3">
+            <a:extLst>
+              <a:ext uri="{28A0092B-C50C-407E-A947-70E740481C1C}">
+                <a14:useLocalDpi xmlns:a14="http://schemas.microsoft.com/office/drawing/2010/main" val="0"/>
+              </a:ext>
+            </a:extLst>
+          </a:blip>
+          <a:stretch>
+            <a:fillRect/>
+          </a:stretch>
+        </p:blipFill>
+        <p:spPr>
+          <a:xfrm>
+            <a:off x="11203050" y="-56619"/>
+            <a:ext cx="1008000" cy="1008000"/>
+          </a:xfrm>
+          <a:prstGeom prst="rect">
+            <a:avLst/>
+          </a:prstGeom>
+        </p:spPr>
+      </p:pic>
+      <p:sp>
+        <p:nvSpPr>
+          <p:cNvPr id="2" name="Tekstvak 1">
+            <a:extLst>
+              <a:ext uri="{FF2B5EF4-FFF2-40B4-BE49-F238E27FC236}">
+                <a16:creationId xmlns:a16="http://schemas.microsoft.com/office/drawing/2014/main" id="{4424E1BC-9EF4-BF97-93C8-C753CBF35A9D}"/>
+              </a:ext>
+            </a:extLst>
+          </p:cNvPr>
+          <p:cNvSpPr txBox="1"/>
+          <p:nvPr/>
+        </p:nvSpPr>
+        <p:spPr>
+          <a:xfrm>
+            <a:off x="-19050" y="15300"/>
+            <a:ext cx="12192000" cy="1938992"/>
+          </a:xfrm>
+          <a:prstGeom prst="rect">
+            <a:avLst/>
+          </a:prstGeom>
+          <a:noFill/>
+        </p:spPr>
+        <p:txBody>
+          <a:bodyPr wrap="square" rtlCol="0">
+            <a:spAutoFit/>
+          </a:bodyPr>
+          <a:lstStyle/>
+          <a:p>
+            <a:pPr algn="ctr"/>
+            <a:r>
+              <a:rPr lang="nl-BE" sz="12000" dirty="0">
+                <a:ln w="0">
+                  <a:solidFill>
+                    <a:schemeClr val="tx1"/>
+                  </a:solidFill>
+                </a:ln>
+                <a:solidFill>
+                  <a:srgbClr val="EFF7FB"/>
+                </a:solidFill>
+                <a:effectLst>
+                  <a:outerShdw blurRad="50800" dist="38100" dir="5400000" algn="t" rotWithShape="0">
+                    <a:prstClr val="black">
+                      <a:alpha val="40000"/>
+                    </a:prstClr>
+                  </a:outerShdw>
+                </a:effectLst>
+                <a:latin typeface="Inter"/>
+              </a:rPr>
+              <a:t>Oproep tot actie</a:t>
+            </a:r>
+          </a:p>
+        </p:txBody>
+      </p:sp>
+      <p:pic>
+        <p:nvPicPr>
+          <p:cNvPr id="7" name="Afbeelding 6">
+            <a:extLst>
+              <a:ext uri="{FF2B5EF4-FFF2-40B4-BE49-F238E27FC236}">
+                <a16:creationId xmlns:a16="http://schemas.microsoft.com/office/drawing/2014/main" id="{560E1DE7-68A6-97F1-1BD0-4A4DC03BC3DE}"/>
+              </a:ext>
+            </a:extLst>
+          </p:cNvPr>
+          <p:cNvPicPr>
+            <a:picLocks noChangeAspect="1"/>
+          </p:cNvPicPr>
+          <p:nvPr/>
+        </p:nvPicPr>
+        <p:blipFill>
+          <a:blip r:embed="rId4">
+            <a:extLst>
+              <a:ext uri="{28A0092B-C50C-407E-A947-70E740481C1C}">
+                <a14:useLocalDpi xmlns:a14="http://schemas.microsoft.com/office/drawing/2010/main" val="0"/>
+              </a:ext>
+            </a:extLst>
+          </a:blip>
+          <a:srcRect/>
+          <a:stretch/>
+        </p:blipFill>
+        <p:spPr>
+          <a:xfrm>
+            <a:off x="3936000" y="2172875"/>
+            <a:ext cx="4320000" cy="4320000"/>
+          </a:xfrm>
+          <a:prstGeom prst="rect">
+            <a:avLst/>
+          </a:prstGeom>
+        </p:spPr>
+      </p:pic>
+    </p:spTree>
+    <p:extLst>
+      <p:ext uri="{BB962C8B-B14F-4D97-AF65-F5344CB8AC3E}">
+        <p14:creationId xmlns:p14="http://schemas.microsoft.com/office/powerpoint/2010/main" val="170730004"/>
+      </p:ext>
+    </p:extLst>
+  </p:cSld>
+  <p:clrMapOvr>
+    <a:masterClrMapping/>
+  </p:clrMapOvr>
+  <mc:AlternateContent xmlns:mc="http://schemas.openxmlformats.org/markup-compatibility/2006" xmlns:p159="http://schemas.microsoft.com/office/powerpoint/2015/09/main">
+    <mc:Choice Requires="p159">
+      <p:transition spd="med">
+        <p159:morph option="byObject"/>
+      </p:transition>
+    </mc:Choice>
+    <mc:Fallback xmlns="">
+      <p:transition spd="med">
+        <p:fade/>
+      </p:transition>
+    </mc:Fallback>
+  </mc:AlternateContent>
+</p:sld>
+</file>
+
+<file path=ppt/slides/slide14.xml><?xml version="1.0" encoding="utf-8"?>
+<p:sld xmlns:a="http://schemas.openxmlformats.org/drawingml/2006/main" xmlns:r="http://schemas.openxmlformats.org/officeDocument/2006/relationships" xmlns:p="http://schemas.openxmlformats.org/presentationml/2006/main">
+  <p:cSld>
+    <p:spTree>
+      <p:nvGrpSpPr>
+        <p:cNvPr id="1" name="">
+          <a:extLst>
+            <a:ext uri="{FF2B5EF4-FFF2-40B4-BE49-F238E27FC236}">
+              <a16:creationId xmlns:a16="http://schemas.microsoft.com/office/drawing/2014/main" id="{E4ABED07-5B73-E4EE-05B2-9BABDCE5E9F2}"/>
+            </a:ext>
+          </a:extLst>
+        </p:cNvPr>
+        <p:cNvGrpSpPr/>
+        <p:nvPr/>
+      </p:nvGrpSpPr>
+      <p:grpSpPr>
+        <a:xfrm>
+          <a:off x="0" y="0"/>
+          <a:ext cx="0" cy="0"/>
+          <a:chOff x="0" y="0"/>
+          <a:chExt cx="0" cy="0"/>
+        </a:xfrm>
+      </p:grpSpPr>
+      <p:sp>
+        <p:nvSpPr>
+          <p:cNvPr id="3" name="Rechthoek 2">
+            <a:extLst>
+              <a:ext uri="{FF2B5EF4-FFF2-40B4-BE49-F238E27FC236}">
+                <a16:creationId xmlns:a16="http://schemas.microsoft.com/office/drawing/2014/main" id="{478C3CD0-EF3B-A62A-2E5C-1C09692176A7}"/>
+              </a:ext>
+            </a:extLst>
+          </p:cNvPr>
+          <p:cNvSpPr/>
+          <p:nvPr/>
+        </p:nvSpPr>
+        <p:spPr>
+          <a:xfrm>
+            <a:off x="0" y="1120"/>
+            <a:ext cx="12192000" cy="6858000"/>
+          </a:xfrm>
+          <a:prstGeom prst="rect">
+            <a:avLst/>
+          </a:prstGeom>
+          <a:solidFill>
+            <a:srgbClr val="8F7EB4"/>
+          </a:solidFill>
+          <a:ln>
+            <a:solidFill>
+              <a:srgbClr val="8F7EB4"/>
+            </a:solidFill>
+          </a:ln>
+        </p:spPr>
+        <p:style>
+          <a:lnRef idx="2">
+            <a:schemeClr val="accent1">
+              <a:shade val="15000"/>
+            </a:schemeClr>
+          </a:lnRef>
+          <a:fillRef idx="1">
+            <a:schemeClr val="accent1"/>
+          </a:fillRef>
+          <a:effectRef idx="0">
+            <a:schemeClr val="accent1"/>
+          </a:effectRef>
+          <a:fontRef idx="minor">
+            <a:schemeClr val="lt1"/>
+          </a:fontRef>
+        </p:style>
+        <p:txBody>
+          <a:bodyPr rtlCol="0" anchor="ctr"/>
+          <a:lstStyle/>
+          <a:p>
+            <a:pPr algn="ctr"/>
+            <a:endParaRPr lang="nl-BE"/>
+          </a:p>
+        </p:txBody>
+      </p:sp>
+      <p:sp>
+        <p:nvSpPr>
+          <p:cNvPr id="24" name="Ovaal 23">
+            <a:extLst>
+              <a:ext uri="{FF2B5EF4-FFF2-40B4-BE49-F238E27FC236}">
+                <a16:creationId xmlns:a16="http://schemas.microsoft.com/office/drawing/2014/main" id="{8C317566-26AA-DF5F-4138-C71D9A468046}"/>
+              </a:ext>
+            </a:extLst>
+          </p:cNvPr>
+          <p:cNvSpPr/>
+          <p:nvPr/>
+        </p:nvSpPr>
+        <p:spPr>
+          <a:xfrm>
+            <a:off x="4656000" y="1331775"/>
+            <a:ext cx="2880000" cy="2880000"/>
+          </a:xfrm>
+          <a:prstGeom prst="ellipse">
+            <a:avLst/>
+          </a:prstGeom>
+          <a:solidFill>
+            <a:srgbClr val="85D0FF"/>
+          </a:solidFill>
+          <a:ln>
+            <a:solidFill>
+              <a:schemeClr val="tx1"/>
+            </a:solidFill>
+          </a:ln>
+        </p:spPr>
+        <p:style>
+          <a:lnRef idx="2">
+            <a:schemeClr val="accent1">
+              <a:shade val="15000"/>
+            </a:schemeClr>
+          </a:lnRef>
+          <a:fillRef idx="1">
+            <a:schemeClr val="accent1"/>
+          </a:fillRef>
+          <a:effectRef idx="0">
+            <a:schemeClr val="accent1"/>
+          </a:effectRef>
+          <a:fontRef idx="minor">
+            <a:schemeClr val="lt1"/>
+          </a:fontRef>
+        </p:style>
+        <p:txBody>
+          <a:bodyPr rtlCol="0" anchor="ctr"/>
+          <a:lstStyle/>
+          <a:p>
+            <a:pPr algn="ctr"/>
+            <a:endParaRPr lang="nl-BE"/>
+          </a:p>
+        </p:txBody>
+      </p:sp>
+      <p:sp>
+        <p:nvSpPr>
+          <p:cNvPr id="2" name="Kubus 1">
+            <a:extLst>
+              <a:ext uri="{FF2B5EF4-FFF2-40B4-BE49-F238E27FC236}">
+                <a16:creationId xmlns:a16="http://schemas.microsoft.com/office/drawing/2014/main" id="{C5BCE197-CEC5-EF2B-127B-62FEB19B0D2B}"/>
+              </a:ext>
+            </a:extLst>
+          </p:cNvPr>
+          <p:cNvSpPr/>
+          <p:nvPr/>
+        </p:nvSpPr>
+        <p:spPr>
+          <a:xfrm>
+            <a:off x="4901158" y="1617130"/>
+            <a:ext cx="720000" cy="720000"/>
+          </a:xfrm>
+          <a:prstGeom prst="cube">
+            <a:avLst>
+              <a:gd name="adj" fmla="val 32409"/>
+            </a:avLst>
+          </a:prstGeom>
+          <a:solidFill>
+            <a:srgbClr val="AC8FBD"/>
+          </a:solidFill>
+          <a:ln>
+            <a:solidFill>
+              <a:schemeClr val="tx1"/>
+            </a:solidFill>
+          </a:ln>
+        </p:spPr>
+        <p:style>
+          <a:lnRef idx="2">
+            <a:schemeClr val="accent1">
+              <a:shade val="15000"/>
+            </a:schemeClr>
+          </a:lnRef>
+          <a:fillRef idx="1">
+            <a:schemeClr val="accent1"/>
+          </a:fillRef>
+          <a:effectRef idx="0">
+            <a:schemeClr val="accent1"/>
+          </a:effectRef>
+          <a:fontRef idx="minor">
+            <a:schemeClr val="lt1"/>
+          </a:fontRef>
+        </p:style>
+        <p:txBody>
+          <a:bodyPr rtlCol="0" anchor="ctr"/>
+          <a:lstStyle/>
+          <a:p>
+            <a:pPr algn="ctr"/>
+            <a:endParaRPr lang="nl-BE"/>
+          </a:p>
+        </p:txBody>
+      </p:sp>
+      <p:sp>
+        <p:nvSpPr>
+          <p:cNvPr id="4" name="Kubus 3">
+            <a:extLst>
+              <a:ext uri="{FF2B5EF4-FFF2-40B4-BE49-F238E27FC236}">
+                <a16:creationId xmlns:a16="http://schemas.microsoft.com/office/drawing/2014/main" id="{C7B6EDAA-E149-13B4-C46B-BB941A2ED714}"/>
+              </a:ext>
+            </a:extLst>
+          </p:cNvPr>
+          <p:cNvSpPr/>
+          <p:nvPr/>
+        </p:nvSpPr>
+        <p:spPr>
+          <a:xfrm>
+            <a:off x="5053558" y="1769530"/>
+            <a:ext cx="720000" cy="720000"/>
+          </a:xfrm>
+          <a:prstGeom prst="cube">
+            <a:avLst>
+              <a:gd name="adj" fmla="val 32409"/>
+            </a:avLst>
+          </a:prstGeom>
+          <a:solidFill>
+            <a:srgbClr val="B6ABCE"/>
+          </a:solidFill>
+          <a:ln>
+            <a:solidFill>
+              <a:schemeClr val="tx1"/>
+            </a:solidFill>
+          </a:ln>
+        </p:spPr>
+        <p:style>
+          <a:lnRef idx="2">
+            <a:schemeClr val="accent1">
+              <a:shade val="15000"/>
+            </a:schemeClr>
+          </a:lnRef>
+          <a:fillRef idx="1">
+            <a:schemeClr val="accent1"/>
+          </a:fillRef>
+          <a:effectRef idx="0">
+            <a:schemeClr val="accent1"/>
+          </a:effectRef>
+          <a:fontRef idx="minor">
+            <a:schemeClr val="lt1"/>
+          </a:fontRef>
+        </p:style>
+        <p:txBody>
+          <a:bodyPr rtlCol="0" anchor="ctr"/>
+          <a:lstStyle/>
+          <a:p>
+            <a:pPr algn="ctr"/>
+            <a:endParaRPr lang="nl-BE"/>
+          </a:p>
+        </p:txBody>
+      </p:sp>
+      <p:sp>
+        <p:nvSpPr>
+          <p:cNvPr id="7" name="Kubus 6">
+            <a:extLst>
+              <a:ext uri="{FF2B5EF4-FFF2-40B4-BE49-F238E27FC236}">
+                <a16:creationId xmlns:a16="http://schemas.microsoft.com/office/drawing/2014/main" id="{26BE279B-C328-F70B-4977-F0ED3634F56F}"/>
+              </a:ext>
+            </a:extLst>
+          </p:cNvPr>
+          <p:cNvSpPr/>
+          <p:nvPr/>
+        </p:nvSpPr>
+        <p:spPr>
+          <a:xfrm>
+            <a:off x="5205958" y="1921930"/>
+            <a:ext cx="720000" cy="720000"/>
+          </a:xfrm>
+          <a:prstGeom prst="cube">
+            <a:avLst>
+              <a:gd name="adj" fmla="val 32409"/>
+            </a:avLst>
+          </a:prstGeom>
+          <a:solidFill>
+            <a:srgbClr val="AC8FBD"/>
+          </a:solidFill>
+          <a:ln>
+            <a:solidFill>
+              <a:schemeClr val="tx1"/>
+            </a:solidFill>
+          </a:ln>
+        </p:spPr>
+        <p:style>
+          <a:lnRef idx="2">
+            <a:schemeClr val="accent1">
+              <a:shade val="15000"/>
+            </a:schemeClr>
+          </a:lnRef>
+          <a:fillRef idx="1">
+            <a:schemeClr val="accent1"/>
+          </a:fillRef>
+          <a:effectRef idx="0">
+            <a:schemeClr val="accent1"/>
+          </a:effectRef>
+          <a:fontRef idx="minor">
+            <a:schemeClr val="lt1"/>
+          </a:fontRef>
+        </p:style>
+        <p:txBody>
+          <a:bodyPr rtlCol="0" anchor="ctr"/>
+          <a:lstStyle/>
+          <a:p>
+            <a:pPr algn="ctr"/>
+            <a:endParaRPr lang="nl-BE"/>
+          </a:p>
+        </p:txBody>
+      </p:sp>
+      <p:sp>
+        <p:nvSpPr>
+          <p:cNvPr id="8" name="Kubus 7">
+            <a:extLst>
+              <a:ext uri="{FF2B5EF4-FFF2-40B4-BE49-F238E27FC236}">
+                <a16:creationId xmlns:a16="http://schemas.microsoft.com/office/drawing/2014/main" id="{1D5EA90B-3B18-99A4-5889-3648C8B2D0C1}"/>
+              </a:ext>
+            </a:extLst>
+          </p:cNvPr>
+          <p:cNvSpPr/>
+          <p:nvPr/>
+        </p:nvSpPr>
+        <p:spPr>
+          <a:xfrm>
+            <a:off x="4981665" y="3008819"/>
+            <a:ext cx="720000" cy="720000"/>
+          </a:xfrm>
+          <a:prstGeom prst="cube">
+            <a:avLst>
+              <a:gd name="adj" fmla="val 32409"/>
+            </a:avLst>
+          </a:prstGeom>
+          <a:solidFill>
+            <a:srgbClr val="AC8FBD"/>
+          </a:solidFill>
+          <a:ln>
+            <a:solidFill>
+              <a:schemeClr val="tx1"/>
+            </a:solidFill>
+          </a:ln>
+        </p:spPr>
+        <p:style>
+          <a:lnRef idx="2">
+            <a:schemeClr val="accent1">
+              <a:shade val="15000"/>
+            </a:schemeClr>
+          </a:lnRef>
+          <a:fillRef idx="1">
+            <a:schemeClr val="accent1"/>
+          </a:fillRef>
+          <a:effectRef idx="0">
+            <a:schemeClr val="accent1"/>
+          </a:effectRef>
+          <a:fontRef idx="minor">
+            <a:schemeClr val="lt1"/>
+          </a:fontRef>
+        </p:style>
+        <p:txBody>
+          <a:bodyPr rtlCol="0" anchor="ctr"/>
+          <a:lstStyle/>
+          <a:p>
+            <a:pPr algn="ctr"/>
+            <a:endParaRPr lang="nl-BE"/>
+          </a:p>
+        </p:txBody>
+      </p:sp>
+      <p:sp>
+        <p:nvSpPr>
+          <p:cNvPr id="12" name="Kubus 11">
+            <a:extLst>
+              <a:ext uri="{FF2B5EF4-FFF2-40B4-BE49-F238E27FC236}">
+                <a16:creationId xmlns:a16="http://schemas.microsoft.com/office/drawing/2014/main" id="{99853381-BEF6-50FC-AD51-55D906CCFE0A}"/>
+              </a:ext>
+            </a:extLst>
+          </p:cNvPr>
+          <p:cNvSpPr/>
+          <p:nvPr/>
+        </p:nvSpPr>
+        <p:spPr>
+          <a:xfrm>
+            <a:off x="5134065" y="3161219"/>
+            <a:ext cx="720000" cy="720000"/>
+          </a:xfrm>
+          <a:prstGeom prst="cube">
+            <a:avLst>
+              <a:gd name="adj" fmla="val 32409"/>
+            </a:avLst>
+          </a:prstGeom>
+          <a:solidFill>
+            <a:srgbClr val="B6ABCE"/>
+          </a:solidFill>
+          <a:ln>
+            <a:solidFill>
+              <a:schemeClr val="tx1"/>
+            </a:solidFill>
+          </a:ln>
+        </p:spPr>
+        <p:style>
+          <a:lnRef idx="2">
+            <a:schemeClr val="accent1">
+              <a:shade val="15000"/>
+            </a:schemeClr>
+          </a:lnRef>
+          <a:fillRef idx="1">
+            <a:schemeClr val="accent1"/>
+          </a:fillRef>
+          <a:effectRef idx="0">
+            <a:schemeClr val="accent1"/>
+          </a:effectRef>
+          <a:fontRef idx="minor">
+            <a:schemeClr val="lt1"/>
+          </a:fontRef>
+        </p:style>
+        <p:txBody>
+          <a:bodyPr rtlCol="0" anchor="ctr"/>
+          <a:lstStyle/>
+          <a:p>
+            <a:pPr algn="ctr"/>
+            <a:endParaRPr lang="nl-BE"/>
+          </a:p>
+        </p:txBody>
+      </p:sp>
+      <p:sp>
+        <p:nvSpPr>
+          <p:cNvPr id="13" name="Kubus 12">
+            <a:extLst>
+              <a:ext uri="{FF2B5EF4-FFF2-40B4-BE49-F238E27FC236}">
+                <a16:creationId xmlns:a16="http://schemas.microsoft.com/office/drawing/2014/main" id="{5752DAEE-DA2D-5245-ACB1-FC5CD7DFAFEB}"/>
+              </a:ext>
+            </a:extLst>
+          </p:cNvPr>
+          <p:cNvSpPr/>
+          <p:nvPr/>
+        </p:nvSpPr>
+        <p:spPr>
+          <a:xfrm>
+            <a:off x="5286465" y="3313619"/>
+            <a:ext cx="720000" cy="720000"/>
+          </a:xfrm>
+          <a:prstGeom prst="cube">
+            <a:avLst>
+              <a:gd name="adj" fmla="val 32409"/>
+            </a:avLst>
+          </a:prstGeom>
+          <a:solidFill>
+            <a:srgbClr val="AC8FBD"/>
+          </a:solidFill>
+          <a:ln>
+            <a:solidFill>
+              <a:schemeClr val="tx1"/>
+            </a:solidFill>
+          </a:ln>
+        </p:spPr>
+        <p:style>
+          <a:lnRef idx="2">
+            <a:schemeClr val="accent1">
+              <a:shade val="15000"/>
+            </a:schemeClr>
+          </a:lnRef>
+          <a:fillRef idx="1">
+            <a:schemeClr val="accent1"/>
+          </a:fillRef>
+          <a:effectRef idx="0">
+            <a:schemeClr val="accent1"/>
+          </a:effectRef>
+          <a:fontRef idx="minor">
+            <a:schemeClr val="lt1"/>
+          </a:fontRef>
+        </p:style>
+        <p:txBody>
+          <a:bodyPr rtlCol="0" anchor="ctr"/>
+          <a:lstStyle/>
+          <a:p>
+            <a:pPr algn="ctr"/>
+            <a:endParaRPr lang="nl-BE"/>
+          </a:p>
+        </p:txBody>
+      </p:sp>
+      <p:sp>
+        <p:nvSpPr>
+          <p:cNvPr id="17" name="Kubus 16">
+            <a:extLst>
+              <a:ext uri="{FF2B5EF4-FFF2-40B4-BE49-F238E27FC236}">
+                <a16:creationId xmlns:a16="http://schemas.microsoft.com/office/drawing/2014/main" id="{A7C4198F-5ECB-0B41-0408-7A57CF2FDFB6}"/>
+              </a:ext>
+            </a:extLst>
+          </p:cNvPr>
+          <p:cNvSpPr/>
+          <p:nvPr/>
+        </p:nvSpPr>
+        <p:spPr>
+          <a:xfrm>
+            <a:off x="6251732" y="2917436"/>
+            <a:ext cx="720000" cy="720000"/>
+          </a:xfrm>
+          <a:prstGeom prst="cube">
+            <a:avLst>
+              <a:gd name="adj" fmla="val 32409"/>
+            </a:avLst>
+          </a:prstGeom>
+          <a:solidFill>
+            <a:srgbClr val="B6ABCE"/>
+          </a:solidFill>
+          <a:ln>
+            <a:solidFill>
+              <a:schemeClr val="tx1"/>
+            </a:solidFill>
+          </a:ln>
+        </p:spPr>
+        <p:style>
+          <a:lnRef idx="2">
+            <a:schemeClr val="accent1">
+              <a:shade val="15000"/>
+            </a:schemeClr>
+          </a:lnRef>
+          <a:fillRef idx="1">
+            <a:schemeClr val="accent1"/>
+          </a:fillRef>
+          <a:effectRef idx="0">
+            <a:schemeClr val="accent1"/>
+          </a:effectRef>
+          <a:fontRef idx="minor">
+            <a:schemeClr val="lt1"/>
+          </a:fontRef>
+        </p:style>
+        <p:txBody>
+          <a:bodyPr rtlCol="0" anchor="ctr"/>
+          <a:lstStyle/>
+          <a:p>
+            <a:pPr algn="ctr"/>
+            <a:endParaRPr lang="nl-BE"/>
+          </a:p>
+        </p:txBody>
+      </p:sp>
+      <p:sp>
+        <p:nvSpPr>
+          <p:cNvPr id="18" name="Kubus 17">
+            <a:extLst>
+              <a:ext uri="{FF2B5EF4-FFF2-40B4-BE49-F238E27FC236}">
+                <a16:creationId xmlns:a16="http://schemas.microsoft.com/office/drawing/2014/main" id="{12CE0A45-3FE3-7456-0314-6D8305BBCF7F}"/>
+              </a:ext>
+            </a:extLst>
+          </p:cNvPr>
+          <p:cNvSpPr/>
+          <p:nvPr/>
+        </p:nvSpPr>
+        <p:spPr>
+          <a:xfrm>
+            <a:off x="6404132" y="3069836"/>
+            <a:ext cx="720000" cy="720000"/>
+          </a:xfrm>
+          <a:prstGeom prst="cube">
+            <a:avLst>
+              <a:gd name="adj" fmla="val 32409"/>
+            </a:avLst>
+          </a:prstGeom>
+          <a:solidFill>
+            <a:srgbClr val="AC8FBD"/>
+          </a:solidFill>
+          <a:ln>
+            <a:solidFill>
+              <a:schemeClr val="tx1"/>
+            </a:solidFill>
+          </a:ln>
+        </p:spPr>
+        <p:style>
+          <a:lnRef idx="2">
+            <a:schemeClr val="accent1">
+              <a:shade val="15000"/>
+            </a:schemeClr>
+          </a:lnRef>
+          <a:fillRef idx="1">
+            <a:schemeClr val="accent1"/>
+          </a:fillRef>
+          <a:effectRef idx="0">
+            <a:schemeClr val="accent1"/>
+          </a:effectRef>
+          <a:fontRef idx="minor">
+            <a:schemeClr val="lt1"/>
+          </a:fontRef>
+        </p:style>
+        <p:txBody>
+          <a:bodyPr rtlCol="0" anchor="ctr"/>
+          <a:lstStyle/>
+          <a:p>
+            <a:pPr algn="ctr"/>
+            <a:endParaRPr lang="nl-BE"/>
+          </a:p>
+        </p:txBody>
+      </p:sp>
+      <p:sp>
+        <p:nvSpPr>
+          <p:cNvPr id="22" name="Kubus 21">
+            <a:extLst>
+              <a:ext uri="{FF2B5EF4-FFF2-40B4-BE49-F238E27FC236}">
+                <a16:creationId xmlns:a16="http://schemas.microsoft.com/office/drawing/2014/main" id="{3F876561-3888-7ECC-96A0-C7AC6E28058A}"/>
+              </a:ext>
+            </a:extLst>
+          </p:cNvPr>
+          <p:cNvSpPr/>
+          <p:nvPr/>
+        </p:nvSpPr>
+        <p:spPr>
+          <a:xfrm>
+            <a:off x="6556532" y="3222236"/>
+            <a:ext cx="720000" cy="720000"/>
+          </a:xfrm>
+          <a:prstGeom prst="cube">
+            <a:avLst>
+              <a:gd name="adj" fmla="val 32409"/>
+            </a:avLst>
+          </a:prstGeom>
+          <a:solidFill>
+            <a:srgbClr val="B6ABCE"/>
+          </a:solidFill>
+          <a:ln>
+            <a:solidFill>
+              <a:schemeClr val="tx1"/>
+            </a:solidFill>
+          </a:ln>
+        </p:spPr>
+        <p:style>
+          <a:lnRef idx="2">
+            <a:schemeClr val="accent1">
+              <a:shade val="15000"/>
+            </a:schemeClr>
+          </a:lnRef>
+          <a:fillRef idx="1">
+            <a:schemeClr val="accent1"/>
+          </a:fillRef>
+          <a:effectRef idx="0">
+            <a:schemeClr val="accent1"/>
+          </a:effectRef>
+          <a:fontRef idx="minor">
+            <a:schemeClr val="lt1"/>
+          </a:fontRef>
+        </p:style>
+        <p:txBody>
+          <a:bodyPr rtlCol="0" anchor="ctr"/>
+          <a:lstStyle/>
+          <a:p>
+            <a:pPr algn="ctr"/>
+            <a:endParaRPr lang="nl-BE"/>
+          </a:p>
+        </p:txBody>
+      </p:sp>
+      <p:sp>
+        <p:nvSpPr>
+          <p:cNvPr id="25" name="Kubus 24">
+            <a:extLst>
+              <a:ext uri="{FF2B5EF4-FFF2-40B4-BE49-F238E27FC236}">
+                <a16:creationId xmlns:a16="http://schemas.microsoft.com/office/drawing/2014/main" id="{F66CB447-8755-7267-CBD2-0952E19A3E5F}"/>
+              </a:ext>
+            </a:extLst>
+          </p:cNvPr>
+          <p:cNvSpPr/>
+          <p:nvPr/>
+        </p:nvSpPr>
+        <p:spPr>
+          <a:xfrm>
+            <a:off x="6186485" y="1507550"/>
+            <a:ext cx="720000" cy="720000"/>
+          </a:xfrm>
+          <a:prstGeom prst="cube">
+            <a:avLst>
+              <a:gd name="adj" fmla="val 32409"/>
+            </a:avLst>
+          </a:prstGeom>
+          <a:solidFill>
+            <a:srgbClr val="B6ABCE"/>
+          </a:solidFill>
+          <a:ln>
+            <a:solidFill>
+              <a:schemeClr val="tx1"/>
+            </a:solidFill>
+          </a:ln>
+        </p:spPr>
+        <p:style>
+          <a:lnRef idx="2">
+            <a:schemeClr val="accent1">
+              <a:shade val="15000"/>
+            </a:schemeClr>
+          </a:lnRef>
+          <a:fillRef idx="1">
+            <a:schemeClr val="accent1"/>
+          </a:fillRef>
+          <a:effectRef idx="0">
+            <a:schemeClr val="accent1"/>
+          </a:effectRef>
+          <a:fontRef idx="minor">
+            <a:schemeClr val="lt1"/>
+          </a:fontRef>
+        </p:style>
+        <p:txBody>
+          <a:bodyPr rtlCol="0" anchor="ctr"/>
+          <a:lstStyle/>
+          <a:p>
+            <a:pPr algn="ctr"/>
+            <a:endParaRPr lang="nl-BE"/>
+          </a:p>
+        </p:txBody>
+      </p:sp>
+      <p:sp>
+        <p:nvSpPr>
+          <p:cNvPr id="26" name="Kubus 25">
+            <a:extLst>
+              <a:ext uri="{FF2B5EF4-FFF2-40B4-BE49-F238E27FC236}">
+                <a16:creationId xmlns:a16="http://schemas.microsoft.com/office/drawing/2014/main" id="{251ED04C-3DC3-3E3A-A822-45AC44E8C7DA}"/>
+              </a:ext>
+            </a:extLst>
+          </p:cNvPr>
+          <p:cNvSpPr/>
+          <p:nvPr/>
+        </p:nvSpPr>
+        <p:spPr>
+          <a:xfrm>
+            <a:off x="6338885" y="1659950"/>
+            <a:ext cx="720000" cy="720000"/>
+          </a:xfrm>
+          <a:prstGeom prst="cube">
+            <a:avLst>
+              <a:gd name="adj" fmla="val 32409"/>
+            </a:avLst>
+          </a:prstGeom>
+          <a:solidFill>
+            <a:srgbClr val="AC8FBD"/>
+          </a:solidFill>
+          <a:ln>
+            <a:solidFill>
+              <a:schemeClr val="tx1"/>
+            </a:solidFill>
+          </a:ln>
+        </p:spPr>
+        <p:style>
+          <a:lnRef idx="2">
+            <a:schemeClr val="accent1">
+              <a:shade val="15000"/>
+            </a:schemeClr>
+          </a:lnRef>
+          <a:fillRef idx="1">
+            <a:schemeClr val="accent1"/>
+          </a:fillRef>
+          <a:effectRef idx="0">
+            <a:schemeClr val="accent1"/>
+          </a:effectRef>
+          <a:fontRef idx="minor">
+            <a:schemeClr val="lt1"/>
+          </a:fontRef>
+        </p:style>
+        <p:txBody>
+          <a:bodyPr rtlCol="0" anchor="ctr"/>
+          <a:lstStyle/>
+          <a:p>
+            <a:pPr algn="ctr"/>
+            <a:endParaRPr lang="nl-BE"/>
+          </a:p>
+        </p:txBody>
+      </p:sp>
+      <p:sp>
+        <p:nvSpPr>
+          <p:cNvPr id="27" name="Kubus 26">
+            <a:extLst>
+              <a:ext uri="{FF2B5EF4-FFF2-40B4-BE49-F238E27FC236}">
+                <a16:creationId xmlns:a16="http://schemas.microsoft.com/office/drawing/2014/main" id="{E1517849-D54A-7460-2E1B-FC33051CABFC}"/>
+              </a:ext>
+            </a:extLst>
+          </p:cNvPr>
+          <p:cNvSpPr/>
+          <p:nvPr/>
+        </p:nvSpPr>
+        <p:spPr>
+          <a:xfrm>
+            <a:off x="6491285" y="1812350"/>
+            <a:ext cx="720000" cy="720000"/>
+          </a:xfrm>
+          <a:prstGeom prst="cube">
+            <a:avLst>
+              <a:gd name="adj" fmla="val 32409"/>
+            </a:avLst>
+          </a:prstGeom>
+          <a:solidFill>
+            <a:srgbClr val="B6ABCE"/>
+          </a:solidFill>
+          <a:ln>
+            <a:solidFill>
+              <a:schemeClr val="tx1"/>
+            </a:solidFill>
+          </a:ln>
+        </p:spPr>
+        <p:style>
+          <a:lnRef idx="2">
+            <a:schemeClr val="accent1">
+              <a:shade val="15000"/>
+            </a:schemeClr>
+          </a:lnRef>
+          <a:fillRef idx="1">
+            <a:schemeClr val="accent1"/>
+          </a:fillRef>
+          <a:effectRef idx="0">
+            <a:schemeClr val="accent1"/>
+          </a:effectRef>
+          <a:fontRef idx="minor">
+            <a:schemeClr val="lt1"/>
+          </a:fontRef>
+        </p:style>
+        <p:txBody>
+          <a:bodyPr rtlCol="0" anchor="ctr"/>
+          <a:lstStyle/>
+          <a:p>
+            <a:pPr algn="ctr"/>
+            <a:endParaRPr lang="nl-BE"/>
+          </a:p>
+        </p:txBody>
+      </p:sp>
+      <p:sp>
+        <p:nvSpPr>
+          <p:cNvPr id="28" name="Kubus 27">
+            <a:extLst>
+              <a:ext uri="{FF2B5EF4-FFF2-40B4-BE49-F238E27FC236}">
+                <a16:creationId xmlns:a16="http://schemas.microsoft.com/office/drawing/2014/main" id="{1D1A4C03-8796-ADAC-F423-1F73EB3E24E7}"/>
+              </a:ext>
+            </a:extLst>
+          </p:cNvPr>
+          <p:cNvSpPr/>
+          <p:nvPr/>
+        </p:nvSpPr>
+        <p:spPr>
+          <a:xfrm>
+            <a:off x="5736000" y="2411775"/>
+            <a:ext cx="720000" cy="720000"/>
+          </a:xfrm>
+          <a:prstGeom prst="cube">
+            <a:avLst>
+              <a:gd name="adj" fmla="val 32409"/>
+            </a:avLst>
+          </a:prstGeom>
+          <a:solidFill>
+            <a:srgbClr val="85D0FF"/>
+          </a:solidFill>
+          <a:ln>
+            <a:solidFill>
+              <a:schemeClr val="tx1"/>
+            </a:solidFill>
+          </a:ln>
+        </p:spPr>
+        <p:style>
+          <a:lnRef idx="2">
+            <a:schemeClr val="accent1">
+              <a:shade val="15000"/>
+            </a:schemeClr>
+          </a:lnRef>
+          <a:fillRef idx="1">
+            <a:schemeClr val="accent1"/>
+          </a:fillRef>
+          <a:effectRef idx="0">
+            <a:schemeClr val="accent1"/>
+          </a:effectRef>
+          <a:fontRef idx="minor">
+            <a:schemeClr val="lt1"/>
+          </a:fontRef>
+        </p:style>
+        <p:txBody>
+          <a:bodyPr rtlCol="0" anchor="ctr"/>
+          <a:lstStyle/>
+          <a:p>
+            <a:pPr algn="ctr"/>
+            <a:endParaRPr lang="nl-BE"/>
+          </a:p>
+        </p:txBody>
+      </p:sp>
+      <p:sp>
+        <p:nvSpPr>
+          <p:cNvPr id="5" name="Tekstvak 4">
+            <a:extLst>
+              <a:ext uri="{FF2B5EF4-FFF2-40B4-BE49-F238E27FC236}">
+                <a16:creationId xmlns:a16="http://schemas.microsoft.com/office/drawing/2014/main" id="{FC439B68-3221-83D9-6D28-5F02E8FB8648}"/>
+              </a:ext>
+            </a:extLst>
+          </p:cNvPr>
+          <p:cNvSpPr txBox="1"/>
+          <p:nvPr/>
+        </p:nvSpPr>
+        <p:spPr>
+          <a:xfrm>
+            <a:off x="4578578" y="4299225"/>
+            <a:ext cx="3215813" cy="1938992"/>
+          </a:xfrm>
+          <a:prstGeom prst="rect">
+            <a:avLst/>
+          </a:prstGeom>
+          <a:noFill/>
+        </p:spPr>
+        <p:txBody>
+          <a:bodyPr wrap="square" rtlCol="0">
+            <a:spAutoFit/>
+          </a:bodyPr>
+          <a:lstStyle/>
+          <a:p>
+            <a:r>
+              <a:rPr lang="nl-BE" sz="12000" dirty="0">
+                <a:ln w="0">
+                  <a:solidFill>
+                    <a:schemeClr val="tx1"/>
+                  </a:solidFill>
+                </a:ln>
+                <a:solidFill>
+                  <a:srgbClr val="EFF7FB"/>
+                </a:solidFill>
+                <a:effectLst>
+                  <a:outerShdw blurRad="50800" dist="38100" dir="5400000" algn="t" rotWithShape="0">
+                    <a:prstClr val="black">
+                      <a:alpha val="40000"/>
+                    </a:prstClr>
+                  </a:outerShdw>
+                </a:effectLst>
+                <a:latin typeface="Inter"/>
+              </a:rPr>
+              <a:t>K10s</a:t>
+            </a:r>
+          </a:p>
+        </p:txBody>
+      </p:sp>
+    </p:spTree>
+    <p:extLst>
+      <p:ext uri="{BB962C8B-B14F-4D97-AF65-F5344CB8AC3E}">
+        <p14:creationId xmlns:p14="http://schemas.microsoft.com/office/powerpoint/2010/main" val="416273316"/>
+      </p:ext>
+    </p:extLst>
+  </p:cSld>
+  <p:clrMapOvr>
+    <a:masterClrMapping/>
+  </p:clrMapOvr>
+  <mc:AlternateContent xmlns:mc="http://schemas.openxmlformats.org/markup-compatibility/2006" xmlns:p159="http://schemas.microsoft.com/office/powerpoint/2015/09/main">
+    <mc:Choice Requires="p159">
+      <p:transition xmlns:p14="http://schemas.microsoft.com/office/powerpoint/2010/main" spd="slow" p14:dur="2000">
+        <p159:morph option="byObject"/>
+      </p:transition>
+    </mc:Choice>
+    <mc:Fallback xmlns="">
+      <p:transition spd="slow">
+        <p:fade/>
+      </p:transition>
+    </mc:Fallback>
+  </mc:AlternateContent>
+</p:sld>
+</file>
+
 <file path=ppt/slides/slide2.xml><?xml version="1.0" encoding="utf-8"?>
 <p:sld xmlns:a="http://schemas.openxmlformats.org/drawingml/2006/main" xmlns:r="http://schemas.openxmlformats.org/officeDocument/2006/relationships" xmlns:p="http://schemas.openxmlformats.org/presentationml/2006/main">
   <p:cSld>
@@ -10534,10 +14021,383 @@
           </a:p>
         </p:txBody>
       </p:sp>
+      <p:sp>
+        <p:nvSpPr>
+          <p:cNvPr id="5" name="Tekstvak 4">
+            <a:extLst>
+              <a:ext uri="{FF2B5EF4-FFF2-40B4-BE49-F238E27FC236}">
+                <a16:creationId xmlns:a16="http://schemas.microsoft.com/office/drawing/2014/main" id="{C97C3E3D-335B-1712-6E69-0D1C99FD404A}"/>
+              </a:ext>
+            </a:extLst>
+          </p:cNvPr>
+          <p:cNvSpPr txBox="1"/>
+          <p:nvPr/>
+        </p:nvSpPr>
+        <p:spPr>
+          <a:xfrm>
+            <a:off x="4482101" y="2397948"/>
+            <a:ext cx="3227797" cy="2554545"/>
+          </a:xfrm>
+          <a:prstGeom prst="rect">
+            <a:avLst/>
+          </a:prstGeom>
+          <a:noFill/>
+        </p:spPr>
+        <p:txBody>
+          <a:bodyPr wrap="square" rtlCol="0">
+            <a:spAutoFit/>
+          </a:bodyPr>
+          <a:lstStyle/>
+          <a:p>
+            <a:pPr algn="ctr"/>
+            <a:r>
+              <a:rPr lang="en-US" sz="3200" dirty="0">
+                <a:solidFill>
+                  <a:srgbClr val="8F7EB4"/>
+                </a:solidFill>
+                <a:latin typeface="Inter"/>
+              </a:rPr>
+              <a:t>Open Source (GitHub) </a:t>
+            </a:r>
+          </a:p>
+          <a:p>
+            <a:pPr algn="ctr"/>
+            <a:r>
+              <a:rPr lang="en-US" sz="3200" dirty="0">
+                <a:solidFill>
+                  <a:srgbClr val="8F7EB4"/>
+                </a:solidFill>
+                <a:latin typeface="Inter"/>
+              </a:rPr>
+              <a:t>Management </a:t>
+            </a:r>
+          </a:p>
+          <a:p>
+            <a:pPr algn="ctr"/>
+            <a:r>
+              <a:rPr lang="en-US" sz="3200" dirty="0">
+                <a:solidFill>
+                  <a:srgbClr val="8F7EB4"/>
+                </a:solidFill>
+                <a:latin typeface="Inter"/>
+              </a:rPr>
+              <a:t>Monitoring</a:t>
+            </a:r>
+          </a:p>
+          <a:p>
+            <a:pPr algn="ctr"/>
+            <a:r>
+              <a:rPr lang="en-US" sz="3200" dirty="0">
+                <a:solidFill>
+                  <a:srgbClr val="8F7EB4"/>
+                </a:solidFill>
+                <a:latin typeface="Inter"/>
+              </a:rPr>
+              <a:t>Visualization</a:t>
+            </a:r>
+            <a:endParaRPr lang="nl-BE" sz="3200" dirty="0">
+              <a:solidFill>
+                <a:srgbClr val="8F7EB4"/>
+              </a:solidFill>
+              <a:latin typeface="Inter"/>
+              <a:cs typeface="Arial" panose="020B0604020202020204" pitchFamily="34" charset="0"/>
+            </a:endParaRPr>
+          </a:p>
+        </p:txBody>
+      </p:sp>
     </p:spTree>
     <p:extLst>
       <p:ext uri="{BB962C8B-B14F-4D97-AF65-F5344CB8AC3E}">
         <p14:creationId xmlns:p14="http://schemas.microsoft.com/office/powerpoint/2010/main" val="235943227"/>
+      </p:ext>
+    </p:extLst>
+  </p:cSld>
+  <p:clrMapOvr>
+    <a:masterClrMapping/>
+  </p:clrMapOvr>
+  <mc:AlternateContent xmlns:mc="http://schemas.openxmlformats.org/markup-compatibility/2006" xmlns:p159="http://schemas.microsoft.com/office/powerpoint/2015/09/main">
+    <mc:Choice Requires="p159">
+      <p:transition spd="med">
+        <p159:morph option="byObject"/>
+      </p:transition>
+    </mc:Choice>
+    <mc:Fallback xmlns="">
+      <p:transition spd="med">
+        <p:fade/>
+      </p:transition>
+    </mc:Fallback>
+  </mc:AlternateContent>
+</p:sld>
+</file>
+
+<file path=ppt/slides/slide9.xml><?xml version="1.0" encoding="utf-8"?>
+<p:sld xmlns:a="http://schemas.openxmlformats.org/drawingml/2006/main" xmlns:r="http://schemas.openxmlformats.org/officeDocument/2006/relationships" xmlns:p="http://schemas.openxmlformats.org/presentationml/2006/main">
+  <p:cSld>
+    <p:spTree>
+      <p:nvGrpSpPr>
+        <p:cNvPr id="1" name="">
+          <a:extLst>
+            <a:ext uri="{FF2B5EF4-FFF2-40B4-BE49-F238E27FC236}">
+              <a16:creationId xmlns:a16="http://schemas.microsoft.com/office/drawing/2014/main" id="{1E6BA0BF-0B6E-B27E-449E-C698F222B9D3}"/>
+            </a:ext>
+          </a:extLst>
+        </p:cNvPr>
+        <p:cNvGrpSpPr/>
+        <p:nvPr/>
+      </p:nvGrpSpPr>
+      <p:grpSpPr>
+        <a:xfrm>
+          <a:off x="0" y="0"/>
+          <a:ext cx="0" cy="0"/>
+          <a:chOff x="0" y="0"/>
+          <a:chExt cx="0" cy="0"/>
+        </a:xfrm>
+      </p:grpSpPr>
+      <p:sp>
+        <p:nvSpPr>
+          <p:cNvPr id="4" name="Rechthoek 3">
+            <a:extLst>
+              <a:ext uri="{FF2B5EF4-FFF2-40B4-BE49-F238E27FC236}">
+                <a16:creationId xmlns:a16="http://schemas.microsoft.com/office/drawing/2014/main" id="{BCDFE1E1-C879-FE23-8CA4-1A84C66644ED}"/>
+              </a:ext>
+            </a:extLst>
+          </p:cNvPr>
+          <p:cNvSpPr/>
+          <p:nvPr/>
+        </p:nvSpPr>
+        <p:spPr>
+          <a:xfrm>
+            <a:off x="0" y="1"/>
+            <a:ext cx="12192000" cy="932330"/>
+          </a:xfrm>
+          <a:prstGeom prst="rect">
+            <a:avLst/>
+          </a:prstGeom>
+          <a:solidFill>
+            <a:srgbClr val="B6ABCE"/>
+          </a:solidFill>
+          <a:ln>
+            <a:solidFill>
+              <a:srgbClr val="B6ABCE"/>
+            </a:solidFill>
+          </a:ln>
+        </p:spPr>
+        <p:style>
+          <a:lnRef idx="2">
+            <a:schemeClr val="accent1">
+              <a:shade val="15000"/>
+            </a:schemeClr>
+          </a:lnRef>
+          <a:fillRef idx="1">
+            <a:schemeClr val="accent1"/>
+          </a:fillRef>
+          <a:effectRef idx="0">
+            <a:schemeClr val="accent1"/>
+          </a:effectRef>
+          <a:fontRef idx="minor">
+            <a:schemeClr val="lt1"/>
+          </a:fontRef>
+        </p:style>
+        <p:txBody>
+          <a:bodyPr rtlCol="0" anchor="ctr"/>
+          <a:lstStyle/>
+          <a:p>
+            <a:pPr algn="ctr"/>
+            <a:r>
+              <a:rPr lang="nl-BE" sz="5000" b="1" dirty="0">
+                <a:latin typeface="Inter"/>
+                <a:cs typeface="Arial" panose="020B0604020202020204" pitchFamily="34" charset="0"/>
+              </a:rPr>
+              <a:t>Het Probleem</a:t>
+            </a:r>
+          </a:p>
+        </p:txBody>
+      </p:sp>
+      <p:sp>
+        <p:nvSpPr>
+          <p:cNvPr id="6" name="Rechthoek 5">
+            <a:extLst>
+              <a:ext uri="{FF2B5EF4-FFF2-40B4-BE49-F238E27FC236}">
+                <a16:creationId xmlns:a16="http://schemas.microsoft.com/office/drawing/2014/main" id="{868D8A20-30B8-6F5C-4272-8468B6F44763}"/>
+              </a:ext>
+            </a:extLst>
+          </p:cNvPr>
+          <p:cNvSpPr/>
+          <p:nvPr/>
+        </p:nvSpPr>
+        <p:spPr>
+          <a:xfrm>
+            <a:off x="0" y="6492875"/>
+            <a:ext cx="12192000" cy="365125"/>
+          </a:xfrm>
+          <a:prstGeom prst="rect">
+            <a:avLst/>
+          </a:prstGeom>
+          <a:solidFill>
+            <a:srgbClr val="8F7EB4"/>
+          </a:solidFill>
+          <a:ln>
+            <a:solidFill>
+              <a:srgbClr val="8F7EB4"/>
+            </a:solidFill>
+          </a:ln>
+        </p:spPr>
+        <p:style>
+          <a:lnRef idx="2">
+            <a:schemeClr val="accent1">
+              <a:shade val="15000"/>
+            </a:schemeClr>
+          </a:lnRef>
+          <a:fillRef idx="1">
+            <a:schemeClr val="accent1"/>
+          </a:fillRef>
+          <a:effectRef idx="0">
+            <a:schemeClr val="accent1"/>
+          </a:effectRef>
+          <a:fontRef idx="minor">
+            <a:schemeClr val="lt1"/>
+          </a:fontRef>
+        </p:style>
+        <p:txBody>
+          <a:bodyPr rtlCol="0" anchor="ctr"/>
+          <a:lstStyle/>
+          <a:p>
+            <a:pPr algn="ctr"/>
+            <a:endParaRPr lang="nl-BE">
+              <a:solidFill>
+                <a:srgbClr val="F37C00"/>
+              </a:solidFill>
+            </a:endParaRPr>
+          </a:p>
+        </p:txBody>
+      </p:sp>
+      <p:sp>
+        <p:nvSpPr>
+          <p:cNvPr id="11" name="Tijdelijke aanduiding voor dianummer 10">
+            <a:extLst>
+              <a:ext uri="{FF2B5EF4-FFF2-40B4-BE49-F238E27FC236}">
+                <a16:creationId xmlns:a16="http://schemas.microsoft.com/office/drawing/2014/main" id="{FC0DD2B4-8FA4-9AC7-E1B0-6724A7DC2D1C}"/>
+              </a:ext>
+            </a:extLst>
+          </p:cNvPr>
+          <p:cNvSpPr>
+            <a:spLocks noGrp="1"/>
+          </p:cNvSpPr>
+          <p:nvPr>
+            <p:ph type="sldNum" sz="quarter" idx="12"/>
+          </p:nvPr>
+        </p:nvSpPr>
+        <p:spPr>
+          <a:xfrm>
+            <a:off x="11362267" y="6492875"/>
+            <a:ext cx="829733" cy="365125"/>
+          </a:xfrm>
+        </p:spPr>
+        <p:txBody>
+          <a:bodyPr/>
+          <a:lstStyle/>
+          <a:p>
+            <a:r>
+              <a:rPr lang="nl-BE" sz="2000" b="1" dirty="0">
+                <a:solidFill>
+                  <a:schemeClr val="bg1"/>
+                </a:solidFill>
+                <a:latin typeface="Inter"/>
+                <a:cs typeface="Arial" panose="020B0604020202020204" pitchFamily="34" charset="0"/>
+              </a:rPr>
+              <a:t>05/20</a:t>
+            </a:r>
+          </a:p>
+        </p:txBody>
+      </p:sp>
+      <p:pic>
+        <p:nvPicPr>
+          <p:cNvPr id="19" name="Afbeelding 18" descr="Afbeelding met cirkel, diagram, pixel&#10;&#10;Door AI gegenereerde inhoud is mogelijk onjuist.">
+            <a:extLst>
+              <a:ext uri="{FF2B5EF4-FFF2-40B4-BE49-F238E27FC236}">
+                <a16:creationId xmlns:a16="http://schemas.microsoft.com/office/drawing/2014/main" id="{6DB61B01-7A0E-1C48-C228-56CD5F262A89}"/>
+              </a:ext>
+            </a:extLst>
+          </p:cNvPr>
+          <p:cNvPicPr>
+            <a:picLocks noChangeAspect="1"/>
+          </p:cNvPicPr>
+          <p:nvPr/>
+        </p:nvPicPr>
+        <p:blipFill>
+          <a:blip r:embed="rId3">
+            <a:extLst>
+              <a:ext uri="{28A0092B-C50C-407E-A947-70E740481C1C}">
+                <a14:useLocalDpi xmlns:a14="http://schemas.microsoft.com/office/drawing/2010/main" val="0"/>
+              </a:ext>
+            </a:extLst>
+          </a:blip>
+          <a:stretch>
+            <a:fillRect/>
+          </a:stretch>
+        </p:blipFill>
+        <p:spPr>
+          <a:xfrm>
+            <a:off x="11203050" y="-56619"/>
+            <a:ext cx="1008000" cy="1008000"/>
+          </a:xfrm>
+          <a:prstGeom prst="rect">
+            <a:avLst/>
+          </a:prstGeom>
+        </p:spPr>
+      </p:pic>
+      <p:sp>
+        <p:nvSpPr>
+          <p:cNvPr id="17" name="Tekstvak 16">
+            <a:extLst>
+              <a:ext uri="{FF2B5EF4-FFF2-40B4-BE49-F238E27FC236}">
+                <a16:creationId xmlns:a16="http://schemas.microsoft.com/office/drawing/2014/main" id="{8CEC4065-FDB7-BC4D-E25B-AEAD97453264}"/>
+              </a:ext>
+            </a:extLst>
+          </p:cNvPr>
+          <p:cNvSpPr txBox="1"/>
+          <p:nvPr/>
+        </p:nvSpPr>
+        <p:spPr>
+          <a:xfrm>
+            <a:off x="0" y="6492875"/>
+            <a:ext cx="2725426" cy="369332"/>
+          </a:xfrm>
+          <a:prstGeom prst="rect">
+            <a:avLst/>
+          </a:prstGeom>
+          <a:noFill/>
+        </p:spPr>
+        <p:txBody>
+          <a:bodyPr wrap="square" rtlCol="0">
+            <a:spAutoFit/>
+          </a:bodyPr>
+          <a:lstStyle/>
+          <a:p>
+            <a:r>
+              <a:rPr lang="nl-BE" b="1" dirty="0">
+                <a:solidFill>
+                  <a:schemeClr val="bg1"/>
+                </a:solidFill>
+                <a:latin typeface="Inter"/>
+                <a:cs typeface="Arial" panose="020B0604020202020204" pitchFamily="34" charset="0"/>
+              </a:rPr>
+              <a:t>Spreker: Elias De Hondt</a:t>
+            </a:r>
+            <a:endParaRPr lang="nl-BE" sz="1800" b="1" dirty="0">
+              <a:solidFill>
+                <a:schemeClr val="bg1"/>
+              </a:solidFill>
+              <a:latin typeface="Inter"/>
+              <a:cs typeface="Arial" panose="020B0604020202020204" pitchFamily="34" charset="0"/>
+            </a:endParaRPr>
+          </a:p>
+        </p:txBody>
+      </p:sp>
+    </p:spTree>
+    <p:extLst>
+      <p:ext uri="{BB962C8B-B14F-4D97-AF65-F5344CB8AC3E}">
+        <p14:creationId xmlns:p14="http://schemas.microsoft.com/office/powerpoint/2010/main" val="2918437992"/>
       </p:ext>
     </p:extLst>
   </p:cSld>

</xml_diff>

<commit_message>
Update presentation file with new content
</commit_message>
<xml_diff>
--- a/docs/pptx/presentation.pptx
+++ b/docs/pptx/presentation.pptx
@@ -5,7 +5,7 @@
     <p:sldMasterId id="2147483648" r:id="rId1"/>
   </p:sldMasterIdLst>
   <p:notesMasterIdLst>
-    <p:notesMasterId r:id="rId19"/>
+    <p:notesMasterId r:id="rId20"/>
   </p:notesMasterIdLst>
   <p:sldIdLst>
     <p:sldId id="268" r:id="rId2"/>
@@ -16,15 +16,16 @@
     <p:sldId id="274" r:id="rId7"/>
     <p:sldId id="275" r:id="rId8"/>
     <p:sldId id="276" r:id="rId9"/>
-    <p:sldId id="279" r:id="rId10"/>
-    <p:sldId id="280" r:id="rId11"/>
-    <p:sldId id="285" r:id="rId12"/>
-    <p:sldId id="278" r:id="rId13"/>
-    <p:sldId id="287" r:id="rId14"/>
-    <p:sldId id="286" r:id="rId15"/>
-    <p:sldId id="277" r:id="rId16"/>
-    <p:sldId id="281" r:id="rId17"/>
-    <p:sldId id="284" r:id="rId18"/>
+    <p:sldId id="288" r:id="rId10"/>
+    <p:sldId id="279" r:id="rId11"/>
+    <p:sldId id="280" r:id="rId12"/>
+    <p:sldId id="285" r:id="rId13"/>
+    <p:sldId id="278" r:id="rId14"/>
+    <p:sldId id="287" r:id="rId15"/>
+    <p:sldId id="286" r:id="rId16"/>
+    <p:sldId id="277" r:id="rId17"/>
+    <p:sldId id="281" r:id="rId18"/>
+    <p:sldId id="284" r:id="rId19"/>
   </p:sldIdLst>
   <p:sldSz cx="12192000" cy="6858000"/>
   <p:notesSz cx="6858000" cy="9144000"/>
@@ -144,6 +145,7 @@
         <p14:section name="Body" id="{50C48108-5850-422B-80BC-1455754F8DDD}">
           <p14:sldIdLst>
             <p14:sldId id="276"/>
+            <p14:sldId id="288"/>
             <p14:sldId id="279"/>
             <p14:sldId id="280"/>
             <p14:sldId id="285"/>
@@ -1032,7 +1034,7 @@
           <a:p>
             <a:fld id="{F4EB8CDE-9571-4377-94AA-D6A6C7869D2C}" type="datetimeFigureOut">
               <a:rPr lang="nl-BE" smtClean="0"/>
-              <a:t>14/03/2025</a:t>
+              <a:t>19/03/2025</a:t>
             </a:fld>
             <a:endParaRPr lang="nl-BE"/>
           </a:p>
@@ -1392,6 +1394,114 @@
         <p:cNvPr id="1" name="">
           <a:extLst>
             <a:ext uri="{FF2B5EF4-FFF2-40B4-BE49-F238E27FC236}">
+              <a16:creationId xmlns:a16="http://schemas.microsoft.com/office/drawing/2014/main" id="{BB76C3F9-F7BB-3758-C7F6-052960F587F3}"/>
+            </a:ext>
+          </a:extLst>
+        </p:cNvPr>
+        <p:cNvGrpSpPr/>
+        <p:nvPr/>
+      </p:nvGrpSpPr>
+      <p:grpSpPr>
+        <a:xfrm>
+          <a:off x="0" y="0"/>
+          <a:ext cx="0" cy="0"/>
+          <a:chOff x="0" y="0"/>
+          <a:chExt cx="0" cy="0"/>
+        </a:xfrm>
+      </p:grpSpPr>
+      <p:sp>
+        <p:nvSpPr>
+          <p:cNvPr id="2" name="Tijdelijke aanduiding voor dia-afbeelding 1">
+            <a:extLst>
+              <a:ext uri="{FF2B5EF4-FFF2-40B4-BE49-F238E27FC236}">
+                <a16:creationId xmlns:a16="http://schemas.microsoft.com/office/drawing/2014/main" id="{56B5F8E3-68E3-9A51-C8FE-7D1DCB4A2C81}"/>
+              </a:ext>
+            </a:extLst>
+          </p:cNvPr>
+          <p:cNvSpPr>
+            <a:spLocks noGrp="1" noRot="1" noChangeAspect="1"/>
+          </p:cNvSpPr>
+          <p:nvPr>
+            <p:ph type="sldImg"/>
+          </p:nvPr>
+        </p:nvSpPr>
+        <p:spPr/>
+      </p:sp>
+      <p:sp>
+        <p:nvSpPr>
+          <p:cNvPr id="3" name="Tijdelijke aanduiding voor notities 2">
+            <a:extLst>
+              <a:ext uri="{FF2B5EF4-FFF2-40B4-BE49-F238E27FC236}">
+                <a16:creationId xmlns:a16="http://schemas.microsoft.com/office/drawing/2014/main" id="{163B3412-9B15-9D73-1529-F890E63A30EF}"/>
+              </a:ext>
+            </a:extLst>
+          </p:cNvPr>
+          <p:cNvSpPr>
+            <a:spLocks noGrp="1"/>
+          </p:cNvSpPr>
+          <p:nvPr>
+            <p:ph type="body" idx="1"/>
+          </p:nvPr>
+        </p:nvSpPr>
+        <p:spPr/>
+        <p:txBody>
+          <a:bodyPr/>
+          <a:lstStyle/>
+          <a:p>
+            <a:endParaRPr lang="nl-BE" dirty="0"/>
+          </a:p>
+        </p:txBody>
+      </p:sp>
+      <p:sp>
+        <p:nvSpPr>
+          <p:cNvPr id="4" name="Tijdelijke aanduiding voor dianummer 3">
+            <a:extLst>
+              <a:ext uri="{FF2B5EF4-FFF2-40B4-BE49-F238E27FC236}">
+                <a16:creationId xmlns:a16="http://schemas.microsoft.com/office/drawing/2014/main" id="{D41155C9-6A7A-262E-9288-575374E7EAFF}"/>
+              </a:ext>
+            </a:extLst>
+          </p:cNvPr>
+          <p:cNvSpPr>
+            <a:spLocks noGrp="1"/>
+          </p:cNvSpPr>
+          <p:nvPr>
+            <p:ph type="sldNum" sz="quarter" idx="5"/>
+          </p:nvPr>
+        </p:nvSpPr>
+        <p:spPr/>
+        <p:txBody>
+          <a:bodyPr/>
+          <a:lstStyle/>
+          <a:p>
+            <a:fld id="{89284E18-2A08-4495-ABBA-2C4402C2FBE9}" type="slidenum">
+              <a:rPr lang="nl-BE" smtClean="0"/>
+              <a:t>13</a:t>
+            </a:fld>
+            <a:endParaRPr lang="nl-BE"/>
+          </a:p>
+        </p:txBody>
+      </p:sp>
+    </p:spTree>
+    <p:extLst>
+      <p:ext uri="{BB962C8B-B14F-4D97-AF65-F5344CB8AC3E}">
+        <p14:creationId xmlns:p14="http://schemas.microsoft.com/office/powerpoint/2010/main" val="2939006583"/>
+      </p:ext>
+    </p:extLst>
+  </p:cSld>
+  <p:clrMapOvr>
+    <a:masterClrMapping/>
+  </p:clrMapOvr>
+</p:notes>
+</file>
+
+<file path=ppt/notesSlides/notesSlide11.xml><?xml version="1.0" encoding="utf-8"?>
+<p:notes xmlns:a="http://schemas.openxmlformats.org/drawingml/2006/main" xmlns:r="http://schemas.openxmlformats.org/officeDocument/2006/relationships" xmlns:p="http://schemas.openxmlformats.org/presentationml/2006/main">
+  <p:cSld>
+    <p:spTree>
+      <p:nvGrpSpPr>
+        <p:cNvPr id="1" name="">
+          <a:extLst>
+            <a:ext uri="{FF2B5EF4-FFF2-40B4-BE49-F238E27FC236}">
               <a16:creationId xmlns:a16="http://schemas.microsoft.com/office/drawing/2014/main" id="{014EA9DE-A771-EFFE-71D1-ECFAE95C8CC4}"/>
             </a:ext>
           </a:extLst>
@@ -1473,7 +1583,7 @@
           <a:p>
             <a:fld id="{89284E18-2A08-4495-ABBA-2C4402C2FBE9}" type="slidenum">
               <a:rPr lang="nl-BE" smtClean="0"/>
-              <a:t>13</a:t>
+              <a:t>14</a:t>
             </a:fld>
             <a:endParaRPr lang="nl-BE"/>
           </a:p>
@@ -1492,7 +1602,7 @@
 </p:notes>
 </file>
 
-<file path=ppt/notesSlides/notesSlide11.xml><?xml version="1.0" encoding="utf-8"?>
+<file path=ppt/notesSlides/notesSlide12.xml><?xml version="1.0" encoding="utf-8"?>
 <p:notes xmlns:a="http://schemas.openxmlformats.org/drawingml/2006/main" xmlns:r="http://schemas.openxmlformats.org/officeDocument/2006/relationships" xmlns:p="http://schemas.openxmlformats.org/presentationml/2006/main">
   <p:cSld>
     <p:spTree>
@@ -1581,7 +1691,7 @@
           <a:p>
             <a:fld id="{89284E18-2A08-4495-ABBA-2C4402C2FBE9}" type="slidenum">
               <a:rPr lang="nl-BE" smtClean="0"/>
-              <a:t>14</a:t>
+              <a:t>15</a:t>
             </a:fld>
             <a:endParaRPr lang="nl-BE"/>
           </a:p>
@@ -1600,7 +1710,7 @@
 </p:notes>
 </file>
 
-<file path=ppt/notesSlides/notesSlide12.xml><?xml version="1.0" encoding="utf-8"?>
+<file path=ppt/notesSlides/notesSlide13.xml><?xml version="1.0" encoding="utf-8"?>
 <p:notes xmlns:a="http://schemas.openxmlformats.org/drawingml/2006/main" xmlns:r="http://schemas.openxmlformats.org/officeDocument/2006/relationships" xmlns:p="http://schemas.openxmlformats.org/presentationml/2006/main">
   <p:cSld>
     <p:spTree>
@@ -1689,7 +1799,7 @@
           <a:p>
             <a:fld id="{89284E18-2A08-4495-ABBA-2C4402C2FBE9}" type="slidenum">
               <a:rPr lang="nl-BE" smtClean="0"/>
-              <a:t>15</a:t>
+              <a:t>16</a:t>
             </a:fld>
             <a:endParaRPr lang="nl-BE"/>
           </a:p>
@@ -1708,7 +1818,7 @@
 </p:notes>
 </file>
 
-<file path=ppt/notesSlides/notesSlide13.xml><?xml version="1.0" encoding="utf-8"?>
+<file path=ppt/notesSlides/notesSlide14.xml><?xml version="1.0" encoding="utf-8"?>
 <p:notes xmlns:a="http://schemas.openxmlformats.org/drawingml/2006/main" xmlns:r="http://schemas.openxmlformats.org/officeDocument/2006/relationships" xmlns:p="http://schemas.openxmlformats.org/presentationml/2006/main">
   <p:cSld>
     <p:spTree>
@@ -1797,7 +1907,7 @@
           <a:p>
             <a:fld id="{89284E18-2A08-4495-ABBA-2C4402C2FBE9}" type="slidenum">
               <a:rPr lang="nl-BE" smtClean="0"/>
-              <a:t>16</a:t>
+              <a:t>17</a:t>
             </a:fld>
             <a:endParaRPr lang="nl-BE"/>
           </a:p>
@@ -2256,6 +2366,114 @@
         <p:cNvPr id="1" name="">
           <a:extLst>
             <a:ext uri="{FF2B5EF4-FFF2-40B4-BE49-F238E27FC236}">
+              <a16:creationId xmlns:a16="http://schemas.microsoft.com/office/drawing/2014/main" id="{C7F83F98-CE49-AD5B-D250-275C32B82702}"/>
+            </a:ext>
+          </a:extLst>
+        </p:cNvPr>
+        <p:cNvGrpSpPr/>
+        <p:nvPr/>
+      </p:nvGrpSpPr>
+      <p:grpSpPr>
+        <a:xfrm>
+          <a:off x="0" y="0"/>
+          <a:ext cx="0" cy="0"/>
+          <a:chOff x="0" y="0"/>
+          <a:chExt cx="0" cy="0"/>
+        </a:xfrm>
+      </p:grpSpPr>
+      <p:sp>
+        <p:nvSpPr>
+          <p:cNvPr id="2" name="Tijdelijke aanduiding voor dia-afbeelding 1">
+            <a:extLst>
+              <a:ext uri="{FF2B5EF4-FFF2-40B4-BE49-F238E27FC236}">
+                <a16:creationId xmlns:a16="http://schemas.microsoft.com/office/drawing/2014/main" id="{177EA63F-8004-48CA-AD1E-C856C6CB6938}"/>
+              </a:ext>
+            </a:extLst>
+          </p:cNvPr>
+          <p:cNvSpPr>
+            <a:spLocks noGrp="1" noRot="1" noChangeAspect="1"/>
+          </p:cNvSpPr>
+          <p:nvPr>
+            <p:ph type="sldImg"/>
+          </p:nvPr>
+        </p:nvSpPr>
+        <p:spPr/>
+      </p:sp>
+      <p:sp>
+        <p:nvSpPr>
+          <p:cNvPr id="3" name="Tijdelijke aanduiding voor notities 2">
+            <a:extLst>
+              <a:ext uri="{FF2B5EF4-FFF2-40B4-BE49-F238E27FC236}">
+                <a16:creationId xmlns:a16="http://schemas.microsoft.com/office/drawing/2014/main" id="{27D3B0AE-66AD-6ED8-E158-FE1C1E71B895}"/>
+              </a:ext>
+            </a:extLst>
+          </p:cNvPr>
+          <p:cNvSpPr>
+            <a:spLocks noGrp="1"/>
+          </p:cNvSpPr>
+          <p:nvPr>
+            <p:ph type="body" idx="1"/>
+          </p:nvPr>
+        </p:nvSpPr>
+        <p:spPr/>
+        <p:txBody>
+          <a:bodyPr/>
+          <a:lstStyle/>
+          <a:p>
+            <a:endParaRPr lang="nl-BE" dirty="0"/>
+          </a:p>
+        </p:txBody>
+      </p:sp>
+      <p:sp>
+        <p:nvSpPr>
+          <p:cNvPr id="4" name="Tijdelijke aanduiding voor dianummer 3">
+            <a:extLst>
+              <a:ext uri="{FF2B5EF4-FFF2-40B4-BE49-F238E27FC236}">
+                <a16:creationId xmlns:a16="http://schemas.microsoft.com/office/drawing/2014/main" id="{5200B7E5-693B-CC7D-FCC4-77BEA56E67D7}"/>
+              </a:ext>
+            </a:extLst>
+          </p:cNvPr>
+          <p:cNvSpPr>
+            <a:spLocks noGrp="1"/>
+          </p:cNvSpPr>
+          <p:nvPr>
+            <p:ph type="sldNum" sz="quarter" idx="5"/>
+          </p:nvPr>
+        </p:nvSpPr>
+        <p:spPr/>
+        <p:txBody>
+          <a:bodyPr/>
+          <a:lstStyle/>
+          <a:p>
+            <a:fld id="{89284E18-2A08-4495-ABBA-2C4402C2FBE9}" type="slidenum">
+              <a:rPr lang="nl-BE" smtClean="0"/>
+              <a:t>9</a:t>
+            </a:fld>
+            <a:endParaRPr lang="nl-BE"/>
+          </a:p>
+        </p:txBody>
+      </p:sp>
+    </p:spTree>
+    <p:extLst>
+      <p:ext uri="{BB962C8B-B14F-4D97-AF65-F5344CB8AC3E}">
+        <p14:creationId xmlns:p14="http://schemas.microsoft.com/office/powerpoint/2010/main" val="3465802460"/>
+      </p:ext>
+    </p:extLst>
+  </p:cSld>
+  <p:clrMapOvr>
+    <a:masterClrMapping/>
+  </p:clrMapOvr>
+</p:notes>
+</file>
+
+<file path=ppt/notesSlides/notesSlide7.xml><?xml version="1.0" encoding="utf-8"?>
+<p:notes xmlns:a="http://schemas.openxmlformats.org/drawingml/2006/main" xmlns:r="http://schemas.openxmlformats.org/officeDocument/2006/relationships" xmlns:p="http://schemas.openxmlformats.org/presentationml/2006/main">
+  <p:cSld>
+    <p:spTree>
+      <p:nvGrpSpPr>
+        <p:cNvPr id="1" name="">
+          <a:extLst>
+            <a:ext uri="{FF2B5EF4-FFF2-40B4-BE49-F238E27FC236}">
               <a16:creationId xmlns:a16="http://schemas.microsoft.com/office/drawing/2014/main" id="{28F40876-76C1-162C-B168-45E10D8F3C26}"/>
             </a:ext>
           </a:extLst>
@@ -2337,7 +2555,7 @@
           <a:p>
             <a:fld id="{89284E18-2A08-4495-ABBA-2C4402C2FBE9}" type="slidenum">
               <a:rPr lang="nl-BE" smtClean="0"/>
-              <a:t>9</a:t>
+              <a:t>10</a:t>
             </a:fld>
             <a:endParaRPr lang="nl-BE"/>
           </a:p>
@@ -2356,7 +2574,7 @@
 </p:notes>
 </file>
 
-<file path=ppt/notesSlides/notesSlide7.xml><?xml version="1.0" encoding="utf-8"?>
+<file path=ppt/notesSlides/notesSlide8.xml><?xml version="1.0" encoding="utf-8"?>
 <p:notes xmlns:a="http://schemas.openxmlformats.org/drawingml/2006/main" xmlns:r="http://schemas.openxmlformats.org/officeDocument/2006/relationships" xmlns:p="http://schemas.openxmlformats.org/presentationml/2006/main">
   <p:cSld>
     <p:spTree>
@@ -2445,7 +2663,7 @@
           <a:p>
             <a:fld id="{89284E18-2A08-4495-ABBA-2C4402C2FBE9}" type="slidenum">
               <a:rPr lang="nl-BE" smtClean="0"/>
-              <a:t>10</a:t>
+              <a:t>11</a:t>
             </a:fld>
             <a:endParaRPr lang="nl-BE"/>
           </a:p>
@@ -2464,7 +2682,7 @@
 </p:notes>
 </file>
 
-<file path=ppt/notesSlides/notesSlide8.xml><?xml version="1.0" encoding="utf-8"?>
+<file path=ppt/notesSlides/notesSlide9.xml><?xml version="1.0" encoding="utf-8"?>
 <p:notes xmlns:a="http://schemas.openxmlformats.org/drawingml/2006/main" xmlns:r="http://schemas.openxmlformats.org/officeDocument/2006/relationships" xmlns:p="http://schemas.openxmlformats.org/presentationml/2006/main">
   <p:cSld>
     <p:spTree>
@@ -2553,7 +2771,7 @@
           <a:p>
             <a:fld id="{89284E18-2A08-4495-ABBA-2C4402C2FBE9}" type="slidenum">
               <a:rPr lang="nl-BE" smtClean="0"/>
-              <a:t>11</a:t>
+              <a:t>12</a:t>
             </a:fld>
             <a:endParaRPr lang="nl-BE"/>
           </a:p>
@@ -2563,114 +2781,6 @@
     <p:extLst>
       <p:ext uri="{BB962C8B-B14F-4D97-AF65-F5344CB8AC3E}">
         <p14:creationId xmlns:p14="http://schemas.microsoft.com/office/powerpoint/2010/main" val="1271421733"/>
-      </p:ext>
-    </p:extLst>
-  </p:cSld>
-  <p:clrMapOvr>
-    <a:masterClrMapping/>
-  </p:clrMapOvr>
-</p:notes>
-</file>
-
-<file path=ppt/notesSlides/notesSlide9.xml><?xml version="1.0" encoding="utf-8"?>
-<p:notes xmlns:a="http://schemas.openxmlformats.org/drawingml/2006/main" xmlns:r="http://schemas.openxmlformats.org/officeDocument/2006/relationships" xmlns:p="http://schemas.openxmlformats.org/presentationml/2006/main">
-  <p:cSld>
-    <p:spTree>
-      <p:nvGrpSpPr>
-        <p:cNvPr id="1" name="">
-          <a:extLst>
-            <a:ext uri="{FF2B5EF4-FFF2-40B4-BE49-F238E27FC236}">
-              <a16:creationId xmlns:a16="http://schemas.microsoft.com/office/drawing/2014/main" id="{BB76C3F9-F7BB-3758-C7F6-052960F587F3}"/>
-            </a:ext>
-          </a:extLst>
-        </p:cNvPr>
-        <p:cNvGrpSpPr/>
-        <p:nvPr/>
-      </p:nvGrpSpPr>
-      <p:grpSpPr>
-        <a:xfrm>
-          <a:off x="0" y="0"/>
-          <a:ext cx="0" cy="0"/>
-          <a:chOff x="0" y="0"/>
-          <a:chExt cx="0" cy="0"/>
-        </a:xfrm>
-      </p:grpSpPr>
-      <p:sp>
-        <p:nvSpPr>
-          <p:cNvPr id="2" name="Tijdelijke aanduiding voor dia-afbeelding 1">
-            <a:extLst>
-              <a:ext uri="{FF2B5EF4-FFF2-40B4-BE49-F238E27FC236}">
-                <a16:creationId xmlns:a16="http://schemas.microsoft.com/office/drawing/2014/main" id="{56B5F8E3-68E3-9A51-C8FE-7D1DCB4A2C81}"/>
-              </a:ext>
-            </a:extLst>
-          </p:cNvPr>
-          <p:cNvSpPr>
-            <a:spLocks noGrp="1" noRot="1" noChangeAspect="1"/>
-          </p:cNvSpPr>
-          <p:nvPr>
-            <p:ph type="sldImg"/>
-          </p:nvPr>
-        </p:nvSpPr>
-        <p:spPr/>
-      </p:sp>
-      <p:sp>
-        <p:nvSpPr>
-          <p:cNvPr id="3" name="Tijdelijke aanduiding voor notities 2">
-            <a:extLst>
-              <a:ext uri="{FF2B5EF4-FFF2-40B4-BE49-F238E27FC236}">
-                <a16:creationId xmlns:a16="http://schemas.microsoft.com/office/drawing/2014/main" id="{163B3412-9B15-9D73-1529-F890E63A30EF}"/>
-              </a:ext>
-            </a:extLst>
-          </p:cNvPr>
-          <p:cNvSpPr>
-            <a:spLocks noGrp="1"/>
-          </p:cNvSpPr>
-          <p:nvPr>
-            <p:ph type="body" idx="1"/>
-          </p:nvPr>
-        </p:nvSpPr>
-        <p:spPr/>
-        <p:txBody>
-          <a:bodyPr/>
-          <a:lstStyle/>
-          <a:p>
-            <a:endParaRPr lang="nl-BE" dirty="0"/>
-          </a:p>
-        </p:txBody>
-      </p:sp>
-      <p:sp>
-        <p:nvSpPr>
-          <p:cNvPr id="4" name="Tijdelijke aanduiding voor dianummer 3">
-            <a:extLst>
-              <a:ext uri="{FF2B5EF4-FFF2-40B4-BE49-F238E27FC236}">
-                <a16:creationId xmlns:a16="http://schemas.microsoft.com/office/drawing/2014/main" id="{D41155C9-6A7A-262E-9288-575374E7EAFF}"/>
-              </a:ext>
-            </a:extLst>
-          </p:cNvPr>
-          <p:cNvSpPr>
-            <a:spLocks noGrp="1"/>
-          </p:cNvSpPr>
-          <p:nvPr>
-            <p:ph type="sldNum" sz="quarter" idx="5"/>
-          </p:nvPr>
-        </p:nvSpPr>
-        <p:spPr/>
-        <p:txBody>
-          <a:bodyPr/>
-          <a:lstStyle/>
-          <a:p>
-            <a:fld id="{89284E18-2A08-4495-ABBA-2C4402C2FBE9}" type="slidenum">
-              <a:rPr lang="nl-BE" smtClean="0"/>
-              <a:t>12</a:t>
-            </a:fld>
-            <a:endParaRPr lang="nl-BE"/>
-          </a:p>
-        </p:txBody>
-      </p:sp>
-    </p:spTree>
-    <p:extLst>
-      <p:ext uri="{BB962C8B-B14F-4D97-AF65-F5344CB8AC3E}">
-        <p14:creationId xmlns:p14="http://schemas.microsoft.com/office/powerpoint/2010/main" val="2939006583"/>
       </p:ext>
     </p:extLst>
   </p:cSld>
@@ -2829,7 +2939,7 @@
           <a:p>
             <a:fld id="{686F7AF0-E817-4751-8020-06980DDBEBE6}" type="datetimeFigureOut">
               <a:rPr lang="nl-BE" smtClean="0"/>
-              <a:t>14/03/2025</a:t>
+              <a:t>19/03/2025</a:t>
             </a:fld>
             <a:endParaRPr lang="nl-BE"/>
           </a:p>
@@ -3029,7 +3139,7 @@
           <a:p>
             <a:fld id="{686F7AF0-E817-4751-8020-06980DDBEBE6}" type="datetimeFigureOut">
               <a:rPr lang="nl-BE" smtClean="0"/>
-              <a:t>14/03/2025</a:t>
+              <a:t>19/03/2025</a:t>
             </a:fld>
             <a:endParaRPr lang="nl-BE"/>
           </a:p>
@@ -3239,7 +3349,7 @@
           <a:p>
             <a:fld id="{686F7AF0-E817-4751-8020-06980DDBEBE6}" type="datetimeFigureOut">
               <a:rPr lang="nl-BE" smtClean="0"/>
-              <a:t>14/03/2025</a:t>
+              <a:t>19/03/2025</a:t>
             </a:fld>
             <a:endParaRPr lang="nl-BE"/>
           </a:p>
@@ -3439,7 +3549,7 @@
           <a:p>
             <a:fld id="{686F7AF0-E817-4751-8020-06980DDBEBE6}" type="datetimeFigureOut">
               <a:rPr lang="nl-BE" smtClean="0"/>
-              <a:t>14/03/2025</a:t>
+              <a:t>19/03/2025</a:t>
             </a:fld>
             <a:endParaRPr lang="nl-BE"/>
           </a:p>
@@ -3715,7 +3825,7 @@
           <a:p>
             <a:fld id="{686F7AF0-E817-4751-8020-06980DDBEBE6}" type="datetimeFigureOut">
               <a:rPr lang="nl-BE" smtClean="0"/>
-              <a:t>14/03/2025</a:t>
+              <a:t>19/03/2025</a:t>
             </a:fld>
             <a:endParaRPr lang="nl-BE"/>
           </a:p>
@@ -3983,7 +4093,7 @@
           <a:p>
             <a:fld id="{686F7AF0-E817-4751-8020-06980DDBEBE6}" type="datetimeFigureOut">
               <a:rPr lang="nl-BE" smtClean="0"/>
-              <a:t>14/03/2025</a:t>
+              <a:t>19/03/2025</a:t>
             </a:fld>
             <a:endParaRPr lang="nl-BE"/>
           </a:p>
@@ -4398,7 +4508,7 @@
           <a:p>
             <a:fld id="{686F7AF0-E817-4751-8020-06980DDBEBE6}" type="datetimeFigureOut">
               <a:rPr lang="nl-BE" smtClean="0"/>
-              <a:t>14/03/2025</a:t>
+              <a:t>19/03/2025</a:t>
             </a:fld>
             <a:endParaRPr lang="nl-BE"/>
           </a:p>
@@ -4540,7 +4650,7 @@
           <a:p>
             <a:fld id="{686F7AF0-E817-4751-8020-06980DDBEBE6}" type="datetimeFigureOut">
               <a:rPr lang="nl-BE" smtClean="0"/>
-              <a:t>14/03/2025</a:t>
+              <a:t>19/03/2025</a:t>
             </a:fld>
             <a:endParaRPr lang="nl-BE"/>
           </a:p>
@@ -4653,7 +4763,7 @@
           <a:p>
             <a:fld id="{686F7AF0-E817-4751-8020-06980DDBEBE6}" type="datetimeFigureOut">
               <a:rPr lang="nl-BE" smtClean="0"/>
-              <a:t>14/03/2025</a:t>
+              <a:t>19/03/2025</a:t>
             </a:fld>
             <a:endParaRPr lang="nl-BE"/>
           </a:p>
@@ -4966,7 +5076,7 @@
           <a:p>
             <a:fld id="{686F7AF0-E817-4751-8020-06980DDBEBE6}" type="datetimeFigureOut">
               <a:rPr lang="nl-BE" smtClean="0"/>
-              <a:t>14/03/2025</a:t>
+              <a:t>19/03/2025</a:t>
             </a:fld>
             <a:endParaRPr lang="nl-BE"/>
           </a:p>
@@ -5255,7 +5365,7 @@
           <a:p>
             <a:fld id="{686F7AF0-E817-4751-8020-06980DDBEBE6}" type="datetimeFigureOut">
               <a:rPr lang="nl-BE" smtClean="0"/>
-              <a:t>14/03/2025</a:t>
+              <a:t>19/03/2025</a:t>
             </a:fld>
             <a:endParaRPr lang="nl-BE"/>
           </a:p>
@@ -5498,7 +5608,7 @@
           <a:p>
             <a:fld id="{686F7AF0-E817-4751-8020-06980DDBEBE6}" type="datetimeFigureOut">
               <a:rPr lang="nl-BE" smtClean="0"/>
-              <a:t>14/03/2025</a:t>
+              <a:t>19/03/2025</a:t>
             </a:fld>
             <a:endParaRPr lang="nl-BE"/>
           </a:p>
@@ -6790,6 +6900,580 @@
         <p:cNvPr id="1" name="">
           <a:extLst>
             <a:ext uri="{FF2B5EF4-FFF2-40B4-BE49-F238E27FC236}">
+              <a16:creationId xmlns:a16="http://schemas.microsoft.com/office/drawing/2014/main" id="{1E6BA0BF-0B6E-B27E-449E-C698F222B9D3}"/>
+            </a:ext>
+          </a:extLst>
+        </p:cNvPr>
+        <p:cNvGrpSpPr/>
+        <p:nvPr/>
+      </p:nvGrpSpPr>
+      <p:grpSpPr>
+        <a:xfrm>
+          <a:off x="0" y="0"/>
+          <a:ext cx="0" cy="0"/>
+          <a:chOff x="0" y="0"/>
+          <a:chExt cx="0" cy="0"/>
+        </a:xfrm>
+      </p:grpSpPr>
+      <p:sp>
+        <p:nvSpPr>
+          <p:cNvPr id="4" name="Rechthoek 3">
+            <a:extLst>
+              <a:ext uri="{FF2B5EF4-FFF2-40B4-BE49-F238E27FC236}">
+                <a16:creationId xmlns:a16="http://schemas.microsoft.com/office/drawing/2014/main" id="{BCDFE1E1-C879-FE23-8CA4-1A84C66644ED}"/>
+              </a:ext>
+            </a:extLst>
+          </p:cNvPr>
+          <p:cNvSpPr/>
+          <p:nvPr/>
+        </p:nvSpPr>
+        <p:spPr>
+          <a:xfrm>
+            <a:off x="0" y="1"/>
+            <a:ext cx="12192000" cy="932330"/>
+          </a:xfrm>
+          <a:prstGeom prst="rect">
+            <a:avLst/>
+          </a:prstGeom>
+          <a:solidFill>
+            <a:srgbClr val="B6ABCE"/>
+          </a:solidFill>
+          <a:ln>
+            <a:solidFill>
+              <a:srgbClr val="B6ABCE"/>
+            </a:solidFill>
+          </a:ln>
+        </p:spPr>
+        <p:style>
+          <a:lnRef idx="2">
+            <a:schemeClr val="accent1">
+              <a:shade val="15000"/>
+            </a:schemeClr>
+          </a:lnRef>
+          <a:fillRef idx="1">
+            <a:schemeClr val="accent1"/>
+          </a:fillRef>
+          <a:effectRef idx="0">
+            <a:schemeClr val="accent1"/>
+          </a:effectRef>
+          <a:fontRef idx="minor">
+            <a:schemeClr val="lt1"/>
+          </a:fontRef>
+        </p:style>
+        <p:txBody>
+          <a:bodyPr rtlCol="0" anchor="ctr"/>
+          <a:lstStyle/>
+          <a:p>
+            <a:pPr algn="ctr"/>
+            <a:r>
+              <a:rPr lang="nl-BE" sz="5000" b="1" dirty="0">
+                <a:latin typeface="Inter"/>
+                <a:cs typeface="Arial" panose="020B0604020202020204" pitchFamily="34" charset="0"/>
+              </a:rPr>
+              <a:t>Het Probleem</a:t>
+            </a:r>
+          </a:p>
+        </p:txBody>
+      </p:sp>
+      <p:sp>
+        <p:nvSpPr>
+          <p:cNvPr id="6" name="Rechthoek 5">
+            <a:extLst>
+              <a:ext uri="{FF2B5EF4-FFF2-40B4-BE49-F238E27FC236}">
+                <a16:creationId xmlns:a16="http://schemas.microsoft.com/office/drawing/2014/main" id="{868D8A20-30B8-6F5C-4272-8468B6F44763}"/>
+              </a:ext>
+            </a:extLst>
+          </p:cNvPr>
+          <p:cNvSpPr/>
+          <p:nvPr/>
+        </p:nvSpPr>
+        <p:spPr>
+          <a:xfrm>
+            <a:off x="0" y="6492875"/>
+            <a:ext cx="12192000" cy="365125"/>
+          </a:xfrm>
+          <a:prstGeom prst="rect">
+            <a:avLst/>
+          </a:prstGeom>
+          <a:solidFill>
+            <a:srgbClr val="8F7EB4"/>
+          </a:solidFill>
+          <a:ln>
+            <a:solidFill>
+              <a:srgbClr val="8F7EB4"/>
+            </a:solidFill>
+          </a:ln>
+        </p:spPr>
+        <p:style>
+          <a:lnRef idx="2">
+            <a:schemeClr val="accent1">
+              <a:shade val="15000"/>
+            </a:schemeClr>
+          </a:lnRef>
+          <a:fillRef idx="1">
+            <a:schemeClr val="accent1"/>
+          </a:fillRef>
+          <a:effectRef idx="0">
+            <a:schemeClr val="accent1"/>
+          </a:effectRef>
+          <a:fontRef idx="minor">
+            <a:schemeClr val="lt1"/>
+          </a:fontRef>
+        </p:style>
+        <p:txBody>
+          <a:bodyPr rtlCol="0" anchor="ctr"/>
+          <a:lstStyle/>
+          <a:p>
+            <a:pPr algn="ctr"/>
+            <a:endParaRPr lang="nl-BE">
+              <a:solidFill>
+                <a:srgbClr val="F37C00"/>
+              </a:solidFill>
+            </a:endParaRPr>
+          </a:p>
+        </p:txBody>
+      </p:sp>
+      <p:sp>
+        <p:nvSpPr>
+          <p:cNvPr id="11" name="Tijdelijke aanduiding voor dianummer 10">
+            <a:extLst>
+              <a:ext uri="{FF2B5EF4-FFF2-40B4-BE49-F238E27FC236}">
+                <a16:creationId xmlns:a16="http://schemas.microsoft.com/office/drawing/2014/main" id="{FC0DD2B4-8FA4-9AC7-E1B0-6724A7DC2D1C}"/>
+              </a:ext>
+            </a:extLst>
+          </p:cNvPr>
+          <p:cNvSpPr>
+            <a:spLocks noGrp="1"/>
+          </p:cNvSpPr>
+          <p:nvPr>
+            <p:ph type="sldNum" sz="quarter" idx="12"/>
+          </p:nvPr>
+        </p:nvSpPr>
+        <p:spPr>
+          <a:xfrm>
+            <a:off x="11362267" y="6492875"/>
+            <a:ext cx="829733" cy="365125"/>
+          </a:xfrm>
+        </p:spPr>
+        <p:txBody>
+          <a:bodyPr/>
+          <a:lstStyle/>
+          <a:p>
+            <a:r>
+              <a:rPr lang="nl-BE" sz="2000" b="1" dirty="0">
+                <a:solidFill>
+                  <a:schemeClr val="bg1"/>
+                </a:solidFill>
+                <a:latin typeface="Inter"/>
+                <a:cs typeface="Arial" panose="020B0604020202020204" pitchFamily="34" charset="0"/>
+              </a:rPr>
+              <a:t>06/10</a:t>
+            </a:r>
+          </a:p>
+        </p:txBody>
+      </p:sp>
+      <p:pic>
+        <p:nvPicPr>
+          <p:cNvPr id="19" name="Afbeelding 18" descr="Afbeelding met cirkel, diagram, pixel&#10;&#10;Door AI gegenereerde inhoud is mogelijk onjuist.">
+            <a:extLst>
+              <a:ext uri="{FF2B5EF4-FFF2-40B4-BE49-F238E27FC236}">
+                <a16:creationId xmlns:a16="http://schemas.microsoft.com/office/drawing/2014/main" id="{6DB61B01-7A0E-1C48-C228-56CD5F262A89}"/>
+              </a:ext>
+            </a:extLst>
+          </p:cNvPr>
+          <p:cNvPicPr>
+            <a:picLocks noChangeAspect="1"/>
+          </p:cNvPicPr>
+          <p:nvPr/>
+        </p:nvPicPr>
+        <p:blipFill>
+          <a:blip r:embed="rId3">
+            <a:extLst>
+              <a:ext uri="{28A0092B-C50C-407E-A947-70E740481C1C}">
+                <a14:useLocalDpi xmlns:a14="http://schemas.microsoft.com/office/drawing/2010/main" val="0"/>
+              </a:ext>
+            </a:extLst>
+          </a:blip>
+          <a:stretch>
+            <a:fillRect/>
+          </a:stretch>
+        </p:blipFill>
+        <p:spPr>
+          <a:xfrm>
+            <a:off x="11203050" y="-56619"/>
+            <a:ext cx="1008000" cy="1008000"/>
+          </a:xfrm>
+          <a:prstGeom prst="rect">
+            <a:avLst/>
+          </a:prstGeom>
+        </p:spPr>
+      </p:pic>
+      <p:sp>
+        <p:nvSpPr>
+          <p:cNvPr id="17" name="Tekstvak 16">
+            <a:extLst>
+              <a:ext uri="{FF2B5EF4-FFF2-40B4-BE49-F238E27FC236}">
+                <a16:creationId xmlns:a16="http://schemas.microsoft.com/office/drawing/2014/main" id="{8CEC4065-FDB7-BC4D-E25B-AEAD97453264}"/>
+              </a:ext>
+            </a:extLst>
+          </p:cNvPr>
+          <p:cNvSpPr txBox="1"/>
+          <p:nvPr/>
+        </p:nvSpPr>
+        <p:spPr>
+          <a:xfrm>
+            <a:off x="0" y="6492875"/>
+            <a:ext cx="2725426" cy="369332"/>
+          </a:xfrm>
+          <a:prstGeom prst="rect">
+            <a:avLst/>
+          </a:prstGeom>
+          <a:noFill/>
+        </p:spPr>
+        <p:txBody>
+          <a:bodyPr wrap="square" rtlCol="0">
+            <a:spAutoFit/>
+          </a:bodyPr>
+          <a:lstStyle/>
+          <a:p>
+            <a:r>
+              <a:rPr lang="nl-BE" b="1" dirty="0">
+                <a:solidFill>
+                  <a:schemeClr val="bg1"/>
+                </a:solidFill>
+                <a:latin typeface="Inter"/>
+                <a:cs typeface="Arial" panose="020B0604020202020204" pitchFamily="34" charset="0"/>
+              </a:rPr>
+              <a:t>Spreker: </a:t>
+            </a:r>
+            <a:r>
+              <a:rPr lang="nl-BE" sz="1800" b="1" dirty="0">
+                <a:solidFill>
+                  <a:schemeClr val="bg1"/>
+                </a:solidFill>
+                <a:latin typeface="Inter"/>
+                <a:cs typeface="Arial" panose="020B0604020202020204" pitchFamily="34" charset="0"/>
+              </a:rPr>
+              <a:t>Vera Wise</a:t>
+            </a:r>
+          </a:p>
+        </p:txBody>
+      </p:sp>
+      <p:pic>
+        <p:nvPicPr>
+          <p:cNvPr id="2" name="Afbeelding 1" descr="Afbeelding met symbool&#10;&#10;Automatisch gegenereerde beschrijving">
+            <a:extLst>
+              <a:ext uri="{FF2B5EF4-FFF2-40B4-BE49-F238E27FC236}">
+                <a16:creationId xmlns:a16="http://schemas.microsoft.com/office/drawing/2014/main" id="{9CFD641F-ED8F-21BE-7E5C-A677768DBB8C}"/>
+              </a:ext>
+            </a:extLst>
+          </p:cNvPr>
+          <p:cNvPicPr>
+            <a:picLocks noChangeAspect="1"/>
+          </p:cNvPicPr>
+          <p:nvPr/>
+        </p:nvPicPr>
+        <p:blipFill>
+          <a:blip r:embed="rId4">
+            <a:extLst>
+              <a:ext uri="{28A0092B-C50C-407E-A947-70E740481C1C}">
+                <a14:useLocalDpi xmlns:a14="http://schemas.microsoft.com/office/drawing/2010/main" val="0"/>
+              </a:ext>
+            </a:extLst>
+          </a:blip>
+          <a:stretch>
+            <a:fillRect/>
+          </a:stretch>
+        </p:blipFill>
+        <p:spPr>
+          <a:xfrm>
+            <a:off x="5082675" y="2472825"/>
+            <a:ext cx="2160000" cy="2160000"/>
+          </a:xfrm>
+          <a:prstGeom prst="rect">
+            <a:avLst/>
+          </a:prstGeom>
+        </p:spPr>
+      </p:pic>
+      <p:sp>
+        <p:nvSpPr>
+          <p:cNvPr id="3" name="Tekstvak 2">
+            <a:extLst>
+              <a:ext uri="{FF2B5EF4-FFF2-40B4-BE49-F238E27FC236}">
+                <a16:creationId xmlns:a16="http://schemas.microsoft.com/office/drawing/2014/main" id="{98FB5733-FF59-94B4-FE4F-5A8CAC9643BC}"/>
+              </a:ext>
+            </a:extLst>
+          </p:cNvPr>
+          <p:cNvSpPr txBox="1"/>
+          <p:nvPr/>
+        </p:nvSpPr>
+        <p:spPr>
+          <a:xfrm>
+            <a:off x="1669290" y="2096776"/>
+            <a:ext cx="3227797" cy="584775"/>
+          </a:xfrm>
+          <a:prstGeom prst="rect">
+            <a:avLst/>
+          </a:prstGeom>
+          <a:noFill/>
+        </p:spPr>
+        <p:txBody>
+          <a:bodyPr wrap="square" rtlCol="0">
+            <a:spAutoFit/>
+          </a:bodyPr>
+          <a:lstStyle/>
+          <a:p>
+            <a:pPr algn="ctr"/>
+            <a:r>
+              <a:rPr lang="en-US" sz="3200" b="1" dirty="0">
+                <a:solidFill>
+                  <a:srgbClr val="8F7EB4"/>
+                </a:solidFill>
+                <a:latin typeface="Inter"/>
+              </a:rPr>
+              <a:t>Wat </a:t>
+            </a:r>
+            <a:r>
+              <a:rPr lang="en-US" sz="3200" b="1" dirty="0" err="1">
+                <a:solidFill>
+                  <a:srgbClr val="8F7EB4"/>
+                </a:solidFill>
+                <a:latin typeface="Inter"/>
+              </a:rPr>
+              <a:t>staat</a:t>
+            </a:r>
+            <a:r>
+              <a:rPr lang="en-US" sz="3200" b="1" dirty="0">
+                <a:solidFill>
+                  <a:srgbClr val="8F7EB4"/>
+                </a:solidFill>
+                <a:latin typeface="Inter"/>
+              </a:rPr>
+              <a:t> </a:t>
+            </a:r>
+            <a:r>
+              <a:rPr lang="en-US" sz="3200" b="1" dirty="0" err="1">
+                <a:solidFill>
+                  <a:srgbClr val="8F7EB4"/>
+                </a:solidFill>
+                <a:latin typeface="Inter"/>
+              </a:rPr>
+              <a:t>waar</a:t>
+            </a:r>
+            <a:r>
+              <a:rPr lang="en-US" sz="3200" b="1" dirty="0">
+                <a:solidFill>
+                  <a:srgbClr val="8F7EB4"/>
+                </a:solidFill>
+                <a:latin typeface="Inter"/>
+              </a:rPr>
+              <a:t>?</a:t>
+            </a:r>
+            <a:endParaRPr lang="nl-BE" sz="3200" b="1" dirty="0">
+              <a:solidFill>
+                <a:srgbClr val="8F7EB4"/>
+              </a:solidFill>
+              <a:latin typeface="Inter"/>
+              <a:cs typeface="Arial" panose="020B0604020202020204" pitchFamily="34" charset="0"/>
+            </a:endParaRPr>
+          </a:p>
+        </p:txBody>
+      </p:sp>
+      <p:sp>
+        <p:nvSpPr>
+          <p:cNvPr id="5" name="Tekstvak 4">
+            <a:extLst>
+              <a:ext uri="{FF2B5EF4-FFF2-40B4-BE49-F238E27FC236}">
+                <a16:creationId xmlns:a16="http://schemas.microsoft.com/office/drawing/2014/main" id="{40397355-42C2-65C8-D8F5-C3DE0E1417A8}"/>
+              </a:ext>
+            </a:extLst>
+          </p:cNvPr>
+          <p:cNvSpPr txBox="1"/>
+          <p:nvPr/>
+        </p:nvSpPr>
+        <p:spPr>
+          <a:xfrm>
+            <a:off x="1986077" y="4222045"/>
+            <a:ext cx="3705807" cy="584775"/>
+          </a:xfrm>
+          <a:prstGeom prst="rect">
+            <a:avLst/>
+          </a:prstGeom>
+          <a:noFill/>
+        </p:spPr>
+        <p:txBody>
+          <a:bodyPr wrap="square" rtlCol="0">
+            <a:spAutoFit/>
+          </a:bodyPr>
+          <a:lstStyle/>
+          <a:p>
+            <a:pPr algn="ctr"/>
+            <a:r>
+              <a:rPr lang="en-US" sz="3200" b="1" dirty="0">
+                <a:solidFill>
+                  <a:srgbClr val="8F7EB4"/>
+                </a:solidFill>
+                <a:latin typeface="Inter"/>
+              </a:rPr>
+              <a:t>Wat is </a:t>
+            </a:r>
+            <a:r>
+              <a:rPr lang="en-US" sz="3200" b="1" dirty="0" err="1">
+                <a:solidFill>
+                  <a:srgbClr val="8F7EB4"/>
+                </a:solidFill>
+                <a:latin typeface="Inter"/>
+              </a:rPr>
+              <a:t>overbelast</a:t>
+            </a:r>
+            <a:r>
+              <a:rPr lang="en-US" sz="3200" b="1" dirty="0">
+                <a:solidFill>
+                  <a:srgbClr val="8F7EB4"/>
+                </a:solidFill>
+                <a:latin typeface="Inter"/>
+              </a:rPr>
+              <a:t>?</a:t>
+            </a:r>
+            <a:endParaRPr lang="nl-BE" sz="3200" b="1" dirty="0">
+              <a:solidFill>
+                <a:srgbClr val="8F7EB4"/>
+              </a:solidFill>
+              <a:latin typeface="Inter"/>
+              <a:cs typeface="Arial" panose="020B0604020202020204" pitchFamily="34" charset="0"/>
+            </a:endParaRPr>
+          </a:p>
+        </p:txBody>
+      </p:sp>
+      <p:sp>
+        <p:nvSpPr>
+          <p:cNvPr id="7" name="Tekstvak 6">
+            <a:extLst>
+              <a:ext uri="{FF2B5EF4-FFF2-40B4-BE49-F238E27FC236}">
+                <a16:creationId xmlns:a16="http://schemas.microsoft.com/office/drawing/2014/main" id="{111EB66E-D621-AA3D-35C9-F5C37715C4C1}"/>
+              </a:ext>
+            </a:extLst>
+          </p:cNvPr>
+          <p:cNvSpPr txBox="1"/>
+          <p:nvPr/>
+        </p:nvSpPr>
+        <p:spPr>
+          <a:xfrm>
+            <a:off x="6330333" y="2266719"/>
+            <a:ext cx="4591096" cy="584775"/>
+          </a:xfrm>
+          <a:prstGeom prst="rect">
+            <a:avLst/>
+          </a:prstGeom>
+          <a:noFill/>
+        </p:spPr>
+        <p:txBody>
+          <a:bodyPr wrap="square" rtlCol="0">
+            <a:spAutoFit/>
+          </a:bodyPr>
+          <a:lstStyle/>
+          <a:p>
+            <a:pPr algn="ctr"/>
+            <a:r>
+              <a:rPr lang="nl-NL" sz="3200" b="1" dirty="0">
+                <a:solidFill>
+                  <a:srgbClr val="8F7EB4"/>
+                </a:solidFill>
+                <a:latin typeface="Inter"/>
+              </a:rPr>
+              <a:t>Wat staat er niet aan?</a:t>
+            </a:r>
+            <a:endParaRPr lang="nl-BE" sz="3200" b="1" dirty="0">
+              <a:solidFill>
+                <a:srgbClr val="8F7EB4"/>
+              </a:solidFill>
+              <a:latin typeface="Inter"/>
+              <a:cs typeface="Arial" panose="020B0604020202020204" pitchFamily="34" charset="0"/>
+            </a:endParaRPr>
+          </a:p>
+        </p:txBody>
+      </p:sp>
+      <p:sp>
+        <p:nvSpPr>
+          <p:cNvPr id="8" name="Tekstvak 7">
+            <a:extLst>
+              <a:ext uri="{FF2B5EF4-FFF2-40B4-BE49-F238E27FC236}">
+                <a16:creationId xmlns:a16="http://schemas.microsoft.com/office/drawing/2014/main" id="{B04BA883-C7C6-92D7-B1E3-EAE4A458069D}"/>
+              </a:ext>
+            </a:extLst>
+          </p:cNvPr>
+          <p:cNvSpPr txBox="1"/>
+          <p:nvPr/>
+        </p:nvSpPr>
+        <p:spPr>
+          <a:xfrm>
+            <a:off x="6965619" y="4520638"/>
+            <a:ext cx="4591096" cy="584775"/>
+          </a:xfrm>
+          <a:prstGeom prst="rect">
+            <a:avLst/>
+          </a:prstGeom>
+          <a:noFill/>
+        </p:spPr>
+        <p:txBody>
+          <a:bodyPr wrap="square" rtlCol="0">
+            <a:spAutoFit/>
+          </a:bodyPr>
+          <a:lstStyle/>
+          <a:p>
+            <a:pPr algn="ctr"/>
+            <a:r>
+              <a:rPr lang="nl-NL" sz="3200" b="1" dirty="0">
+                <a:solidFill>
+                  <a:srgbClr val="8F7EB4"/>
+                </a:solidFill>
+                <a:latin typeface="Inter"/>
+              </a:rPr>
+              <a:t>Is er nog genoeg plaats?</a:t>
+            </a:r>
+            <a:endParaRPr lang="nl-BE" sz="3200" b="1" dirty="0">
+              <a:solidFill>
+                <a:srgbClr val="8F7EB4"/>
+              </a:solidFill>
+              <a:latin typeface="Inter"/>
+              <a:cs typeface="Arial" panose="020B0604020202020204" pitchFamily="34" charset="0"/>
+            </a:endParaRPr>
+          </a:p>
+        </p:txBody>
+      </p:sp>
+    </p:spTree>
+    <p:extLst>
+      <p:ext uri="{BB962C8B-B14F-4D97-AF65-F5344CB8AC3E}">
+        <p14:creationId xmlns:p14="http://schemas.microsoft.com/office/powerpoint/2010/main" val="2918437992"/>
+      </p:ext>
+    </p:extLst>
+  </p:cSld>
+  <p:clrMapOvr>
+    <a:masterClrMapping/>
+  </p:clrMapOvr>
+  <mc:AlternateContent xmlns:mc="http://schemas.openxmlformats.org/markup-compatibility/2006" xmlns:p159="http://schemas.microsoft.com/office/powerpoint/2015/09/main">
+    <mc:Choice Requires="p159">
+      <p:transition spd="med">
+        <p159:morph option="byObject"/>
+      </p:transition>
+    </mc:Choice>
+    <mc:Fallback xmlns="">
+      <p:transition spd="med">
+        <p:fade/>
+      </p:transition>
+    </mc:Fallback>
+  </mc:AlternateContent>
+</p:sld>
+</file>
+
+<file path=ppt/slides/slide11.xml><?xml version="1.0" encoding="utf-8"?>
+<p:sld xmlns:a="http://schemas.openxmlformats.org/drawingml/2006/main" xmlns:r="http://schemas.openxmlformats.org/officeDocument/2006/relationships" xmlns:p="http://schemas.openxmlformats.org/presentationml/2006/main">
+  <p:cSld>
+    <p:spTree>
+      <p:nvGrpSpPr>
+        <p:cNvPr id="1" name="">
+          <a:extLst>
+            <a:ext uri="{FF2B5EF4-FFF2-40B4-BE49-F238E27FC236}">
               <a16:creationId xmlns:a16="http://schemas.microsoft.com/office/drawing/2014/main" id="{0F136276-032C-C7C3-A07C-6F0D5D1832D9}"/>
             </a:ext>
           </a:extLst>
@@ -7359,7 +8043,7 @@
 </p:sld>
 </file>
 
-<file path=ppt/slides/slide11.xml><?xml version="1.0" encoding="utf-8"?>
+<file path=ppt/slides/slide12.xml><?xml version="1.0" encoding="utf-8"?>
 <p:sld xmlns:a="http://schemas.openxmlformats.org/drawingml/2006/main" xmlns:r="http://schemas.openxmlformats.org/officeDocument/2006/relationships" xmlns:p="http://schemas.openxmlformats.org/presentationml/2006/main">
   <p:cSld>
     <p:spTree>
@@ -7889,7 +8573,7 @@
 </p:sld>
 </file>
 
-<file path=ppt/slides/slide12.xml><?xml version="1.0" encoding="utf-8"?>
+<file path=ppt/slides/slide13.xml><?xml version="1.0" encoding="utf-8"?>
 <p:sld xmlns:a="http://schemas.openxmlformats.org/drawingml/2006/main" xmlns:r="http://schemas.openxmlformats.org/officeDocument/2006/relationships" xmlns:p="http://schemas.openxmlformats.org/presentationml/2006/main">
   <p:cSld>
     <p:spTree>
@@ -9318,7 +10002,7 @@
 </p:sld>
 </file>
 
-<file path=ppt/slides/slide13.xml><?xml version="1.0" encoding="utf-8"?>
+<file path=ppt/slides/slide14.xml><?xml version="1.0" encoding="utf-8"?>
 <p:sld xmlns:a="http://schemas.openxmlformats.org/drawingml/2006/main" xmlns:r="http://schemas.openxmlformats.org/officeDocument/2006/relationships" xmlns:p="http://schemas.openxmlformats.org/presentationml/2006/main">
   <p:cSld>
     <p:spTree>
@@ -9688,7 +10372,7 @@
 </p:sld>
 </file>
 
-<file path=ppt/slides/slide14.xml><?xml version="1.0" encoding="utf-8"?>
+<file path=ppt/slides/slide15.xml><?xml version="1.0" encoding="utf-8"?>
 <p:sld xmlns:a="http://schemas.openxmlformats.org/drawingml/2006/main" xmlns:r="http://schemas.openxmlformats.org/officeDocument/2006/relationships" xmlns:p="http://schemas.openxmlformats.org/presentationml/2006/main">
   <p:cSld>
     <p:spTree>
@@ -11122,200 +11806,6 @@
     <p:extLst>
       <p:ext uri="{BB962C8B-B14F-4D97-AF65-F5344CB8AC3E}">
         <p14:creationId xmlns:p14="http://schemas.microsoft.com/office/powerpoint/2010/main" val="3302413249"/>
-      </p:ext>
-    </p:extLst>
-  </p:cSld>
-  <p:clrMapOvr>
-    <a:masterClrMapping/>
-  </p:clrMapOvr>
-  <mc:AlternateContent xmlns:mc="http://schemas.openxmlformats.org/markup-compatibility/2006">
-    <mc:Choice xmlns:p159="http://schemas.microsoft.com/office/powerpoint/2015/09/main" Requires="p159">
-      <p:transition spd="med">
-        <p159:morph option="byObject"/>
-      </p:transition>
-    </mc:Choice>
-    <mc:Fallback>
-      <p:transition spd="med">
-        <p:fade/>
-      </p:transition>
-    </mc:Fallback>
-  </mc:AlternateContent>
-</p:sld>
-</file>
-
-<file path=ppt/slides/slide15.xml><?xml version="1.0" encoding="utf-8"?>
-<p:sld xmlns:a="http://schemas.openxmlformats.org/drawingml/2006/main" xmlns:r="http://schemas.openxmlformats.org/officeDocument/2006/relationships" xmlns:p="http://schemas.openxmlformats.org/presentationml/2006/main">
-  <p:cSld>
-    <p:spTree>
-      <p:nvGrpSpPr>
-        <p:cNvPr id="1" name="">
-          <a:extLst>
-            <a:ext uri="{FF2B5EF4-FFF2-40B4-BE49-F238E27FC236}">
-              <a16:creationId xmlns:a16="http://schemas.microsoft.com/office/drawing/2014/main" id="{EEDB1805-9443-65C1-34CF-330F89F368C9}"/>
-            </a:ext>
-          </a:extLst>
-        </p:cNvPr>
-        <p:cNvGrpSpPr/>
-        <p:nvPr/>
-      </p:nvGrpSpPr>
-      <p:grpSpPr>
-        <a:xfrm>
-          <a:off x="0" y="0"/>
-          <a:ext cx="0" cy="0"/>
-          <a:chOff x="0" y="0"/>
-          <a:chExt cx="0" cy="0"/>
-        </a:xfrm>
-      </p:grpSpPr>
-      <p:sp>
-        <p:nvSpPr>
-          <p:cNvPr id="6" name="Rechthoek 5">
-            <a:extLst>
-              <a:ext uri="{FF2B5EF4-FFF2-40B4-BE49-F238E27FC236}">
-                <a16:creationId xmlns:a16="http://schemas.microsoft.com/office/drawing/2014/main" id="{7ED0E74A-E6FE-5658-590B-112CED66C1DD}"/>
-              </a:ext>
-            </a:extLst>
-          </p:cNvPr>
-          <p:cNvSpPr/>
-          <p:nvPr/>
-        </p:nvSpPr>
-        <p:spPr>
-          <a:xfrm>
-            <a:off x="0" y="0"/>
-            <a:ext cx="12192000" cy="6858001"/>
-          </a:xfrm>
-          <a:prstGeom prst="rect">
-            <a:avLst/>
-          </a:prstGeom>
-          <a:solidFill>
-            <a:srgbClr val="8F7EB4"/>
-          </a:solidFill>
-          <a:ln>
-            <a:solidFill>
-              <a:srgbClr val="8F7EB4"/>
-            </a:solidFill>
-          </a:ln>
-        </p:spPr>
-        <p:style>
-          <a:lnRef idx="2">
-            <a:schemeClr val="accent1">
-              <a:shade val="15000"/>
-            </a:schemeClr>
-          </a:lnRef>
-          <a:fillRef idx="1">
-            <a:schemeClr val="accent1"/>
-          </a:fillRef>
-          <a:effectRef idx="0">
-            <a:schemeClr val="accent1"/>
-          </a:effectRef>
-          <a:fontRef idx="minor">
-            <a:schemeClr val="lt1"/>
-          </a:fontRef>
-        </p:style>
-        <p:txBody>
-          <a:bodyPr rtlCol="0" anchor="ctr"/>
-          <a:lstStyle/>
-          <a:p>
-            <a:pPr algn="ctr"/>
-            <a:endParaRPr lang="nl-BE">
-              <a:solidFill>
-                <a:srgbClr val="F37C00"/>
-              </a:solidFill>
-            </a:endParaRPr>
-          </a:p>
-        </p:txBody>
-      </p:sp>
-      <p:pic>
-        <p:nvPicPr>
-          <p:cNvPr id="19" name="Afbeelding 18" descr="Afbeelding met cirkel, diagram, pixel&#10;&#10;Door AI gegenereerde inhoud is mogelijk onjuist.">
-            <a:extLst>
-              <a:ext uri="{FF2B5EF4-FFF2-40B4-BE49-F238E27FC236}">
-                <a16:creationId xmlns:a16="http://schemas.microsoft.com/office/drawing/2014/main" id="{4A7510FD-E48C-73ED-73EF-610E6A0A8BD2}"/>
-              </a:ext>
-            </a:extLst>
-          </p:cNvPr>
-          <p:cNvPicPr>
-            <a:picLocks noChangeAspect="1"/>
-          </p:cNvPicPr>
-          <p:nvPr/>
-        </p:nvPicPr>
-        <p:blipFill>
-          <a:blip r:embed="rId3">
-            <a:extLst>
-              <a:ext uri="{28A0092B-C50C-407E-A947-70E740481C1C}">
-                <a14:useLocalDpi xmlns:a14="http://schemas.microsoft.com/office/drawing/2010/main" val="0"/>
-              </a:ext>
-            </a:extLst>
-          </a:blip>
-          <a:stretch>
-            <a:fillRect/>
-          </a:stretch>
-        </p:blipFill>
-        <p:spPr>
-          <a:xfrm>
-            <a:off x="11203050" y="-56619"/>
-            <a:ext cx="1008000" cy="1008000"/>
-          </a:xfrm>
-          <a:prstGeom prst="rect">
-            <a:avLst/>
-          </a:prstGeom>
-        </p:spPr>
-      </p:pic>
-      <p:sp>
-        <p:nvSpPr>
-          <p:cNvPr id="2" name="Tekstvak 1">
-            <a:extLst>
-              <a:ext uri="{FF2B5EF4-FFF2-40B4-BE49-F238E27FC236}">
-                <a16:creationId xmlns:a16="http://schemas.microsoft.com/office/drawing/2014/main" id="{FEFE6F41-8CD3-3476-DF39-F9E97EDCF534}"/>
-              </a:ext>
-            </a:extLst>
-          </p:cNvPr>
-          <p:cNvSpPr txBox="1"/>
-          <p:nvPr/>
-        </p:nvSpPr>
-        <p:spPr>
-          <a:xfrm>
-            <a:off x="4029046" y="2459504"/>
-            <a:ext cx="4133908" cy="1938992"/>
-          </a:xfrm>
-          <a:prstGeom prst="rect">
-            <a:avLst/>
-          </a:prstGeom>
-          <a:noFill/>
-        </p:spPr>
-        <p:txBody>
-          <a:bodyPr wrap="square" rtlCol="0">
-            <a:spAutoFit/>
-          </a:bodyPr>
-          <a:lstStyle/>
-          <a:p>
-            <a:r>
-              <a:rPr lang="nl-BE" sz="12000" dirty="0">
-                <a:ln w="0">
-                  <a:solidFill>
-                    <a:schemeClr val="tx1"/>
-                  </a:solidFill>
-                </a:ln>
-                <a:solidFill>
-                  <a:srgbClr val="EFF7FB"/>
-                </a:solidFill>
-                <a:effectLst>
-                  <a:outerShdw blurRad="50800" dist="38100" dir="5400000" algn="t" rotWithShape="0">
-                    <a:prstClr val="black">
-                      <a:alpha val="40000"/>
-                    </a:prstClr>
-                  </a:outerShdw>
-                </a:effectLst>
-                <a:latin typeface="Inter"/>
-              </a:rPr>
-              <a:t>Demo</a:t>
-            </a:r>
-          </a:p>
-        </p:txBody>
-      </p:sp>
-    </p:spTree>
-    <p:extLst>
-      <p:ext uri="{BB962C8B-B14F-4D97-AF65-F5344CB8AC3E}">
-        <p14:creationId xmlns:p14="http://schemas.microsoft.com/office/powerpoint/2010/main" val="899992369"/>
       </p:ext>
     </p:extLst>
   </p:cSld>
@@ -11345,6 +11835,200 @@
         <p:cNvPr id="1" name="">
           <a:extLst>
             <a:ext uri="{FF2B5EF4-FFF2-40B4-BE49-F238E27FC236}">
+              <a16:creationId xmlns:a16="http://schemas.microsoft.com/office/drawing/2014/main" id="{EEDB1805-9443-65C1-34CF-330F89F368C9}"/>
+            </a:ext>
+          </a:extLst>
+        </p:cNvPr>
+        <p:cNvGrpSpPr/>
+        <p:nvPr/>
+      </p:nvGrpSpPr>
+      <p:grpSpPr>
+        <a:xfrm>
+          <a:off x="0" y="0"/>
+          <a:ext cx="0" cy="0"/>
+          <a:chOff x="0" y="0"/>
+          <a:chExt cx="0" cy="0"/>
+        </a:xfrm>
+      </p:grpSpPr>
+      <p:sp>
+        <p:nvSpPr>
+          <p:cNvPr id="6" name="Rechthoek 5">
+            <a:extLst>
+              <a:ext uri="{FF2B5EF4-FFF2-40B4-BE49-F238E27FC236}">
+                <a16:creationId xmlns:a16="http://schemas.microsoft.com/office/drawing/2014/main" id="{7ED0E74A-E6FE-5658-590B-112CED66C1DD}"/>
+              </a:ext>
+            </a:extLst>
+          </p:cNvPr>
+          <p:cNvSpPr/>
+          <p:nvPr/>
+        </p:nvSpPr>
+        <p:spPr>
+          <a:xfrm>
+            <a:off x="0" y="0"/>
+            <a:ext cx="12192000" cy="6858001"/>
+          </a:xfrm>
+          <a:prstGeom prst="rect">
+            <a:avLst/>
+          </a:prstGeom>
+          <a:solidFill>
+            <a:srgbClr val="8F7EB4"/>
+          </a:solidFill>
+          <a:ln>
+            <a:solidFill>
+              <a:srgbClr val="8F7EB4"/>
+            </a:solidFill>
+          </a:ln>
+        </p:spPr>
+        <p:style>
+          <a:lnRef idx="2">
+            <a:schemeClr val="accent1">
+              <a:shade val="15000"/>
+            </a:schemeClr>
+          </a:lnRef>
+          <a:fillRef idx="1">
+            <a:schemeClr val="accent1"/>
+          </a:fillRef>
+          <a:effectRef idx="0">
+            <a:schemeClr val="accent1"/>
+          </a:effectRef>
+          <a:fontRef idx="minor">
+            <a:schemeClr val="lt1"/>
+          </a:fontRef>
+        </p:style>
+        <p:txBody>
+          <a:bodyPr rtlCol="0" anchor="ctr"/>
+          <a:lstStyle/>
+          <a:p>
+            <a:pPr algn="ctr"/>
+            <a:endParaRPr lang="nl-BE">
+              <a:solidFill>
+                <a:srgbClr val="F37C00"/>
+              </a:solidFill>
+            </a:endParaRPr>
+          </a:p>
+        </p:txBody>
+      </p:sp>
+      <p:pic>
+        <p:nvPicPr>
+          <p:cNvPr id="19" name="Afbeelding 18" descr="Afbeelding met cirkel, diagram, pixel&#10;&#10;Door AI gegenereerde inhoud is mogelijk onjuist.">
+            <a:extLst>
+              <a:ext uri="{FF2B5EF4-FFF2-40B4-BE49-F238E27FC236}">
+                <a16:creationId xmlns:a16="http://schemas.microsoft.com/office/drawing/2014/main" id="{4A7510FD-E48C-73ED-73EF-610E6A0A8BD2}"/>
+              </a:ext>
+            </a:extLst>
+          </p:cNvPr>
+          <p:cNvPicPr>
+            <a:picLocks noChangeAspect="1"/>
+          </p:cNvPicPr>
+          <p:nvPr/>
+        </p:nvPicPr>
+        <p:blipFill>
+          <a:blip r:embed="rId3">
+            <a:extLst>
+              <a:ext uri="{28A0092B-C50C-407E-A947-70E740481C1C}">
+                <a14:useLocalDpi xmlns:a14="http://schemas.microsoft.com/office/drawing/2010/main" val="0"/>
+              </a:ext>
+            </a:extLst>
+          </a:blip>
+          <a:stretch>
+            <a:fillRect/>
+          </a:stretch>
+        </p:blipFill>
+        <p:spPr>
+          <a:xfrm>
+            <a:off x="11203050" y="-56619"/>
+            <a:ext cx="1008000" cy="1008000"/>
+          </a:xfrm>
+          <a:prstGeom prst="rect">
+            <a:avLst/>
+          </a:prstGeom>
+        </p:spPr>
+      </p:pic>
+      <p:sp>
+        <p:nvSpPr>
+          <p:cNvPr id="2" name="Tekstvak 1">
+            <a:extLst>
+              <a:ext uri="{FF2B5EF4-FFF2-40B4-BE49-F238E27FC236}">
+                <a16:creationId xmlns:a16="http://schemas.microsoft.com/office/drawing/2014/main" id="{FEFE6F41-8CD3-3476-DF39-F9E97EDCF534}"/>
+              </a:ext>
+            </a:extLst>
+          </p:cNvPr>
+          <p:cNvSpPr txBox="1"/>
+          <p:nvPr/>
+        </p:nvSpPr>
+        <p:spPr>
+          <a:xfrm>
+            <a:off x="4029046" y="2459504"/>
+            <a:ext cx="4133908" cy="1938992"/>
+          </a:xfrm>
+          <a:prstGeom prst="rect">
+            <a:avLst/>
+          </a:prstGeom>
+          <a:noFill/>
+        </p:spPr>
+        <p:txBody>
+          <a:bodyPr wrap="square" rtlCol="0">
+            <a:spAutoFit/>
+          </a:bodyPr>
+          <a:lstStyle/>
+          <a:p>
+            <a:r>
+              <a:rPr lang="nl-BE" sz="12000" dirty="0">
+                <a:ln w="0">
+                  <a:solidFill>
+                    <a:schemeClr val="tx1"/>
+                  </a:solidFill>
+                </a:ln>
+                <a:solidFill>
+                  <a:srgbClr val="EFF7FB"/>
+                </a:solidFill>
+                <a:effectLst>
+                  <a:outerShdw blurRad="50800" dist="38100" dir="5400000" algn="t" rotWithShape="0">
+                    <a:prstClr val="black">
+                      <a:alpha val="40000"/>
+                    </a:prstClr>
+                  </a:outerShdw>
+                </a:effectLst>
+                <a:latin typeface="Inter"/>
+              </a:rPr>
+              <a:t>Demo</a:t>
+            </a:r>
+          </a:p>
+        </p:txBody>
+      </p:sp>
+    </p:spTree>
+    <p:extLst>
+      <p:ext uri="{BB962C8B-B14F-4D97-AF65-F5344CB8AC3E}">
+        <p14:creationId xmlns:p14="http://schemas.microsoft.com/office/powerpoint/2010/main" val="899992369"/>
+      </p:ext>
+    </p:extLst>
+  </p:cSld>
+  <p:clrMapOvr>
+    <a:masterClrMapping/>
+  </p:clrMapOvr>
+  <mc:AlternateContent xmlns:mc="http://schemas.openxmlformats.org/markup-compatibility/2006" xmlns:p159="http://schemas.microsoft.com/office/powerpoint/2015/09/main">
+    <mc:Choice Requires="p159">
+      <p:transition spd="med">
+        <p159:morph option="byObject"/>
+      </p:transition>
+    </mc:Choice>
+    <mc:Fallback xmlns="">
+      <p:transition spd="med">
+        <p:fade/>
+      </p:transition>
+    </mc:Fallback>
+  </mc:AlternateContent>
+</p:sld>
+</file>
+
+<file path=ppt/slides/slide17.xml><?xml version="1.0" encoding="utf-8"?>
+<p:sld xmlns:a="http://schemas.openxmlformats.org/drawingml/2006/main" xmlns:r="http://schemas.openxmlformats.org/officeDocument/2006/relationships" xmlns:p="http://schemas.openxmlformats.org/presentationml/2006/main">
+  <p:cSld>
+    <p:spTree>
+      <p:nvGrpSpPr>
+        <p:cNvPr id="1" name="">
+          <a:extLst>
+            <a:ext uri="{FF2B5EF4-FFF2-40B4-BE49-F238E27FC236}">
               <a16:creationId xmlns:a16="http://schemas.microsoft.com/office/drawing/2014/main" id="{E1F78CB1-D9BC-11BB-39AE-A64FD11F2CAB}"/>
             </a:ext>
           </a:extLst>
@@ -11567,7 +12251,7 @@
 </p:sld>
 </file>
 
-<file path=ppt/slides/slide17.xml><?xml version="1.0" encoding="utf-8"?>
+<file path=ppt/slides/slide18.xml><?xml version="1.0" encoding="utf-8"?>
 <p:sld xmlns:a="http://schemas.openxmlformats.org/drawingml/2006/main" xmlns:r="http://schemas.openxmlformats.org/officeDocument/2006/relationships" xmlns:p="http://schemas.openxmlformats.org/presentationml/2006/main">
   <p:cSld>
     <p:spTree>
@@ -14492,7 +15176,7 @@
                 <a:latin typeface="Inter"/>
                 <a:cs typeface="Arial" panose="020B0604020202020204" pitchFamily="34" charset="0"/>
               </a:rPr>
-              <a:t>01/10</a:t>
+              <a:t>00/10</a:t>
             </a:r>
           </a:p>
         </p:txBody>
@@ -15116,7 +15800,7 @@
                 <a:latin typeface="Inter"/>
                 <a:cs typeface="Arial" panose="020B0604020202020204" pitchFamily="34" charset="0"/>
               </a:rPr>
-              <a:t>02/10</a:t>
+              <a:t>01/10</a:t>
             </a:r>
           </a:p>
         </p:txBody>
@@ -15818,7 +16502,7 @@
                 <a:latin typeface="Inter"/>
                 <a:cs typeface="Arial" panose="020B0604020202020204" pitchFamily="34" charset="0"/>
               </a:rPr>
-              <a:t>03/10</a:t>
+              <a:t>02/10</a:t>
             </a:r>
           </a:p>
         </p:txBody>
@@ -16529,7 +17213,7 @@
                 <a:latin typeface="Inter"/>
                 <a:cs typeface="Arial" panose="020B0604020202020204" pitchFamily="34" charset="0"/>
               </a:rPr>
-              <a:t>04/10</a:t>
+              <a:t>03/10</a:t>
             </a:r>
           </a:p>
         </p:txBody>
@@ -17096,7 +17780,21 @@
                 <a:latin typeface="Inter"/>
                 <a:cs typeface="Arial" panose="020B0604020202020204" pitchFamily="34" charset="0"/>
               </a:rPr>
-              <a:t>Wat is K10s</a:t>
+              <a:t>Wat is </a:t>
+            </a:r>
+            <a:r>
+              <a:rPr lang="nl-BE" sz="5000" b="1" dirty="0" err="1">
+                <a:latin typeface="Inter"/>
+                <a:cs typeface="Arial" panose="020B0604020202020204" pitchFamily="34" charset="0"/>
+              </a:rPr>
+              <a:t>Kubernetes</a:t>
+            </a:r>
+            <a:r>
+              <a:rPr lang="nl-BE" sz="5000" b="1" dirty="0">
+                <a:latin typeface="Inter"/>
+                <a:cs typeface="Arial" panose="020B0604020202020204" pitchFamily="34" charset="0"/>
+              </a:rPr>
+              <a:t>?</a:t>
             </a:r>
           </a:p>
         </p:txBody>
@@ -17193,7 +17891,7 @@
                 <a:latin typeface="Inter"/>
                 <a:cs typeface="Arial" panose="020B0604020202020204" pitchFamily="34" charset="0"/>
               </a:rPr>
-              <a:t>05/10</a:t>
+              <a:t>04/10</a:t>
             </a:r>
           </a:p>
         </p:txBody>
@@ -17287,10 +17985,10 @@
       </p:sp>
       <p:sp>
         <p:nvSpPr>
-          <p:cNvPr id="5" name="Tekstvak 4">
-            <a:extLst>
-              <a:ext uri="{FF2B5EF4-FFF2-40B4-BE49-F238E27FC236}">
-                <a16:creationId xmlns:a16="http://schemas.microsoft.com/office/drawing/2014/main" id="{C97C3E3D-335B-1712-6E69-0D1C99FD404A}"/>
+          <p:cNvPr id="3" name="Tekstvak 2">
+            <a:extLst>
+              <a:ext uri="{FF2B5EF4-FFF2-40B4-BE49-F238E27FC236}">
+                <a16:creationId xmlns:a16="http://schemas.microsoft.com/office/drawing/2014/main" id="{6FD9F529-1A44-55D9-CB25-C1807FAC023D}"/>
               </a:ext>
             </a:extLst>
           </p:cNvPr>
@@ -17299,7 +17997,188 @@
         </p:nvSpPr>
         <p:spPr>
           <a:xfrm>
-            <a:off x="7176000" y="4216614"/>
+            <a:off x="1058780" y="2340608"/>
+            <a:ext cx="3879404" cy="584775"/>
+          </a:xfrm>
+          <a:prstGeom prst="rect">
+            <a:avLst/>
+          </a:prstGeom>
+          <a:noFill/>
+        </p:spPr>
+        <p:txBody>
+          <a:bodyPr wrap="square" rtlCol="0">
+            <a:spAutoFit/>
+          </a:bodyPr>
+          <a:lstStyle/>
+          <a:p>
+            <a:pPr algn="ctr"/>
+            <a:r>
+              <a:rPr lang="nl-BE" sz="3200" b="1">
+                <a:solidFill>
+                  <a:srgbClr val="8F7EB4"/>
+                </a:solidFill>
+                <a:latin typeface="Inter"/>
+                <a:cs typeface="Arial" panose="020B0604020202020204" pitchFamily="34" charset="0"/>
+              </a:rPr>
+              <a:t>Containerorkestratie</a:t>
+            </a:r>
+            <a:endParaRPr lang="nl-BE" sz="3200" b="1" dirty="0">
+              <a:solidFill>
+                <a:srgbClr val="8F7EB4"/>
+              </a:solidFill>
+              <a:latin typeface="Inter"/>
+              <a:cs typeface="Arial" panose="020B0604020202020204" pitchFamily="34" charset="0"/>
+            </a:endParaRPr>
+          </a:p>
+        </p:txBody>
+      </p:sp>
+      <p:sp>
+        <p:nvSpPr>
+          <p:cNvPr id="7" name="Tekstvak 6">
+            <a:extLst>
+              <a:ext uri="{FF2B5EF4-FFF2-40B4-BE49-F238E27FC236}">
+                <a16:creationId xmlns:a16="http://schemas.microsoft.com/office/drawing/2014/main" id="{233ADDD9-9FDD-ADC8-ED2C-847672B45AA9}"/>
+              </a:ext>
+            </a:extLst>
+          </p:cNvPr>
+          <p:cNvSpPr txBox="1"/>
+          <p:nvPr/>
+        </p:nvSpPr>
+        <p:spPr>
+          <a:xfrm>
+            <a:off x="4737231" y="4782895"/>
+            <a:ext cx="3227797" cy="584775"/>
+          </a:xfrm>
+          <a:prstGeom prst="rect">
+            <a:avLst/>
+          </a:prstGeom>
+          <a:noFill/>
+        </p:spPr>
+        <p:txBody>
+          <a:bodyPr wrap="square" rtlCol="0">
+            <a:spAutoFit/>
+          </a:bodyPr>
+          <a:lstStyle/>
+          <a:p>
+            <a:pPr algn="ctr"/>
+            <a:r>
+              <a:rPr lang="en-US" sz="3200" b="1" dirty="0" err="1">
+                <a:solidFill>
+                  <a:srgbClr val="8F7EB4"/>
+                </a:solidFill>
+                <a:latin typeface="Inter"/>
+              </a:rPr>
+              <a:t>Automatisering</a:t>
+            </a:r>
+            <a:endParaRPr lang="nl-BE" sz="3200" b="1" dirty="0">
+              <a:solidFill>
+                <a:srgbClr val="8F7EB4"/>
+              </a:solidFill>
+              <a:latin typeface="Inter"/>
+              <a:cs typeface="Arial" panose="020B0604020202020204" pitchFamily="34" charset="0"/>
+            </a:endParaRPr>
+          </a:p>
+        </p:txBody>
+      </p:sp>
+      <p:sp>
+        <p:nvSpPr>
+          <p:cNvPr id="8" name="Tekstvak 7">
+            <a:extLst>
+              <a:ext uri="{FF2B5EF4-FFF2-40B4-BE49-F238E27FC236}">
+                <a16:creationId xmlns:a16="http://schemas.microsoft.com/office/drawing/2014/main" id="{D307EE5B-417A-2E7C-1885-3BDC1F104007}"/>
+              </a:ext>
+            </a:extLst>
+          </p:cNvPr>
+          <p:cNvSpPr txBox="1"/>
+          <p:nvPr/>
+        </p:nvSpPr>
+        <p:spPr>
+          <a:xfrm>
+            <a:off x="5484284" y="1651521"/>
+            <a:ext cx="3227797" cy="584775"/>
+          </a:xfrm>
+          <a:prstGeom prst="rect">
+            <a:avLst/>
+          </a:prstGeom>
+          <a:noFill/>
+        </p:spPr>
+        <p:txBody>
+          <a:bodyPr wrap="square" rtlCol="0">
+            <a:spAutoFit/>
+          </a:bodyPr>
+          <a:lstStyle/>
+          <a:p>
+            <a:pPr algn="ctr"/>
+            <a:r>
+              <a:rPr lang="en-US" sz="3200" b="1" dirty="0" err="1">
+                <a:solidFill>
+                  <a:srgbClr val="8F7EB4"/>
+                </a:solidFill>
+                <a:latin typeface="Inter"/>
+              </a:rPr>
+              <a:t>Schaalbaarheid</a:t>
+            </a:r>
+            <a:endParaRPr lang="nl-BE" sz="3200" b="1" dirty="0">
+              <a:solidFill>
+                <a:srgbClr val="8F7EB4"/>
+              </a:solidFill>
+              <a:latin typeface="Inter"/>
+              <a:cs typeface="Arial" panose="020B0604020202020204" pitchFamily="34" charset="0"/>
+            </a:endParaRPr>
+          </a:p>
+        </p:txBody>
+      </p:sp>
+      <p:pic>
+        <p:nvPicPr>
+          <p:cNvPr id="2" name="Afbeelding 1" descr="Afbeelding met symbool, cirkel, wiel&#10;&#10;Door AI gegenereerde inhoud is mogelijk onjuist.">
+            <a:extLst>
+              <a:ext uri="{FF2B5EF4-FFF2-40B4-BE49-F238E27FC236}">
+                <a16:creationId xmlns:a16="http://schemas.microsoft.com/office/drawing/2014/main" id="{2E555575-344D-08CE-8C83-F6A7F892B31A}"/>
+              </a:ext>
+            </a:extLst>
+          </p:cNvPr>
+          <p:cNvPicPr>
+            <a:picLocks noChangeAspect="1"/>
+          </p:cNvPicPr>
+          <p:nvPr/>
+        </p:nvPicPr>
+        <p:blipFill>
+          <a:blip r:embed="rId4">
+            <a:extLst>
+              <a:ext uri="{28A0092B-C50C-407E-A947-70E740481C1C}">
+                <a14:useLocalDpi xmlns:a14="http://schemas.microsoft.com/office/drawing/2010/main" val="0"/>
+              </a:ext>
+            </a:extLst>
+          </a:blip>
+          <a:stretch>
+            <a:fillRect/>
+          </a:stretch>
+        </p:blipFill>
+        <p:spPr>
+          <a:xfrm>
+            <a:off x="4938183" y="2337826"/>
+            <a:ext cx="2160000" cy="2160000"/>
+          </a:xfrm>
+          <a:prstGeom prst="rect">
+            <a:avLst/>
+          </a:prstGeom>
+        </p:spPr>
+      </p:pic>
+      <p:sp>
+        <p:nvSpPr>
+          <p:cNvPr id="10" name="Tekstvak 9">
+            <a:extLst>
+              <a:ext uri="{FF2B5EF4-FFF2-40B4-BE49-F238E27FC236}">
+                <a16:creationId xmlns:a16="http://schemas.microsoft.com/office/drawing/2014/main" id="{9207DFEC-60ED-0D03-7898-E4BF7601D23C}"/>
+              </a:ext>
+            </a:extLst>
+          </p:cNvPr>
+          <p:cNvSpPr txBox="1"/>
+          <p:nvPr/>
+        </p:nvSpPr>
+        <p:spPr>
+          <a:xfrm>
+            <a:off x="8549336" y="3913051"/>
             <a:ext cx="3227797" cy="584775"/>
           </a:xfrm>
           <a:prstGeom prst="rect">
@@ -17321,7 +18200,7 @@
                 </a:solidFill>
                 <a:latin typeface="Inter"/>
               </a:rPr>
-              <a:t>Visualization</a:t>
+              <a:t>Nodes</a:t>
             </a:r>
             <a:endParaRPr lang="nl-BE" sz="3200" b="1" dirty="0">
               <a:solidFill>
@@ -17335,10 +18214,10 @@
       </p:sp>
       <p:sp>
         <p:nvSpPr>
-          <p:cNvPr id="3" name="Tekstvak 2">
-            <a:extLst>
-              <a:ext uri="{FF2B5EF4-FFF2-40B4-BE49-F238E27FC236}">
-                <a16:creationId xmlns:a16="http://schemas.microsoft.com/office/drawing/2014/main" id="{6FD9F529-1A44-55D9-CB25-C1807FAC023D}"/>
+          <p:cNvPr id="12" name="Tekstvak 11">
+            <a:extLst>
+              <a:ext uri="{FF2B5EF4-FFF2-40B4-BE49-F238E27FC236}">
+                <a16:creationId xmlns:a16="http://schemas.microsoft.com/office/drawing/2014/main" id="{05BE7F48-D03C-3E57-6126-3B52B105546A}"/>
               </a:ext>
             </a:extLst>
           </p:cNvPr>
@@ -17347,8 +18226,8 @@
         </p:nvSpPr>
         <p:spPr>
           <a:xfrm>
-            <a:off x="1710386" y="2340608"/>
-            <a:ext cx="3227797" cy="1077218"/>
+            <a:off x="8549336" y="5120265"/>
+            <a:ext cx="3227797" cy="584775"/>
           </a:xfrm>
           <a:prstGeom prst="rect">
             <a:avLst/>
@@ -17369,7 +18248,7 @@
                 </a:solidFill>
                 <a:latin typeface="Inter"/>
               </a:rPr>
-              <a:t>Open Source (GitHub)</a:t>
+              <a:t>Services </a:t>
             </a:r>
             <a:endParaRPr lang="nl-BE" sz="3200" b="1" dirty="0">
               <a:solidFill>
@@ -17383,10 +18262,10 @@
       </p:sp>
       <p:sp>
         <p:nvSpPr>
-          <p:cNvPr id="7" name="Tekstvak 6">
-            <a:extLst>
-              <a:ext uri="{FF2B5EF4-FFF2-40B4-BE49-F238E27FC236}">
-                <a16:creationId xmlns:a16="http://schemas.microsoft.com/office/drawing/2014/main" id="{233ADDD9-9FDD-ADC8-ED2C-847672B45AA9}"/>
+          <p:cNvPr id="13" name="Tekstvak 12">
+            <a:extLst>
+              <a:ext uri="{FF2B5EF4-FFF2-40B4-BE49-F238E27FC236}">
+                <a16:creationId xmlns:a16="http://schemas.microsoft.com/office/drawing/2014/main" id="{D0ADFC37-A418-108C-8865-E2F885F1BB25}"/>
               </a:ext>
             </a:extLst>
           </p:cNvPr>
@@ -17395,7 +18274,7 @@
         </p:nvSpPr>
         <p:spPr>
           <a:xfrm>
-            <a:off x="2196161" y="4623775"/>
+            <a:off x="8549336" y="2692444"/>
             <a:ext cx="3227797" cy="584775"/>
           </a:xfrm>
           <a:prstGeom prst="rect">
@@ -17417,7 +18296,7 @@
                 </a:solidFill>
                 <a:latin typeface="Inter"/>
               </a:rPr>
-              <a:t>Management</a:t>
+              <a:t>Clusters</a:t>
             </a:r>
             <a:endParaRPr lang="nl-BE" sz="3200" b="1" dirty="0">
               <a:solidFill>
@@ -17429,99 +18308,152 @@
           </a:p>
         </p:txBody>
       </p:sp>
-      <p:sp>
-        <p:nvSpPr>
-          <p:cNvPr id="8" name="Tekstvak 7">
-            <a:extLst>
-              <a:ext uri="{FF2B5EF4-FFF2-40B4-BE49-F238E27FC236}">
-                <a16:creationId xmlns:a16="http://schemas.microsoft.com/office/drawing/2014/main" id="{D307EE5B-417A-2E7C-1885-3BDC1F104007}"/>
-              </a:ext>
-            </a:extLst>
-          </p:cNvPr>
-          <p:cNvSpPr txBox="1"/>
-          <p:nvPr/>
-        </p:nvSpPr>
-        <p:spPr>
-          <a:xfrm>
-            <a:off x="6358467" y="2056612"/>
-            <a:ext cx="3227797" cy="584775"/>
-          </a:xfrm>
-          <a:prstGeom prst="rect">
+      <p:cxnSp>
+        <p:nvCxnSpPr>
+          <p:cNvPr id="14" name="Rechte verbindingslijn 13">
+            <a:extLst>
+              <a:ext uri="{FF2B5EF4-FFF2-40B4-BE49-F238E27FC236}">
+                <a16:creationId xmlns:a16="http://schemas.microsoft.com/office/drawing/2014/main" id="{8AF84076-DFEE-CCD8-9A51-1BE2051E8ABB}"/>
+              </a:ext>
+            </a:extLst>
+          </p:cNvPr>
+          <p:cNvCxnSpPr>
+            <a:cxnSpLocks/>
+            <a:stCxn id="10" idx="0"/>
+            <a:endCxn id="13" idx="2"/>
+          </p:cNvCxnSpPr>
+          <p:nvPr/>
+        </p:nvCxnSpPr>
+        <p:spPr>
+          <a:xfrm flipV="1">
+            <a:off x="10163235" y="3277219"/>
+            <a:ext cx="0" cy="635832"/>
+          </a:xfrm>
+          <a:prstGeom prst="line">
             <a:avLst/>
           </a:prstGeom>
-          <a:noFill/>
-        </p:spPr>
-        <p:txBody>
-          <a:bodyPr wrap="square" rtlCol="0">
-            <a:spAutoFit/>
-          </a:bodyPr>
-          <a:lstStyle/>
-          <a:p>
-            <a:pPr algn="ctr"/>
-            <a:r>
-              <a:rPr lang="en-US" sz="3200" dirty="0">
-                <a:solidFill>
-                  <a:srgbClr val="8F7EB4"/>
-                </a:solidFill>
-                <a:latin typeface="Inter"/>
-              </a:rPr>
-              <a:t> </a:t>
-            </a:r>
-            <a:r>
-              <a:rPr lang="en-US" sz="3200" b="1" dirty="0">
-                <a:solidFill>
-                  <a:srgbClr val="8F7EB4"/>
-                </a:solidFill>
-                <a:latin typeface="Inter"/>
-              </a:rPr>
-              <a:t>Monitoring</a:t>
-            </a:r>
-            <a:endParaRPr lang="nl-BE" sz="3200" b="1" dirty="0">
-              <a:solidFill>
-                <a:srgbClr val="8F7EB4"/>
-              </a:solidFill>
-              <a:latin typeface="Inter"/>
-              <a:cs typeface="Arial" panose="020B0604020202020204" pitchFamily="34" charset="0"/>
-            </a:endParaRPr>
-          </a:p>
-        </p:txBody>
-      </p:sp>
-      <p:pic>
-        <p:nvPicPr>
-          <p:cNvPr id="9" name="Afbeelding 8" descr="Afbeelding met Rechthoek, schermopname, clipart, tekenfilm&#10;&#10;Automatisch gegenereerde beschrijving">
-            <a:extLst>
-              <a:ext uri="{FF2B5EF4-FFF2-40B4-BE49-F238E27FC236}">
-                <a16:creationId xmlns:a16="http://schemas.microsoft.com/office/drawing/2014/main" id="{A49F1F91-FFD3-74C5-0468-78B3F118A89B}"/>
-              </a:ext>
-            </a:extLst>
-          </p:cNvPr>
-          <p:cNvPicPr>
-            <a:picLocks noChangeAspect="1"/>
-          </p:cNvPicPr>
-          <p:nvPr/>
-        </p:nvPicPr>
-        <p:blipFill>
-          <a:blip r:embed="rId4">
-            <a:extLst>
-              <a:ext uri="{28A0092B-C50C-407E-A947-70E740481C1C}">
-                <a14:useLocalDpi xmlns:a14="http://schemas.microsoft.com/office/drawing/2010/main" val="0"/>
-              </a:ext>
-            </a:extLst>
-          </a:blip>
-          <a:stretch>
-            <a:fillRect/>
-          </a:stretch>
-        </p:blipFill>
-        <p:spPr>
-          <a:xfrm>
-            <a:off x="5016000" y="2349000"/>
-            <a:ext cx="2160000" cy="2160000"/>
-          </a:xfrm>
-          <a:prstGeom prst="rect">
+          <a:ln w="19050" cap="flat" cmpd="sng" algn="ctr">
+            <a:solidFill>
+              <a:srgbClr val="8F7EB4"/>
+            </a:solidFill>
+            <a:prstDash val="solid"/>
+            <a:round/>
+            <a:headEnd type="arrow" w="med" len="med"/>
+            <a:tailEnd type="arrow" w="med" len="med"/>
+          </a:ln>
+        </p:spPr>
+        <p:style>
+          <a:lnRef idx="0">
+            <a:scrgbClr r="0" g="0" b="0"/>
+          </a:lnRef>
+          <a:fillRef idx="0">
+            <a:scrgbClr r="0" g="0" b="0"/>
+          </a:fillRef>
+          <a:effectRef idx="0">
+            <a:scrgbClr r="0" g="0" b="0"/>
+          </a:effectRef>
+          <a:fontRef idx="minor">
+            <a:schemeClr val="tx1"/>
+          </a:fontRef>
+        </p:style>
+      </p:cxnSp>
+      <p:cxnSp>
+        <p:nvCxnSpPr>
+          <p:cNvPr id="18" name="Rechte verbindingslijn 17">
+            <a:extLst>
+              <a:ext uri="{FF2B5EF4-FFF2-40B4-BE49-F238E27FC236}">
+                <a16:creationId xmlns:a16="http://schemas.microsoft.com/office/drawing/2014/main" id="{0C2762B7-1132-270B-DD6F-1B71E726331B}"/>
+              </a:ext>
+            </a:extLst>
+          </p:cNvPr>
+          <p:cNvCxnSpPr>
+            <a:cxnSpLocks/>
+            <a:stCxn id="12" idx="0"/>
+            <a:endCxn id="10" idx="2"/>
+          </p:cNvCxnSpPr>
+          <p:nvPr/>
+        </p:nvCxnSpPr>
+        <p:spPr>
+          <a:xfrm flipV="1">
+            <a:off x="10163235" y="4497826"/>
+            <a:ext cx="0" cy="622439"/>
+          </a:xfrm>
+          <a:prstGeom prst="line">
             <a:avLst/>
           </a:prstGeom>
-        </p:spPr>
-      </p:pic>
+          <a:ln w="19050" cap="flat" cmpd="sng" algn="ctr">
+            <a:solidFill>
+              <a:srgbClr val="8F7EB4"/>
+            </a:solidFill>
+            <a:prstDash val="solid"/>
+            <a:round/>
+            <a:headEnd type="arrow" w="med" len="med"/>
+            <a:tailEnd type="arrow" w="med" len="med"/>
+          </a:ln>
+        </p:spPr>
+        <p:style>
+          <a:lnRef idx="0">
+            <a:scrgbClr r="0" g="0" b="0"/>
+          </a:lnRef>
+          <a:fillRef idx="0">
+            <a:scrgbClr r="0" g="0" b="0"/>
+          </a:fillRef>
+          <a:effectRef idx="0">
+            <a:scrgbClr r="0" g="0" b="0"/>
+          </a:effectRef>
+          <a:fontRef idx="minor">
+            <a:schemeClr val="tx1"/>
+          </a:fontRef>
+        </p:style>
+      </p:cxnSp>
+      <p:cxnSp>
+        <p:nvCxnSpPr>
+          <p:cNvPr id="33" name="Rechte verbindingslijn 32">
+            <a:extLst>
+              <a:ext uri="{FF2B5EF4-FFF2-40B4-BE49-F238E27FC236}">
+                <a16:creationId xmlns:a16="http://schemas.microsoft.com/office/drawing/2014/main" id="{3DE4C55F-C37C-CC50-3009-10D4A2539E41}"/>
+              </a:ext>
+            </a:extLst>
+          </p:cNvPr>
+          <p:cNvCxnSpPr>
+            <a:cxnSpLocks/>
+            <a:endCxn id="12" idx="2"/>
+          </p:cNvCxnSpPr>
+          <p:nvPr/>
+        </p:nvCxnSpPr>
+        <p:spPr>
+          <a:xfrm flipV="1">
+            <a:off x="10163234" y="5705040"/>
+            <a:ext cx="1" cy="916440"/>
+          </a:xfrm>
+          <a:prstGeom prst="line">
+            <a:avLst/>
+          </a:prstGeom>
+          <a:ln w="19050" cap="flat" cmpd="sng" algn="ctr">
+            <a:solidFill>
+              <a:srgbClr val="8F7EB4"/>
+            </a:solidFill>
+            <a:prstDash val="solid"/>
+            <a:round/>
+            <a:headEnd type="arrow" w="med" len="med"/>
+            <a:tailEnd type="arrow" w="med" len="med"/>
+          </a:ln>
+        </p:spPr>
+        <p:style>
+          <a:lnRef idx="0">
+            <a:scrgbClr r="0" g="0" b="0"/>
+          </a:lnRef>
+          <a:fillRef idx="0">
+            <a:scrgbClr r="0" g="0" b="0"/>
+          </a:fillRef>
+          <a:effectRef idx="0">
+            <a:scrgbClr r="0" g="0" b="0"/>
+          </a:effectRef>
+          <a:fontRef idx="minor">
+            <a:schemeClr val="tx1"/>
+          </a:fontRef>
+        </p:style>
+      </p:cxnSp>
     </p:spTree>
     <p:extLst>
       <p:ext uri="{BB962C8B-B14F-4D97-AF65-F5344CB8AC3E}">
@@ -17555,7 +18487,7 @@
         <p:cNvPr id="1" name="">
           <a:extLst>
             <a:ext uri="{FF2B5EF4-FFF2-40B4-BE49-F238E27FC236}">
-              <a16:creationId xmlns:a16="http://schemas.microsoft.com/office/drawing/2014/main" id="{1E6BA0BF-0B6E-B27E-449E-C698F222B9D3}"/>
+              <a16:creationId xmlns:a16="http://schemas.microsoft.com/office/drawing/2014/main" id="{42517A0D-63FC-C9A1-C8BC-93CD3650434E}"/>
             </a:ext>
           </a:extLst>
         </p:cNvPr>
@@ -17575,7 +18507,7 @@
           <p:cNvPr id="4" name="Rechthoek 3">
             <a:extLst>
               <a:ext uri="{FF2B5EF4-FFF2-40B4-BE49-F238E27FC236}">
-                <a16:creationId xmlns:a16="http://schemas.microsoft.com/office/drawing/2014/main" id="{BCDFE1E1-C879-FE23-8CA4-1A84C66644ED}"/>
+                <a16:creationId xmlns:a16="http://schemas.microsoft.com/office/drawing/2014/main" id="{31687040-3DFD-2F91-60E3-D2174D0EB4AA}"/>
               </a:ext>
             </a:extLst>
           </p:cNvPr>
@@ -17625,7 +18557,7 @@
                 <a:latin typeface="Inter"/>
                 <a:cs typeface="Arial" panose="020B0604020202020204" pitchFamily="34" charset="0"/>
               </a:rPr>
-              <a:t>Het Probleem</a:t>
+              <a:t>Wat is K10s</a:t>
             </a:r>
           </a:p>
         </p:txBody>
@@ -17635,7 +18567,7 @@
           <p:cNvPr id="6" name="Rechthoek 5">
             <a:extLst>
               <a:ext uri="{FF2B5EF4-FFF2-40B4-BE49-F238E27FC236}">
-                <a16:creationId xmlns:a16="http://schemas.microsoft.com/office/drawing/2014/main" id="{868D8A20-30B8-6F5C-4272-8468B6F44763}"/>
+                <a16:creationId xmlns:a16="http://schemas.microsoft.com/office/drawing/2014/main" id="{F9F6C999-25BF-1BA5-8669-11199F8D09AC}"/>
               </a:ext>
             </a:extLst>
           </p:cNvPr>
@@ -17693,7 +18625,7 @@
           <p:cNvPr id="11" name="Tijdelijke aanduiding voor dianummer 10">
             <a:extLst>
               <a:ext uri="{FF2B5EF4-FFF2-40B4-BE49-F238E27FC236}">
-                <a16:creationId xmlns:a16="http://schemas.microsoft.com/office/drawing/2014/main" id="{FC0DD2B4-8FA4-9AC7-E1B0-6724A7DC2D1C}"/>
+                <a16:creationId xmlns:a16="http://schemas.microsoft.com/office/drawing/2014/main" id="{1157E075-CC32-781D-3A88-364CEFC40A1D}"/>
               </a:ext>
             </a:extLst>
           </p:cNvPr>
@@ -17722,7 +18654,7 @@
                 <a:latin typeface="Inter"/>
                 <a:cs typeface="Arial" panose="020B0604020202020204" pitchFamily="34" charset="0"/>
               </a:rPr>
-              <a:t>06/10</a:t>
+              <a:t>05/10</a:t>
             </a:r>
           </a:p>
         </p:txBody>
@@ -17732,7 +18664,7 @@
           <p:cNvPr id="19" name="Afbeelding 18" descr="Afbeelding met cirkel, diagram, pixel&#10;&#10;Door AI gegenereerde inhoud is mogelijk onjuist.">
             <a:extLst>
               <a:ext uri="{FF2B5EF4-FFF2-40B4-BE49-F238E27FC236}">
-                <a16:creationId xmlns:a16="http://schemas.microsoft.com/office/drawing/2014/main" id="{6DB61B01-7A0E-1C48-C228-56CD5F262A89}"/>
+                <a16:creationId xmlns:a16="http://schemas.microsoft.com/office/drawing/2014/main" id="{027C0766-2F43-55DC-AC6E-17DD679E522C}"/>
               </a:ext>
             </a:extLst>
           </p:cNvPr>
@@ -17768,7 +18700,7 @@
           <p:cNvPr id="17" name="Tekstvak 16">
             <a:extLst>
               <a:ext uri="{FF2B5EF4-FFF2-40B4-BE49-F238E27FC236}">
-                <a16:creationId xmlns:a16="http://schemas.microsoft.com/office/drawing/2014/main" id="{8CEC4065-FDB7-BC4D-E25B-AEAD97453264}"/>
+                <a16:creationId xmlns:a16="http://schemas.microsoft.com/office/drawing/2014/main" id="{B4E1918B-715F-4F5D-3F67-A1627CD7E5E8}"/>
               </a:ext>
             </a:extLst>
           </p:cNvPr>
@@ -17814,48 +18746,12 @@
           </a:p>
         </p:txBody>
       </p:sp>
-      <p:pic>
-        <p:nvPicPr>
-          <p:cNvPr id="2" name="Afbeelding 1" descr="Afbeelding met symbool&#10;&#10;Automatisch gegenereerde beschrijving">
-            <a:extLst>
-              <a:ext uri="{FF2B5EF4-FFF2-40B4-BE49-F238E27FC236}">
-                <a16:creationId xmlns:a16="http://schemas.microsoft.com/office/drawing/2014/main" id="{9CFD641F-ED8F-21BE-7E5C-A677768DBB8C}"/>
-              </a:ext>
-            </a:extLst>
-          </p:cNvPr>
-          <p:cNvPicPr>
-            <a:picLocks noChangeAspect="1"/>
-          </p:cNvPicPr>
-          <p:nvPr/>
-        </p:nvPicPr>
-        <p:blipFill>
-          <a:blip r:embed="rId4">
-            <a:extLst>
-              <a:ext uri="{28A0092B-C50C-407E-A947-70E740481C1C}">
-                <a14:useLocalDpi xmlns:a14="http://schemas.microsoft.com/office/drawing/2010/main" val="0"/>
-              </a:ext>
-            </a:extLst>
-          </a:blip>
-          <a:stretch>
-            <a:fillRect/>
-          </a:stretch>
-        </p:blipFill>
-        <p:spPr>
-          <a:xfrm>
-            <a:off x="5082675" y="2472825"/>
-            <a:ext cx="2160000" cy="2160000"/>
-          </a:xfrm>
-          <a:prstGeom prst="rect">
-            <a:avLst/>
-          </a:prstGeom>
-        </p:spPr>
-      </p:pic>
-      <p:sp>
-        <p:nvSpPr>
-          <p:cNvPr id="3" name="Tekstvak 2">
-            <a:extLst>
-              <a:ext uri="{FF2B5EF4-FFF2-40B4-BE49-F238E27FC236}">
-                <a16:creationId xmlns:a16="http://schemas.microsoft.com/office/drawing/2014/main" id="{98FB5733-FF59-94B4-FE4F-5A8CAC9643BC}"/>
+      <p:sp>
+        <p:nvSpPr>
+          <p:cNvPr id="5" name="Tekstvak 4">
+            <a:extLst>
+              <a:ext uri="{FF2B5EF4-FFF2-40B4-BE49-F238E27FC236}">
+                <a16:creationId xmlns:a16="http://schemas.microsoft.com/office/drawing/2014/main" id="{5FF125C2-0183-8290-2758-515F39CE364A}"/>
               </a:ext>
             </a:extLst>
           </p:cNvPr>
@@ -17864,7 +18760,7 @@
         </p:nvSpPr>
         <p:spPr>
           <a:xfrm>
-            <a:off x="1669290" y="2096776"/>
+            <a:off x="7176000" y="4216614"/>
             <a:ext cx="3227797" cy="584775"/>
           </a:xfrm>
           <a:prstGeom prst="rect">
@@ -17886,16 +18782,151 @@
                 </a:solidFill>
                 <a:latin typeface="Inter"/>
               </a:rPr>
-              <a:t>Wat </a:t>
+              <a:t>Visualization</a:t>
             </a:r>
+            <a:endParaRPr lang="nl-BE" sz="3200" b="1" dirty="0">
+              <a:solidFill>
+                <a:srgbClr val="8F7EB4"/>
+              </a:solidFill>
+              <a:latin typeface="Inter"/>
+              <a:cs typeface="Arial" panose="020B0604020202020204" pitchFamily="34" charset="0"/>
+            </a:endParaRPr>
+          </a:p>
+        </p:txBody>
+      </p:sp>
+      <p:sp>
+        <p:nvSpPr>
+          <p:cNvPr id="3" name="Tekstvak 2">
+            <a:extLst>
+              <a:ext uri="{FF2B5EF4-FFF2-40B4-BE49-F238E27FC236}">
+                <a16:creationId xmlns:a16="http://schemas.microsoft.com/office/drawing/2014/main" id="{D6CE7932-8778-4C9C-959B-6CA252E7A3DA}"/>
+              </a:ext>
+            </a:extLst>
+          </p:cNvPr>
+          <p:cNvSpPr txBox="1"/>
+          <p:nvPr/>
+        </p:nvSpPr>
+        <p:spPr>
+          <a:xfrm>
+            <a:off x="1710386" y="2340608"/>
+            <a:ext cx="3227797" cy="1077218"/>
+          </a:xfrm>
+          <a:prstGeom prst="rect">
+            <a:avLst/>
+          </a:prstGeom>
+          <a:noFill/>
+        </p:spPr>
+        <p:txBody>
+          <a:bodyPr wrap="square" rtlCol="0">
+            <a:spAutoFit/>
+          </a:bodyPr>
+          <a:lstStyle/>
+          <a:p>
+            <a:pPr algn="ctr"/>
             <a:r>
-              <a:rPr lang="en-US" sz="3200" b="1" dirty="0" err="1">
+              <a:rPr lang="en-US" sz="3200" b="1" dirty="0">
                 <a:solidFill>
                   <a:srgbClr val="8F7EB4"/>
                 </a:solidFill>
                 <a:latin typeface="Inter"/>
               </a:rPr>
-              <a:t>staat</a:t>
+              <a:t>Open Source (GitHub)</a:t>
+            </a:r>
+            <a:endParaRPr lang="nl-BE" sz="3200" b="1" dirty="0">
+              <a:solidFill>
+                <a:srgbClr val="8F7EB4"/>
+              </a:solidFill>
+              <a:latin typeface="Inter"/>
+              <a:cs typeface="Arial" panose="020B0604020202020204" pitchFamily="34" charset="0"/>
+            </a:endParaRPr>
+          </a:p>
+        </p:txBody>
+      </p:sp>
+      <p:sp>
+        <p:nvSpPr>
+          <p:cNvPr id="7" name="Tekstvak 6">
+            <a:extLst>
+              <a:ext uri="{FF2B5EF4-FFF2-40B4-BE49-F238E27FC236}">
+                <a16:creationId xmlns:a16="http://schemas.microsoft.com/office/drawing/2014/main" id="{79B86957-7A65-40FB-01C7-34AA18DA15F5}"/>
+              </a:ext>
+            </a:extLst>
+          </p:cNvPr>
+          <p:cNvSpPr txBox="1"/>
+          <p:nvPr/>
+        </p:nvSpPr>
+        <p:spPr>
+          <a:xfrm>
+            <a:off x="2196161" y="4623775"/>
+            <a:ext cx="3227797" cy="584775"/>
+          </a:xfrm>
+          <a:prstGeom prst="rect">
+            <a:avLst/>
+          </a:prstGeom>
+          <a:noFill/>
+        </p:spPr>
+        <p:txBody>
+          <a:bodyPr wrap="square" rtlCol="0">
+            <a:spAutoFit/>
+          </a:bodyPr>
+          <a:lstStyle/>
+          <a:p>
+            <a:pPr algn="ctr"/>
+            <a:r>
+              <a:rPr lang="en-US" sz="3200" b="1" dirty="0">
+                <a:solidFill>
+                  <a:srgbClr val="8F7EB4"/>
+                </a:solidFill>
+                <a:latin typeface="Inter"/>
+              </a:rPr>
+              <a:t>Management</a:t>
+            </a:r>
+            <a:endParaRPr lang="nl-BE" sz="3200" b="1" dirty="0">
+              <a:solidFill>
+                <a:srgbClr val="8F7EB4"/>
+              </a:solidFill>
+              <a:latin typeface="Inter"/>
+              <a:cs typeface="Arial" panose="020B0604020202020204" pitchFamily="34" charset="0"/>
+            </a:endParaRPr>
+          </a:p>
+        </p:txBody>
+      </p:sp>
+      <p:sp>
+        <p:nvSpPr>
+          <p:cNvPr id="8" name="Tekstvak 7">
+            <a:extLst>
+              <a:ext uri="{FF2B5EF4-FFF2-40B4-BE49-F238E27FC236}">
+                <a16:creationId xmlns:a16="http://schemas.microsoft.com/office/drawing/2014/main" id="{2C7DC9C9-6087-ABE5-AA8B-CE5C69A953EA}"/>
+              </a:ext>
+            </a:extLst>
+          </p:cNvPr>
+          <p:cNvSpPr txBox="1"/>
+          <p:nvPr/>
+        </p:nvSpPr>
+        <p:spPr>
+          <a:xfrm>
+            <a:off x="6358467" y="2056612"/>
+            <a:ext cx="3227797" cy="584775"/>
+          </a:xfrm>
+          <a:prstGeom prst="rect">
+            <a:avLst/>
+          </a:prstGeom>
+          <a:noFill/>
+        </p:spPr>
+        <p:txBody>
+          <a:bodyPr wrap="square" rtlCol="0">
+            <a:spAutoFit/>
+          </a:bodyPr>
+          <a:lstStyle/>
+          <a:p>
+            <a:pPr algn="ctr"/>
+            <a:r>
+              <a:rPr lang="en-US" sz="3200" dirty="0">
+                <a:solidFill>
+                  <a:srgbClr val="8F7EB4"/>
+                </a:solidFill>
+                <a:latin typeface="Inter"/>
+              </a:rPr>
+              <a:t> </a:t>
             </a:r>
             <a:r>
               <a:rPr lang="en-US" sz="3200" b="1" dirty="0">
@@ -17904,25 +18935,7 @@
                 </a:solidFill>
                 <a:latin typeface="Inter"/>
               </a:rPr>
-              <a:t> </a:t>
-            </a:r>
-            <a:r>
-              <a:rPr lang="en-US" sz="3200" b="1" dirty="0" err="1">
-                <a:solidFill>
-                  <a:srgbClr val="8F7EB4"/>
-                </a:solidFill>
-                <a:latin typeface="Inter"/>
-              </a:rPr>
-              <a:t>waar</a:t>
-            </a:r>
-            <a:r>
-              <a:rPr lang="en-US" sz="3200" b="1" dirty="0">
-                <a:solidFill>
-                  <a:srgbClr val="8F7EB4"/>
-                </a:solidFill>
-                <a:latin typeface="Inter"/>
-              </a:rPr>
-              <a:t>?</a:t>
+              <a:t>Monitoring</a:t>
             </a:r>
             <a:endParaRPr lang="nl-BE" sz="3200" b="1" dirty="0">
               <a:solidFill>
@@ -17934,172 +18947,46 @@
           </a:p>
         </p:txBody>
       </p:sp>
-      <p:sp>
-        <p:nvSpPr>
-          <p:cNvPr id="5" name="Tekstvak 4">
-            <a:extLst>
-              <a:ext uri="{FF2B5EF4-FFF2-40B4-BE49-F238E27FC236}">
-                <a16:creationId xmlns:a16="http://schemas.microsoft.com/office/drawing/2014/main" id="{40397355-42C2-65C8-D8F5-C3DE0E1417A8}"/>
-              </a:ext>
-            </a:extLst>
-          </p:cNvPr>
-          <p:cNvSpPr txBox="1"/>
-          <p:nvPr/>
-        </p:nvSpPr>
-        <p:spPr>
-          <a:xfrm>
-            <a:off x="1986077" y="4222045"/>
-            <a:ext cx="3705807" cy="584775"/>
+      <p:pic>
+        <p:nvPicPr>
+          <p:cNvPr id="9" name="Afbeelding 8" descr="Afbeelding met Rechthoek, schermopname, clipart, tekenfilm&#10;&#10;Automatisch gegenereerde beschrijving">
+            <a:extLst>
+              <a:ext uri="{FF2B5EF4-FFF2-40B4-BE49-F238E27FC236}">
+                <a16:creationId xmlns:a16="http://schemas.microsoft.com/office/drawing/2014/main" id="{45CE1EF0-6F67-93E7-FB49-ABCD82DDF234}"/>
+              </a:ext>
+            </a:extLst>
+          </p:cNvPr>
+          <p:cNvPicPr>
+            <a:picLocks noChangeAspect="1"/>
+          </p:cNvPicPr>
+          <p:nvPr/>
+        </p:nvPicPr>
+        <p:blipFill>
+          <a:blip r:embed="rId4">
+            <a:extLst>
+              <a:ext uri="{28A0092B-C50C-407E-A947-70E740481C1C}">
+                <a14:useLocalDpi xmlns:a14="http://schemas.microsoft.com/office/drawing/2010/main" val="0"/>
+              </a:ext>
+            </a:extLst>
+          </a:blip>
+          <a:stretch>
+            <a:fillRect/>
+          </a:stretch>
+        </p:blipFill>
+        <p:spPr>
+          <a:xfrm>
+            <a:off x="5016000" y="2349000"/>
+            <a:ext cx="2160000" cy="2160000"/>
           </a:xfrm>
           <a:prstGeom prst="rect">
             <a:avLst/>
           </a:prstGeom>
-          <a:noFill/>
-        </p:spPr>
-        <p:txBody>
-          <a:bodyPr wrap="square" rtlCol="0">
-            <a:spAutoFit/>
-          </a:bodyPr>
-          <a:lstStyle/>
-          <a:p>
-            <a:pPr algn="ctr"/>
-            <a:r>
-              <a:rPr lang="en-US" sz="3200" b="1" dirty="0">
-                <a:solidFill>
-                  <a:srgbClr val="8F7EB4"/>
-                </a:solidFill>
-                <a:latin typeface="Inter"/>
-              </a:rPr>
-              <a:t>Wat is </a:t>
-            </a:r>
-            <a:r>
-              <a:rPr lang="en-US" sz="3200" b="1" dirty="0" err="1">
-                <a:solidFill>
-                  <a:srgbClr val="8F7EB4"/>
-                </a:solidFill>
-                <a:latin typeface="Inter"/>
-              </a:rPr>
-              <a:t>overbelast</a:t>
-            </a:r>
-            <a:r>
-              <a:rPr lang="en-US" sz="3200" b="1" dirty="0">
-                <a:solidFill>
-                  <a:srgbClr val="8F7EB4"/>
-                </a:solidFill>
-                <a:latin typeface="Inter"/>
-              </a:rPr>
-              <a:t>?</a:t>
-            </a:r>
-            <a:endParaRPr lang="nl-BE" sz="3200" b="1" dirty="0">
-              <a:solidFill>
-                <a:srgbClr val="8F7EB4"/>
-              </a:solidFill>
-              <a:latin typeface="Inter"/>
-              <a:cs typeface="Arial" panose="020B0604020202020204" pitchFamily="34" charset="0"/>
-            </a:endParaRPr>
-          </a:p>
-        </p:txBody>
-      </p:sp>
-      <p:sp>
-        <p:nvSpPr>
-          <p:cNvPr id="7" name="Tekstvak 6">
-            <a:extLst>
-              <a:ext uri="{FF2B5EF4-FFF2-40B4-BE49-F238E27FC236}">
-                <a16:creationId xmlns:a16="http://schemas.microsoft.com/office/drawing/2014/main" id="{111EB66E-D621-AA3D-35C9-F5C37715C4C1}"/>
-              </a:ext>
-            </a:extLst>
-          </p:cNvPr>
-          <p:cNvSpPr txBox="1"/>
-          <p:nvPr/>
-        </p:nvSpPr>
-        <p:spPr>
-          <a:xfrm>
-            <a:off x="6330333" y="2266719"/>
-            <a:ext cx="4591096" cy="584775"/>
-          </a:xfrm>
-          <a:prstGeom prst="rect">
-            <a:avLst/>
-          </a:prstGeom>
-          <a:noFill/>
-        </p:spPr>
-        <p:txBody>
-          <a:bodyPr wrap="square" rtlCol="0">
-            <a:spAutoFit/>
-          </a:bodyPr>
-          <a:lstStyle/>
-          <a:p>
-            <a:pPr algn="ctr"/>
-            <a:r>
-              <a:rPr lang="nl-NL" sz="3200" b="1" dirty="0">
-                <a:solidFill>
-                  <a:srgbClr val="8F7EB4"/>
-                </a:solidFill>
-                <a:latin typeface="Inter"/>
-              </a:rPr>
-              <a:t>Wat staat er niet aan?</a:t>
-            </a:r>
-            <a:endParaRPr lang="nl-BE" sz="3200" b="1" dirty="0">
-              <a:solidFill>
-                <a:srgbClr val="8F7EB4"/>
-              </a:solidFill>
-              <a:latin typeface="Inter"/>
-              <a:cs typeface="Arial" panose="020B0604020202020204" pitchFamily="34" charset="0"/>
-            </a:endParaRPr>
-          </a:p>
-        </p:txBody>
-      </p:sp>
-      <p:sp>
-        <p:nvSpPr>
-          <p:cNvPr id="8" name="Tekstvak 7">
-            <a:extLst>
-              <a:ext uri="{FF2B5EF4-FFF2-40B4-BE49-F238E27FC236}">
-                <a16:creationId xmlns:a16="http://schemas.microsoft.com/office/drawing/2014/main" id="{B04BA883-C7C6-92D7-B1E3-EAE4A458069D}"/>
-              </a:ext>
-            </a:extLst>
-          </p:cNvPr>
-          <p:cNvSpPr txBox="1"/>
-          <p:nvPr/>
-        </p:nvSpPr>
-        <p:spPr>
-          <a:xfrm>
-            <a:off x="6965619" y="4520638"/>
-            <a:ext cx="4591096" cy="584775"/>
-          </a:xfrm>
-          <a:prstGeom prst="rect">
-            <a:avLst/>
-          </a:prstGeom>
-          <a:noFill/>
-        </p:spPr>
-        <p:txBody>
-          <a:bodyPr wrap="square" rtlCol="0">
-            <a:spAutoFit/>
-          </a:bodyPr>
-          <a:lstStyle/>
-          <a:p>
-            <a:pPr algn="ctr"/>
-            <a:r>
-              <a:rPr lang="nl-NL" sz="3200" b="1" dirty="0">
-                <a:solidFill>
-                  <a:srgbClr val="8F7EB4"/>
-                </a:solidFill>
-                <a:latin typeface="Inter"/>
-              </a:rPr>
-              <a:t>Is er nog genoeg plaats?</a:t>
-            </a:r>
-            <a:endParaRPr lang="nl-BE" sz="3200" b="1" dirty="0">
-              <a:solidFill>
-                <a:srgbClr val="8F7EB4"/>
-              </a:solidFill>
-              <a:latin typeface="Inter"/>
-              <a:cs typeface="Arial" panose="020B0604020202020204" pitchFamily="34" charset="0"/>
-            </a:endParaRPr>
-          </a:p>
-        </p:txBody>
-      </p:sp>
+        </p:spPr>
+      </p:pic>
     </p:spTree>
     <p:extLst>
       <p:ext uri="{BB962C8B-B14F-4D97-AF65-F5344CB8AC3E}">
-        <p14:creationId xmlns:p14="http://schemas.microsoft.com/office/powerpoint/2010/main" val="2918437992"/>
+        <p14:creationId xmlns:p14="http://schemas.microsoft.com/office/powerpoint/2010/main" val="1509599139"/>
       </p:ext>
     </p:extLst>
   </p:cSld>

</xml_diff>